<commit_message>
added kmeans plot and labels
</commit_message>
<xml_diff>
--- a/poster/jpo4_poster.pptx
+++ b/poster/jpo4_poster.pptx
@@ -462,7 +462,7 @@
     </p:spTree>
     <p:extLst>
       <p:ext uri="{BB962C8B-B14F-4D97-AF65-F5344CB8AC3E}">
-        <p14:creationId xmlns="" xmlns:a="http://schemas.openxmlformats.org/drawingml/2006/main" xmlns:r="http://schemas.openxmlformats.org/officeDocument/2006/relationships" xmlns:p="http://schemas.openxmlformats.org/presentationml/2006/main" xmlns:p14="http://schemas.microsoft.com/office/powerpoint/2010/main" xmlns:mv="urn:schemas-microsoft-com:mac:vml" xmlns:mc="http://schemas.openxmlformats.org/markup-compatibility/2006" val="2638942905"/>
+        <p14:creationId xmlns:mc="http://schemas.openxmlformats.org/markup-compatibility/2006" xmlns:mv="urn:schemas-microsoft-com:mac:vml" xmlns:p14="http://schemas.microsoft.com/office/powerpoint/2010/main" xmlns:p="http://schemas.openxmlformats.org/presentationml/2006/main" xmlns:r="http://schemas.openxmlformats.org/officeDocument/2006/relationships" xmlns:a="http://schemas.openxmlformats.org/drawingml/2006/main" xmlns="" val="2638942905"/>
       </p:ext>
     </p:extLst>
   </p:cSld>
@@ -8384,6 +8384,30 @@
           <a:xfrm>
             <a:off x="19720684" y="17741204"/>
             <a:ext cx="8505067" cy="12577779"/>
+          </a:xfrm>
+          <a:prstGeom prst="rect">
+            <a:avLst/>
+          </a:prstGeom>
+        </p:spPr>
+      </p:pic>
+      <p:pic>
+        <p:nvPicPr>
+          <p:cNvPr id="13" name="Picture 12" descr="kmeans2.eps.png"/>
+          <p:cNvPicPr>
+            <a:picLocks noChangeAspect="1"/>
+          </p:cNvPicPr>
+          <p:nvPr/>
+        </p:nvPicPr>
+        <p:blipFill>
+          <a:blip r:embed="rId6"/>
+          <a:stretch>
+            <a:fillRect/>
+          </a:stretch>
+        </p:blipFill>
+        <p:spPr>
+          <a:xfrm>
+            <a:off x="28225750" y="7542898"/>
+            <a:ext cx="10338497" cy="13373182"/>
           </a:xfrm>
           <a:prstGeom prst="rect">
             <a:avLst/>

</xml_diff>

<commit_message>
put k means data in graph
</commit_message>
<xml_diff>
--- a/poster/jpo4_poster.pptx
+++ b/poster/jpo4_poster.pptx
@@ -8406,7 +8406,7 @@
         </p:blipFill>
         <p:spPr>
           <a:xfrm>
-            <a:off x="28225750" y="7542898"/>
+            <a:off x="28225750" y="5019831"/>
             <a:ext cx="10338497" cy="13373182"/>
           </a:xfrm>
           <a:prstGeom prst="rect">
@@ -8430,7 +8430,7 @@
         </p:blipFill>
         <p:spPr>
           <a:xfrm>
-            <a:off x="28225751" y="13488304"/>
+            <a:off x="28225750" y="10113804"/>
             <a:ext cx="10409675" cy="13470119"/>
           </a:xfrm>
           <a:prstGeom prst="rect">
@@ -8438,6 +8438,1057 @@
           </a:prstGeom>
         </p:spPr>
       </p:pic>
+      <p:graphicFrame>
+        <p:nvGraphicFramePr>
+          <p:cNvPr id="16" name="Table 15"/>
+          <p:cNvGraphicFramePr>
+            <a:graphicFrameLocks noGrp="1"/>
+          </p:cNvGraphicFramePr>
+          <p:nvPr/>
+        </p:nvGraphicFramePr>
+        <p:xfrm>
+          <a:off x="10282767" y="6773333"/>
+          <a:ext cx="8276168" cy="6075678"/>
+        </p:xfrm>
+        <a:graphic>
+          <a:graphicData uri="http://schemas.openxmlformats.org/drawingml/2006/table">
+            <a:tbl>
+              <a:tblPr firstRow="1" bandRow="1">
+                <a:tableStyleId>{D7AC3CCA-C797-4891-BE02-D94E43425B78}</a:tableStyleId>
+              </a:tblPr>
+              <a:tblGrid>
+                <a:gridCol w="1028700"/>
+                <a:gridCol w="1794933"/>
+                <a:gridCol w="4021667"/>
+                <a:gridCol w="1430868"/>
+              </a:tblGrid>
+              <a:tr h="601133">
+                <a:tc>
+                  <a:txBody>
+                    <a:bodyPr/>
+                    <a:lstStyle/>
+                    <a:p>
+                      <a:pPr algn="ctr"/>
+                      <a:r>
+                        <a:rPr lang="en-US" sz="1600"/>
+                        <a:t>#</a:t>
+                      </a:r>
+                      <a:r>
+                        <a:rPr lang="en-US" sz="1600" baseline="0"/>
+                        <a:t> Mixtures</a:t>
+                      </a:r>
+                      <a:endParaRPr lang="en-US" sz="1600" b="1"/>
+                    </a:p>
+                  </a:txBody>
+                  <a:tcPr anchor="ctr"/>
+                </a:tc>
+                <a:tc>
+                  <a:txBody>
+                    <a:bodyPr/>
+                    <a:lstStyle/>
+                    <a:p>
+                      <a:pPr algn="ctr"/>
+                      <a:r>
+                        <a:rPr lang="en-US" sz="1600"/>
+                        <a:t>K Means Features</a:t>
+                      </a:r>
+                      <a:endParaRPr lang="en-US" sz="1600" b="1"/>
+                    </a:p>
+                  </a:txBody>
+                  <a:tcPr anchor="ctr"/>
+                </a:tc>
+                <a:tc>
+                  <a:txBody>
+                    <a:bodyPr/>
+                    <a:lstStyle/>
+                    <a:p>
+                      <a:pPr algn="ctr"/>
+                      <a:r>
+                        <a:rPr lang="en-US" sz="2000"/>
+                        <a:t>β</a:t>
+                      </a:r>
+                      <a:r>
+                        <a:rPr lang="en-US" sz="2000" baseline="-25000"/>
+                        <a:t>1 </a:t>
+                      </a:r>
+                      <a:r>
+                        <a:rPr lang="en-US" sz="2000" baseline="0"/>
+                        <a:t>… </a:t>
+                      </a:r>
+                      <a:r>
+                        <a:rPr lang="en-US" sz="2000"/>
+                        <a:t>β</a:t>
+                      </a:r>
+                      <a:r>
+                        <a:rPr lang="en-US" sz="2000" baseline="-25000"/>
+                        <a:t>K</a:t>
+                      </a:r>
+                      <a:endParaRPr lang="en-US" sz="2000" b="1"/>
+                    </a:p>
+                  </a:txBody>
+                  <a:tcPr anchor="ctr"/>
+                </a:tc>
+                <a:tc>
+                  <a:txBody>
+                    <a:bodyPr/>
+                    <a:lstStyle/>
+                    <a:p>
+                      <a:pPr algn="ctr"/>
+                      <a:r>
+                        <a:rPr lang="en-US" sz="1600"/>
+                        <a:t>Discounted</a:t>
+                      </a:r>
+                    </a:p>
+                    <a:p>
+                      <a:pPr algn="ctr"/>
+                      <a:r>
+                        <a:rPr lang="en-US" sz="1600"/>
+                        <a:t>Cumulative</a:t>
+                      </a:r>
+                    </a:p>
+                    <a:p>
+                      <a:pPr algn="ctr"/>
+                      <a:r>
+                        <a:rPr lang="en-US" sz="1600"/>
+                        <a:t>Gain</a:t>
+                      </a:r>
+                      <a:endParaRPr lang="en-US" sz="1600" b="1"/>
+                    </a:p>
+                  </a:txBody>
+                  <a:tcPr anchor="ctr"/>
+                </a:tc>
+              </a:tr>
+              <a:tr h="601133">
+                <a:tc>
+                  <a:txBody>
+                    <a:bodyPr/>
+                    <a:lstStyle/>
+                    <a:p>
+                      <a:pPr algn="ctr"/>
+                      <a:r>
+                        <a:rPr lang="en-US" sz="1600"/>
+                        <a:t>2</a:t>
+                      </a:r>
+                      <a:endParaRPr lang="en-US" sz="1600" b="0"/>
+                    </a:p>
+                  </a:txBody>
+                  <a:tcPr anchor="ctr"/>
+                </a:tc>
+                <a:tc>
+                  <a:txBody>
+                    <a:bodyPr/>
+                    <a:lstStyle/>
+                    <a:p>
+                      <a:pPr algn="ctr"/>
+                      <a:r>
+                        <a:rPr lang="en-US" sz="1600"/>
+                        <a:t>Catches</a:t>
+                      </a:r>
+                      <a:br>
+                        <a:rPr lang="en-US" sz="1600"/>
+                      </a:br>
+                      <a:r>
+                        <a:rPr lang="en-US" sz="1600"/>
+                        <a:t>Fantasy</a:t>
+                      </a:r>
+                      <a:r>
+                        <a:rPr lang="en-US" sz="1600" baseline="0"/>
+                        <a:t> Points</a:t>
+                      </a:r>
+                      <a:endParaRPr lang="en-US" sz="1600" b="0" baseline="0"/>
+                    </a:p>
+                  </a:txBody>
+                  <a:tcPr anchor="ctr"/>
+                </a:tc>
+                <a:tc>
+                  <a:txBody>
+                    <a:bodyPr/>
+                    <a:lstStyle/>
+                    <a:p>
+                      <a:pPr algn="ctr"/>
+                      <a:r>
+                        <a:rPr lang="en-US" sz="1600"/>
+                        <a:t>β</a:t>
+                      </a:r>
+                      <a:r>
+                        <a:rPr lang="en-US" sz="1600" baseline="-25000"/>
+                        <a:t>1 </a:t>
+                      </a:r>
+                      <a:r>
+                        <a:rPr lang="en-US" sz="1600" baseline="0"/>
+                        <a:t>= [-3.57, 0.46, 26.96, -0.025, 1.91, 8.75]</a:t>
+                      </a:r>
+                      <a:r>
+                        <a:rPr lang="en-US" sz="1600" baseline="-25000"/>
+                        <a:t/>
+                      </a:r>
+                      <a:br>
+                        <a:rPr lang="en-US" sz="1600" baseline="-25000"/>
+                      </a:br>
+                      <a:r>
+                        <a:rPr lang="en-US" sz="1600"/>
+                        <a:t>β</a:t>
+                      </a:r>
+                      <a:r>
+                        <a:rPr lang="en-US" sz="1600" baseline="-25000"/>
+                        <a:t>2 </a:t>
+                      </a:r>
+                      <a:r>
+                        <a:rPr lang="en-US" sz="1600" baseline="0"/>
+                        <a:t>= [-7.38, 0.92, 41.55, -0.094, 1.61, 6.85]</a:t>
+                      </a:r>
+                      <a:endParaRPr lang="en-US" sz="1600" b="0"/>
+                    </a:p>
+                  </a:txBody>
+                  <a:tcPr anchor="ctr"/>
+                </a:tc>
+                <a:tc>
+                  <a:txBody>
+                    <a:bodyPr/>
+                    <a:lstStyle/>
+                    <a:p>
+                      <a:pPr algn="ctr"/>
+                      <a:r>
+                        <a:rPr lang="en-US" sz="1600"/>
+                        <a:t>1.7601</a:t>
+                      </a:r>
+                      <a:endParaRPr lang="en-US" sz="1600" b="0"/>
+                    </a:p>
+                  </a:txBody>
+                  <a:tcPr anchor="ctr"/>
+                </a:tc>
+              </a:tr>
+              <a:tr h="601133">
+                <a:tc>
+                  <a:txBody>
+                    <a:bodyPr/>
+                    <a:lstStyle/>
+                    <a:p>
+                      <a:pPr algn="ctr"/>
+                      <a:r>
+                        <a:rPr lang="en-US" sz="1600"/>
+                        <a:t>2</a:t>
+                      </a:r>
+                      <a:endParaRPr lang="en-US" sz="1600" b="0"/>
+                    </a:p>
+                  </a:txBody>
+                  <a:tcPr anchor="ctr"/>
+                </a:tc>
+                <a:tc>
+                  <a:txBody>
+                    <a:bodyPr/>
+                    <a:lstStyle/>
+                    <a:p>
+                      <a:pPr algn="ctr"/>
+                      <a:r>
+                        <a:rPr lang="en-US" sz="1600"/>
+                        <a:t>Fantasy Points</a:t>
+                      </a:r>
+                      <a:endParaRPr lang="en-US" sz="1600" b="0"/>
+                    </a:p>
+                  </a:txBody>
+                  <a:tcPr anchor="ctr"/>
+                </a:tc>
+                <a:tc>
+                  <a:txBody>
+                    <a:bodyPr/>
+                    <a:lstStyle/>
+                    <a:p>
+                      <a:pPr marL="0" marR="0" indent="0" algn="ctr" defTabSz="457105" rtl="0" eaLnBrk="1" fontAlgn="auto" latinLnBrk="0" hangingPunct="1">
+                        <a:lnSpc>
+                          <a:spcPct val="100000"/>
+                        </a:lnSpc>
+                        <a:spcBef>
+                          <a:spcPts val="0"/>
+                        </a:spcBef>
+                        <a:spcAft>
+                          <a:spcPts val="0"/>
+                        </a:spcAft>
+                        <a:buClrTx/>
+                        <a:buSzTx/>
+                        <a:buFontTx/>
+                        <a:buNone/>
+                        <a:tabLst/>
+                        <a:defRPr/>
+                      </a:pPr>
+                      <a:r>
+                        <a:rPr lang="en-US" sz="1600"/>
+                        <a:t>β</a:t>
+                      </a:r>
+                      <a:r>
+                        <a:rPr lang="en-US" sz="1600" baseline="-25000"/>
+                        <a:t>1 </a:t>
+                      </a:r>
+                      <a:r>
+                        <a:rPr lang="en-US" sz="1600" baseline="0"/>
+                        <a:t>= [-3.57, 0.46, 26.97, -0.025, 1.91, 8.75]</a:t>
+                      </a:r>
+                      <a:r>
+                        <a:rPr lang="en-US" sz="1600" baseline="-25000"/>
+                        <a:t/>
+                      </a:r>
+                      <a:br>
+                        <a:rPr lang="en-US" sz="1600" baseline="-25000"/>
+                      </a:br>
+                      <a:r>
+                        <a:rPr lang="en-US" sz="1600"/>
+                        <a:t>β</a:t>
+                      </a:r>
+                      <a:r>
+                        <a:rPr lang="en-US" sz="1600" baseline="-25000"/>
+                        <a:t>2 </a:t>
+                      </a:r>
+                      <a:r>
+                        <a:rPr lang="en-US" sz="1600" baseline="0"/>
+                        <a:t>= [-7.38, 0.92, 41.55, -0.094, 1.61, 6.85]</a:t>
+                      </a:r>
+                      <a:endParaRPr lang="en-US" sz="1600" b="0"/>
+                    </a:p>
+                  </a:txBody>
+                  <a:tcPr anchor="ctr"/>
+                </a:tc>
+                <a:tc>
+                  <a:txBody>
+                    <a:bodyPr/>
+                    <a:lstStyle/>
+                    <a:p>
+                      <a:pPr algn="ctr"/>
+                      <a:r>
+                        <a:rPr lang="en-US" sz="1600"/>
+                        <a:t>1.7601</a:t>
+                      </a:r>
+                      <a:endParaRPr lang="en-US" sz="1600" b="0"/>
+                    </a:p>
+                  </a:txBody>
+                  <a:tcPr anchor="ctr"/>
+                </a:tc>
+              </a:tr>
+              <a:tr h="601133">
+                <a:tc>
+                  <a:txBody>
+                    <a:bodyPr/>
+                    <a:lstStyle/>
+                    <a:p>
+                      <a:pPr algn="ctr"/>
+                      <a:r>
+                        <a:rPr lang="en-US" sz="1600"/>
+                        <a:t>3</a:t>
+                      </a:r>
+                      <a:endParaRPr lang="en-US" sz="1600" b="0"/>
+                    </a:p>
+                  </a:txBody>
+                  <a:tcPr anchor="ctr"/>
+                </a:tc>
+                <a:tc>
+                  <a:txBody>
+                    <a:bodyPr/>
+                    <a:lstStyle/>
+                    <a:p>
+                      <a:pPr algn="ctr"/>
+                      <a:r>
+                        <a:rPr lang="en-US" sz="1600"/>
+                        <a:t>Fantasy Points</a:t>
+                      </a:r>
+                      <a:endParaRPr lang="en-US" sz="1600" b="0"/>
+                    </a:p>
+                  </a:txBody>
+                  <a:tcPr anchor="ctr"/>
+                </a:tc>
+                <a:tc>
+                  <a:txBody>
+                    <a:bodyPr/>
+                    <a:lstStyle/>
+                    <a:p>
+                      <a:pPr algn="ctr"/>
+                      <a:r>
+                        <a:rPr lang="en-US" sz="1600"/>
+                        <a:t>β</a:t>
+                      </a:r>
+                      <a:r>
+                        <a:rPr lang="en-US" sz="1600" baseline="-25000"/>
+                        <a:t>1 </a:t>
+                      </a:r>
+                      <a:r>
+                        <a:rPr lang="en-US" sz="1600" baseline="0"/>
+                        <a:t>= [-1.71, 0.37, 23.83, -0.01, 2.24, 71.3]</a:t>
+                      </a:r>
+                      <a:r>
+                        <a:rPr lang="en-US" sz="1600" baseline="-25000"/>
+                        <a:t/>
+                      </a:r>
+                      <a:br>
+                        <a:rPr lang="en-US" sz="1600" baseline="-25000"/>
+                      </a:br>
+                      <a:r>
+                        <a:rPr lang="en-US" sz="1600"/>
+                        <a:t>β</a:t>
+                      </a:r>
+                      <a:r>
+                        <a:rPr lang="en-US" sz="1600" baseline="-25000"/>
+                        <a:t>2 </a:t>
+                      </a:r>
+                      <a:r>
+                        <a:rPr lang="en-US" sz="1600" baseline="0"/>
+                        <a:t>= [-0.14, 0.12, 10.48, -0.04, -7.11, 1.5]</a:t>
+                      </a:r>
+                      <a:r>
+                        <a:rPr lang="en-US" sz="1600" baseline="-25000"/>
+                        <a:t/>
+                      </a:r>
+                      <a:br>
+                        <a:rPr lang="en-US" sz="1600" baseline="-25000"/>
+                      </a:br>
+                      <a:r>
+                        <a:rPr lang="en-US" sz="1600"/>
+                        <a:t>β</a:t>
+                      </a:r>
+                      <a:r>
+                        <a:rPr lang="en-US" sz="1600" baseline="-25000"/>
+                        <a:t>3 </a:t>
+                      </a:r>
+                      <a:r>
+                        <a:rPr lang="en-US" sz="1600" baseline="0"/>
+                        <a:t>= [-3.78, 0.61, 12.37, -0.12, 10.2, 13.7]</a:t>
+                      </a:r>
+                      <a:endParaRPr lang="en-US" sz="1600" b="0"/>
+                    </a:p>
+                  </a:txBody>
+                  <a:tcPr anchor="ctr"/>
+                </a:tc>
+                <a:tc>
+                  <a:txBody>
+                    <a:bodyPr/>
+                    <a:lstStyle/>
+                    <a:p>
+                      <a:pPr algn="ctr"/>
+                      <a:r>
+                        <a:rPr lang="en-US" sz="1600"/>
+                        <a:t>1.3621</a:t>
+                      </a:r>
+                      <a:endParaRPr lang="en-US" sz="1600" b="0"/>
+                    </a:p>
+                  </a:txBody>
+                  <a:tcPr anchor="ctr"/>
+                </a:tc>
+              </a:tr>
+              <a:tr h="601133">
+                <a:tc>
+                  <a:txBody>
+                    <a:bodyPr/>
+                    <a:lstStyle/>
+                    <a:p>
+                      <a:pPr algn="ctr"/>
+                      <a:r>
+                        <a:rPr lang="en-US" sz="1600"/>
+                        <a:t>2</a:t>
+                      </a:r>
+                      <a:endParaRPr lang="en-US" sz="1600" b="0"/>
+                    </a:p>
+                  </a:txBody>
+                  <a:tcPr anchor="ctr"/>
+                </a:tc>
+                <a:tc>
+                  <a:txBody>
+                    <a:bodyPr/>
+                    <a:lstStyle/>
+                    <a:p>
+                      <a:pPr algn="ctr"/>
+                      <a:r>
+                        <a:rPr lang="en-US" sz="1600"/>
+                        <a:t>Receiving Targets</a:t>
+                      </a:r>
+                      <a:endParaRPr lang="en-US" sz="1600" b="0"/>
+                    </a:p>
+                  </a:txBody>
+                  <a:tcPr anchor="ctr"/>
+                </a:tc>
+                <a:tc>
+                  <a:txBody>
+                    <a:bodyPr/>
+                    <a:lstStyle/>
+                    <a:p>
+                      <a:pPr marL="0" marR="0" indent="0" algn="ctr" defTabSz="457105" rtl="0" eaLnBrk="1" fontAlgn="auto" latinLnBrk="0" hangingPunct="1">
+                        <a:lnSpc>
+                          <a:spcPct val="100000"/>
+                        </a:lnSpc>
+                        <a:spcBef>
+                          <a:spcPts val="0"/>
+                        </a:spcBef>
+                        <a:spcAft>
+                          <a:spcPts val="0"/>
+                        </a:spcAft>
+                        <a:buClrTx/>
+                        <a:buSzTx/>
+                        <a:buFontTx/>
+                        <a:buNone/>
+                        <a:tabLst/>
+                        <a:defRPr/>
+                      </a:pPr>
+                      <a:r>
+                        <a:rPr lang="en-US" sz="1600"/>
+                        <a:t>β</a:t>
+                      </a:r>
+                      <a:r>
+                        <a:rPr lang="en-US" sz="1600" baseline="-25000"/>
+                        <a:t>1 </a:t>
+                      </a:r>
+                      <a:r>
+                        <a:rPr lang="en-US" sz="1600" baseline="0"/>
+                        <a:t>= [-8.45, 1.17, 27.46, -0.12, 11.5, 13.35]</a:t>
+                      </a:r>
+                      <a:r>
+                        <a:rPr lang="en-US" sz="1600" baseline="-25000"/>
+                        <a:t/>
+                      </a:r>
+                      <a:br>
+                        <a:rPr lang="en-US" sz="1600" baseline="-25000"/>
+                      </a:br>
+                      <a:r>
+                        <a:rPr lang="en-US" sz="1600"/>
+                        <a:t>β</a:t>
+                      </a:r>
+                      <a:r>
+                        <a:rPr lang="en-US" sz="1600" baseline="-25000"/>
+                        <a:t>2 </a:t>
+                      </a:r>
+                      <a:r>
+                        <a:rPr lang="en-US" sz="1600" baseline="0"/>
+                        <a:t>= [-0.54, 0.2, 4.82, -0.085, -0.089, 4.20]</a:t>
+                      </a:r>
+                      <a:endParaRPr lang="en-US" sz="1600" b="0"/>
+                    </a:p>
+                  </a:txBody>
+                  <a:tcPr anchor="ctr"/>
+                </a:tc>
+                <a:tc>
+                  <a:txBody>
+                    <a:bodyPr/>
+                    <a:lstStyle/>
+                    <a:p>
+                      <a:pPr algn="ctr"/>
+                      <a:r>
+                        <a:rPr lang="en-US" sz="1600"/>
+                        <a:t>1.2053</a:t>
+                      </a:r>
+                      <a:endParaRPr lang="en-US" sz="1600" b="0"/>
+                    </a:p>
+                  </a:txBody>
+                  <a:tcPr anchor="ctr"/>
+                </a:tc>
+              </a:tr>
+              <a:tr h="601133">
+                <a:tc>
+                  <a:txBody>
+                    <a:bodyPr/>
+                    <a:lstStyle/>
+                    <a:p>
+                      <a:pPr algn="ctr"/>
+                      <a:r>
+                        <a:rPr lang="en-US" sz="1600"/>
+                        <a:t>2</a:t>
+                      </a:r>
+                      <a:endParaRPr lang="en-US" sz="1600" b="0"/>
+                    </a:p>
+                  </a:txBody>
+                  <a:tcPr anchor="ctr"/>
+                </a:tc>
+                <a:tc>
+                  <a:txBody>
+                    <a:bodyPr/>
+                    <a:lstStyle/>
+                    <a:p>
+                      <a:pPr algn="ctr"/>
+                      <a:r>
+                        <a:rPr lang="en-US" sz="1600"/>
+                        <a:t>Catches</a:t>
+                      </a:r>
+                      <a:br>
+                        <a:rPr lang="en-US" sz="1600"/>
+                      </a:br>
+                      <a:r>
+                        <a:rPr lang="en-US" sz="1600"/>
+                        <a:t>Fantasy</a:t>
+                      </a:r>
+                      <a:r>
+                        <a:rPr lang="en-US" sz="1600" baseline="0"/>
+                        <a:t> Points</a:t>
+                      </a:r>
+                    </a:p>
+                    <a:p>
+                      <a:pPr algn="ctr"/>
+                      <a:r>
+                        <a:rPr lang="en-US" sz="1600" baseline="0"/>
+                        <a:t>Targets</a:t>
+                      </a:r>
+                      <a:endParaRPr lang="en-US" sz="1600" b="0"/>
+                    </a:p>
+                  </a:txBody>
+                  <a:tcPr anchor="ctr"/>
+                </a:tc>
+                <a:tc>
+                  <a:txBody>
+                    <a:bodyPr/>
+                    <a:lstStyle/>
+                    <a:p>
+                      <a:pPr algn="ctr"/>
+                      <a:r>
+                        <a:rPr lang="en-US" sz="1600"/>
+                        <a:t>β</a:t>
+                      </a:r>
+                      <a:r>
+                        <a:rPr lang="en-US" sz="1600" baseline="-25000"/>
+                        <a:t>1 </a:t>
+                      </a:r>
+                      <a:r>
+                        <a:rPr lang="en-US" sz="1600" baseline="0"/>
+                        <a:t>= [2.71, -0.42, 0.61, -0.89, 45.02, 42.26]</a:t>
+                      </a:r>
+                      <a:r>
+                        <a:rPr lang="en-US" sz="1600" baseline="-25000"/>
+                        <a:t/>
+                      </a:r>
+                      <a:br>
+                        <a:rPr lang="en-US" sz="1600" baseline="-25000"/>
+                      </a:br>
+                      <a:r>
+                        <a:rPr lang="en-US" sz="1600"/>
+                        <a:t>β</a:t>
+                      </a:r>
+                      <a:r>
+                        <a:rPr lang="en-US" sz="1600" baseline="-25000"/>
+                        <a:t>2 </a:t>
+                      </a:r>
+                      <a:r>
+                        <a:rPr lang="en-US" sz="1600" baseline="0"/>
+                        <a:t>= [-0.70, 0.23, 4.00, -0.084, 0.83, 2.64]</a:t>
+                      </a:r>
+                      <a:endParaRPr lang="en-US" sz="1600" b="0"/>
+                    </a:p>
+                  </a:txBody>
+                  <a:tcPr anchor="ctr"/>
+                </a:tc>
+                <a:tc>
+                  <a:txBody>
+                    <a:bodyPr/>
+                    <a:lstStyle/>
+                    <a:p>
+                      <a:pPr algn="ctr"/>
+                      <a:r>
+                        <a:rPr lang="en-US" sz="1600"/>
+                        <a:t>1.1887</a:t>
+                      </a:r>
+                      <a:endParaRPr lang="en-US" sz="1600" b="0"/>
+                    </a:p>
+                  </a:txBody>
+                  <a:tcPr anchor="ctr"/>
+                </a:tc>
+              </a:tr>
+              <a:tr h="601133">
+                <a:tc>
+                  <a:txBody>
+                    <a:bodyPr/>
+                    <a:lstStyle/>
+                    <a:p>
+                      <a:pPr algn="ctr"/>
+                      <a:r>
+                        <a:rPr lang="en-US" sz="1600"/>
+                        <a:t>2</a:t>
+                      </a:r>
+                      <a:endParaRPr lang="en-US" sz="1600" b="0"/>
+                    </a:p>
+                  </a:txBody>
+                  <a:tcPr anchor="ctr"/>
+                </a:tc>
+                <a:tc>
+                  <a:txBody>
+                    <a:bodyPr/>
+                    <a:lstStyle/>
+                    <a:p>
+                      <a:pPr algn="ctr"/>
+                      <a:r>
+                        <a:rPr lang="en-US" sz="1600"/>
+                        <a:t>Catches</a:t>
+                      </a:r>
+                      <a:endParaRPr lang="en-US" sz="1600" b="0"/>
+                    </a:p>
+                  </a:txBody>
+                  <a:tcPr anchor="ctr"/>
+                </a:tc>
+                <a:tc>
+                  <a:txBody>
+                    <a:bodyPr/>
+                    <a:lstStyle/>
+                    <a:p>
+                      <a:pPr marL="0" marR="0" indent="0" algn="ctr" defTabSz="457105" rtl="0" eaLnBrk="1" fontAlgn="auto" latinLnBrk="0" hangingPunct="1">
+                        <a:lnSpc>
+                          <a:spcPct val="100000"/>
+                        </a:lnSpc>
+                        <a:spcBef>
+                          <a:spcPts val="0"/>
+                        </a:spcBef>
+                        <a:spcAft>
+                          <a:spcPts val="0"/>
+                        </a:spcAft>
+                        <a:buClrTx/>
+                        <a:buSzTx/>
+                        <a:buFontTx/>
+                        <a:buNone/>
+                        <a:tabLst/>
+                        <a:defRPr/>
+                      </a:pPr>
+                      <a:r>
+                        <a:rPr lang="en-US" sz="1600"/>
+                        <a:t>β</a:t>
+                      </a:r>
+                      <a:r>
+                        <a:rPr lang="en-US" sz="1600" baseline="-25000"/>
+                        <a:t>1 </a:t>
+                      </a:r>
+                      <a:r>
+                        <a:rPr lang="en-US" sz="1600" baseline="0"/>
+                        <a:t>= [-1.04, 0.27, 6.02, -0.083, 0.16, 3.02]</a:t>
+                      </a:r>
+                      <a:r>
+                        <a:rPr lang="en-US" sz="1600" baseline="-25000"/>
+                        <a:t/>
+                      </a:r>
+                      <a:br>
+                        <a:rPr lang="en-US" sz="1600" baseline="-25000"/>
+                      </a:br>
+                      <a:r>
+                        <a:rPr lang="en-US" sz="1600"/>
+                        <a:t>β</a:t>
+                      </a:r>
+                      <a:r>
+                        <a:rPr lang="en-US" sz="1600" baseline="-25000"/>
+                        <a:t>2 </a:t>
+                      </a:r>
+                      <a:r>
+                        <a:rPr lang="en-US" sz="1600" baseline="0"/>
+                        <a:t>= [4.98, -0.99, 68.03, -0.32, 56.68, 24.8]</a:t>
+                      </a:r>
+                      <a:endParaRPr lang="en-US" sz="1600" b="0"/>
+                    </a:p>
+                  </a:txBody>
+                  <a:tcPr anchor="ctr"/>
+                </a:tc>
+                <a:tc>
+                  <a:txBody>
+                    <a:bodyPr/>
+                    <a:lstStyle/>
+                    <a:p>
+                      <a:pPr algn="ctr"/>
+                      <a:r>
+                        <a:rPr lang="en-US" sz="1600"/>
+                        <a:t>1.1811</a:t>
+                      </a:r>
+                      <a:endParaRPr lang="en-US" sz="1600" b="0"/>
+                    </a:p>
+                  </a:txBody>
+                  <a:tcPr anchor="ctr"/>
+                </a:tc>
+              </a:tr>
+              <a:tr h="601133">
+                <a:tc>
+                  <a:txBody>
+                    <a:bodyPr/>
+                    <a:lstStyle/>
+                    <a:p>
+                      <a:pPr algn="ctr"/>
+                      <a:r>
+                        <a:rPr lang="en-US" sz="1600"/>
+                        <a:t>2</a:t>
+                      </a:r>
+                      <a:endParaRPr lang="en-US" sz="1600" b="0"/>
+                    </a:p>
+                  </a:txBody>
+                  <a:tcPr anchor="ctr"/>
+                </a:tc>
+                <a:tc>
+                  <a:txBody>
+                    <a:bodyPr/>
+                    <a:lstStyle/>
+                    <a:p>
+                      <a:pPr algn="ctr"/>
+                      <a:r>
+                        <a:rPr lang="en-US" sz="1600"/>
+                        <a:t>Touchdowns</a:t>
+                      </a:r>
+                      <a:endParaRPr lang="en-US" sz="1600" b="0"/>
+                    </a:p>
+                  </a:txBody>
+                  <a:tcPr anchor="ctr"/>
+                </a:tc>
+                <a:tc>
+                  <a:txBody>
+                    <a:bodyPr/>
+                    <a:lstStyle/>
+                    <a:p>
+                      <a:pPr marL="0" marR="0" indent="0" algn="ctr" defTabSz="457105" rtl="0" eaLnBrk="1" fontAlgn="auto" latinLnBrk="0" hangingPunct="1">
+                        <a:lnSpc>
+                          <a:spcPct val="100000"/>
+                        </a:lnSpc>
+                        <a:spcBef>
+                          <a:spcPts val="0"/>
+                        </a:spcBef>
+                        <a:spcAft>
+                          <a:spcPts val="0"/>
+                        </a:spcAft>
+                        <a:buClrTx/>
+                        <a:buSzTx/>
+                        <a:buFontTx/>
+                        <a:buNone/>
+                        <a:tabLst/>
+                        <a:defRPr/>
+                      </a:pPr>
+                      <a:r>
+                        <a:rPr lang="en-US" sz="1600"/>
+                        <a:t>β</a:t>
+                      </a:r>
+                      <a:r>
+                        <a:rPr lang="en-US" sz="1600" baseline="-25000"/>
+                        <a:t>1 </a:t>
+                      </a:r>
+                      <a:r>
+                        <a:rPr lang="en-US" sz="1600" baseline="0"/>
+                        <a:t>= [-4.09, 0.56, 24.85, -0.02, -4.31, 3.59]</a:t>
+                      </a:r>
+                      <a:r>
+                        <a:rPr lang="en-US" sz="1600" baseline="-25000"/>
+                        <a:t/>
+                      </a:r>
+                      <a:br>
+                        <a:rPr lang="en-US" sz="1600" baseline="-25000"/>
+                      </a:br>
+                      <a:r>
+                        <a:rPr lang="en-US" sz="1600"/>
+                        <a:t>β</a:t>
+                      </a:r>
+                      <a:r>
+                        <a:rPr lang="en-US" sz="1600" baseline="-25000"/>
+                        <a:t>2 </a:t>
+                      </a:r>
+                      <a:r>
+                        <a:rPr lang="en-US" sz="1600" baseline="0"/>
+                        <a:t>= [44.5, -4.44, -288, 0.11, 48.39, 52.04]</a:t>
+                      </a:r>
+                      <a:endParaRPr lang="en-US" sz="1600" b="0"/>
+                    </a:p>
+                  </a:txBody>
+                  <a:tcPr anchor="ctr"/>
+                </a:tc>
+                <a:tc>
+                  <a:txBody>
+                    <a:bodyPr/>
+                    <a:lstStyle/>
+                    <a:p>
+                      <a:pPr algn="ctr"/>
+                      <a:r>
+                        <a:rPr lang="en-US" sz="1600"/>
+                        <a:t>1.1107</a:t>
+                      </a:r>
+                      <a:endParaRPr lang="en-US" sz="1600" b="0"/>
+                    </a:p>
+                  </a:txBody>
+                  <a:tcPr anchor="ctr"/>
+                </a:tc>
+              </a:tr>
+              <a:tr h="601133">
+                <a:tc>
+                  <a:txBody>
+                    <a:bodyPr/>
+                    <a:lstStyle/>
+                    <a:p>
+                      <a:pPr algn="ctr"/>
+                      <a:r>
+                        <a:rPr lang="en-US" sz="1600"/>
+                        <a:t>2</a:t>
+                      </a:r>
+                      <a:endParaRPr lang="en-US" sz="1600" b="0"/>
+                    </a:p>
+                  </a:txBody>
+                  <a:tcPr anchor="ctr"/>
+                </a:tc>
+                <a:tc>
+                  <a:txBody>
+                    <a:bodyPr/>
+                    <a:lstStyle/>
+                    <a:p>
+                      <a:pPr algn="ctr"/>
+                      <a:r>
+                        <a:rPr lang="en-US" sz="1600"/>
+                        <a:t>Receiving Yards</a:t>
+                      </a:r>
+                      <a:endParaRPr lang="en-US" sz="1600" b="0"/>
+                    </a:p>
+                  </a:txBody>
+                  <a:tcPr anchor="ctr"/>
+                </a:tc>
+                <a:tc>
+                  <a:txBody>
+                    <a:bodyPr/>
+                    <a:lstStyle/>
+                    <a:p>
+                      <a:pPr marL="0" marR="0" indent="0" algn="ctr" defTabSz="457105" rtl="0" eaLnBrk="1" fontAlgn="auto" latinLnBrk="0" hangingPunct="1">
+                        <a:lnSpc>
+                          <a:spcPct val="100000"/>
+                        </a:lnSpc>
+                        <a:spcBef>
+                          <a:spcPts val="0"/>
+                        </a:spcBef>
+                        <a:spcAft>
+                          <a:spcPts val="0"/>
+                        </a:spcAft>
+                        <a:buClrTx/>
+                        <a:buSzTx/>
+                        <a:buFontTx/>
+                        <a:buNone/>
+                        <a:tabLst/>
+                        <a:defRPr/>
+                      </a:pPr>
+                      <a:r>
+                        <a:rPr lang="en-US" sz="1600"/>
+                        <a:t>β</a:t>
+                      </a:r>
+                      <a:r>
+                        <a:rPr lang="en-US" sz="1600" baseline="-25000"/>
+                        <a:t>1 </a:t>
+                      </a:r>
+                      <a:r>
+                        <a:rPr lang="en-US" sz="1600" baseline="0"/>
+                        <a:t>= [-3.48, 0.48, 25.5, -0.06, -0.51, 5.64]</a:t>
+                      </a:r>
+                      <a:r>
+                        <a:rPr lang="en-US" sz="1600" baseline="-25000"/>
+                        <a:t/>
+                      </a:r>
+                      <a:br>
+                        <a:rPr lang="en-US" sz="1600" baseline="-25000"/>
+                      </a:br>
+                      <a:r>
+                        <a:rPr lang="en-US" sz="1600"/>
+                        <a:t>β</a:t>
+                      </a:r>
+                      <a:r>
+                        <a:rPr lang="en-US" sz="1600" baseline="-25000"/>
+                        <a:t>2 </a:t>
+                      </a:r>
+                      <a:r>
+                        <a:rPr lang="en-US" sz="1600" baseline="0"/>
+                        <a:t>= [17.87, -1.5, -115.9, -0.06, 3.82, 6.90]</a:t>
+                      </a:r>
+                      <a:endParaRPr lang="en-US" sz="1600" b="0"/>
+                    </a:p>
+                  </a:txBody>
+                  <a:tcPr anchor="ctr"/>
+                </a:tc>
+                <a:tc>
+                  <a:txBody>
+                    <a:bodyPr/>
+                    <a:lstStyle/>
+                    <a:p>
+                      <a:pPr algn="ctr"/>
+                      <a:r>
+                        <a:rPr lang="en-US" sz="1600"/>
+                        <a:t>1.0857</a:t>
+                      </a:r>
+                      <a:endParaRPr lang="en-US" sz="1600" b="0"/>
+                    </a:p>
+                  </a:txBody>
+                  <a:tcPr anchor="ctr"/>
+                </a:tc>
+              </a:tr>
+            </a:tbl>
+          </a:graphicData>
+        </a:graphic>
+      </p:graphicFrame>
+      <p:sp>
+        <p:nvSpPr>
+          <p:cNvPr id="20" name="TextBox 19"/>
+          <p:cNvSpPr txBox="1"/>
+          <p:nvPr/>
+        </p:nvSpPr>
+        <p:spPr>
+          <a:xfrm>
+            <a:off x="10056812" y="12919566"/>
+            <a:ext cx="8734427" cy="523220"/>
+          </a:xfrm>
+          <a:prstGeom prst="rect">
+            <a:avLst/>
+          </a:prstGeom>
+          <a:noFill/>
+        </p:spPr>
+        <p:txBody>
+          <a:bodyPr wrap="square" rtlCol="0">
+            <a:spAutoFit/>
+          </a:bodyPr>
+          <a:lstStyle/>
+          <a:p>
+            <a:pPr algn="ctr"/>
+            <a:r>
+              <a:rPr lang="en-US"/>
+              <a:t>β</a:t>
+            </a:r>
+            <a:r>
+              <a:rPr lang="en-US" baseline="-25000"/>
+              <a:t>i</a:t>
+            </a:r>
+            <a:r>
+              <a:rPr lang="en-US"/>
+              <a:t> = [ w</a:t>
+            </a:r>
+            <a:r>
+              <a:rPr lang="en-US" baseline="-25000"/>
+              <a:t>FantasyPts</a:t>
+            </a:r>
+            <a:r>
+              <a:rPr lang="en-US"/>
+              <a:t> w</a:t>
+            </a:r>
+            <a:r>
+              <a:rPr lang="en-US" baseline="-25000"/>
+              <a:t>RecYds</a:t>
+            </a:r>
+            <a:r>
+              <a:rPr lang="en-US"/>
+              <a:t> w</a:t>
+            </a:r>
+            <a:r>
+              <a:rPr lang="en-US" baseline="-25000"/>
+              <a:t>RecTDs</a:t>
+            </a:r>
+            <a:r>
+              <a:rPr lang="en-US"/>
+              <a:t> w</a:t>
+            </a:r>
+            <a:r>
+              <a:rPr lang="en-US" baseline="-25000"/>
+              <a:t>Δ1yrRecYds</a:t>
+            </a:r>
+            <a:r>
+              <a:rPr lang="en-US"/>
+              <a:t> w</a:t>
+            </a:r>
+            <a:r>
+              <a:rPr lang="en-US" baseline="-25000"/>
+              <a:t>Δ1yrRecTDs</a:t>
+            </a:r>
+            <a:r>
+              <a:rPr lang="en-US"/>
+              <a:t> w</a:t>
+            </a:r>
+            <a:r>
+              <a:rPr lang="en-US" baseline="-25000"/>
+              <a:t>ESPN</a:t>
+            </a:r>
+            <a:r>
+              <a:rPr lang="en-US"/>
+              <a:t> ]</a:t>
+            </a:r>
+            <a:endParaRPr lang="en-US" baseline="-25000"/>
+          </a:p>
+        </p:txBody>
+      </p:sp>
     </p:spTree>
   </p:cSld>
   <p:clrMapOvr>

</xml_diff>

<commit_message>
Adding DCG error for overview
</commit_message>
<xml_diff>
--- a/poster/jpo4_poster.pptx
+++ b/poster/jpo4_poster.pptx
@@ -462,7 +462,7 @@
     </p:spTree>
     <p:extLst>
       <p:ext uri="{BB962C8B-B14F-4D97-AF65-F5344CB8AC3E}">
-        <p14:creationId xmlns:mc="http://schemas.openxmlformats.org/markup-compatibility/2006" xmlns:mv="urn:schemas-microsoft-com:mac:vml" xmlns:p14="http://schemas.microsoft.com/office/powerpoint/2010/main" xmlns:p="http://schemas.openxmlformats.org/presentationml/2006/main" xmlns:r="http://schemas.openxmlformats.org/officeDocument/2006/relationships" xmlns:a="http://schemas.openxmlformats.org/drawingml/2006/main" xmlns="" val="2638942905"/>
+        <p14:creationId xmlns="" xmlns:a="http://schemas.openxmlformats.org/drawingml/2006/main" xmlns:r="http://schemas.openxmlformats.org/officeDocument/2006/relationships" xmlns:p="http://schemas.openxmlformats.org/presentationml/2006/main" xmlns:p14="http://schemas.microsoft.com/office/powerpoint/2010/main" xmlns:mv="urn:schemas-microsoft-com:mac:vml" xmlns:mc="http://schemas.openxmlformats.org/markup-compatibility/2006" val="2638942905"/>
       </p:ext>
     </p:extLst>
   </p:cSld>
@@ -8342,102 +8342,6 @@
           </a:p>
         </p:txBody>
       </p:sp>
-      <p:pic>
-        <p:nvPicPr>
-          <p:cNvPr id="17" name="Picture 16" descr="top30_lin_reg_all_feat.eps.png"/>
-          <p:cNvPicPr>
-            <a:picLocks noChangeAspect="1"/>
-          </p:cNvPicPr>
-          <p:nvPr/>
-        </p:nvPicPr>
-        <p:blipFill>
-          <a:blip r:embed="rId4"/>
-          <a:stretch>
-            <a:fillRect/>
-          </a:stretch>
-        </p:blipFill>
-        <p:spPr>
-          <a:xfrm>
-            <a:off x="19720684" y="9741402"/>
-            <a:ext cx="8505067" cy="12573232"/>
-          </a:xfrm>
-          <a:prstGeom prst="rect">
-            <a:avLst/>
-          </a:prstGeom>
-        </p:spPr>
-      </p:pic>
-      <p:pic>
-        <p:nvPicPr>
-          <p:cNvPr id="18" name="Picture 17" descr="rmse_plus_dcg.png"/>
-          <p:cNvPicPr>
-            <a:picLocks noChangeAspect="1"/>
-          </p:cNvPicPr>
-          <p:nvPr/>
-        </p:nvPicPr>
-        <p:blipFill>
-          <a:blip r:embed="rId5"/>
-          <a:stretch>
-            <a:fillRect/>
-          </a:stretch>
-        </p:blipFill>
-        <p:spPr>
-          <a:xfrm>
-            <a:off x="19720684" y="17741204"/>
-            <a:ext cx="8505067" cy="12577779"/>
-          </a:xfrm>
-          <a:prstGeom prst="rect">
-            <a:avLst/>
-          </a:prstGeom>
-        </p:spPr>
-      </p:pic>
-      <p:pic>
-        <p:nvPicPr>
-          <p:cNvPr id="13" name="Picture 12" descr="kmeans2.eps.png"/>
-          <p:cNvPicPr>
-            <a:picLocks noChangeAspect="1"/>
-          </p:cNvPicPr>
-          <p:nvPr/>
-        </p:nvPicPr>
-        <p:blipFill>
-          <a:blip r:embed="rId6"/>
-          <a:stretch>
-            <a:fillRect/>
-          </a:stretch>
-        </p:blipFill>
-        <p:spPr>
-          <a:xfrm>
-            <a:off x="28225750" y="5019831"/>
-            <a:ext cx="10338497" cy="13373182"/>
-          </a:xfrm>
-          <a:prstGeom prst="rect">
-            <a:avLst/>
-          </a:prstGeom>
-        </p:spPr>
-      </p:pic>
-      <p:pic>
-        <p:nvPicPr>
-          <p:cNvPr id="14" name="Picture 13" descr="kmeans3.eps.png"/>
-          <p:cNvPicPr>
-            <a:picLocks noChangeAspect="1"/>
-          </p:cNvPicPr>
-          <p:nvPr/>
-        </p:nvPicPr>
-        <p:blipFill>
-          <a:blip r:embed="rId7"/>
-          <a:stretch>
-            <a:fillRect/>
-          </a:stretch>
-        </p:blipFill>
-        <p:spPr>
-          <a:xfrm>
-            <a:off x="28225750" y="10113804"/>
-            <a:ext cx="10409675" cy="13470119"/>
-          </a:xfrm>
-          <a:prstGeom prst="rect">
-            <a:avLst/>
-          </a:prstGeom>
-        </p:spPr>
-      </p:pic>
       <p:graphicFrame>
         <p:nvGraphicFramePr>
           <p:cNvPr id="16" name="Table 15"/>
@@ -8447,7 +8351,7 @@
           <p:nvPr/>
         </p:nvGraphicFramePr>
         <p:xfrm>
-          <a:off x="10282767" y="6773333"/>
+          <a:off x="29190229" y="19747884"/>
           <a:ext cx="8276168" cy="6075678"/>
         </p:xfrm>
         <a:graphic>
@@ -9410,7 +9314,7 @@
         </p:nvSpPr>
         <p:spPr>
           <a:xfrm>
-            <a:off x="10056812" y="12919566"/>
+            <a:off x="28964274" y="25894117"/>
             <a:ext cx="8734427" cy="523220"/>
           </a:xfrm>
           <a:prstGeom prst="rect">
@@ -9480,6 +9384,1296 @@
             <a:r>
               <a:rPr lang="en-US" baseline="-25000"/>
               <a:t>ESPN</a:t>
+            </a:r>
+            <a:r>
+              <a:rPr lang="en-US"/>
+              <a:t> ]</a:t>
+            </a:r>
+            <a:endParaRPr lang="en-US" baseline="-25000"/>
+          </a:p>
+        </p:txBody>
+      </p:sp>
+      <p:pic>
+        <p:nvPicPr>
+          <p:cNvPr id="22" name="Picture 21" descr="top30_lin_reg_all_feat.eps.png"/>
+          <p:cNvPicPr>
+            <a:picLocks noChangeAspect="1"/>
+          </p:cNvPicPr>
+          <p:nvPr/>
+        </p:nvPicPr>
+        <p:blipFill>
+          <a:blip r:embed="rId4"/>
+          <a:stretch>
+            <a:fillRect/>
+          </a:stretch>
+        </p:blipFill>
+        <p:spPr>
+          <a:xfrm>
+            <a:off x="19491324" y="25823562"/>
+            <a:ext cx="8734427" cy="4067375"/>
+          </a:xfrm>
+          <a:prstGeom prst="rect">
+            <a:avLst/>
+          </a:prstGeom>
+        </p:spPr>
+      </p:pic>
+      <p:pic>
+        <p:nvPicPr>
+          <p:cNvPr id="23" name="Picture 22" descr="rmse_plus_dcg.png"/>
+          <p:cNvPicPr>
+            <a:picLocks noChangeAspect="1"/>
+          </p:cNvPicPr>
+          <p:nvPr/>
+        </p:nvPicPr>
+        <p:blipFill>
+          <a:blip r:embed="rId5"/>
+          <a:stretch>
+            <a:fillRect/>
+          </a:stretch>
+        </p:blipFill>
+        <p:spPr>
+          <a:xfrm>
+            <a:off x="19491324" y="17741204"/>
+            <a:ext cx="8718213" cy="6277113"/>
+          </a:xfrm>
+          <a:prstGeom prst="rect">
+            <a:avLst/>
+          </a:prstGeom>
+        </p:spPr>
+      </p:pic>
+      <p:pic>
+        <p:nvPicPr>
+          <p:cNvPr id="25" name="Picture 24" descr="kmeans3.eps.png"/>
+          <p:cNvPicPr>
+            <a:picLocks noChangeAspect="1"/>
+          </p:cNvPicPr>
+          <p:nvPr/>
+        </p:nvPicPr>
+        <p:blipFill>
+          <a:blip r:embed="rId6"/>
+          <a:stretch>
+            <a:fillRect/>
+          </a:stretch>
+        </p:blipFill>
+        <p:spPr>
+          <a:xfrm>
+            <a:off x="28731971" y="14577913"/>
+            <a:ext cx="8734426" cy="4541902"/>
+          </a:xfrm>
+          <a:prstGeom prst="rect">
+            <a:avLst/>
+          </a:prstGeom>
+        </p:spPr>
+      </p:pic>
+      <p:pic>
+        <p:nvPicPr>
+          <p:cNvPr id="26" name="Picture 25" descr="kmeans2.eps.png"/>
+          <p:cNvPicPr>
+            <a:picLocks noChangeAspect="1"/>
+          </p:cNvPicPr>
+          <p:nvPr/>
+        </p:nvPicPr>
+        <p:blipFill>
+          <a:blip r:embed="rId7"/>
+          <a:stretch>
+            <a:fillRect/>
+          </a:stretch>
+        </p:blipFill>
+        <p:spPr>
+          <a:xfrm>
+            <a:off x="28964275" y="7146887"/>
+            <a:ext cx="8734426" cy="6638164"/>
+          </a:xfrm>
+          <a:prstGeom prst="rect">
+            <a:avLst/>
+          </a:prstGeom>
+        </p:spPr>
+      </p:pic>
+      <p:graphicFrame>
+        <p:nvGraphicFramePr>
+          <p:cNvPr id="27" name="Table 26"/>
+          <p:cNvGraphicFramePr>
+            <a:graphicFrameLocks noGrp="1"/>
+          </p:cNvGraphicFramePr>
+          <p:nvPr/>
+        </p:nvGraphicFramePr>
+        <p:xfrm>
+          <a:off x="19717279" y="10179411"/>
+          <a:ext cx="8276168" cy="6075678"/>
+        </p:xfrm>
+        <a:graphic>
+          <a:graphicData uri="http://schemas.openxmlformats.org/drawingml/2006/table">
+            <a:tbl>
+              <a:tblPr firstRow="1" bandRow="1">
+                <a:tableStyleId>{D7AC3CCA-C797-4891-BE02-D94E43425B78}</a:tableStyleId>
+              </a:tblPr>
+              <a:tblGrid>
+                <a:gridCol w="1028700"/>
+                <a:gridCol w="1794933"/>
+                <a:gridCol w="4021667"/>
+                <a:gridCol w="1430868"/>
+              </a:tblGrid>
+              <a:tr h="601133">
+                <a:tc>
+                  <a:txBody>
+                    <a:bodyPr/>
+                    <a:lstStyle/>
+                    <a:p>
+                      <a:pPr algn="ctr"/>
+                      <a:r>
+                        <a:rPr lang="en-US" sz="1600"/>
+                        <a:t>#</a:t>
+                      </a:r>
+                      <a:r>
+                        <a:rPr lang="en-US" sz="1600" baseline="0"/>
+                        <a:t> Mixtures</a:t>
+                      </a:r>
+                      <a:endParaRPr lang="en-US" sz="1600" b="1"/>
+                    </a:p>
+                  </a:txBody>
+                  <a:tcPr anchor="ctr"/>
+                </a:tc>
+                <a:tc>
+                  <a:txBody>
+                    <a:bodyPr/>
+                    <a:lstStyle/>
+                    <a:p>
+                      <a:pPr algn="ctr"/>
+                      <a:r>
+                        <a:rPr lang="en-US" sz="1600"/>
+                        <a:t>K Means Features</a:t>
+                      </a:r>
+                      <a:endParaRPr lang="en-US" sz="1600" b="1"/>
+                    </a:p>
+                  </a:txBody>
+                  <a:tcPr anchor="ctr"/>
+                </a:tc>
+                <a:tc>
+                  <a:txBody>
+                    <a:bodyPr/>
+                    <a:lstStyle/>
+                    <a:p>
+                      <a:pPr algn="ctr"/>
+                      <a:r>
+                        <a:rPr lang="en-US" sz="2000"/>
+                        <a:t>β</a:t>
+                      </a:r>
+                      <a:r>
+                        <a:rPr lang="en-US" sz="2000" baseline="-25000"/>
+                        <a:t>1 </a:t>
+                      </a:r>
+                      <a:r>
+                        <a:rPr lang="en-US" sz="2000" baseline="0"/>
+                        <a:t>… </a:t>
+                      </a:r>
+                      <a:r>
+                        <a:rPr lang="en-US" sz="2000"/>
+                        <a:t>β</a:t>
+                      </a:r>
+                      <a:r>
+                        <a:rPr lang="en-US" sz="2000" baseline="-25000"/>
+                        <a:t>K</a:t>
+                      </a:r>
+                      <a:endParaRPr lang="en-US" sz="2000" b="1"/>
+                    </a:p>
+                  </a:txBody>
+                  <a:tcPr anchor="ctr"/>
+                </a:tc>
+                <a:tc>
+                  <a:txBody>
+                    <a:bodyPr/>
+                    <a:lstStyle/>
+                    <a:p>
+                      <a:pPr algn="ctr"/>
+                      <a:r>
+                        <a:rPr lang="en-US" sz="1600"/>
+                        <a:t>Discounted</a:t>
+                      </a:r>
+                    </a:p>
+                    <a:p>
+                      <a:pPr algn="ctr"/>
+                      <a:r>
+                        <a:rPr lang="en-US" sz="1600"/>
+                        <a:t>Cumulative</a:t>
+                      </a:r>
+                    </a:p>
+                    <a:p>
+                      <a:pPr algn="ctr"/>
+                      <a:r>
+                        <a:rPr lang="en-US" sz="1600"/>
+                        <a:t>Gain</a:t>
+                      </a:r>
+                      <a:endParaRPr lang="en-US" sz="1600" b="1"/>
+                    </a:p>
+                  </a:txBody>
+                  <a:tcPr anchor="ctr"/>
+                </a:tc>
+              </a:tr>
+              <a:tr h="601133">
+                <a:tc>
+                  <a:txBody>
+                    <a:bodyPr/>
+                    <a:lstStyle/>
+                    <a:p>
+                      <a:pPr algn="ctr"/>
+                      <a:r>
+                        <a:rPr lang="en-US" sz="1600"/>
+                        <a:t>2</a:t>
+                      </a:r>
+                      <a:endParaRPr lang="en-US" sz="1600" b="0"/>
+                    </a:p>
+                  </a:txBody>
+                  <a:tcPr anchor="ctr"/>
+                </a:tc>
+                <a:tc>
+                  <a:txBody>
+                    <a:bodyPr/>
+                    <a:lstStyle/>
+                    <a:p>
+                      <a:pPr algn="ctr"/>
+                      <a:r>
+                        <a:rPr lang="en-US" sz="1600"/>
+                        <a:t>Catches</a:t>
+                      </a:r>
+                      <a:br>
+                        <a:rPr lang="en-US" sz="1600"/>
+                      </a:br>
+                      <a:r>
+                        <a:rPr lang="en-US" sz="1600"/>
+                        <a:t>Fantasy</a:t>
+                      </a:r>
+                      <a:r>
+                        <a:rPr lang="en-US" sz="1600" baseline="0"/>
+                        <a:t> Points</a:t>
+                      </a:r>
+                      <a:endParaRPr lang="en-US" sz="1600" b="0" baseline="0"/>
+                    </a:p>
+                  </a:txBody>
+                  <a:tcPr anchor="ctr"/>
+                </a:tc>
+                <a:tc>
+                  <a:txBody>
+                    <a:bodyPr/>
+                    <a:lstStyle/>
+                    <a:p>
+                      <a:pPr algn="ctr"/>
+                      <a:r>
+                        <a:rPr lang="en-US" sz="1600"/>
+                        <a:t>β</a:t>
+                      </a:r>
+                      <a:r>
+                        <a:rPr lang="en-US" sz="1600" baseline="-25000"/>
+                        <a:t>1 </a:t>
+                      </a:r>
+                      <a:r>
+                        <a:rPr lang="en-US" sz="1600" baseline="0"/>
+                        <a:t>= [-3.57, 0.46, 26.96, -0.025, 1.91, 8.75]</a:t>
+                      </a:r>
+                      <a:r>
+                        <a:rPr lang="en-US" sz="1600" baseline="-25000"/>
+                        <a:t/>
+                      </a:r>
+                      <a:br>
+                        <a:rPr lang="en-US" sz="1600" baseline="-25000"/>
+                      </a:br>
+                      <a:r>
+                        <a:rPr lang="en-US" sz="1600"/>
+                        <a:t>β</a:t>
+                      </a:r>
+                      <a:r>
+                        <a:rPr lang="en-US" sz="1600" baseline="-25000"/>
+                        <a:t>2 </a:t>
+                      </a:r>
+                      <a:r>
+                        <a:rPr lang="en-US" sz="1600" baseline="0"/>
+                        <a:t>= [-7.38, 0.92, 41.55, -0.094, 1.61, 6.85]</a:t>
+                      </a:r>
+                      <a:endParaRPr lang="en-US" sz="1600" b="0"/>
+                    </a:p>
+                  </a:txBody>
+                  <a:tcPr anchor="ctr"/>
+                </a:tc>
+                <a:tc>
+                  <a:txBody>
+                    <a:bodyPr/>
+                    <a:lstStyle/>
+                    <a:p>
+                      <a:pPr algn="ctr"/>
+                      <a:r>
+                        <a:rPr lang="en-US" sz="1600"/>
+                        <a:t>1.7601</a:t>
+                      </a:r>
+                      <a:endParaRPr lang="en-US" sz="1600" b="0"/>
+                    </a:p>
+                  </a:txBody>
+                  <a:tcPr anchor="ctr"/>
+                </a:tc>
+              </a:tr>
+              <a:tr h="601133">
+                <a:tc>
+                  <a:txBody>
+                    <a:bodyPr/>
+                    <a:lstStyle/>
+                    <a:p>
+                      <a:pPr algn="ctr"/>
+                      <a:r>
+                        <a:rPr lang="en-US" sz="1600"/>
+                        <a:t>2</a:t>
+                      </a:r>
+                      <a:endParaRPr lang="en-US" sz="1600" b="0"/>
+                    </a:p>
+                  </a:txBody>
+                  <a:tcPr anchor="ctr"/>
+                </a:tc>
+                <a:tc>
+                  <a:txBody>
+                    <a:bodyPr/>
+                    <a:lstStyle/>
+                    <a:p>
+                      <a:pPr algn="ctr"/>
+                      <a:r>
+                        <a:rPr lang="en-US" sz="1600"/>
+                        <a:t>Fantasy Points</a:t>
+                      </a:r>
+                      <a:endParaRPr lang="en-US" sz="1600" b="0"/>
+                    </a:p>
+                  </a:txBody>
+                  <a:tcPr anchor="ctr"/>
+                </a:tc>
+                <a:tc>
+                  <a:txBody>
+                    <a:bodyPr/>
+                    <a:lstStyle/>
+                    <a:p>
+                      <a:pPr marL="0" marR="0" indent="0" algn="ctr" defTabSz="457105" rtl="0" eaLnBrk="1" fontAlgn="auto" latinLnBrk="0" hangingPunct="1">
+                        <a:lnSpc>
+                          <a:spcPct val="100000"/>
+                        </a:lnSpc>
+                        <a:spcBef>
+                          <a:spcPts val="0"/>
+                        </a:spcBef>
+                        <a:spcAft>
+                          <a:spcPts val="0"/>
+                        </a:spcAft>
+                        <a:buClrTx/>
+                        <a:buSzTx/>
+                        <a:buFontTx/>
+                        <a:buNone/>
+                        <a:tabLst/>
+                        <a:defRPr/>
+                      </a:pPr>
+                      <a:r>
+                        <a:rPr lang="en-US" sz="1600"/>
+                        <a:t>β</a:t>
+                      </a:r>
+                      <a:r>
+                        <a:rPr lang="en-US" sz="1600" baseline="-25000"/>
+                        <a:t>1 </a:t>
+                      </a:r>
+                      <a:r>
+                        <a:rPr lang="en-US" sz="1600" baseline="0"/>
+                        <a:t>= [-3.57, 0.46, 26.97, -0.025, 1.91, 8.75]</a:t>
+                      </a:r>
+                      <a:r>
+                        <a:rPr lang="en-US" sz="1600" baseline="-25000"/>
+                        <a:t/>
+                      </a:r>
+                      <a:br>
+                        <a:rPr lang="en-US" sz="1600" baseline="-25000"/>
+                      </a:br>
+                      <a:r>
+                        <a:rPr lang="en-US" sz="1600"/>
+                        <a:t>β</a:t>
+                      </a:r>
+                      <a:r>
+                        <a:rPr lang="en-US" sz="1600" baseline="-25000"/>
+                        <a:t>2 </a:t>
+                      </a:r>
+                      <a:r>
+                        <a:rPr lang="en-US" sz="1600" baseline="0"/>
+                        <a:t>= [-7.38, 0.92, 41.55, -0.094, 1.61, 6.85]</a:t>
+                      </a:r>
+                      <a:endParaRPr lang="en-US" sz="1600" b="0"/>
+                    </a:p>
+                  </a:txBody>
+                  <a:tcPr anchor="ctr"/>
+                </a:tc>
+                <a:tc>
+                  <a:txBody>
+                    <a:bodyPr/>
+                    <a:lstStyle/>
+                    <a:p>
+                      <a:pPr algn="ctr"/>
+                      <a:r>
+                        <a:rPr lang="en-US" sz="1600"/>
+                        <a:t>1.7601</a:t>
+                      </a:r>
+                      <a:endParaRPr lang="en-US" sz="1600" b="0"/>
+                    </a:p>
+                  </a:txBody>
+                  <a:tcPr anchor="ctr"/>
+                </a:tc>
+              </a:tr>
+              <a:tr h="601133">
+                <a:tc>
+                  <a:txBody>
+                    <a:bodyPr/>
+                    <a:lstStyle/>
+                    <a:p>
+                      <a:pPr algn="ctr"/>
+                      <a:r>
+                        <a:rPr lang="en-US" sz="1600"/>
+                        <a:t>3</a:t>
+                      </a:r>
+                      <a:endParaRPr lang="en-US" sz="1600" b="0"/>
+                    </a:p>
+                  </a:txBody>
+                  <a:tcPr anchor="ctr"/>
+                </a:tc>
+                <a:tc>
+                  <a:txBody>
+                    <a:bodyPr/>
+                    <a:lstStyle/>
+                    <a:p>
+                      <a:pPr algn="ctr"/>
+                      <a:r>
+                        <a:rPr lang="en-US" sz="1600"/>
+                        <a:t>Fantasy Points</a:t>
+                      </a:r>
+                      <a:endParaRPr lang="en-US" sz="1600" b="0"/>
+                    </a:p>
+                  </a:txBody>
+                  <a:tcPr anchor="ctr"/>
+                </a:tc>
+                <a:tc>
+                  <a:txBody>
+                    <a:bodyPr/>
+                    <a:lstStyle/>
+                    <a:p>
+                      <a:pPr algn="ctr"/>
+                      <a:r>
+                        <a:rPr lang="en-US" sz="1600"/>
+                        <a:t>β</a:t>
+                      </a:r>
+                      <a:r>
+                        <a:rPr lang="en-US" sz="1600" baseline="-25000"/>
+                        <a:t>1 </a:t>
+                      </a:r>
+                      <a:r>
+                        <a:rPr lang="en-US" sz="1600" baseline="0"/>
+                        <a:t>= [-1.71, 0.37, 23.83, -0.01, 2.24, 71.3]</a:t>
+                      </a:r>
+                      <a:r>
+                        <a:rPr lang="en-US" sz="1600" baseline="-25000"/>
+                        <a:t/>
+                      </a:r>
+                      <a:br>
+                        <a:rPr lang="en-US" sz="1600" baseline="-25000"/>
+                      </a:br>
+                      <a:r>
+                        <a:rPr lang="en-US" sz="1600"/>
+                        <a:t>β</a:t>
+                      </a:r>
+                      <a:r>
+                        <a:rPr lang="en-US" sz="1600" baseline="-25000"/>
+                        <a:t>2 </a:t>
+                      </a:r>
+                      <a:r>
+                        <a:rPr lang="en-US" sz="1600" baseline="0"/>
+                        <a:t>= [-0.14, 0.12, 10.48, -0.04, -7.11, 1.5]</a:t>
+                      </a:r>
+                      <a:r>
+                        <a:rPr lang="en-US" sz="1600" baseline="-25000"/>
+                        <a:t/>
+                      </a:r>
+                      <a:br>
+                        <a:rPr lang="en-US" sz="1600" baseline="-25000"/>
+                      </a:br>
+                      <a:r>
+                        <a:rPr lang="en-US" sz="1600"/>
+                        <a:t>β</a:t>
+                      </a:r>
+                      <a:r>
+                        <a:rPr lang="en-US" sz="1600" baseline="-25000"/>
+                        <a:t>3 </a:t>
+                      </a:r>
+                      <a:r>
+                        <a:rPr lang="en-US" sz="1600" baseline="0"/>
+                        <a:t>= [-3.78, 0.61, 12.37, -0.12, 10.2, 13.7]</a:t>
+                      </a:r>
+                      <a:endParaRPr lang="en-US" sz="1600" b="0"/>
+                    </a:p>
+                  </a:txBody>
+                  <a:tcPr anchor="ctr"/>
+                </a:tc>
+                <a:tc>
+                  <a:txBody>
+                    <a:bodyPr/>
+                    <a:lstStyle/>
+                    <a:p>
+                      <a:pPr algn="ctr"/>
+                      <a:r>
+                        <a:rPr lang="en-US" sz="1600"/>
+                        <a:t>1.3621</a:t>
+                      </a:r>
+                      <a:endParaRPr lang="en-US" sz="1600" b="0"/>
+                    </a:p>
+                  </a:txBody>
+                  <a:tcPr anchor="ctr"/>
+                </a:tc>
+              </a:tr>
+              <a:tr h="601133">
+                <a:tc>
+                  <a:txBody>
+                    <a:bodyPr/>
+                    <a:lstStyle/>
+                    <a:p>
+                      <a:pPr algn="ctr"/>
+                      <a:r>
+                        <a:rPr lang="en-US" sz="1600"/>
+                        <a:t>2</a:t>
+                      </a:r>
+                      <a:endParaRPr lang="en-US" sz="1600" b="0"/>
+                    </a:p>
+                  </a:txBody>
+                  <a:tcPr anchor="ctr"/>
+                </a:tc>
+                <a:tc>
+                  <a:txBody>
+                    <a:bodyPr/>
+                    <a:lstStyle/>
+                    <a:p>
+                      <a:pPr algn="ctr"/>
+                      <a:r>
+                        <a:rPr lang="en-US" sz="1600"/>
+                        <a:t>Receiving Targets</a:t>
+                      </a:r>
+                      <a:endParaRPr lang="en-US" sz="1600" b="0"/>
+                    </a:p>
+                  </a:txBody>
+                  <a:tcPr anchor="ctr"/>
+                </a:tc>
+                <a:tc>
+                  <a:txBody>
+                    <a:bodyPr/>
+                    <a:lstStyle/>
+                    <a:p>
+                      <a:pPr marL="0" marR="0" indent="0" algn="ctr" defTabSz="457105" rtl="0" eaLnBrk="1" fontAlgn="auto" latinLnBrk="0" hangingPunct="1">
+                        <a:lnSpc>
+                          <a:spcPct val="100000"/>
+                        </a:lnSpc>
+                        <a:spcBef>
+                          <a:spcPts val="0"/>
+                        </a:spcBef>
+                        <a:spcAft>
+                          <a:spcPts val="0"/>
+                        </a:spcAft>
+                        <a:buClrTx/>
+                        <a:buSzTx/>
+                        <a:buFontTx/>
+                        <a:buNone/>
+                        <a:tabLst/>
+                        <a:defRPr/>
+                      </a:pPr>
+                      <a:r>
+                        <a:rPr lang="en-US" sz="1600"/>
+                        <a:t>β</a:t>
+                      </a:r>
+                      <a:r>
+                        <a:rPr lang="en-US" sz="1600" baseline="-25000"/>
+                        <a:t>1 </a:t>
+                      </a:r>
+                      <a:r>
+                        <a:rPr lang="en-US" sz="1600" baseline="0"/>
+                        <a:t>= [-8.45, 1.17, 27.46, -0.12, 11.5, 13.35]</a:t>
+                      </a:r>
+                      <a:r>
+                        <a:rPr lang="en-US" sz="1600" baseline="-25000"/>
+                        <a:t/>
+                      </a:r>
+                      <a:br>
+                        <a:rPr lang="en-US" sz="1600" baseline="-25000"/>
+                      </a:br>
+                      <a:r>
+                        <a:rPr lang="en-US" sz="1600"/>
+                        <a:t>β</a:t>
+                      </a:r>
+                      <a:r>
+                        <a:rPr lang="en-US" sz="1600" baseline="-25000"/>
+                        <a:t>2 </a:t>
+                      </a:r>
+                      <a:r>
+                        <a:rPr lang="en-US" sz="1600" baseline="0"/>
+                        <a:t>= [-0.54, 0.2, 4.82, -0.085, -0.089, 4.20]</a:t>
+                      </a:r>
+                      <a:endParaRPr lang="en-US" sz="1600" b="0"/>
+                    </a:p>
+                  </a:txBody>
+                  <a:tcPr anchor="ctr"/>
+                </a:tc>
+                <a:tc>
+                  <a:txBody>
+                    <a:bodyPr/>
+                    <a:lstStyle/>
+                    <a:p>
+                      <a:pPr algn="ctr"/>
+                      <a:r>
+                        <a:rPr lang="en-US" sz="1600"/>
+                        <a:t>1.2053</a:t>
+                      </a:r>
+                      <a:endParaRPr lang="en-US" sz="1600" b="0"/>
+                    </a:p>
+                  </a:txBody>
+                  <a:tcPr anchor="ctr"/>
+                </a:tc>
+              </a:tr>
+              <a:tr h="601133">
+                <a:tc>
+                  <a:txBody>
+                    <a:bodyPr/>
+                    <a:lstStyle/>
+                    <a:p>
+                      <a:pPr algn="ctr"/>
+                      <a:r>
+                        <a:rPr lang="en-US" sz="1600"/>
+                        <a:t>2</a:t>
+                      </a:r>
+                      <a:endParaRPr lang="en-US" sz="1600" b="0"/>
+                    </a:p>
+                  </a:txBody>
+                  <a:tcPr anchor="ctr"/>
+                </a:tc>
+                <a:tc>
+                  <a:txBody>
+                    <a:bodyPr/>
+                    <a:lstStyle/>
+                    <a:p>
+                      <a:pPr algn="ctr"/>
+                      <a:r>
+                        <a:rPr lang="en-US" sz="1600"/>
+                        <a:t>Catches</a:t>
+                      </a:r>
+                      <a:br>
+                        <a:rPr lang="en-US" sz="1600"/>
+                      </a:br>
+                      <a:r>
+                        <a:rPr lang="en-US" sz="1600"/>
+                        <a:t>Fantasy</a:t>
+                      </a:r>
+                      <a:r>
+                        <a:rPr lang="en-US" sz="1600" baseline="0"/>
+                        <a:t> Points</a:t>
+                      </a:r>
+                    </a:p>
+                    <a:p>
+                      <a:pPr algn="ctr"/>
+                      <a:r>
+                        <a:rPr lang="en-US" sz="1600" baseline="0"/>
+                        <a:t>Targets</a:t>
+                      </a:r>
+                      <a:endParaRPr lang="en-US" sz="1600" b="0"/>
+                    </a:p>
+                  </a:txBody>
+                  <a:tcPr anchor="ctr"/>
+                </a:tc>
+                <a:tc>
+                  <a:txBody>
+                    <a:bodyPr/>
+                    <a:lstStyle/>
+                    <a:p>
+                      <a:pPr algn="ctr"/>
+                      <a:r>
+                        <a:rPr lang="en-US" sz="1600"/>
+                        <a:t>β</a:t>
+                      </a:r>
+                      <a:r>
+                        <a:rPr lang="en-US" sz="1600" baseline="-25000"/>
+                        <a:t>1 </a:t>
+                      </a:r>
+                      <a:r>
+                        <a:rPr lang="en-US" sz="1600" baseline="0"/>
+                        <a:t>= [2.71, -0.42, 0.61, -0.89, 45.02, 42.26]</a:t>
+                      </a:r>
+                      <a:r>
+                        <a:rPr lang="en-US" sz="1600" baseline="-25000"/>
+                        <a:t/>
+                      </a:r>
+                      <a:br>
+                        <a:rPr lang="en-US" sz="1600" baseline="-25000"/>
+                      </a:br>
+                      <a:r>
+                        <a:rPr lang="en-US" sz="1600"/>
+                        <a:t>β</a:t>
+                      </a:r>
+                      <a:r>
+                        <a:rPr lang="en-US" sz="1600" baseline="-25000"/>
+                        <a:t>2 </a:t>
+                      </a:r>
+                      <a:r>
+                        <a:rPr lang="en-US" sz="1600" baseline="0"/>
+                        <a:t>= [-0.70, 0.23, 4.00, -0.084, 0.83, 2.64]</a:t>
+                      </a:r>
+                      <a:endParaRPr lang="en-US" sz="1600" b="0"/>
+                    </a:p>
+                  </a:txBody>
+                  <a:tcPr anchor="ctr"/>
+                </a:tc>
+                <a:tc>
+                  <a:txBody>
+                    <a:bodyPr/>
+                    <a:lstStyle/>
+                    <a:p>
+                      <a:pPr algn="ctr"/>
+                      <a:r>
+                        <a:rPr lang="en-US" sz="1600"/>
+                        <a:t>1.1887</a:t>
+                      </a:r>
+                      <a:endParaRPr lang="en-US" sz="1600" b="0"/>
+                    </a:p>
+                  </a:txBody>
+                  <a:tcPr anchor="ctr"/>
+                </a:tc>
+              </a:tr>
+              <a:tr h="601133">
+                <a:tc>
+                  <a:txBody>
+                    <a:bodyPr/>
+                    <a:lstStyle/>
+                    <a:p>
+                      <a:pPr algn="ctr"/>
+                      <a:r>
+                        <a:rPr lang="en-US" sz="1600"/>
+                        <a:t>2</a:t>
+                      </a:r>
+                      <a:endParaRPr lang="en-US" sz="1600" b="0"/>
+                    </a:p>
+                  </a:txBody>
+                  <a:tcPr anchor="ctr"/>
+                </a:tc>
+                <a:tc>
+                  <a:txBody>
+                    <a:bodyPr/>
+                    <a:lstStyle/>
+                    <a:p>
+                      <a:pPr algn="ctr"/>
+                      <a:r>
+                        <a:rPr lang="en-US" sz="1600"/>
+                        <a:t>Catches</a:t>
+                      </a:r>
+                      <a:endParaRPr lang="en-US" sz="1600" b="0"/>
+                    </a:p>
+                  </a:txBody>
+                  <a:tcPr anchor="ctr"/>
+                </a:tc>
+                <a:tc>
+                  <a:txBody>
+                    <a:bodyPr/>
+                    <a:lstStyle/>
+                    <a:p>
+                      <a:pPr marL="0" marR="0" indent="0" algn="ctr" defTabSz="457105" rtl="0" eaLnBrk="1" fontAlgn="auto" latinLnBrk="0" hangingPunct="1">
+                        <a:lnSpc>
+                          <a:spcPct val="100000"/>
+                        </a:lnSpc>
+                        <a:spcBef>
+                          <a:spcPts val="0"/>
+                        </a:spcBef>
+                        <a:spcAft>
+                          <a:spcPts val="0"/>
+                        </a:spcAft>
+                        <a:buClrTx/>
+                        <a:buSzTx/>
+                        <a:buFontTx/>
+                        <a:buNone/>
+                        <a:tabLst/>
+                        <a:defRPr/>
+                      </a:pPr>
+                      <a:r>
+                        <a:rPr lang="en-US" sz="1600"/>
+                        <a:t>β</a:t>
+                      </a:r>
+                      <a:r>
+                        <a:rPr lang="en-US" sz="1600" baseline="-25000"/>
+                        <a:t>1 </a:t>
+                      </a:r>
+                      <a:r>
+                        <a:rPr lang="en-US" sz="1600" baseline="0"/>
+                        <a:t>= [-1.04, 0.27, 6.02, -0.083, 0.16, 3.02]</a:t>
+                      </a:r>
+                      <a:r>
+                        <a:rPr lang="en-US" sz="1600" baseline="-25000"/>
+                        <a:t/>
+                      </a:r>
+                      <a:br>
+                        <a:rPr lang="en-US" sz="1600" baseline="-25000"/>
+                      </a:br>
+                      <a:r>
+                        <a:rPr lang="en-US" sz="1600"/>
+                        <a:t>β</a:t>
+                      </a:r>
+                      <a:r>
+                        <a:rPr lang="en-US" sz="1600" baseline="-25000"/>
+                        <a:t>2 </a:t>
+                      </a:r>
+                      <a:r>
+                        <a:rPr lang="en-US" sz="1600" baseline="0"/>
+                        <a:t>= [4.98, -0.99, 68.03, -0.32, 56.68, 24.8]</a:t>
+                      </a:r>
+                      <a:endParaRPr lang="en-US" sz="1600" b="0"/>
+                    </a:p>
+                  </a:txBody>
+                  <a:tcPr anchor="ctr"/>
+                </a:tc>
+                <a:tc>
+                  <a:txBody>
+                    <a:bodyPr/>
+                    <a:lstStyle/>
+                    <a:p>
+                      <a:pPr algn="ctr"/>
+                      <a:r>
+                        <a:rPr lang="en-US" sz="1600"/>
+                        <a:t>1.1811</a:t>
+                      </a:r>
+                      <a:endParaRPr lang="en-US" sz="1600" b="0"/>
+                    </a:p>
+                  </a:txBody>
+                  <a:tcPr anchor="ctr"/>
+                </a:tc>
+              </a:tr>
+              <a:tr h="601133">
+                <a:tc>
+                  <a:txBody>
+                    <a:bodyPr/>
+                    <a:lstStyle/>
+                    <a:p>
+                      <a:pPr algn="ctr"/>
+                      <a:r>
+                        <a:rPr lang="en-US" sz="1600"/>
+                        <a:t>2</a:t>
+                      </a:r>
+                      <a:endParaRPr lang="en-US" sz="1600" b="0"/>
+                    </a:p>
+                  </a:txBody>
+                  <a:tcPr anchor="ctr"/>
+                </a:tc>
+                <a:tc>
+                  <a:txBody>
+                    <a:bodyPr/>
+                    <a:lstStyle/>
+                    <a:p>
+                      <a:pPr algn="ctr"/>
+                      <a:r>
+                        <a:rPr lang="en-US" sz="1600"/>
+                        <a:t>Touchdowns</a:t>
+                      </a:r>
+                      <a:endParaRPr lang="en-US" sz="1600" b="0"/>
+                    </a:p>
+                  </a:txBody>
+                  <a:tcPr anchor="ctr"/>
+                </a:tc>
+                <a:tc>
+                  <a:txBody>
+                    <a:bodyPr/>
+                    <a:lstStyle/>
+                    <a:p>
+                      <a:pPr marL="0" marR="0" indent="0" algn="ctr" defTabSz="457105" rtl="0" eaLnBrk="1" fontAlgn="auto" latinLnBrk="0" hangingPunct="1">
+                        <a:lnSpc>
+                          <a:spcPct val="100000"/>
+                        </a:lnSpc>
+                        <a:spcBef>
+                          <a:spcPts val="0"/>
+                        </a:spcBef>
+                        <a:spcAft>
+                          <a:spcPts val="0"/>
+                        </a:spcAft>
+                        <a:buClrTx/>
+                        <a:buSzTx/>
+                        <a:buFontTx/>
+                        <a:buNone/>
+                        <a:tabLst/>
+                        <a:defRPr/>
+                      </a:pPr>
+                      <a:r>
+                        <a:rPr lang="en-US" sz="1600"/>
+                        <a:t>β</a:t>
+                      </a:r>
+                      <a:r>
+                        <a:rPr lang="en-US" sz="1600" baseline="-25000"/>
+                        <a:t>1 </a:t>
+                      </a:r>
+                      <a:r>
+                        <a:rPr lang="en-US" sz="1600" baseline="0"/>
+                        <a:t>= [-4.09, 0.56, 24.85, -0.02, -4.31, 3.59]</a:t>
+                      </a:r>
+                      <a:r>
+                        <a:rPr lang="en-US" sz="1600" baseline="-25000"/>
+                        <a:t/>
+                      </a:r>
+                      <a:br>
+                        <a:rPr lang="en-US" sz="1600" baseline="-25000"/>
+                      </a:br>
+                      <a:r>
+                        <a:rPr lang="en-US" sz="1600"/>
+                        <a:t>β</a:t>
+                      </a:r>
+                      <a:r>
+                        <a:rPr lang="en-US" sz="1600" baseline="-25000"/>
+                        <a:t>2 </a:t>
+                      </a:r>
+                      <a:r>
+                        <a:rPr lang="en-US" sz="1600" baseline="0"/>
+                        <a:t>= [44.5, -4.44, -288, 0.11, 48.39, 52.04]</a:t>
+                      </a:r>
+                      <a:endParaRPr lang="en-US" sz="1600" b="0"/>
+                    </a:p>
+                  </a:txBody>
+                  <a:tcPr anchor="ctr"/>
+                </a:tc>
+                <a:tc>
+                  <a:txBody>
+                    <a:bodyPr/>
+                    <a:lstStyle/>
+                    <a:p>
+                      <a:pPr algn="ctr"/>
+                      <a:r>
+                        <a:rPr lang="en-US" sz="1600"/>
+                        <a:t>1.1107</a:t>
+                      </a:r>
+                      <a:endParaRPr lang="en-US" sz="1600" b="0"/>
+                    </a:p>
+                  </a:txBody>
+                  <a:tcPr anchor="ctr"/>
+                </a:tc>
+              </a:tr>
+              <a:tr h="601133">
+                <a:tc>
+                  <a:txBody>
+                    <a:bodyPr/>
+                    <a:lstStyle/>
+                    <a:p>
+                      <a:pPr algn="ctr"/>
+                      <a:r>
+                        <a:rPr lang="en-US" sz="1600"/>
+                        <a:t>2</a:t>
+                      </a:r>
+                      <a:endParaRPr lang="en-US" sz="1600" b="0"/>
+                    </a:p>
+                  </a:txBody>
+                  <a:tcPr anchor="ctr"/>
+                </a:tc>
+                <a:tc>
+                  <a:txBody>
+                    <a:bodyPr/>
+                    <a:lstStyle/>
+                    <a:p>
+                      <a:pPr algn="ctr"/>
+                      <a:r>
+                        <a:rPr lang="en-US" sz="1600"/>
+                        <a:t>Receiving Yards</a:t>
+                      </a:r>
+                      <a:endParaRPr lang="en-US" sz="1600" b="0"/>
+                    </a:p>
+                  </a:txBody>
+                  <a:tcPr anchor="ctr"/>
+                </a:tc>
+                <a:tc>
+                  <a:txBody>
+                    <a:bodyPr/>
+                    <a:lstStyle/>
+                    <a:p>
+                      <a:pPr marL="0" marR="0" indent="0" algn="ctr" defTabSz="457105" rtl="0" eaLnBrk="1" fontAlgn="auto" latinLnBrk="0" hangingPunct="1">
+                        <a:lnSpc>
+                          <a:spcPct val="100000"/>
+                        </a:lnSpc>
+                        <a:spcBef>
+                          <a:spcPts val="0"/>
+                        </a:spcBef>
+                        <a:spcAft>
+                          <a:spcPts val="0"/>
+                        </a:spcAft>
+                        <a:buClrTx/>
+                        <a:buSzTx/>
+                        <a:buFontTx/>
+                        <a:buNone/>
+                        <a:tabLst/>
+                        <a:defRPr/>
+                      </a:pPr>
+                      <a:r>
+                        <a:rPr lang="en-US" sz="1600"/>
+                        <a:t>β</a:t>
+                      </a:r>
+                      <a:r>
+                        <a:rPr lang="en-US" sz="1600" baseline="-25000"/>
+                        <a:t>1 </a:t>
+                      </a:r>
+                      <a:r>
+                        <a:rPr lang="en-US" sz="1600" baseline="0"/>
+                        <a:t>= [-3.48, 0.48, 25.5, -0.06, -0.51, 5.64]</a:t>
+                      </a:r>
+                      <a:r>
+                        <a:rPr lang="en-US" sz="1600" baseline="-25000"/>
+                        <a:t/>
+                      </a:r>
+                      <a:br>
+                        <a:rPr lang="en-US" sz="1600" baseline="-25000"/>
+                      </a:br>
+                      <a:r>
+                        <a:rPr lang="en-US" sz="1600"/>
+                        <a:t>β</a:t>
+                      </a:r>
+                      <a:r>
+                        <a:rPr lang="en-US" sz="1600" baseline="-25000"/>
+                        <a:t>2 </a:t>
+                      </a:r>
+                      <a:r>
+                        <a:rPr lang="en-US" sz="1600" baseline="0"/>
+                        <a:t>= [17.87, -1.5, -115.9, -0.06, 3.82, 6.90]</a:t>
+                      </a:r>
+                      <a:endParaRPr lang="en-US" sz="1600" b="0"/>
+                    </a:p>
+                  </a:txBody>
+                  <a:tcPr anchor="ctr"/>
+                </a:tc>
+                <a:tc>
+                  <a:txBody>
+                    <a:bodyPr/>
+                    <a:lstStyle/>
+                    <a:p>
+                      <a:pPr algn="ctr"/>
+                      <a:r>
+                        <a:rPr lang="en-US" sz="1600"/>
+                        <a:t>1.0857</a:t>
+                      </a:r>
+                      <a:endParaRPr lang="en-US" sz="1600" b="0"/>
+                    </a:p>
+                  </a:txBody>
+                  <a:tcPr anchor="ctr"/>
+                </a:tc>
+              </a:tr>
+            </a:tbl>
+          </a:graphicData>
+        </a:graphic>
+      </p:graphicFrame>
+      <p:sp>
+        <p:nvSpPr>
+          <p:cNvPr id="28" name="TextBox 27"/>
+          <p:cNvSpPr txBox="1"/>
+          <p:nvPr/>
+        </p:nvSpPr>
+        <p:spPr>
+          <a:xfrm>
+            <a:off x="19491324" y="16325644"/>
+            <a:ext cx="8734427" cy="523220"/>
+          </a:xfrm>
+          <a:prstGeom prst="rect">
+            <a:avLst/>
+          </a:prstGeom>
+          <a:noFill/>
+        </p:spPr>
+        <p:txBody>
+          <a:bodyPr wrap="square" rtlCol="0">
+            <a:spAutoFit/>
+          </a:bodyPr>
+          <a:lstStyle/>
+          <a:p>
+            <a:pPr algn="ctr"/>
+            <a:r>
+              <a:rPr lang="en-US"/>
+              <a:t>β</a:t>
+            </a:r>
+            <a:r>
+              <a:rPr lang="en-US" baseline="-25000"/>
+              <a:t>i</a:t>
+            </a:r>
+            <a:r>
+              <a:rPr lang="en-US"/>
+              <a:t> = [ w</a:t>
+            </a:r>
+            <a:r>
+              <a:rPr lang="en-US" baseline="-25000"/>
+              <a:t>FantasyPts</a:t>
+            </a:r>
+            <a:r>
+              <a:rPr lang="en-US"/>
+              <a:t> w</a:t>
+            </a:r>
+            <a:r>
+              <a:rPr lang="en-US" baseline="-25000"/>
+              <a:t>RecYds</a:t>
+            </a:r>
+            <a:r>
+              <a:rPr lang="en-US"/>
+              <a:t> w</a:t>
+            </a:r>
+            <a:r>
+              <a:rPr lang="en-US" baseline="-25000"/>
+              <a:t>RecTDs</a:t>
+            </a:r>
+            <a:r>
+              <a:rPr lang="en-US"/>
+              <a:t> w</a:t>
+            </a:r>
+            <a:r>
+              <a:rPr lang="en-US" baseline="-25000"/>
+              <a:t>Δ1yrRecYds</a:t>
+            </a:r>
+            <a:r>
+              <a:rPr lang="en-US"/>
+              <a:t> w</a:t>
+            </a:r>
+            <a:r>
+              <a:rPr lang="en-US" baseline="-25000"/>
+              <a:t>Δ1yrRecTDs</a:t>
+            </a:r>
+            <a:r>
+              <a:rPr lang="en-US"/>
+              <a:t> w</a:t>
+            </a:r>
+            <a:r>
+              <a:rPr lang="en-US" baseline="-25000"/>
+              <a:t>ESPN</a:t>
+            </a:r>
+            <a:r>
+              <a:rPr lang="en-US"/>
+              <a:t> ]</a:t>
+            </a:r>
+            <a:endParaRPr lang="en-US" baseline="-25000"/>
+          </a:p>
+        </p:txBody>
+      </p:sp>
+      <p:sp>
+        <p:nvSpPr>
+          <p:cNvPr id="29" name="TextBox 28"/>
+          <p:cNvSpPr txBox="1"/>
+          <p:nvPr/>
+        </p:nvSpPr>
+        <p:spPr>
+          <a:xfrm>
+            <a:off x="10040599" y="19961754"/>
+            <a:ext cx="8734427" cy="954107"/>
+          </a:xfrm>
+          <a:prstGeom prst="rect">
+            <a:avLst/>
+          </a:prstGeom>
+          <a:noFill/>
+        </p:spPr>
+        <p:txBody>
+          <a:bodyPr wrap="square" rtlCol="0">
+            <a:spAutoFit/>
+          </a:bodyPr>
+          <a:lstStyle/>
+          <a:p>
+            <a:pPr algn="ctr"/>
+            <a:r>
+              <a:rPr lang="en-US"/>
+              <a:t>β</a:t>
+            </a:r>
+            <a:r>
+              <a:rPr lang="en-US" baseline="-25000"/>
+              <a:t>i</a:t>
+            </a:r>
+            <a:r>
+              <a:rPr lang="en-US"/>
+              <a:t> = [ w</a:t>
+            </a:r>
+            <a:r>
+              <a:rPr lang="en-US" baseline="-25000"/>
+              <a:t>FantasyPts</a:t>
+            </a:r>
+            <a:r>
+              <a:rPr lang="en-US"/>
+              <a:t> w</a:t>
+            </a:r>
+            <a:r>
+              <a:rPr lang="en-US" baseline="-25000"/>
+              <a:t>RecYds</a:t>
+            </a:r>
+            <a:r>
+              <a:rPr lang="en-US"/>
+              <a:t> w</a:t>
+            </a:r>
+            <a:r>
+              <a:rPr lang="en-US" baseline="-25000"/>
+              <a:t>RecTDs</a:t>
+            </a:r>
+            <a:r>
+              <a:rPr lang="en-US"/>
+              <a:t> w</a:t>
+            </a:r>
+            <a:r>
+              <a:rPr lang="en-US" baseline="-25000"/>
+              <a:t>Targets</a:t>
+            </a:r>
+            <a:r>
+              <a:rPr lang="en-US"/>
+              <a:t> w</a:t>
+            </a:r>
+            <a:r>
+              <a:rPr lang="en-US" baseline="-25000"/>
+              <a:t>Catches</a:t>
+            </a:r>
+            <a:r>
+              <a:rPr lang="en-US"/>
+              <a:t> w</a:t>
+            </a:r>
+            <a:r>
+              <a:rPr lang="en-US" baseline="-25000"/>
+              <a:t>Δ1yrRecYds</a:t>
+            </a:r>
+            <a:r>
+              <a:rPr lang="en-US"/>
+              <a:t> w</a:t>
+            </a:r>
+            <a:r>
+              <a:rPr lang="en-US" baseline="-25000"/>
+              <a:t>Δ1yrRecTDs</a:t>
+            </a:r>
+            <a:r>
+              <a:rPr lang="en-US"/>
+              <a:t> w</a:t>
+            </a:r>
+            <a:r>
+              <a:rPr lang="en-US" baseline="-25000"/>
+              <a:t>Δ2yrRecYds</a:t>
+            </a:r>
+            <a:r>
+              <a:rPr lang="en-US"/>
+              <a:t> w</a:t>
+            </a:r>
+            <a:r>
+              <a:rPr lang="en-US" baseline="-25000"/>
+              <a:t>Δ2yrRecYds</a:t>
+            </a:r>
+            <a:r>
+              <a:rPr lang="en-US"/>
+              <a:t> w</a:t>
+            </a:r>
+            <a:r>
+              <a:rPr lang="en-US" baseline="-25000"/>
+              <a:t>Δ3yrRecYds</a:t>
+            </a:r>
+            <a:r>
+              <a:rPr lang="en-US"/>
+              <a:t> w</a:t>
+            </a:r>
+            <a:r>
+              <a:rPr lang="en-US" baseline="-25000"/>
+              <a:t>Δ3yrRecYds</a:t>
+            </a:r>
+            <a:r>
+              <a:rPr lang="en-US"/>
+              <a:t> w</a:t>
+            </a:r>
+            <a:r>
+              <a:rPr lang="en-US" baseline="-25000"/>
+              <a:t>ESPN</a:t>
+            </a:r>
+            <a:r>
+              <a:rPr lang="en-US"/>
+              <a:t> w</a:t>
+            </a:r>
+            <a:r>
+              <a:rPr lang="en-US" baseline="-25000"/>
+              <a:t>Yahoo</a:t>
             </a:r>
             <a:r>
               <a:rPr lang="en-US"/>

</xml_diff>

<commit_message>
added bar graph for data on naive methods
</commit_message>
<xml_diff>
--- a/poster/jpo4_poster.pptx
+++ b/poster/jpo4_poster.pptx
@@ -462,7 +462,7 @@
     </p:spTree>
     <p:extLst>
       <p:ext uri="{BB962C8B-B14F-4D97-AF65-F5344CB8AC3E}">
-        <p14:creationId xmlns="" xmlns:a="http://schemas.openxmlformats.org/drawingml/2006/main" xmlns:r="http://schemas.openxmlformats.org/officeDocument/2006/relationships" xmlns:p="http://schemas.openxmlformats.org/presentationml/2006/main" xmlns:p14="http://schemas.microsoft.com/office/powerpoint/2010/main" xmlns:mv="urn:schemas-microsoft-com:mac:vml" xmlns:mc="http://schemas.openxmlformats.org/markup-compatibility/2006" val="2638942905"/>
+        <p14:creationId xmlns:mc="http://schemas.openxmlformats.org/markup-compatibility/2006" xmlns:mv="urn:schemas-microsoft-com:mac:vml" xmlns:p14="http://schemas.microsoft.com/office/powerpoint/2010/main" xmlns:p="http://schemas.openxmlformats.org/presentationml/2006/main" xmlns:r="http://schemas.openxmlformats.org/officeDocument/2006/relationships" xmlns:a="http://schemas.openxmlformats.org/drawingml/2006/main" xmlns="" val="2638942905"/>
       </p:ext>
     </p:extLst>
   </p:cSld>
@@ -9433,8 +9433,8 @@
         </p:blipFill>
         <p:spPr>
           <a:xfrm>
-            <a:off x="19491324" y="17741204"/>
-            <a:ext cx="8718213" cy="6277113"/>
+            <a:off x="19621069" y="17818172"/>
+            <a:ext cx="8492258" cy="6114425"/>
           </a:xfrm>
           <a:prstGeom prst="rect">
             <a:avLst/>
@@ -10683,6 +10683,30 @@
           </a:p>
         </p:txBody>
       </p:sp>
+      <p:pic>
+        <p:nvPicPr>
+          <p:cNvPr id="21" name="Picture 20" descr="dcg_naive.eps.png"/>
+          <p:cNvPicPr>
+            <a:picLocks noChangeAspect="1"/>
+          </p:cNvPicPr>
+          <p:nvPr/>
+        </p:nvPicPr>
+        <p:blipFill>
+          <a:blip r:embed="rId8"/>
+          <a:stretch>
+            <a:fillRect/>
+          </a:stretch>
+        </p:blipFill>
+        <p:spPr>
+          <a:xfrm>
+            <a:off x="10073026" y="8020565"/>
+            <a:ext cx="8718213" cy="3632589"/>
+          </a:xfrm>
+          <a:prstGeom prst="rect">
+            <a:avLst/>
+          </a:prstGeom>
+        </p:spPr>
+      </p:pic>
     </p:spTree>
   </p:cSld>
   <p:clrMapOvr>

</xml_diff>

<commit_message>
adding small features sets
</commit_message>
<xml_diff>
--- a/poster/jpo4_poster.pptx
+++ b/poster/jpo4_poster.pptx
@@ -9306,93 +9306,6 @@
           </a:graphicData>
         </a:graphic>
       </p:graphicFrame>
-      <p:sp>
-        <p:nvSpPr>
-          <p:cNvPr id="20" name="TextBox 19"/>
-          <p:cNvSpPr txBox="1"/>
-          <p:nvPr/>
-        </p:nvSpPr>
-        <p:spPr>
-          <a:xfrm>
-            <a:off x="28964274" y="25894117"/>
-            <a:ext cx="8734427" cy="523220"/>
-          </a:xfrm>
-          <a:prstGeom prst="rect">
-            <a:avLst/>
-          </a:prstGeom>
-          <a:noFill/>
-        </p:spPr>
-        <p:txBody>
-          <a:bodyPr wrap="square" rtlCol="0">
-            <a:spAutoFit/>
-          </a:bodyPr>
-          <a:lstStyle/>
-          <a:p>
-            <a:pPr algn="ctr"/>
-            <a:r>
-              <a:rPr lang="en-US"/>
-              <a:t>β</a:t>
-            </a:r>
-            <a:r>
-              <a:rPr lang="en-US" baseline="-25000"/>
-              <a:t>i</a:t>
-            </a:r>
-            <a:r>
-              <a:rPr lang="en-US"/>
-              <a:t> = [ w</a:t>
-            </a:r>
-            <a:r>
-              <a:rPr lang="en-US" baseline="-25000"/>
-              <a:t>FantasyPts</a:t>
-            </a:r>
-            <a:r>
-              <a:rPr lang="en-US"/>
-              <a:t> w</a:t>
-            </a:r>
-            <a:r>
-              <a:rPr lang="en-US" baseline="-25000"/>
-              <a:t>RecYds</a:t>
-            </a:r>
-            <a:r>
-              <a:rPr lang="en-US"/>
-              <a:t> w</a:t>
-            </a:r>
-            <a:r>
-              <a:rPr lang="en-US" baseline="-25000"/>
-              <a:t>RecTDs</a:t>
-            </a:r>
-            <a:r>
-              <a:rPr lang="en-US"/>
-              <a:t> w</a:t>
-            </a:r>
-            <a:r>
-              <a:rPr lang="en-US" baseline="-25000"/>
-              <a:t>Δ1yrRecYds</a:t>
-            </a:r>
-            <a:r>
-              <a:rPr lang="en-US"/>
-              <a:t> w</a:t>
-            </a:r>
-            <a:r>
-              <a:rPr lang="en-US" baseline="-25000"/>
-              <a:t>Δ1yrRecTDs</a:t>
-            </a:r>
-            <a:r>
-              <a:rPr lang="en-US"/>
-              <a:t> w</a:t>
-            </a:r>
-            <a:r>
-              <a:rPr lang="en-US" baseline="-25000"/>
-              <a:t>ESPN</a:t>
-            </a:r>
-            <a:r>
-              <a:rPr lang="en-US"/>
-              <a:t> ]</a:t>
-            </a:r>
-            <a:endParaRPr lang="en-US" baseline="-25000"/>
-          </a:p>
-        </p:txBody>
-      </p:sp>
       <p:pic>
         <p:nvPicPr>
           <p:cNvPr id="22" name="Picture 21" descr="top30_lin_reg_all_feat.eps.png"/>
@@ -9498,8 +9411,8 @@
           <p:nvPr/>
         </p:nvGraphicFramePr>
         <p:xfrm>
-          <a:off x="19717279" y="10179411"/>
-          <a:ext cx="8276168" cy="6075678"/>
+          <a:off x="19621071" y="10179411"/>
+          <a:ext cx="8492257" cy="5120640"/>
         </p:xfrm>
         <a:graphic>
           <a:graphicData uri="http://schemas.openxmlformats.org/drawingml/2006/table">
@@ -9508,10 +9421,9 @@
                 <a:tableStyleId>{D7AC3CCA-C797-4891-BE02-D94E43425B78}</a:tableStyleId>
               </a:tblPr>
               <a:tblGrid>
-                <a:gridCol w="1028700"/>
-                <a:gridCol w="1794933"/>
-                <a:gridCol w="4021667"/>
-                <a:gridCol w="1430868"/>
+                <a:gridCol w="1486329"/>
+                <a:gridCol w="5655733"/>
+                <a:gridCol w="1350195"/>
               </a:tblGrid>
               <a:tr h="601133">
                 <a:tc>
@@ -9522,11 +9434,7 @@
                       <a:pPr algn="ctr"/>
                       <a:r>
                         <a:rPr lang="en-US" sz="1600"/>
-                        <a:t>#</a:t>
-                      </a:r>
-                      <a:r>
-                        <a:rPr lang="en-US" sz="1600" baseline="0"/>
-                        <a:t> Mixtures</a:t>
+                        <a:t>Method</a:t>
                       </a:r>
                       <a:endParaRPr lang="en-US" sz="1600" b="1"/>
                     </a:p>
@@ -9540,39 +9448,8 @@
                     <a:p>
                       <a:pPr algn="ctr"/>
                       <a:r>
-                        <a:rPr lang="en-US" sz="1600"/>
-                        <a:t>K Means Features</a:t>
-                      </a:r>
-                      <a:endParaRPr lang="en-US" sz="1600" b="1"/>
-                    </a:p>
-                  </a:txBody>
-                  <a:tcPr anchor="ctr"/>
-                </a:tc>
-                <a:tc>
-                  <a:txBody>
-                    <a:bodyPr/>
-                    <a:lstStyle/>
-                    <a:p>
-                      <a:pPr algn="ctr"/>
-                      <a:r>
                         <a:rPr lang="en-US" sz="2000"/>
                         <a:t>β</a:t>
-                      </a:r>
-                      <a:r>
-                        <a:rPr lang="en-US" sz="2000" baseline="-25000"/>
-                        <a:t>1 </a:t>
-                      </a:r>
-                      <a:r>
-                        <a:rPr lang="en-US" sz="2000" baseline="0"/>
-                        <a:t>… </a:t>
-                      </a:r>
-                      <a:r>
-                        <a:rPr lang="en-US" sz="2000"/>
-                        <a:t>β</a:t>
-                      </a:r>
-                      <a:r>
-                        <a:rPr lang="en-US" sz="2000" baseline="-25000"/>
-                        <a:t>K</a:t>
                       </a:r>
                       <a:endParaRPr lang="en-US" sz="2000" b="1"/>
                     </a:p>
@@ -9609,133 +9486,17 @@
                   <a:tcPr anchor="ctr"/>
                 </a:tc>
               </a:tr>
-              <a:tr h="601133">
-                <a:tc>
+              <a:tr h="300567">
+                <a:tc rowSpan="2">
                   <a:txBody>
                     <a:bodyPr/>
                     <a:lstStyle/>
                     <a:p>
                       <a:pPr algn="ctr"/>
                       <a:r>
-                        <a:rPr lang="en-US" sz="1600"/>
-                        <a:t>2</a:t>
-                      </a:r>
-                      <a:endParaRPr lang="en-US" sz="1600" b="0"/>
-                    </a:p>
-                  </a:txBody>
-                  <a:tcPr anchor="ctr"/>
-                </a:tc>
-                <a:tc>
-                  <a:txBody>
-                    <a:bodyPr/>
-                    <a:lstStyle/>
-                    <a:p>
-                      <a:pPr algn="ctr"/>
-                      <a:r>
-                        <a:rPr lang="en-US" sz="1600"/>
-                        <a:t>Catches</a:t>
-                      </a:r>
-                      <a:br>
-                        <a:rPr lang="en-US" sz="1600"/>
-                      </a:br>
-                      <a:r>
-                        <a:rPr lang="en-US" sz="1600"/>
-                        <a:t>Fantasy</a:t>
-                      </a:r>
-                      <a:r>
-                        <a:rPr lang="en-US" sz="1600" baseline="0"/>
-                        <a:t> Points</a:t>
-                      </a:r>
-                      <a:endParaRPr lang="en-US" sz="1600" b="0" baseline="0"/>
-                    </a:p>
-                  </a:txBody>
-                  <a:tcPr anchor="ctr"/>
-                </a:tc>
-                <a:tc>
-                  <a:txBody>
-                    <a:bodyPr/>
-                    <a:lstStyle/>
-                    <a:p>
-                      <a:pPr algn="ctr"/>
-                      <a:r>
-                        <a:rPr lang="en-US" sz="1600"/>
-                        <a:t>β</a:t>
-                      </a:r>
-                      <a:r>
-                        <a:rPr lang="en-US" sz="1600" baseline="-25000"/>
-                        <a:t>1 </a:t>
-                      </a:r>
-                      <a:r>
-                        <a:rPr lang="en-US" sz="1600" baseline="0"/>
-                        <a:t>= [-3.57, 0.46, 26.96, -0.025, 1.91, 8.75]</a:t>
-                      </a:r>
-                      <a:r>
-                        <a:rPr lang="en-US" sz="1600" baseline="-25000"/>
-                        <a:t/>
-                      </a:r>
-                      <a:br>
-                        <a:rPr lang="en-US" sz="1600" baseline="-25000"/>
-                      </a:br>
-                      <a:r>
-                        <a:rPr lang="en-US" sz="1600"/>
-                        <a:t>β</a:t>
-                      </a:r>
-                      <a:r>
-                        <a:rPr lang="en-US" sz="1600" baseline="-25000"/>
-                        <a:t>2 </a:t>
-                      </a:r>
-                      <a:r>
-                        <a:rPr lang="en-US" sz="1600" baseline="0"/>
-                        <a:t>= [-7.38, 0.92, 41.55, -0.094, 1.61, 6.85]</a:t>
-                      </a:r>
-                      <a:endParaRPr lang="en-US" sz="1600" b="0"/>
-                    </a:p>
-                  </a:txBody>
-                  <a:tcPr anchor="ctr"/>
-                </a:tc>
-                <a:tc>
-                  <a:txBody>
-                    <a:bodyPr/>
-                    <a:lstStyle/>
-                    <a:p>
-                      <a:pPr algn="ctr"/>
-                      <a:r>
-                        <a:rPr lang="en-US" sz="1600"/>
-                        <a:t>1.7601</a:t>
-                      </a:r>
-                      <a:endParaRPr lang="en-US" sz="1600" b="0"/>
-                    </a:p>
-                  </a:txBody>
-                  <a:tcPr anchor="ctr"/>
-                </a:tc>
-              </a:tr>
-              <a:tr h="601133">
-                <a:tc>
-                  <a:txBody>
-                    <a:bodyPr/>
-                    <a:lstStyle/>
-                    <a:p>
-                      <a:pPr algn="ctr"/>
-                      <a:r>
-                        <a:rPr lang="en-US" sz="1600"/>
-                        <a:t>2</a:t>
-                      </a:r>
-                      <a:endParaRPr lang="en-US" sz="1600" b="0"/>
-                    </a:p>
-                  </a:txBody>
-                  <a:tcPr anchor="ctr"/>
-                </a:tc>
-                <a:tc>
-                  <a:txBody>
-                    <a:bodyPr/>
-                    <a:lstStyle/>
-                    <a:p>
-                      <a:pPr algn="ctr"/>
-                      <a:r>
-                        <a:rPr lang="en-US" sz="1600"/>
-                        <a:t>Fantasy Points</a:t>
-                      </a:r>
-                      <a:endParaRPr lang="en-US" sz="1600" b="0"/>
+                        <a:rPr lang="en-US" sz="1600" b="0"/>
+                        <a:t>13 Features</a:t>
+                      </a:r>
                     </a:p>
                   </a:txBody>
                   <a:tcPr anchor="ctr"/>
@@ -9763,192 +9524,410 @@
                         <a:defRPr/>
                       </a:pPr>
                       <a:r>
+                        <a:rPr lang="en-US" sz="1400"/>
+                        <a:t>β = [ w</a:t>
+                      </a:r>
+                      <a:r>
+                        <a:rPr lang="en-US" sz="1400" baseline="-25000"/>
+                        <a:t>FantasyPts</a:t>
+                      </a:r>
+                      <a:r>
+                        <a:rPr lang="en-US" sz="1400"/>
+                        <a:t> w</a:t>
+                      </a:r>
+                      <a:r>
+                        <a:rPr lang="en-US" sz="1400" baseline="-25000"/>
+                        <a:t>RecYds</a:t>
+                      </a:r>
+                      <a:r>
+                        <a:rPr lang="en-US" sz="1400"/>
+                        <a:t> w</a:t>
+                      </a:r>
+                      <a:r>
+                        <a:rPr lang="en-US" sz="1400" baseline="-25000"/>
+                        <a:t>RecTDs</a:t>
+                      </a:r>
+                      <a:r>
+                        <a:rPr lang="en-US" sz="1400"/>
+                        <a:t> w</a:t>
+                      </a:r>
+                      <a:r>
+                        <a:rPr lang="en-US" sz="1400" baseline="-25000"/>
+                        <a:t>Targets</a:t>
+                      </a:r>
+                      <a:r>
+                        <a:rPr lang="en-US" sz="1400"/>
+                        <a:t> w</a:t>
+                      </a:r>
+                      <a:r>
+                        <a:rPr lang="en-US" sz="1400" baseline="-25000"/>
+                        <a:t>Catches</a:t>
+                      </a:r>
+                      <a:r>
+                        <a:rPr lang="en-US" sz="1400"/>
+                        <a:t> w</a:t>
+                      </a:r>
+                      <a:r>
+                        <a:rPr lang="en-US" sz="1400" baseline="-25000"/>
+                        <a:t>Δ1yrRecYds</a:t>
+                      </a:r>
+                      <a:r>
+                        <a:rPr lang="en-US" sz="1400"/>
+                        <a:t> w</a:t>
+                      </a:r>
+                      <a:r>
+                        <a:rPr lang="en-US" sz="1400" baseline="-25000"/>
+                        <a:t>Δ1yrRecTDs</a:t>
+                      </a:r>
+                      <a:r>
+                        <a:rPr lang="en-US" sz="1400"/>
+                        <a:t> w</a:t>
+                      </a:r>
+                      <a:r>
+                        <a:rPr lang="en-US" sz="1400" baseline="-25000"/>
+                        <a:t>Δ2yrRecYds</a:t>
+                      </a:r>
+                      <a:r>
+                        <a:rPr lang="en-US" sz="1400"/>
+                        <a:t> w</a:t>
+                      </a:r>
+                      <a:r>
+                        <a:rPr lang="en-US" sz="1400" baseline="-25000"/>
+                        <a:t>Δ2yrRecYds</a:t>
+                      </a:r>
+                      <a:r>
+                        <a:rPr lang="en-US" sz="1400"/>
+                        <a:t> w</a:t>
+                      </a:r>
+                      <a:r>
+                        <a:rPr lang="en-US" sz="1400" baseline="-25000"/>
+                        <a:t>Δ3yrRecYds</a:t>
+                      </a:r>
+                      <a:r>
+                        <a:rPr lang="en-US" sz="1400"/>
+                        <a:t> w</a:t>
+                      </a:r>
+                      <a:r>
+                        <a:rPr lang="en-US" sz="1400" baseline="-25000"/>
+                        <a:t>Δ3yrRecYds</a:t>
+                      </a:r>
+                      <a:r>
+                        <a:rPr lang="en-US" sz="1400"/>
+                        <a:t> w</a:t>
+                      </a:r>
+                      <a:r>
+                        <a:rPr lang="en-US" sz="1400" baseline="-25000"/>
+                        <a:t>ESPN</a:t>
+                      </a:r>
+                      <a:r>
+                        <a:rPr lang="en-US" sz="1400"/>
+                        <a:t> w</a:t>
+                      </a:r>
+                      <a:r>
+                        <a:rPr lang="en-US" sz="1400" baseline="-25000"/>
+                        <a:t>Yahoo</a:t>
+                      </a:r>
+                      <a:r>
+                        <a:rPr lang="en-US" sz="1400"/>
+                        <a:t> ]</a:t>
+                      </a:r>
+                      <a:endParaRPr lang="en-US" sz="1400" baseline="-25000"/>
+                    </a:p>
+                  </a:txBody>
+                  <a:tcPr anchor="ctr"/>
+                </a:tc>
+                <a:tc rowSpan="2">
+                  <a:txBody>
+                    <a:bodyPr/>
+                    <a:lstStyle/>
+                    <a:p>
+                      <a:pPr algn="ctr"/>
+                      <a:r>
                         <a:rPr lang="en-US" sz="1600"/>
-                        <a:t>β</a:t>
-                      </a:r>
-                      <a:r>
-                        <a:rPr lang="en-US" sz="1600" baseline="-25000"/>
-                        <a:t>1 </a:t>
-                      </a:r>
-                      <a:r>
-                        <a:rPr lang="en-US" sz="1600" baseline="0"/>
-                        <a:t>= [-3.57, 0.46, 26.97, -0.025, 1.91, 8.75]</a:t>
-                      </a:r>
-                      <a:r>
-                        <a:rPr lang="en-US" sz="1600" baseline="-25000"/>
-                        <a:t/>
-                      </a:r>
-                      <a:br>
-                        <a:rPr lang="en-US" sz="1600" baseline="-25000"/>
-                      </a:br>
-                      <a:r>
-                        <a:rPr lang="en-US" sz="1600"/>
-                        <a:t>β</a:t>
-                      </a:r>
-                      <a:r>
-                        <a:rPr lang="en-US" sz="1600" baseline="-25000"/>
-                        <a:t>2 </a:t>
-                      </a:r>
-                      <a:r>
-                        <a:rPr lang="en-US" sz="1600" baseline="0"/>
-                        <a:t>= [-7.38, 0.92, 41.55, -0.094, 1.61, 6.85]</a:t>
+                        <a:t>1.7179</a:t>
                       </a:r>
                       <a:endParaRPr lang="en-US" sz="1600" b="0"/>
                     </a:p>
                   </a:txBody>
                   <a:tcPr anchor="ctr"/>
+                </a:tc>
+              </a:tr>
+              <a:tr h="300567">
+                <a:tc vMerge="1">
+                  <a:txBody>
+                    <a:bodyPr/>
+                    <a:lstStyle/>
+                    <a:p>
+                      <a:endParaRPr lang="en-US"/>
+                    </a:p>
+                  </a:txBody>
+                  <a:tcPr/>
                 </a:tc>
                 <a:tc>
                   <a:txBody>
                     <a:bodyPr/>
                     <a:lstStyle/>
                     <a:p>
-                      <a:pPr algn="ctr"/>
+                      <a:pPr marL="0" marR="0" indent="0" algn="ctr" defTabSz="457105" rtl="0" eaLnBrk="1" fontAlgn="auto" latinLnBrk="0" hangingPunct="1">
+                        <a:lnSpc>
+                          <a:spcPct val="100000"/>
+                        </a:lnSpc>
+                        <a:spcBef>
+                          <a:spcPts val="0"/>
+                        </a:spcBef>
+                        <a:spcAft>
+                          <a:spcPts val="0"/>
+                        </a:spcAft>
+                        <a:buClrTx/>
+                        <a:buSzTx/>
+                        <a:buFontTx/>
+                        <a:buNone/>
+                        <a:tabLst/>
+                        <a:defRPr/>
+                      </a:pPr>
                       <a:r>
                         <a:rPr lang="en-US" sz="1600"/>
-                        <a:t>1.7601</a:t>
+                        <a:t>β</a:t>
+                      </a:r>
+                      <a:r>
+                        <a:rPr lang="en-US" sz="1600" baseline="-25000"/>
+                        <a:t> </a:t>
+                      </a:r>
+                      <a:r>
+                        <a:rPr lang="en-US" sz="1600" baseline="0"/>
+                        <a:t>= [0.17, 0.059, 12.91, -0.25, 0.18, -0.34, -4.82</a:t>
+                      </a:r>
+                      <a:br>
+                        <a:rPr lang="en-US" sz="1600" baseline="0"/>
+                      </a:br>
+                      <a:r>
+                        <a:rPr lang="en-US" sz="1600" baseline="0"/>
+                        <a:t>-0.031, 0.61, 0.044, -3.36, -1.05, 1.03]</a:t>
                       </a:r>
                       <a:endParaRPr lang="en-US" sz="1600" b="0"/>
                     </a:p>
                   </a:txBody>
-                  <a:tcPr anchor="ctr"/>
+                  <a:tcPr anchor="ctr">
+                    <a:solidFill>
+                      <a:srgbClr val="CCCCCC"/>
+                    </a:solidFill>
+                  </a:tcPr>
+                </a:tc>
+                <a:tc vMerge="1">
+                  <a:txBody>
+                    <a:bodyPr/>
+                    <a:lstStyle/>
+                    <a:p>
+                      <a:endParaRPr lang="en-US"/>
+                    </a:p>
+                  </a:txBody>
+                  <a:tcPr/>
                 </a:tc>
               </a:tr>
-              <a:tr h="601133">
-                <a:tc>
+              <a:tr h="300567">
+                <a:tc rowSpan="2">
                   <a:txBody>
                     <a:bodyPr/>
                     <a:lstStyle/>
                     <a:p>
                       <a:pPr algn="ctr"/>
                       <a:r>
-                        <a:rPr lang="en-US" sz="1600"/>
-                        <a:t>3</a:t>
-                      </a:r>
-                      <a:endParaRPr lang="en-US" sz="1600" b="0"/>
+                        <a:rPr lang="en-US" sz="1600" b="0"/>
+                        <a:t>7 Features</a:t>
+                      </a:r>
                     </a:p>
                   </a:txBody>
-                  <a:tcPr anchor="ctr"/>
+                  <a:tcPr anchor="ctr">
+                    <a:solidFill>
+                      <a:schemeClr val="accent5"/>
+                    </a:solidFill>
+                  </a:tcPr>
                 </a:tc>
                 <a:tc>
                   <a:txBody>
                     <a:bodyPr/>
                     <a:lstStyle/>
                     <a:p>
-                      <a:pPr algn="ctr"/>
-                      <a:r>
-                        <a:rPr lang="en-US" sz="1600"/>
-                        <a:t>Fantasy Points</a:t>
-                      </a:r>
-                      <a:endParaRPr lang="en-US" sz="1600" b="0"/>
+                      <a:pPr marL="0" marR="0" indent="0" algn="ctr" defTabSz="457105" rtl="0" eaLnBrk="1" fontAlgn="auto" latinLnBrk="0" hangingPunct="1">
+                        <a:lnSpc>
+                          <a:spcPct val="100000"/>
+                        </a:lnSpc>
+                        <a:spcBef>
+                          <a:spcPts val="0"/>
+                        </a:spcBef>
+                        <a:spcAft>
+                          <a:spcPts val="0"/>
+                        </a:spcAft>
+                        <a:buClrTx/>
+                        <a:buSzTx/>
+                        <a:buFontTx/>
+                        <a:buNone/>
+                        <a:tabLst/>
+                        <a:defRPr/>
+                      </a:pPr>
+                      <a:r>
+                        <a:rPr lang="en-US" sz="1400"/>
+                        <a:t>β = [ w</a:t>
+                      </a:r>
+                      <a:r>
+                        <a:rPr lang="en-US" sz="1400" baseline="-25000"/>
+                        <a:t>FantasyPts</a:t>
+                      </a:r>
+                      <a:r>
+                        <a:rPr lang="en-US" sz="1400"/>
+                        <a:t> w</a:t>
+                      </a:r>
+                      <a:r>
+                        <a:rPr lang="en-US" sz="1400" baseline="-25000"/>
+                        <a:t>RecYds</a:t>
+                      </a:r>
+                      <a:r>
+                        <a:rPr lang="en-US" sz="1400"/>
+                        <a:t> w</a:t>
+                      </a:r>
+                      <a:r>
+                        <a:rPr lang="en-US" sz="1400" baseline="-25000"/>
+                        <a:t>RecTDs</a:t>
+                      </a:r>
+                      <a:r>
+                        <a:rPr lang="en-US" sz="1400"/>
+                        <a:t> w</a:t>
+                      </a:r>
+                      <a:r>
+                        <a:rPr lang="en-US" sz="1400" baseline="-25000"/>
+                        <a:t>Δ1yrRecYds</a:t>
+                      </a:r>
+                      <a:r>
+                        <a:rPr lang="en-US" sz="1400"/>
+                        <a:t> w</a:t>
+                      </a:r>
+                      <a:r>
+                        <a:rPr lang="en-US" sz="1400" baseline="-25000"/>
+                        <a:t>Δ1yrRecTDs</a:t>
+                      </a:r>
+                      <a:r>
+                        <a:rPr lang="en-US" sz="1400"/>
+                        <a:t> w</a:t>
+                      </a:r>
+                      <a:r>
+                        <a:rPr lang="en-US" sz="1400" baseline="-25000"/>
+                        <a:t>ESPN</a:t>
+                      </a:r>
+                      <a:r>
+                        <a:rPr lang="en-US" sz="1400"/>
+                        <a:t> w</a:t>
+                      </a:r>
+                      <a:r>
+                        <a:rPr lang="en-US" sz="1400" baseline="-25000"/>
+                        <a:t>Yahoo </a:t>
+                      </a:r>
+                      <a:r>
+                        <a:rPr lang="en-US" sz="1400"/>
+                        <a:t>]</a:t>
+                      </a:r>
                     </a:p>
                   </a:txBody>
-                  <a:tcPr anchor="ctr"/>
+                  <a:tcPr anchor="ctr">
+                    <a:solidFill>
+                      <a:schemeClr val="accent5"/>
+                    </a:solidFill>
+                  </a:tcPr>
+                </a:tc>
+                <a:tc rowSpan="2">
+                  <a:txBody>
+                    <a:bodyPr/>
+                    <a:lstStyle/>
+                    <a:p>
+                      <a:pPr algn="ctr"/>
+                      <a:r>
+                        <a:rPr lang="en-US" sz="1600" b="0"/>
+                        <a:t>1.7722</a:t>
+                      </a:r>
+                    </a:p>
+                  </a:txBody>
+                  <a:tcPr anchor="ctr">
+                    <a:solidFill>
+                      <a:schemeClr val="accent5"/>
+                    </a:solidFill>
+                  </a:tcPr>
+                </a:tc>
+              </a:tr>
+              <a:tr h="300567">
+                <a:tc vMerge="1">
+                  <a:txBody>
+                    <a:bodyPr/>
+                    <a:lstStyle/>
+                    <a:p>
+                      <a:endParaRPr lang="en-US"/>
+                    </a:p>
+                  </a:txBody>
+                  <a:tcPr/>
                 </a:tc>
                 <a:tc>
                   <a:txBody>
                     <a:bodyPr/>
                     <a:lstStyle/>
                     <a:p>
-                      <a:pPr algn="ctr"/>
+                      <a:pPr marL="0" marR="0" indent="0" algn="ctr" defTabSz="457105" rtl="0" eaLnBrk="1" fontAlgn="auto" latinLnBrk="0" hangingPunct="1">
+                        <a:lnSpc>
+                          <a:spcPct val="100000"/>
+                        </a:lnSpc>
+                        <a:spcBef>
+                          <a:spcPts val="0"/>
+                        </a:spcBef>
+                        <a:spcAft>
+                          <a:spcPts val="0"/>
+                        </a:spcAft>
+                        <a:buClrTx/>
+                        <a:buSzTx/>
+                        <a:buFontTx/>
+                        <a:buNone/>
+                        <a:tabLst/>
+                        <a:defRPr/>
+                      </a:pPr>
                       <a:r>
                         <a:rPr lang="en-US" sz="1600"/>
                         <a:t>β</a:t>
                       </a:r>
                       <a:r>
                         <a:rPr lang="en-US" sz="1600" baseline="-25000"/>
-                        <a:t>1 </a:t>
+                        <a:t> </a:t>
                       </a:r>
                       <a:r>
                         <a:rPr lang="en-US" sz="1600" baseline="0"/>
-                        <a:t>= [-1.71, 0.37, 23.83, -0.01, 2.24, 71.3]</a:t>
-                      </a:r>
-                      <a:r>
-                        <a:rPr lang="en-US" sz="1600" baseline="-25000"/>
-                        <a:t/>
-                      </a:r>
-                      <a:br>
-                        <a:rPr lang="en-US" sz="1600" baseline="-25000"/>
-                      </a:br>
-                      <a:r>
-                        <a:rPr lang="en-US" sz="1600"/>
-                        <a:t>β</a:t>
-                      </a:r>
-                      <a:r>
-                        <a:rPr lang="en-US" sz="1600" baseline="-25000"/>
-                        <a:t>2 </a:t>
-                      </a:r>
-                      <a:r>
-                        <a:rPr lang="en-US" sz="1600" baseline="0"/>
-                        <a:t>= [-0.14, 0.12, 10.48, -0.04, -7.11, 1.5]</a:t>
-                      </a:r>
-                      <a:r>
-                        <a:rPr lang="en-US" sz="1600" baseline="-25000"/>
-                        <a:t/>
-                      </a:r>
-                      <a:br>
-                        <a:rPr lang="en-US" sz="1600" baseline="-25000"/>
-                      </a:br>
-                      <a:r>
-                        <a:rPr lang="en-US" sz="1600"/>
-                        <a:t>β</a:t>
-                      </a:r>
-                      <a:r>
-                        <a:rPr lang="en-US" sz="1600" baseline="-25000"/>
-                        <a:t>3 </a:t>
-                      </a:r>
-                      <a:r>
-                        <a:rPr lang="en-US" sz="1600" baseline="0"/>
-                        <a:t>= [-3.78, 0.61, 12.37, -0.12, 10.2, 13.7]</a:t>
+                        <a:t>= [-0.18, 0.12, 11.10, -0.056, -3.35, -2.27, 1.67]</a:t>
                       </a:r>
                       <a:endParaRPr lang="en-US" sz="1600" b="0"/>
                     </a:p>
                   </a:txBody>
-                  <a:tcPr anchor="ctr"/>
+                  <a:tcPr anchor="ctr">
+                    <a:solidFill>
+                      <a:schemeClr val="accent5"/>
+                    </a:solidFill>
+                  </a:tcPr>
                 </a:tc>
-                <a:tc>
+                <a:tc vMerge="1">
+                  <a:txBody>
+                    <a:bodyPr/>
+                    <a:lstStyle/>
+                    <a:p>
+                      <a:endParaRPr lang="en-US"/>
+                    </a:p>
+                  </a:txBody>
+                  <a:tcPr/>
+                </a:tc>
+              </a:tr>
+              <a:tr h="300567">
+                <a:tc rowSpan="2">
                   <a:txBody>
                     <a:bodyPr/>
                     <a:lstStyle/>
                     <a:p>
                       <a:pPr algn="ctr"/>
                       <a:r>
-                        <a:rPr lang="en-US" sz="1600"/>
-                        <a:t>1.3621</a:t>
-                      </a:r>
-                      <a:endParaRPr lang="en-US" sz="1600" b="0"/>
-                    </a:p>
-                  </a:txBody>
-                  <a:tcPr anchor="ctr"/>
-                </a:tc>
-              </a:tr>
-              <a:tr h="601133">
-                <a:tc>
-                  <a:txBody>
-                    <a:bodyPr/>
-                    <a:lstStyle/>
-                    <a:p>
-                      <a:pPr algn="ctr"/>
-                      <a:r>
-                        <a:rPr lang="en-US" sz="1600"/>
-                        <a:t>2</a:t>
-                      </a:r>
-                      <a:endParaRPr lang="en-US" sz="1600" b="0"/>
-                    </a:p>
-                  </a:txBody>
-                  <a:tcPr anchor="ctr"/>
-                </a:tc>
-                <a:tc>
-                  <a:txBody>
-                    <a:bodyPr/>
-                    <a:lstStyle/>
-                    <a:p>
-                      <a:pPr algn="ctr"/>
-                      <a:r>
-                        <a:rPr lang="en-US" sz="1600"/>
-                        <a:t>Receiving Targets</a:t>
-                      </a:r>
-                      <a:endParaRPr lang="en-US" sz="1600" b="0"/>
+                        <a:rPr lang="en-US" sz="1600" b="0"/>
+                        <a:t>6 Features</a:t>
+                      </a:r>
                     </a:p>
                   </a:txBody>
                   <a:tcPr anchor="ctr"/>
@@ -9976,191 +9955,346 @@
                         <a:defRPr/>
                       </a:pPr>
                       <a:r>
+                        <a:rPr lang="en-US" sz="1400"/>
+                        <a:t>β = [ w</a:t>
+                      </a:r>
+                      <a:r>
+                        <a:rPr lang="en-US" sz="1400" baseline="-25000"/>
+                        <a:t>FantasyPts</a:t>
+                      </a:r>
+                      <a:r>
+                        <a:rPr lang="en-US" sz="1400"/>
+                        <a:t> w</a:t>
+                      </a:r>
+                      <a:r>
+                        <a:rPr lang="en-US" sz="1400" baseline="-25000"/>
+                        <a:t>RecYds</a:t>
+                      </a:r>
+                      <a:r>
+                        <a:rPr lang="en-US" sz="1400"/>
+                        <a:t> w</a:t>
+                      </a:r>
+                      <a:r>
+                        <a:rPr lang="en-US" sz="1400" baseline="-25000"/>
+                        <a:t>RecTDs</a:t>
+                      </a:r>
+                      <a:r>
+                        <a:rPr lang="en-US" sz="1400"/>
+                        <a:t> w</a:t>
+                      </a:r>
+                      <a:r>
+                        <a:rPr lang="en-US" sz="1400" baseline="-25000"/>
+                        <a:t>Δ1yrRecYds</a:t>
+                      </a:r>
+                      <a:r>
+                        <a:rPr lang="en-US" sz="1400"/>
+                        <a:t> w</a:t>
+                      </a:r>
+                      <a:r>
+                        <a:rPr lang="en-US" sz="1400" baseline="-25000"/>
+                        <a:t>Δ1yrRecTDs</a:t>
+                      </a:r>
+                      <a:r>
+                        <a:rPr lang="en-US" sz="1400"/>
+                        <a:t> w</a:t>
+                      </a:r>
+                      <a:r>
+                        <a:rPr lang="en-US" sz="1400" baseline="-25000"/>
+                        <a:t>ESPN</a:t>
+                      </a:r>
+                      <a:r>
+                        <a:rPr lang="en-US" sz="1400"/>
+                        <a:t> ]</a:t>
+                      </a:r>
+                    </a:p>
+                  </a:txBody>
+                  <a:tcPr anchor="ctr"/>
+                </a:tc>
+                <a:tc rowSpan="2">
+                  <a:txBody>
+                    <a:bodyPr/>
+                    <a:lstStyle/>
+                    <a:p>
+                      <a:pPr marL="0" marR="0" indent="0" algn="ctr" defTabSz="457105" rtl="0" eaLnBrk="1" fontAlgn="auto" latinLnBrk="0" hangingPunct="1">
+                        <a:lnSpc>
+                          <a:spcPct val="100000"/>
+                        </a:lnSpc>
+                        <a:spcBef>
+                          <a:spcPts val="0"/>
+                        </a:spcBef>
+                        <a:spcAft>
+                          <a:spcPts val="0"/>
+                        </a:spcAft>
+                        <a:buClrTx/>
+                        <a:buSzTx/>
+                        <a:buFontTx/>
+                        <a:buNone/>
+                        <a:tabLst/>
+                        <a:defRPr/>
+                      </a:pPr>
+                      <a:r>
                         <a:rPr lang="en-US" sz="1600"/>
-                        <a:t>β</a:t>
-                      </a:r>
-                      <a:r>
-                        <a:rPr lang="en-US" sz="1600" baseline="-25000"/>
-                        <a:t>1 </a:t>
-                      </a:r>
-                      <a:r>
-                        <a:rPr lang="en-US" sz="1600" baseline="0"/>
-                        <a:t>= [-8.45, 1.17, 27.46, -0.12, 11.5, 13.35]</a:t>
-                      </a:r>
-                      <a:r>
-                        <a:rPr lang="en-US" sz="1600" baseline="-25000"/>
-                        <a:t/>
-                      </a:r>
-                      <a:br>
-                        <a:rPr lang="en-US" sz="1600" baseline="-25000"/>
-                      </a:br>
-                      <a:r>
-                        <a:rPr lang="en-US" sz="1600"/>
-                        <a:t>β</a:t>
-                      </a:r>
-                      <a:r>
-                        <a:rPr lang="en-US" sz="1600" baseline="-25000"/>
-                        <a:t>2 </a:t>
-                      </a:r>
-                      <a:r>
-                        <a:rPr lang="en-US" sz="1600" baseline="0"/>
-                        <a:t>= [-0.54, 0.2, 4.82, -0.085, -0.089, 4.20]</a:t>
+                        <a:t>1.7621</a:t>
                       </a:r>
                       <a:endParaRPr lang="en-US" sz="1600" b="0"/>
                     </a:p>
                   </a:txBody>
                   <a:tcPr anchor="ctr"/>
+                </a:tc>
+              </a:tr>
+              <a:tr h="300567">
+                <a:tc vMerge="1">
+                  <a:txBody>
+                    <a:bodyPr/>
+                    <a:lstStyle/>
+                    <a:p>
+                      <a:endParaRPr lang="en-US"/>
+                    </a:p>
+                  </a:txBody>
+                  <a:tcPr/>
                 </a:tc>
                 <a:tc>
                   <a:txBody>
                     <a:bodyPr/>
                     <a:lstStyle/>
                     <a:p>
-                      <a:pPr algn="ctr"/>
+                      <a:pPr marL="0" marR="0" indent="0" algn="ctr" defTabSz="457105" rtl="0" eaLnBrk="1" fontAlgn="auto" latinLnBrk="0" hangingPunct="1">
+                        <a:lnSpc>
+                          <a:spcPct val="100000"/>
+                        </a:lnSpc>
+                        <a:spcBef>
+                          <a:spcPts val="0"/>
+                        </a:spcBef>
+                        <a:spcAft>
+                          <a:spcPts val="0"/>
+                        </a:spcAft>
+                        <a:buClrTx/>
+                        <a:buSzTx/>
+                        <a:buFontTx/>
+                        <a:buNone/>
+                        <a:tabLst/>
+                        <a:defRPr/>
+                      </a:pPr>
                       <a:r>
                         <a:rPr lang="en-US" sz="1600"/>
-                        <a:t>1.2053</a:t>
+                        <a:t>β</a:t>
+                      </a:r>
+                      <a:r>
+                        <a:rPr lang="en-US" sz="1600" baseline="-25000"/>
+                        <a:t> </a:t>
+                      </a:r>
+                      <a:r>
+                        <a:rPr lang="en-US" sz="1600" baseline="0"/>
+                        <a:t>= [0.10, 0.079, 10.23, -0.06, -3.09, -0.403]</a:t>
                       </a:r>
                       <a:endParaRPr lang="en-US" sz="1600" b="0"/>
                     </a:p>
                   </a:txBody>
-                  <a:tcPr anchor="ctr"/>
+                  <a:tcPr anchor="ctr">
+                    <a:solidFill>
+                      <a:srgbClr val="CCCCCC"/>
+                    </a:solidFill>
+                  </a:tcPr>
+                </a:tc>
+                <a:tc vMerge="1">
+                  <a:txBody>
+                    <a:bodyPr/>
+                    <a:lstStyle/>
+                    <a:p>
+                      <a:endParaRPr lang="en-US"/>
+                    </a:p>
+                  </a:txBody>
+                  <a:tcPr/>
                 </a:tc>
               </a:tr>
-              <a:tr h="601133">
-                <a:tc>
+              <a:tr h="167640">
+                <a:tc rowSpan="2">
                   <a:txBody>
                     <a:bodyPr/>
                     <a:lstStyle/>
                     <a:p>
                       <a:pPr algn="ctr"/>
                       <a:r>
-                        <a:rPr lang="en-US" sz="1600"/>
-                        <a:t>2</a:t>
-                      </a:r>
-                      <a:endParaRPr lang="en-US" sz="1600" b="0"/>
+                        <a:rPr lang="en-US" sz="1600" b="0"/>
+                        <a:t>3 Features</a:t>
+                      </a:r>
                     </a:p>
                   </a:txBody>
-                  <a:tcPr anchor="ctr"/>
+                  <a:tcPr anchor="ctr">
+                    <a:solidFill>
+                      <a:schemeClr val="accent5"/>
+                    </a:solidFill>
+                  </a:tcPr>
                 </a:tc>
                 <a:tc>
                   <a:txBody>
                     <a:bodyPr/>
                     <a:lstStyle/>
                     <a:p>
-                      <a:pPr algn="ctr"/>
-                      <a:r>
-                        <a:rPr lang="en-US" sz="1600"/>
-                        <a:t>Catches</a:t>
-                      </a:r>
-                      <a:br>
-                        <a:rPr lang="en-US" sz="1600"/>
-                      </a:br>
-                      <a:r>
-                        <a:rPr lang="en-US" sz="1600"/>
-                        <a:t>Fantasy</a:t>
-                      </a:r>
-                      <a:r>
-                        <a:rPr lang="en-US" sz="1600" baseline="0"/>
-                        <a:t> Points</a:t>
-                      </a:r>
-                    </a:p>
-                    <a:p>
-                      <a:pPr algn="ctr"/>
-                      <a:r>
-                        <a:rPr lang="en-US" sz="1600" baseline="0"/>
-                        <a:t>Targets</a:t>
-                      </a:r>
-                      <a:endParaRPr lang="en-US" sz="1600" b="0"/>
+                      <a:pPr marL="0" marR="0" indent="0" algn="ctr" defTabSz="457105" rtl="0" eaLnBrk="1" fontAlgn="auto" latinLnBrk="0" hangingPunct="1">
+                        <a:lnSpc>
+                          <a:spcPct val="100000"/>
+                        </a:lnSpc>
+                        <a:spcBef>
+                          <a:spcPts val="0"/>
+                        </a:spcBef>
+                        <a:spcAft>
+                          <a:spcPts val="0"/>
+                        </a:spcAft>
+                        <a:buClrTx/>
+                        <a:buSzTx/>
+                        <a:buFontTx/>
+                        <a:buNone/>
+                        <a:tabLst/>
+                        <a:defRPr/>
+                      </a:pPr>
+                      <a:r>
+                        <a:rPr lang="en-US" sz="1400"/>
+                        <a:t>β = [ w</a:t>
+                      </a:r>
+                      <a:r>
+                        <a:rPr lang="en-US" sz="1400" baseline="-25000"/>
+                        <a:t>FantasyPts</a:t>
+                      </a:r>
+                      <a:r>
+                        <a:rPr lang="en-US" sz="1400"/>
+                        <a:t> w</a:t>
+                      </a:r>
+                      <a:r>
+                        <a:rPr lang="en-US" sz="1400" baseline="-25000"/>
+                        <a:t>RecYds</a:t>
+                      </a:r>
+                      <a:r>
+                        <a:rPr lang="en-US" sz="1400"/>
+                        <a:t> w</a:t>
+                      </a:r>
+                      <a:r>
+                        <a:rPr lang="en-US" sz="1400" baseline="-25000"/>
+                        <a:t>RecTDs</a:t>
+                      </a:r>
+                      <a:r>
+                        <a:rPr lang="en-US" sz="1400" baseline="0"/>
+                        <a:t> </a:t>
+                      </a:r>
+                      <a:r>
+                        <a:rPr lang="en-US" sz="1400"/>
+                        <a:t>]</a:t>
+                      </a:r>
                     </a:p>
                   </a:txBody>
-                  <a:tcPr anchor="ctr"/>
+                  <a:tcPr anchor="ctr">
+                    <a:solidFill>
+                      <a:schemeClr val="accent5"/>
+                    </a:solidFill>
+                  </a:tcPr>
+                </a:tc>
+                <a:tc rowSpan="2">
+                  <a:txBody>
+                    <a:bodyPr/>
+                    <a:lstStyle/>
+                    <a:p>
+                      <a:pPr marL="0" marR="0" indent="0" algn="ctr" defTabSz="457105" rtl="0" eaLnBrk="1" fontAlgn="auto" latinLnBrk="0" hangingPunct="1">
+                        <a:lnSpc>
+                          <a:spcPct val="100000"/>
+                        </a:lnSpc>
+                        <a:spcBef>
+                          <a:spcPts val="0"/>
+                        </a:spcBef>
+                        <a:spcAft>
+                          <a:spcPts val="0"/>
+                        </a:spcAft>
+                        <a:buClrTx/>
+                        <a:buSzTx/>
+                        <a:buFontTx/>
+                        <a:buNone/>
+                        <a:tabLst/>
+                        <a:defRPr/>
+                      </a:pPr>
+                      <a:r>
+                        <a:rPr lang="en-US" sz="1600" b="0"/>
+                        <a:t>1.7806</a:t>
+                      </a:r>
+                    </a:p>
+                  </a:txBody>
+                  <a:tcPr anchor="ctr">
+                    <a:solidFill>
+                      <a:schemeClr val="accent5"/>
+                    </a:solidFill>
+                  </a:tcPr>
+                </a:tc>
+              </a:tr>
+              <a:tr h="167640">
+                <a:tc vMerge="1">
+                  <a:txBody>
+                    <a:bodyPr/>
+                    <a:lstStyle/>
+                    <a:p>
+                      <a:endParaRPr lang="en-US"/>
+                    </a:p>
+                  </a:txBody>
+                  <a:tcPr/>
                 </a:tc>
                 <a:tc>
                   <a:txBody>
                     <a:bodyPr/>
                     <a:lstStyle/>
                     <a:p>
-                      <a:pPr algn="ctr"/>
+                      <a:pPr marL="0" marR="0" indent="0" algn="ctr" defTabSz="457105" rtl="0" eaLnBrk="1" fontAlgn="auto" latinLnBrk="0" hangingPunct="1">
+                        <a:lnSpc>
+                          <a:spcPct val="100000"/>
+                        </a:lnSpc>
+                        <a:spcBef>
+                          <a:spcPts val="0"/>
+                        </a:spcBef>
+                        <a:spcAft>
+                          <a:spcPts val="0"/>
+                        </a:spcAft>
+                        <a:buClrTx/>
+                        <a:buSzTx/>
+                        <a:buFontTx/>
+                        <a:buNone/>
+                        <a:tabLst/>
+                        <a:defRPr/>
+                      </a:pPr>
                       <a:r>
                         <a:rPr lang="en-US" sz="1600"/>
-                        <a:t>β</a:t>
-                      </a:r>
-                      <a:r>
-                        <a:rPr lang="en-US" sz="1600" baseline="-25000"/>
-                        <a:t>1 </a:t>
+                        <a:t>β = [</a:t>
                       </a:r>
                       <a:r>
                         <a:rPr lang="en-US" sz="1600" baseline="0"/>
-                        <a:t>= [2.71, -0.42, 0.61, -0.89, 45.02, 42.26]</a:t>
-                      </a:r>
-                      <a:r>
-                        <a:rPr lang="en-US" sz="1600" baseline="-25000"/>
-                        <a:t/>
-                      </a:r>
-                      <a:br>
-                        <a:rPr lang="en-US" sz="1600" baseline="-25000"/>
-                      </a:br>
-                      <a:r>
-                        <a:rPr lang="en-US" sz="1600"/>
-                        <a:t>β</a:t>
-                      </a:r>
-                      <a:r>
-                        <a:rPr lang="en-US" sz="1600" baseline="-25000"/>
-                        <a:t>2 </a:t>
-                      </a:r>
-                      <a:r>
-                        <a:rPr lang="en-US" sz="1600" baseline="0"/>
-                        <a:t>= [-0.70, 0.23, 4.00, -0.084, 0.83, 2.64]</a:t>
+                        <a:t>1.72, -0.061, -5.08]</a:t>
                       </a:r>
                       <a:endParaRPr lang="en-US" sz="1600" b="0"/>
                     </a:p>
                   </a:txBody>
-                  <a:tcPr anchor="ctr"/>
+                  <a:tcPr anchor="ctr">
+                    <a:solidFill>
+                      <a:schemeClr val="accent5"/>
+                    </a:solidFill>
+                  </a:tcPr>
                 </a:tc>
-                <a:tc>
+                <a:tc vMerge="1">
+                  <a:txBody>
+                    <a:bodyPr/>
+                    <a:lstStyle/>
+                    <a:p>
+                      <a:endParaRPr lang="en-US"/>
+                    </a:p>
+                  </a:txBody>
+                  <a:tcPr/>
+                </a:tc>
+              </a:tr>
+              <a:tr h="167640">
+                <a:tc rowSpan="2">
                   <a:txBody>
                     <a:bodyPr/>
                     <a:lstStyle/>
                     <a:p>
                       <a:pPr algn="ctr"/>
                       <a:r>
-                        <a:rPr lang="en-US" sz="1600"/>
-                        <a:t>1.1887</a:t>
-                      </a:r>
-                      <a:endParaRPr lang="en-US" sz="1600" b="0"/>
-                    </a:p>
-                  </a:txBody>
-                  <a:tcPr anchor="ctr"/>
-                </a:tc>
-              </a:tr>
-              <a:tr h="601133">
-                <a:tc>
-                  <a:txBody>
-                    <a:bodyPr/>
-                    <a:lstStyle/>
-                    <a:p>
-                      <a:pPr algn="ctr"/>
-                      <a:r>
-                        <a:rPr lang="en-US" sz="1600"/>
-                        <a:t>2</a:t>
-                      </a:r>
-                      <a:endParaRPr lang="en-US" sz="1600" b="0"/>
-                    </a:p>
-                  </a:txBody>
-                  <a:tcPr anchor="ctr"/>
-                </a:tc>
-                <a:tc>
-                  <a:txBody>
-                    <a:bodyPr/>
-                    <a:lstStyle/>
-                    <a:p>
-                      <a:pPr algn="ctr"/>
-                      <a:r>
-                        <a:rPr lang="en-US" sz="1600"/>
-                        <a:t>Catches</a:t>
-                      </a:r>
-                      <a:endParaRPr lang="en-US" sz="1600" b="0"/>
+                        <a:rPr lang="en-US" sz="1600" b="0"/>
+                        <a:t>2 Features</a:t>
+                      </a:r>
                     </a:p>
                   </a:txBody>
                   <a:tcPr anchor="ctr"/>
@@ -10188,87 +10322,78 @@
                         <a:defRPr/>
                       </a:pPr>
                       <a:r>
-                        <a:rPr lang="en-US" sz="1600"/>
-                        <a:t>β</a:t>
-                      </a:r>
-                      <a:r>
-                        <a:rPr lang="en-US" sz="1600" baseline="-25000"/>
-                        <a:t>1 </a:t>
-                      </a:r>
-                      <a:r>
-                        <a:rPr lang="en-US" sz="1600" baseline="0"/>
-                        <a:t>= [-1.04, 0.27, 6.02, -0.083, 0.16, 3.02]</a:t>
-                      </a:r>
-                      <a:r>
-                        <a:rPr lang="en-US" sz="1600" baseline="-25000"/>
-                        <a:t/>
-                      </a:r>
-                      <a:br>
-                        <a:rPr lang="en-US" sz="1600" baseline="-25000"/>
-                      </a:br>
-                      <a:r>
-                        <a:rPr lang="en-US" sz="1600"/>
-                        <a:t>β</a:t>
-                      </a:r>
-                      <a:r>
-                        <a:rPr lang="en-US" sz="1600" baseline="-25000"/>
-                        <a:t>2 </a:t>
-                      </a:r>
-                      <a:r>
-                        <a:rPr lang="en-US" sz="1600" baseline="0"/>
-                        <a:t>= [4.98, -0.99, 68.03, -0.32, 56.68, 24.8]</a:t>
-                      </a:r>
-                      <a:endParaRPr lang="en-US" sz="1600" b="0"/>
+                        <a:rPr lang="en-US" sz="1400"/>
+                        <a:t>β = [ w</a:t>
+                      </a:r>
+                      <a:r>
+                        <a:rPr lang="en-US" sz="1400" baseline="-25000"/>
+                        <a:t>FantasyPts</a:t>
+                      </a:r>
+                      <a:r>
+                        <a:rPr lang="en-US" sz="1400"/>
+                        <a:t> w</a:t>
+                      </a:r>
+                      <a:r>
+                        <a:rPr lang="en-US" sz="1400" baseline="-25000"/>
+                        <a:t>RecTDs</a:t>
+                      </a:r>
+                      <a:r>
+                        <a:rPr lang="en-US" sz="1400" baseline="0"/>
+                        <a:t> </a:t>
+                      </a:r>
+                      <a:r>
+                        <a:rPr lang="en-US" sz="1400"/>
+                        <a:t>]</a:t>
+                      </a:r>
                     </a:p>
                   </a:txBody>
-                  <a:tcPr anchor="ctr"/>
+                  <a:tcPr anchor="ctr">
+                    <a:solidFill>
+                      <a:srgbClr val="CCCCCC"/>
+                    </a:solidFill>
+                  </a:tcPr>
                 </a:tc>
-                <a:tc>
+                <a:tc rowSpan="2">
                   <a:txBody>
                     <a:bodyPr/>
                     <a:lstStyle/>
                     <a:p>
-                      <a:pPr algn="ctr"/>
-                      <a:r>
-                        <a:rPr lang="en-US" sz="1600"/>
-                        <a:t>1.1811</a:t>
-                      </a:r>
-                      <a:endParaRPr lang="en-US" sz="1600" b="0"/>
+                      <a:pPr marL="0" marR="0" indent="0" algn="ctr" defTabSz="457105" rtl="0" eaLnBrk="1" fontAlgn="auto" latinLnBrk="0" hangingPunct="1">
+                        <a:lnSpc>
+                          <a:spcPct val="100000"/>
+                        </a:lnSpc>
+                        <a:spcBef>
+                          <a:spcPts val="0"/>
+                        </a:spcBef>
+                        <a:spcAft>
+                          <a:spcPts val="0"/>
+                        </a:spcAft>
+                        <a:buClrTx/>
+                        <a:buSzTx/>
+                        <a:buFontTx/>
+                        <a:buNone/>
+                        <a:tabLst/>
+                        <a:defRPr/>
+                      </a:pPr>
+                      <a:r>
+                        <a:rPr lang="en-US" sz="1600" b="0"/>
+                        <a:t>1.7896</a:t>
+                      </a:r>
                     </a:p>
                   </a:txBody>
                   <a:tcPr anchor="ctr"/>
                 </a:tc>
               </a:tr>
-              <a:tr h="601133">
-                <a:tc>
+              <a:tr h="167640">
+                <a:tc vMerge="1">
                   <a:txBody>
                     <a:bodyPr/>
                     <a:lstStyle/>
                     <a:p>
-                      <a:pPr algn="ctr"/>
-                      <a:r>
-                        <a:rPr lang="en-US" sz="1600"/>
-                        <a:t>2</a:t>
-                      </a:r>
-                      <a:endParaRPr lang="en-US" sz="1600" b="0"/>
+                      <a:endParaRPr lang="en-US"/>
                     </a:p>
                   </a:txBody>
-                  <a:tcPr anchor="ctr"/>
-                </a:tc>
-                <a:tc>
-                  <a:txBody>
-                    <a:bodyPr/>
-                    <a:lstStyle/>
-                    <a:p>
-                      <a:pPr algn="ctr"/>
-                      <a:r>
-                        <a:rPr lang="en-US" sz="1600"/>
-                        <a:t>Touchdowns</a:t>
-                      </a:r>
-                      <a:endParaRPr lang="en-US" sz="1600" b="0"/>
-                    </a:p>
-                  </a:txBody>
-                  <a:tcPr anchor="ctr"/>
+                  <a:tcPr/>
                 </a:tc>
                 <a:tc>
                   <a:txBody>
@@ -10294,86 +10419,54 @@
                       </a:pPr>
                       <a:r>
                         <a:rPr lang="en-US" sz="1600"/>
-                        <a:t>β</a:t>
-                      </a:r>
-                      <a:r>
-                        <a:rPr lang="en-US" sz="1600" baseline="-25000"/>
-                        <a:t>1 </a:t>
+                        <a:t>β = [1.15,</a:t>
                       </a:r>
                       <a:r>
                         <a:rPr lang="en-US" sz="1600" baseline="0"/>
-                        <a:t>= [-4.09, 0.56, 24.85, -0.02, -4.31, 3.59]</a:t>
-                      </a:r>
-                      <a:r>
-                        <a:rPr lang="en-US" sz="1600" baseline="-25000"/>
-                        <a:t/>
-                      </a:r>
-                      <a:br>
-                        <a:rPr lang="en-US" sz="1600" baseline="-25000"/>
-                      </a:br>
+                        <a:t> </a:t>
+                      </a:r>
                       <a:r>
                         <a:rPr lang="en-US" sz="1600"/>
-                        <a:t>β</a:t>
-                      </a:r>
-                      <a:r>
-                        <a:rPr lang="en-US" sz="1600" baseline="-25000"/>
-                        <a:t>2 </a:t>
-                      </a:r>
-                      <a:r>
-                        <a:rPr lang="en-US" sz="1600" baseline="0"/>
-                        <a:t>= [44.5, -4.44, -288, 0.11, 48.39, 52.04]</a:t>
+                        <a:t>-2.031]</a:t>
                       </a:r>
                       <a:endParaRPr lang="en-US" sz="1600" b="0"/>
                     </a:p>
                   </a:txBody>
-                  <a:tcPr anchor="ctr"/>
+                  <a:tcPr anchor="ctr">
+                    <a:solidFill>
+                      <a:srgbClr val="CCCCCC"/>
+                    </a:solidFill>
+                  </a:tcPr>
                 </a:tc>
-                <a:tc>
+                <a:tc vMerge="1">
+                  <a:txBody>
+                    <a:bodyPr/>
+                    <a:lstStyle/>
+                    <a:p>
+                      <a:endParaRPr lang="en-US"/>
+                    </a:p>
+                  </a:txBody>
+                  <a:tcPr/>
+                </a:tc>
+              </a:tr>
+              <a:tr h="167640">
+                <a:tc rowSpan="2">
                   <a:txBody>
                     <a:bodyPr/>
                     <a:lstStyle/>
                     <a:p>
                       <a:pPr algn="ctr"/>
                       <a:r>
-                        <a:rPr lang="en-US" sz="1600"/>
-                        <a:t>1.1107</a:t>
-                      </a:r>
-                      <a:endParaRPr lang="en-US" sz="1600" b="0"/>
+                        <a:rPr lang="en-US" sz="1600" b="0"/>
+                        <a:t>2 Features</a:t>
+                      </a:r>
                     </a:p>
                   </a:txBody>
-                  <a:tcPr anchor="ctr"/>
-                </a:tc>
-              </a:tr>
-              <a:tr h="601133">
-                <a:tc>
-                  <a:txBody>
-                    <a:bodyPr/>
-                    <a:lstStyle/>
-                    <a:p>
-                      <a:pPr algn="ctr"/>
-                      <a:r>
-                        <a:rPr lang="en-US" sz="1600"/>
-                        <a:t>2</a:t>
-                      </a:r>
-                      <a:endParaRPr lang="en-US" sz="1600" b="0"/>
-                    </a:p>
-                  </a:txBody>
-                  <a:tcPr anchor="ctr"/>
-                </a:tc>
-                <a:tc>
-                  <a:txBody>
-                    <a:bodyPr/>
-                    <a:lstStyle/>
-                    <a:p>
-                      <a:pPr algn="ctr"/>
-                      <a:r>
-                        <a:rPr lang="en-US" sz="1600"/>
-                        <a:t>Receiving Yards</a:t>
-                      </a:r>
-                      <a:endParaRPr lang="en-US" sz="1600" b="0"/>
-                    </a:p>
-                  </a:txBody>
-                  <a:tcPr anchor="ctr"/>
+                  <a:tcPr anchor="ctr">
+                    <a:solidFill>
+                      <a:schemeClr val="accent5"/>
+                    </a:solidFill>
+                  </a:tcPr>
                 </a:tc>
                 <a:tc>
                   <a:txBody>
@@ -10398,148 +10491,137 @@
                         <a:defRPr/>
                       </a:pPr>
                       <a:r>
-                        <a:rPr lang="en-US" sz="1600"/>
-                        <a:t>β</a:t>
-                      </a:r>
-                      <a:r>
-                        <a:rPr lang="en-US" sz="1600" baseline="-25000"/>
-                        <a:t>1 </a:t>
-                      </a:r>
-                      <a:r>
-                        <a:rPr lang="en-US" sz="1600" baseline="0"/>
-                        <a:t>= [-3.48, 0.48, 25.5, -0.06, -0.51, 5.64]</a:t>
-                      </a:r>
-                      <a:r>
-                        <a:rPr lang="en-US" sz="1600" baseline="-25000"/>
-                        <a:t/>
-                      </a:r>
-                      <a:br>
-                        <a:rPr lang="en-US" sz="1600" baseline="-25000"/>
-                      </a:br>
-                      <a:r>
-                        <a:rPr lang="en-US" sz="1600"/>
-                        <a:t>β</a:t>
-                      </a:r>
-                      <a:r>
-                        <a:rPr lang="en-US" sz="1600" baseline="-25000"/>
-                        <a:t>2 </a:t>
-                      </a:r>
-                      <a:r>
-                        <a:rPr lang="en-US" sz="1600" baseline="0"/>
-                        <a:t>= [17.87, -1.5, -115.9, -0.06, 3.82, 6.90]</a:t>
-                      </a:r>
-                      <a:endParaRPr lang="en-US" sz="1600" b="0"/>
+                        <a:rPr lang="en-US" sz="1400"/>
+                        <a:t>β = [ w</a:t>
+                      </a:r>
+                      <a:r>
+                        <a:rPr lang="en-US" sz="1400" baseline="-25000"/>
+                        <a:t>FantasyPts</a:t>
+                      </a:r>
+                      <a:r>
+                        <a:rPr lang="en-US" sz="1400"/>
+                        <a:t> w</a:t>
+                      </a:r>
+                      <a:r>
+                        <a:rPr lang="en-US" sz="1400" baseline="-25000"/>
+                        <a:t>RecYds</a:t>
+                      </a:r>
+                      <a:r>
+                        <a:rPr lang="en-US" sz="1400" baseline="0"/>
+                        <a:t> </a:t>
+                      </a:r>
+                      <a:r>
+                        <a:rPr lang="en-US" sz="1400"/>
+                        <a:t>]</a:t>
+                      </a:r>
                     </a:p>
                   </a:txBody>
-                  <a:tcPr anchor="ctr"/>
+                  <a:tcPr anchor="ctr">
+                    <a:solidFill>
+                      <a:schemeClr val="accent5"/>
+                    </a:solidFill>
+                  </a:tcPr>
+                </a:tc>
+                <a:tc rowSpan="2">
+                  <a:txBody>
+                    <a:bodyPr/>
+                    <a:lstStyle/>
+                    <a:p>
+                      <a:pPr marL="0" marR="0" indent="0" algn="ctr" defTabSz="457105" rtl="0" eaLnBrk="1" fontAlgn="auto" latinLnBrk="0" hangingPunct="1">
+                        <a:lnSpc>
+                          <a:spcPct val="100000"/>
+                        </a:lnSpc>
+                        <a:spcBef>
+                          <a:spcPts val="0"/>
+                        </a:spcBef>
+                        <a:spcAft>
+                          <a:spcPts val="0"/>
+                        </a:spcAft>
+                        <a:buClrTx/>
+                        <a:buSzTx/>
+                        <a:buFontTx/>
+                        <a:buNone/>
+                        <a:tabLst/>
+                        <a:defRPr/>
+                      </a:pPr>
+                      <a:r>
+                        <a:rPr lang="en-US" sz="1600" b="0"/>
+                        <a:t>1.7863</a:t>
+                      </a:r>
+                    </a:p>
+                  </a:txBody>
+                  <a:tcPr anchor="ctr">
+                    <a:solidFill>
+                      <a:schemeClr val="accent5"/>
+                    </a:solidFill>
+                  </a:tcPr>
+                </a:tc>
+              </a:tr>
+              <a:tr h="167640">
+                <a:tc vMerge="1">
+                  <a:txBody>
+                    <a:bodyPr/>
+                    <a:lstStyle/>
+                    <a:p>
+                      <a:endParaRPr lang="en-US"/>
+                    </a:p>
+                  </a:txBody>
+                  <a:tcPr/>
                 </a:tc>
                 <a:tc>
                   <a:txBody>
                     <a:bodyPr/>
                     <a:lstStyle/>
                     <a:p>
-                      <a:pPr algn="ctr"/>
+                      <a:pPr marL="0" marR="0" indent="0" algn="ctr" defTabSz="457105" rtl="0" eaLnBrk="1" fontAlgn="auto" latinLnBrk="0" hangingPunct="1">
+                        <a:lnSpc>
+                          <a:spcPct val="100000"/>
+                        </a:lnSpc>
+                        <a:spcBef>
+                          <a:spcPts val="0"/>
+                        </a:spcBef>
+                        <a:spcAft>
+                          <a:spcPts val="0"/>
+                        </a:spcAft>
+                        <a:buClrTx/>
+                        <a:buSzTx/>
+                        <a:buFontTx/>
+                        <a:buNone/>
+                        <a:tabLst/>
+                        <a:defRPr/>
+                      </a:pPr>
                       <a:r>
                         <a:rPr lang="en-US" sz="1600"/>
-                        <a:t>1.0857</a:t>
+                        <a:t>β = [0.92,</a:t>
+                      </a:r>
+                      <a:r>
+                        <a:rPr lang="en-US" sz="1600" baseline="0"/>
+                        <a:t> 0.019]</a:t>
                       </a:r>
                       <a:endParaRPr lang="en-US" sz="1600" b="0"/>
                     </a:p>
                   </a:txBody>
-                  <a:tcPr anchor="ctr"/>
+                  <a:tcPr anchor="ctr">
+                    <a:solidFill>
+                      <a:schemeClr val="accent5"/>
+                    </a:solidFill>
+                  </a:tcPr>
+                </a:tc>
+                <a:tc vMerge="1">
+                  <a:txBody>
+                    <a:bodyPr/>
+                    <a:lstStyle/>
+                    <a:p>
+                      <a:endParaRPr lang="en-US"/>
+                    </a:p>
+                  </a:txBody>
+                  <a:tcPr/>
                 </a:tc>
               </a:tr>
             </a:tbl>
           </a:graphicData>
         </a:graphic>
       </p:graphicFrame>
-      <p:sp>
-        <p:nvSpPr>
-          <p:cNvPr id="28" name="TextBox 27"/>
-          <p:cNvSpPr txBox="1"/>
-          <p:nvPr/>
-        </p:nvSpPr>
-        <p:spPr>
-          <a:xfrm>
-            <a:off x="19491324" y="16325644"/>
-            <a:ext cx="8734427" cy="523220"/>
-          </a:xfrm>
-          <a:prstGeom prst="rect">
-            <a:avLst/>
-          </a:prstGeom>
-          <a:noFill/>
-        </p:spPr>
-        <p:txBody>
-          <a:bodyPr wrap="square" rtlCol="0">
-            <a:spAutoFit/>
-          </a:bodyPr>
-          <a:lstStyle/>
-          <a:p>
-            <a:pPr algn="ctr"/>
-            <a:r>
-              <a:rPr lang="en-US"/>
-              <a:t>β</a:t>
-            </a:r>
-            <a:r>
-              <a:rPr lang="en-US" baseline="-25000"/>
-              <a:t>i</a:t>
-            </a:r>
-            <a:r>
-              <a:rPr lang="en-US"/>
-              <a:t> = [ w</a:t>
-            </a:r>
-            <a:r>
-              <a:rPr lang="en-US" baseline="-25000"/>
-              <a:t>FantasyPts</a:t>
-            </a:r>
-            <a:r>
-              <a:rPr lang="en-US"/>
-              <a:t> w</a:t>
-            </a:r>
-            <a:r>
-              <a:rPr lang="en-US" baseline="-25000"/>
-              <a:t>RecYds</a:t>
-            </a:r>
-            <a:r>
-              <a:rPr lang="en-US"/>
-              <a:t> w</a:t>
-            </a:r>
-            <a:r>
-              <a:rPr lang="en-US" baseline="-25000"/>
-              <a:t>RecTDs</a:t>
-            </a:r>
-            <a:r>
-              <a:rPr lang="en-US"/>
-              <a:t> w</a:t>
-            </a:r>
-            <a:r>
-              <a:rPr lang="en-US" baseline="-25000"/>
-              <a:t>Δ1yrRecYds</a:t>
-            </a:r>
-            <a:r>
-              <a:rPr lang="en-US"/>
-              <a:t> w</a:t>
-            </a:r>
-            <a:r>
-              <a:rPr lang="en-US" baseline="-25000"/>
-              <a:t>Δ1yrRecTDs</a:t>
-            </a:r>
-            <a:r>
-              <a:rPr lang="en-US"/>
-              <a:t> w</a:t>
-            </a:r>
-            <a:r>
-              <a:rPr lang="en-US" baseline="-25000"/>
-              <a:t>ESPN</a:t>
-            </a:r>
-            <a:r>
-              <a:rPr lang="en-US"/>
-              <a:t> ]</a:t>
-            </a:r>
-            <a:endParaRPr lang="en-US" baseline="-25000"/>
-          </a:p>
-        </p:txBody>
-      </p:sp>
       <p:sp>
         <p:nvSpPr>
           <p:cNvPr id="29" name="TextBox 28"/>
@@ -10565,15 +10647,7 @@
             <a:pPr algn="ctr"/>
             <a:r>
               <a:rPr lang="en-US"/>
-              <a:t>β</a:t>
-            </a:r>
-            <a:r>
-              <a:rPr lang="en-US" baseline="-25000"/>
-              <a:t>i</a:t>
-            </a:r>
-            <a:r>
-              <a:rPr lang="en-US"/>
-              <a:t> = [ w</a:t>
+              <a:t>β = [ w</a:t>
             </a:r>
             <a:r>
               <a:rPr lang="en-US" baseline="-25000"/>
@@ -10707,6 +10781,57 @@
           </a:prstGeom>
         </p:spPr>
       </p:pic>
+      <p:sp>
+        <p:nvSpPr>
+          <p:cNvPr id="24" name="TextBox 23"/>
+          <p:cNvSpPr txBox="1"/>
+          <p:nvPr/>
+        </p:nvSpPr>
+        <p:spPr>
+          <a:xfrm>
+            <a:off x="10040599" y="24455817"/>
+            <a:ext cx="8734427" cy="523220"/>
+          </a:xfrm>
+          <a:prstGeom prst="rect">
+            <a:avLst/>
+          </a:prstGeom>
+          <a:noFill/>
+        </p:spPr>
+        <p:txBody>
+          <a:bodyPr wrap="square" rtlCol="0">
+            <a:spAutoFit/>
+          </a:bodyPr>
+          <a:lstStyle/>
+          <a:p>
+            <a:pPr algn="ctr"/>
+            <a:r>
+              <a:rPr lang="en-US"/>
+              <a:t>β = [ w</a:t>
+            </a:r>
+            <a:r>
+              <a:rPr lang="en-US" baseline="-25000"/>
+              <a:t>1</a:t>
+            </a:r>
+            <a:r>
+              <a:rPr lang="en-US"/>
+              <a:t> … w</a:t>
+            </a:r>
+            <a:r>
+              <a:rPr lang="en-US" baseline="-25000"/>
+              <a:t>L</a:t>
+            </a:r>
+            <a:r>
+              <a:rPr lang="en-US"/>
+              <a:t> </a:t>
+            </a:r>
+            <a:r>
+              <a:rPr lang="en-US"/>
+              <a:t>]</a:t>
+            </a:r>
+            <a:endParaRPr lang="en-US" baseline="-25000"/>
+          </a:p>
+        </p:txBody>
+      </p:sp>
     </p:spTree>
   </p:cSld>
   <p:clrMapOvr>

</xml_diff>

<commit_message>
updating poster with b values
</commit_message>
<xml_diff>
--- a/poster/jpo4_poster.pptx
+++ b/poster/jpo4_poster.pptx
@@ -7904,7 +7904,7 @@
         </p:nvSpPr>
         <p:spPr bwMode="auto">
           <a:xfrm>
-            <a:off x="600075" y="19331024"/>
+            <a:off x="600075" y="13701516"/>
             <a:ext cx="8734426" cy="892340"/>
           </a:xfrm>
           <a:prstGeom prst="rect">
@@ -8059,63 +8059,6 @@
       </p:pic>
       <p:sp>
         <p:nvSpPr>
-          <p:cNvPr id="88" name="Text Box 7"/>
-          <p:cNvSpPr txBox="1">
-            <a:spLocks noChangeArrowheads="1"/>
-          </p:cNvSpPr>
-          <p:nvPr/>
-        </p:nvSpPr>
-        <p:spPr bwMode="auto">
-          <a:xfrm>
-            <a:off x="10056813" y="5638800"/>
-            <a:ext cx="8734426" cy="892340"/>
-          </a:xfrm>
-          <a:prstGeom prst="rect">
-            <a:avLst/>
-          </a:prstGeom>
-          <a:solidFill>
-            <a:schemeClr val="accent2"/>
-          </a:solidFill>
-          <a:ln w="9525">
-            <a:noFill/>
-            <a:miter lim="800000"/>
-            <a:headEnd/>
-            <a:tailEnd/>
-          </a:ln>
-          <a:effectLst/>
-        </p:spPr>
-        <p:txBody>
-          <a:bodyPr lIns="91248" tIns="45615" rIns="91248" bIns="45615">
-            <a:prstTxWarp prst="textNoShape">
-              <a:avLst/>
-            </a:prstTxWarp>
-            <a:spAutoFit/>
-          </a:bodyPr>
-          <a:lstStyle/>
-          <a:p>
-            <a:pPr algn="ctr" eaLnBrk="0" hangingPunct="0">
-              <a:spcBef>
-                <a:spcPct val="50000"/>
-              </a:spcBef>
-            </a:pPr>
-            <a:r>
-              <a:rPr lang="en-US" sz="5200" b="1" dirty="0" smtClean="0">
-                <a:solidFill>
-                  <a:srgbClr val="F8F8F8"/>
-                </a:solidFill>
-              </a:rPr>
-              <a:t>Data</a:t>
-            </a:r>
-            <a:endParaRPr lang="en-US" sz="5200" b="1" dirty="0">
-              <a:solidFill>
-                <a:srgbClr val="F8F8F8"/>
-              </a:solidFill>
-            </a:endParaRPr>
-          </a:p>
-        </p:txBody>
-      </p:sp>
-      <p:sp>
-        <p:nvSpPr>
           <p:cNvPr id="89" name="Text Box 7"/>
           <p:cNvSpPr txBox="1">
             <a:spLocks noChangeArrowheads="1"/>
@@ -8161,7 +8104,7 @@
                   <a:srgbClr val="F8F8F8"/>
                 </a:solidFill>
               </a:rPr>
-              <a:t>Results</a:t>
+              <a:t>Linear Regression</a:t>
             </a:r>
             <a:endParaRPr lang="en-US" sz="5200" b="1" dirty="0">
               <a:solidFill>
@@ -8238,7 +8181,7 @@
         </p:nvSpPr>
         <p:spPr bwMode="auto">
           <a:xfrm>
-            <a:off x="10056813" y="16848864"/>
+            <a:off x="10040599" y="5638800"/>
             <a:ext cx="8734426" cy="892340"/>
           </a:xfrm>
           <a:prstGeom prst="rect">
@@ -8342,970 +8285,6 @@
           </a:p>
         </p:txBody>
       </p:sp>
-      <p:graphicFrame>
-        <p:nvGraphicFramePr>
-          <p:cNvPr id="16" name="Table 15"/>
-          <p:cNvGraphicFramePr>
-            <a:graphicFrameLocks noGrp="1"/>
-          </p:cNvGraphicFramePr>
-          <p:nvPr/>
-        </p:nvGraphicFramePr>
-        <p:xfrm>
-          <a:off x="29190229" y="19747884"/>
-          <a:ext cx="8276168" cy="6075678"/>
-        </p:xfrm>
-        <a:graphic>
-          <a:graphicData uri="http://schemas.openxmlformats.org/drawingml/2006/table">
-            <a:tbl>
-              <a:tblPr firstRow="1" bandRow="1">
-                <a:tableStyleId>{D7AC3CCA-C797-4891-BE02-D94E43425B78}</a:tableStyleId>
-              </a:tblPr>
-              <a:tblGrid>
-                <a:gridCol w="1028700"/>
-                <a:gridCol w="1794933"/>
-                <a:gridCol w="4021667"/>
-                <a:gridCol w="1430868"/>
-              </a:tblGrid>
-              <a:tr h="601133">
-                <a:tc>
-                  <a:txBody>
-                    <a:bodyPr/>
-                    <a:lstStyle/>
-                    <a:p>
-                      <a:pPr algn="ctr"/>
-                      <a:r>
-                        <a:rPr lang="en-US" sz="1600"/>
-                        <a:t>#</a:t>
-                      </a:r>
-                      <a:r>
-                        <a:rPr lang="en-US" sz="1600" baseline="0"/>
-                        <a:t> Mixtures</a:t>
-                      </a:r>
-                      <a:endParaRPr lang="en-US" sz="1600" b="1"/>
-                    </a:p>
-                  </a:txBody>
-                  <a:tcPr anchor="ctr"/>
-                </a:tc>
-                <a:tc>
-                  <a:txBody>
-                    <a:bodyPr/>
-                    <a:lstStyle/>
-                    <a:p>
-                      <a:pPr algn="ctr"/>
-                      <a:r>
-                        <a:rPr lang="en-US" sz="1600"/>
-                        <a:t>K Means Features</a:t>
-                      </a:r>
-                      <a:endParaRPr lang="en-US" sz="1600" b="1"/>
-                    </a:p>
-                  </a:txBody>
-                  <a:tcPr anchor="ctr"/>
-                </a:tc>
-                <a:tc>
-                  <a:txBody>
-                    <a:bodyPr/>
-                    <a:lstStyle/>
-                    <a:p>
-                      <a:pPr algn="ctr"/>
-                      <a:r>
-                        <a:rPr lang="en-US" sz="2000"/>
-                        <a:t>β</a:t>
-                      </a:r>
-                      <a:r>
-                        <a:rPr lang="en-US" sz="2000" baseline="-25000"/>
-                        <a:t>1 </a:t>
-                      </a:r>
-                      <a:r>
-                        <a:rPr lang="en-US" sz="2000" baseline="0"/>
-                        <a:t>… </a:t>
-                      </a:r>
-                      <a:r>
-                        <a:rPr lang="en-US" sz="2000"/>
-                        <a:t>β</a:t>
-                      </a:r>
-                      <a:r>
-                        <a:rPr lang="en-US" sz="2000" baseline="-25000"/>
-                        <a:t>K</a:t>
-                      </a:r>
-                      <a:endParaRPr lang="en-US" sz="2000" b="1"/>
-                    </a:p>
-                  </a:txBody>
-                  <a:tcPr anchor="ctr"/>
-                </a:tc>
-                <a:tc>
-                  <a:txBody>
-                    <a:bodyPr/>
-                    <a:lstStyle/>
-                    <a:p>
-                      <a:pPr algn="ctr"/>
-                      <a:r>
-                        <a:rPr lang="en-US" sz="1600"/>
-                        <a:t>Discounted</a:t>
-                      </a:r>
-                    </a:p>
-                    <a:p>
-                      <a:pPr algn="ctr"/>
-                      <a:r>
-                        <a:rPr lang="en-US" sz="1600"/>
-                        <a:t>Cumulative</a:t>
-                      </a:r>
-                    </a:p>
-                    <a:p>
-                      <a:pPr algn="ctr"/>
-                      <a:r>
-                        <a:rPr lang="en-US" sz="1600"/>
-                        <a:t>Gain</a:t>
-                      </a:r>
-                      <a:endParaRPr lang="en-US" sz="1600" b="1"/>
-                    </a:p>
-                  </a:txBody>
-                  <a:tcPr anchor="ctr"/>
-                </a:tc>
-              </a:tr>
-              <a:tr h="601133">
-                <a:tc>
-                  <a:txBody>
-                    <a:bodyPr/>
-                    <a:lstStyle/>
-                    <a:p>
-                      <a:pPr algn="ctr"/>
-                      <a:r>
-                        <a:rPr lang="en-US" sz="1600"/>
-                        <a:t>2</a:t>
-                      </a:r>
-                      <a:endParaRPr lang="en-US" sz="1600" b="0"/>
-                    </a:p>
-                  </a:txBody>
-                  <a:tcPr anchor="ctr"/>
-                </a:tc>
-                <a:tc>
-                  <a:txBody>
-                    <a:bodyPr/>
-                    <a:lstStyle/>
-                    <a:p>
-                      <a:pPr algn="ctr"/>
-                      <a:r>
-                        <a:rPr lang="en-US" sz="1600"/>
-                        <a:t>Catches</a:t>
-                      </a:r>
-                      <a:br>
-                        <a:rPr lang="en-US" sz="1600"/>
-                      </a:br>
-                      <a:r>
-                        <a:rPr lang="en-US" sz="1600"/>
-                        <a:t>Fantasy</a:t>
-                      </a:r>
-                      <a:r>
-                        <a:rPr lang="en-US" sz="1600" baseline="0"/>
-                        <a:t> Points</a:t>
-                      </a:r>
-                      <a:endParaRPr lang="en-US" sz="1600" b="0" baseline="0"/>
-                    </a:p>
-                  </a:txBody>
-                  <a:tcPr anchor="ctr"/>
-                </a:tc>
-                <a:tc>
-                  <a:txBody>
-                    <a:bodyPr/>
-                    <a:lstStyle/>
-                    <a:p>
-                      <a:pPr algn="ctr"/>
-                      <a:r>
-                        <a:rPr lang="en-US" sz="1600"/>
-                        <a:t>β</a:t>
-                      </a:r>
-                      <a:r>
-                        <a:rPr lang="en-US" sz="1600" baseline="-25000"/>
-                        <a:t>1 </a:t>
-                      </a:r>
-                      <a:r>
-                        <a:rPr lang="en-US" sz="1600" baseline="0"/>
-                        <a:t>= [-3.57, 0.46, 26.96, -0.025, 1.91, 8.75]</a:t>
-                      </a:r>
-                      <a:r>
-                        <a:rPr lang="en-US" sz="1600" baseline="-25000"/>
-                        <a:t/>
-                      </a:r>
-                      <a:br>
-                        <a:rPr lang="en-US" sz="1600" baseline="-25000"/>
-                      </a:br>
-                      <a:r>
-                        <a:rPr lang="en-US" sz="1600"/>
-                        <a:t>β</a:t>
-                      </a:r>
-                      <a:r>
-                        <a:rPr lang="en-US" sz="1600" baseline="-25000"/>
-                        <a:t>2 </a:t>
-                      </a:r>
-                      <a:r>
-                        <a:rPr lang="en-US" sz="1600" baseline="0"/>
-                        <a:t>= [-7.38, 0.92, 41.55, -0.094, 1.61, 6.85]</a:t>
-                      </a:r>
-                      <a:endParaRPr lang="en-US" sz="1600" b="0"/>
-                    </a:p>
-                  </a:txBody>
-                  <a:tcPr anchor="ctr"/>
-                </a:tc>
-                <a:tc>
-                  <a:txBody>
-                    <a:bodyPr/>
-                    <a:lstStyle/>
-                    <a:p>
-                      <a:pPr algn="ctr"/>
-                      <a:r>
-                        <a:rPr lang="en-US" sz="1600"/>
-                        <a:t>1.7601</a:t>
-                      </a:r>
-                      <a:endParaRPr lang="en-US" sz="1600" b="0"/>
-                    </a:p>
-                  </a:txBody>
-                  <a:tcPr anchor="ctr"/>
-                </a:tc>
-              </a:tr>
-              <a:tr h="601133">
-                <a:tc>
-                  <a:txBody>
-                    <a:bodyPr/>
-                    <a:lstStyle/>
-                    <a:p>
-                      <a:pPr algn="ctr"/>
-                      <a:r>
-                        <a:rPr lang="en-US" sz="1600"/>
-                        <a:t>2</a:t>
-                      </a:r>
-                      <a:endParaRPr lang="en-US" sz="1600" b="0"/>
-                    </a:p>
-                  </a:txBody>
-                  <a:tcPr anchor="ctr"/>
-                </a:tc>
-                <a:tc>
-                  <a:txBody>
-                    <a:bodyPr/>
-                    <a:lstStyle/>
-                    <a:p>
-                      <a:pPr algn="ctr"/>
-                      <a:r>
-                        <a:rPr lang="en-US" sz="1600"/>
-                        <a:t>Fantasy Points</a:t>
-                      </a:r>
-                      <a:endParaRPr lang="en-US" sz="1600" b="0"/>
-                    </a:p>
-                  </a:txBody>
-                  <a:tcPr anchor="ctr"/>
-                </a:tc>
-                <a:tc>
-                  <a:txBody>
-                    <a:bodyPr/>
-                    <a:lstStyle/>
-                    <a:p>
-                      <a:pPr marL="0" marR="0" indent="0" algn="ctr" defTabSz="457105" rtl="0" eaLnBrk="1" fontAlgn="auto" latinLnBrk="0" hangingPunct="1">
-                        <a:lnSpc>
-                          <a:spcPct val="100000"/>
-                        </a:lnSpc>
-                        <a:spcBef>
-                          <a:spcPts val="0"/>
-                        </a:spcBef>
-                        <a:spcAft>
-                          <a:spcPts val="0"/>
-                        </a:spcAft>
-                        <a:buClrTx/>
-                        <a:buSzTx/>
-                        <a:buFontTx/>
-                        <a:buNone/>
-                        <a:tabLst/>
-                        <a:defRPr/>
-                      </a:pPr>
-                      <a:r>
-                        <a:rPr lang="en-US" sz="1600"/>
-                        <a:t>β</a:t>
-                      </a:r>
-                      <a:r>
-                        <a:rPr lang="en-US" sz="1600" baseline="-25000"/>
-                        <a:t>1 </a:t>
-                      </a:r>
-                      <a:r>
-                        <a:rPr lang="en-US" sz="1600" baseline="0"/>
-                        <a:t>= [-3.57, 0.46, 26.97, -0.025, 1.91, 8.75]</a:t>
-                      </a:r>
-                      <a:r>
-                        <a:rPr lang="en-US" sz="1600" baseline="-25000"/>
-                        <a:t/>
-                      </a:r>
-                      <a:br>
-                        <a:rPr lang="en-US" sz="1600" baseline="-25000"/>
-                      </a:br>
-                      <a:r>
-                        <a:rPr lang="en-US" sz="1600"/>
-                        <a:t>β</a:t>
-                      </a:r>
-                      <a:r>
-                        <a:rPr lang="en-US" sz="1600" baseline="-25000"/>
-                        <a:t>2 </a:t>
-                      </a:r>
-                      <a:r>
-                        <a:rPr lang="en-US" sz="1600" baseline="0"/>
-                        <a:t>= [-7.38, 0.92, 41.55, -0.094, 1.61, 6.85]</a:t>
-                      </a:r>
-                      <a:endParaRPr lang="en-US" sz="1600" b="0"/>
-                    </a:p>
-                  </a:txBody>
-                  <a:tcPr anchor="ctr"/>
-                </a:tc>
-                <a:tc>
-                  <a:txBody>
-                    <a:bodyPr/>
-                    <a:lstStyle/>
-                    <a:p>
-                      <a:pPr algn="ctr"/>
-                      <a:r>
-                        <a:rPr lang="en-US" sz="1600"/>
-                        <a:t>1.7601</a:t>
-                      </a:r>
-                      <a:endParaRPr lang="en-US" sz="1600" b="0"/>
-                    </a:p>
-                  </a:txBody>
-                  <a:tcPr anchor="ctr"/>
-                </a:tc>
-              </a:tr>
-              <a:tr h="601133">
-                <a:tc>
-                  <a:txBody>
-                    <a:bodyPr/>
-                    <a:lstStyle/>
-                    <a:p>
-                      <a:pPr algn="ctr"/>
-                      <a:r>
-                        <a:rPr lang="en-US" sz="1600"/>
-                        <a:t>3</a:t>
-                      </a:r>
-                      <a:endParaRPr lang="en-US" sz="1600" b="0"/>
-                    </a:p>
-                  </a:txBody>
-                  <a:tcPr anchor="ctr"/>
-                </a:tc>
-                <a:tc>
-                  <a:txBody>
-                    <a:bodyPr/>
-                    <a:lstStyle/>
-                    <a:p>
-                      <a:pPr algn="ctr"/>
-                      <a:r>
-                        <a:rPr lang="en-US" sz="1600"/>
-                        <a:t>Fantasy Points</a:t>
-                      </a:r>
-                      <a:endParaRPr lang="en-US" sz="1600" b="0"/>
-                    </a:p>
-                  </a:txBody>
-                  <a:tcPr anchor="ctr"/>
-                </a:tc>
-                <a:tc>
-                  <a:txBody>
-                    <a:bodyPr/>
-                    <a:lstStyle/>
-                    <a:p>
-                      <a:pPr algn="ctr"/>
-                      <a:r>
-                        <a:rPr lang="en-US" sz="1600"/>
-                        <a:t>β</a:t>
-                      </a:r>
-                      <a:r>
-                        <a:rPr lang="en-US" sz="1600" baseline="-25000"/>
-                        <a:t>1 </a:t>
-                      </a:r>
-                      <a:r>
-                        <a:rPr lang="en-US" sz="1600" baseline="0"/>
-                        <a:t>= [-1.71, 0.37, 23.83, -0.01, 2.24, 71.3]</a:t>
-                      </a:r>
-                      <a:r>
-                        <a:rPr lang="en-US" sz="1600" baseline="-25000"/>
-                        <a:t/>
-                      </a:r>
-                      <a:br>
-                        <a:rPr lang="en-US" sz="1600" baseline="-25000"/>
-                      </a:br>
-                      <a:r>
-                        <a:rPr lang="en-US" sz="1600"/>
-                        <a:t>β</a:t>
-                      </a:r>
-                      <a:r>
-                        <a:rPr lang="en-US" sz="1600" baseline="-25000"/>
-                        <a:t>2 </a:t>
-                      </a:r>
-                      <a:r>
-                        <a:rPr lang="en-US" sz="1600" baseline="0"/>
-                        <a:t>= [-0.14, 0.12, 10.48, -0.04, -7.11, 1.5]</a:t>
-                      </a:r>
-                      <a:r>
-                        <a:rPr lang="en-US" sz="1600" baseline="-25000"/>
-                        <a:t/>
-                      </a:r>
-                      <a:br>
-                        <a:rPr lang="en-US" sz="1600" baseline="-25000"/>
-                      </a:br>
-                      <a:r>
-                        <a:rPr lang="en-US" sz="1600"/>
-                        <a:t>β</a:t>
-                      </a:r>
-                      <a:r>
-                        <a:rPr lang="en-US" sz="1600" baseline="-25000"/>
-                        <a:t>3 </a:t>
-                      </a:r>
-                      <a:r>
-                        <a:rPr lang="en-US" sz="1600" baseline="0"/>
-                        <a:t>= [-3.78, 0.61, 12.37, -0.12, 10.2, 13.7]</a:t>
-                      </a:r>
-                      <a:endParaRPr lang="en-US" sz="1600" b="0"/>
-                    </a:p>
-                  </a:txBody>
-                  <a:tcPr anchor="ctr"/>
-                </a:tc>
-                <a:tc>
-                  <a:txBody>
-                    <a:bodyPr/>
-                    <a:lstStyle/>
-                    <a:p>
-                      <a:pPr algn="ctr"/>
-                      <a:r>
-                        <a:rPr lang="en-US" sz="1600"/>
-                        <a:t>1.3621</a:t>
-                      </a:r>
-                      <a:endParaRPr lang="en-US" sz="1600" b="0"/>
-                    </a:p>
-                  </a:txBody>
-                  <a:tcPr anchor="ctr"/>
-                </a:tc>
-              </a:tr>
-              <a:tr h="601133">
-                <a:tc>
-                  <a:txBody>
-                    <a:bodyPr/>
-                    <a:lstStyle/>
-                    <a:p>
-                      <a:pPr algn="ctr"/>
-                      <a:r>
-                        <a:rPr lang="en-US" sz="1600"/>
-                        <a:t>2</a:t>
-                      </a:r>
-                      <a:endParaRPr lang="en-US" sz="1600" b="0"/>
-                    </a:p>
-                  </a:txBody>
-                  <a:tcPr anchor="ctr"/>
-                </a:tc>
-                <a:tc>
-                  <a:txBody>
-                    <a:bodyPr/>
-                    <a:lstStyle/>
-                    <a:p>
-                      <a:pPr algn="ctr"/>
-                      <a:r>
-                        <a:rPr lang="en-US" sz="1600"/>
-                        <a:t>Receiving Targets</a:t>
-                      </a:r>
-                      <a:endParaRPr lang="en-US" sz="1600" b="0"/>
-                    </a:p>
-                  </a:txBody>
-                  <a:tcPr anchor="ctr"/>
-                </a:tc>
-                <a:tc>
-                  <a:txBody>
-                    <a:bodyPr/>
-                    <a:lstStyle/>
-                    <a:p>
-                      <a:pPr marL="0" marR="0" indent="0" algn="ctr" defTabSz="457105" rtl="0" eaLnBrk="1" fontAlgn="auto" latinLnBrk="0" hangingPunct="1">
-                        <a:lnSpc>
-                          <a:spcPct val="100000"/>
-                        </a:lnSpc>
-                        <a:spcBef>
-                          <a:spcPts val="0"/>
-                        </a:spcBef>
-                        <a:spcAft>
-                          <a:spcPts val="0"/>
-                        </a:spcAft>
-                        <a:buClrTx/>
-                        <a:buSzTx/>
-                        <a:buFontTx/>
-                        <a:buNone/>
-                        <a:tabLst/>
-                        <a:defRPr/>
-                      </a:pPr>
-                      <a:r>
-                        <a:rPr lang="en-US" sz="1600"/>
-                        <a:t>β</a:t>
-                      </a:r>
-                      <a:r>
-                        <a:rPr lang="en-US" sz="1600" baseline="-25000"/>
-                        <a:t>1 </a:t>
-                      </a:r>
-                      <a:r>
-                        <a:rPr lang="en-US" sz="1600" baseline="0"/>
-                        <a:t>= [-8.45, 1.17, 27.46, -0.12, 11.5, 13.35]</a:t>
-                      </a:r>
-                      <a:r>
-                        <a:rPr lang="en-US" sz="1600" baseline="-25000"/>
-                        <a:t/>
-                      </a:r>
-                      <a:br>
-                        <a:rPr lang="en-US" sz="1600" baseline="-25000"/>
-                      </a:br>
-                      <a:r>
-                        <a:rPr lang="en-US" sz="1600"/>
-                        <a:t>β</a:t>
-                      </a:r>
-                      <a:r>
-                        <a:rPr lang="en-US" sz="1600" baseline="-25000"/>
-                        <a:t>2 </a:t>
-                      </a:r>
-                      <a:r>
-                        <a:rPr lang="en-US" sz="1600" baseline="0"/>
-                        <a:t>= [-0.54, 0.2, 4.82, -0.085, -0.089, 4.20]</a:t>
-                      </a:r>
-                      <a:endParaRPr lang="en-US" sz="1600" b="0"/>
-                    </a:p>
-                  </a:txBody>
-                  <a:tcPr anchor="ctr"/>
-                </a:tc>
-                <a:tc>
-                  <a:txBody>
-                    <a:bodyPr/>
-                    <a:lstStyle/>
-                    <a:p>
-                      <a:pPr algn="ctr"/>
-                      <a:r>
-                        <a:rPr lang="en-US" sz="1600"/>
-                        <a:t>1.2053</a:t>
-                      </a:r>
-                      <a:endParaRPr lang="en-US" sz="1600" b="0"/>
-                    </a:p>
-                  </a:txBody>
-                  <a:tcPr anchor="ctr"/>
-                </a:tc>
-              </a:tr>
-              <a:tr h="601133">
-                <a:tc>
-                  <a:txBody>
-                    <a:bodyPr/>
-                    <a:lstStyle/>
-                    <a:p>
-                      <a:pPr algn="ctr"/>
-                      <a:r>
-                        <a:rPr lang="en-US" sz="1600"/>
-                        <a:t>2</a:t>
-                      </a:r>
-                      <a:endParaRPr lang="en-US" sz="1600" b="0"/>
-                    </a:p>
-                  </a:txBody>
-                  <a:tcPr anchor="ctr"/>
-                </a:tc>
-                <a:tc>
-                  <a:txBody>
-                    <a:bodyPr/>
-                    <a:lstStyle/>
-                    <a:p>
-                      <a:pPr algn="ctr"/>
-                      <a:r>
-                        <a:rPr lang="en-US" sz="1600"/>
-                        <a:t>Catches</a:t>
-                      </a:r>
-                      <a:br>
-                        <a:rPr lang="en-US" sz="1600"/>
-                      </a:br>
-                      <a:r>
-                        <a:rPr lang="en-US" sz="1600"/>
-                        <a:t>Fantasy</a:t>
-                      </a:r>
-                      <a:r>
-                        <a:rPr lang="en-US" sz="1600" baseline="0"/>
-                        <a:t> Points</a:t>
-                      </a:r>
-                    </a:p>
-                    <a:p>
-                      <a:pPr algn="ctr"/>
-                      <a:r>
-                        <a:rPr lang="en-US" sz="1600" baseline="0"/>
-                        <a:t>Targets</a:t>
-                      </a:r>
-                      <a:endParaRPr lang="en-US" sz="1600" b="0"/>
-                    </a:p>
-                  </a:txBody>
-                  <a:tcPr anchor="ctr"/>
-                </a:tc>
-                <a:tc>
-                  <a:txBody>
-                    <a:bodyPr/>
-                    <a:lstStyle/>
-                    <a:p>
-                      <a:pPr algn="ctr"/>
-                      <a:r>
-                        <a:rPr lang="en-US" sz="1600"/>
-                        <a:t>β</a:t>
-                      </a:r>
-                      <a:r>
-                        <a:rPr lang="en-US" sz="1600" baseline="-25000"/>
-                        <a:t>1 </a:t>
-                      </a:r>
-                      <a:r>
-                        <a:rPr lang="en-US" sz="1600" baseline="0"/>
-                        <a:t>= [2.71, -0.42, 0.61, -0.89, 45.02, 42.26]</a:t>
-                      </a:r>
-                      <a:r>
-                        <a:rPr lang="en-US" sz="1600" baseline="-25000"/>
-                        <a:t/>
-                      </a:r>
-                      <a:br>
-                        <a:rPr lang="en-US" sz="1600" baseline="-25000"/>
-                      </a:br>
-                      <a:r>
-                        <a:rPr lang="en-US" sz="1600"/>
-                        <a:t>β</a:t>
-                      </a:r>
-                      <a:r>
-                        <a:rPr lang="en-US" sz="1600" baseline="-25000"/>
-                        <a:t>2 </a:t>
-                      </a:r>
-                      <a:r>
-                        <a:rPr lang="en-US" sz="1600" baseline="0"/>
-                        <a:t>= [-0.70, 0.23, 4.00, -0.084, 0.83, 2.64]</a:t>
-                      </a:r>
-                      <a:endParaRPr lang="en-US" sz="1600" b="0"/>
-                    </a:p>
-                  </a:txBody>
-                  <a:tcPr anchor="ctr"/>
-                </a:tc>
-                <a:tc>
-                  <a:txBody>
-                    <a:bodyPr/>
-                    <a:lstStyle/>
-                    <a:p>
-                      <a:pPr algn="ctr"/>
-                      <a:r>
-                        <a:rPr lang="en-US" sz="1600"/>
-                        <a:t>1.1887</a:t>
-                      </a:r>
-                      <a:endParaRPr lang="en-US" sz="1600" b="0"/>
-                    </a:p>
-                  </a:txBody>
-                  <a:tcPr anchor="ctr"/>
-                </a:tc>
-              </a:tr>
-              <a:tr h="601133">
-                <a:tc>
-                  <a:txBody>
-                    <a:bodyPr/>
-                    <a:lstStyle/>
-                    <a:p>
-                      <a:pPr algn="ctr"/>
-                      <a:r>
-                        <a:rPr lang="en-US" sz="1600"/>
-                        <a:t>2</a:t>
-                      </a:r>
-                      <a:endParaRPr lang="en-US" sz="1600" b="0"/>
-                    </a:p>
-                  </a:txBody>
-                  <a:tcPr anchor="ctr"/>
-                </a:tc>
-                <a:tc>
-                  <a:txBody>
-                    <a:bodyPr/>
-                    <a:lstStyle/>
-                    <a:p>
-                      <a:pPr algn="ctr"/>
-                      <a:r>
-                        <a:rPr lang="en-US" sz="1600"/>
-                        <a:t>Catches</a:t>
-                      </a:r>
-                      <a:endParaRPr lang="en-US" sz="1600" b="0"/>
-                    </a:p>
-                  </a:txBody>
-                  <a:tcPr anchor="ctr"/>
-                </a:tc>
-                <a:tc>
-                  <a:txBody>
-                    <a:bodyPr/>
-                    <a:lstStyle/>
-                    <a:p>
-                      <a:pPr marL="0" marR="0" indent="0" algn="ctr" defTabSz="457105" rtl="0" eaLnBrk="1" fontAlgn="auto" latinLnBrk="0" hangingPunct="1">
-                        <a:lnSpc>
-                          <a:spcPct val="100000"/>
-                        </a:lnSpc>
-                        <a:spcBef>
-                          <a:spcPts val="0"/>
-                        </a:spcBef>
-                        <a:spcAft>
-                          <a:spcPts val="0"/>
-                        </a:spcAft>
-                        <a:buClrTx/>
-                        <a:buSzTx/>
-                        <a:buFontTx/>
-                        <a:buNone/>
-                        <a:tabLst/>
-                        <a:defRPr/>
-                      </a:pPr>
-                      <a:r>
-                        <a:rPr lang="en-US" sz="1600"/>
-                        <a:t>β</a:t>
-                      </a:r>
-                      <a:r>
-                        <a:rPr lang="en-US" sz="1600" baseline="-25000"/>
-                        <a:t>1 </a:t>
-                      </a:r>
-                      <a:r>
-                        <a:rPr lang="en-US" sz="1600" baseline="0"/>
-                        <a:t>= [-1.04, 0.27, 6.02, -0.083, 0.16, 3.02]</a:t>
-                      </a:r>
-                      <a:r>
-                        <a:rPr lang="en-US" sz="1600" baseline="-25000"/>
-                        <a:t/>
-                      </a:r>
-                      <a:br>
-                        <a:rPr lang="en-US" sz="1600" baseline="-25000"/>
-                      </a:br>
-                      <a:r>
-                        <a:rPr lang="en-US" sz="1600"/>
-                        <a:t>β</a:t>
-                      </a:r>
-                      <a:r>
-                        <a:rPr lang="en-US" sz="1600" baseline="-25000"/>
-                        <a:t>2 </a:t>
-                      </a:r>
-                      <a:r>
-                        <a:rPr lang="en-US" sz="1600" baseline="0"/>
-                        <a:t>= [4.98, -0.99, 68.03, -0.32, 56.68, 24.8]</a:t>
-                      </a:r>
-                      <a:endParaRPr lang="en-US" sz="1600" b="0"/>
-                    </a:p>
-                  </a:txBody>
-                  <a:tcPr anchor="ctr"/>
-                </a:tc>
-                <a:tc>
-                  <a:txBody>
-                    <a:bodyPr/>
-                    <a:lstStyle/>
-                    <a:p>
-                      <a:pPr algn="ctr"/>
-                      <a:r>
-                        <a:rPr lang="en-US" sz="1600"/>
-                        <a:t>1.1811</a:t>
-                      </a:r>
-                      <a:endParaRPr lang="en-US" sz="1600" b="0"/>
-                    </a:p>
-                  </a:txBody>
-                  <a:tcPr anchor="ctr"/>
-                </a:tc>
-              </a:tr>
-              <a:tr h="601133">
-                <a:tc>
-                  <a:txBody>
-                    <a:bodyPr/>
-                    <a:lstStyle/>
-                    <a:p>
-                      <a:pPr algn="ctr"/>
-                      <a:r>
-                        <a:rPr lang="en-US" sz="1600"/>
-                        <a:t>2</a:t>
-                      </a:r>
-                      <a:endParaRPr lang="en-US" sz="1600" b="0"/>
-                    </a:p>
-                  </a:txBody>
-                  <a:tcPr anchor="ctr"/>
-                </a:tc>
-                <a:tc>
-                  <a:txBody>
-                    <a:bodyPr/>
-                    <a:lstStyle/>
-                    <a:p>
-                      <a:pPr algn="ctr"/>
-                      <a:r>
-                        <a:rPr lang="en-US" sz="1600"/>
-                        <a:t>Touchdowns</a:t>
-                      </a:r>
-                      <a:endParaRPr lang="en-US" sz="1600" b="0"/>
-                    </a:p>
-                  </a:txBody>
-                  <a:tcPr anchor="ctr"/>
-                </a:tc>
-                <a:tc>
-                  <a:txBody>
-                    <a:bodyPr/>
-                    <a:lstStyle/>
-                    <a:p>
-                      <a:pPr marL="0" marR="0" indent="0" algn="ctr" defTabSz="457105" rtl="0" eaLnBrk="1" fontAlgn="auto" latinLnBrk="0" hangingPunct="1">
-                        <a:lnSpc>
-                          <a:spcPct val="100000"/>
-                        </a:lnSpc>
-                        <a:spcBef>
-                          <a:spcPts val="0"/>
-                        </a:spcBef>
-                        <a:spcAft>
-                          <a:spcPts val="0"/>
-                        </a:spcAft>
-                        <a:buClrTx/>
-                        <a:buSzTx/>
-                        <a:buFontTx/>
-                        <a:buNone/>
-                        <a:tabLst/>
-                        <a:defRPr/>
-                      </a:pPr>
-                      <a:r>
-                        <a:rPr lang="en-US" sz="1600"/>
-                        <a:t>β</a:t>
-                      </a:r>
-                      <a:r>
-                        <a:rPr lang="en-US" sz="1600" baseline="-25000"/>
-                        <a:t>1 </a:t>
-                      </a:r>
-                      <a:r>
-                        <a:rPr lang="en-US" sz="1600" baseline="0"/>
-                        <a:t>= [-4.09, 0.56, 24.85, -0.02, -4.31, 3.59]</a:t>
-                      </a:r>
-                      <a:r>
-                        <a:rPr lang="en-US" sz="1600" baseline="-25000"/>
-                        <a:t/>
-                      </a:r>
-                      <a:br>
-                        <a:rPr lang="en-US" sz="1600" baseline="-25000"/>
-                      </a:br>
-                      <a:r>
-                        <a:rPr lang="en-US" sz="1600"/>
-                        <a:t>β</a:t>
-                      </a:r>
-                      <a:r>
-                        <a:rPr lang="en-US" sz="1600" baseline="-25000"/>
-                        <a:t>2 </a:t>
-                      </a:r>
-                      <a:r>
-                        <a:rPr lang="en-US" sz="1600" baseline="0"/>
-                        <a:t>= [44.5, -4.44, -288, 0.11, 48.39, 52.04]</a:t>
-                      </a:r>
-                      <a:endParaRPr lang="en-US" sz="1600" b="0"/>
-                    </a:p>
-                  </a:txBody>
-                  <a:tcPr anchor="ctr"/>
-                </a:tc>
-                <a:tc>
-                  <a:txBody>
-                    <a:bodyPr/>
-                    <a:lstStyle/>
-                    <a:p>
-                      <a:pPr algn="ctr"/>
-                      <a:r>
-                        <a:rPr lang="en-US" sz="1600"/>
-                        <a:t>1.1107</a:t>
-                      </a:r>
-                      <a:endParaRPr lang="en-US" sz="1600" b="0"/>
-                    </a:p>
-                  </a:txBody>
-                  <a:tcPr anchor="ctr"/>
-                </a:tc>
-              </a:tr>
-              <a:tr h="601133">
-                <a:tc>
-                  <a:txBody>
-                    <a:bodyPr/>
-                    <a:lstStyle/>
-                    <a:p>
-                      <a:pPr algn="ctr"/>
-                      <a:r>
-                        <a:rPr lang="en-US" sz="1600"/>
-                        <a:t>2</a:t>
-                      </a:r>
-                      <a:endParaRPr lang="en-US" sz="1600" b="0"/>
-                    </a:p>
-                  </a:txBody>
-                  <a:tcPr anchor="ctr"/>
-                </a:tc>
-                <a:tc>
-                  <a:txBody>
-                    <a:bodyPr/>
-                    <a:lstStyle/>
-                    <a:p>
-                      <a:pPr algn="ctr"/>
-                      <a:r>
-                        <a:rPr lang="en-US" sz="1600"/>
-                        <a:t>Receiving Yards</a:t>
-                      </a:r>
-                      <a:endParaRPr lang="en-US" sz="1600" b="0"/>
-                    </a:p>
-                  </a:txBody>
-                  <a:tcPr anchor="ctr"/>
-                </a:tc>
-                <a:tc>
-                  <a:txBody>
-                    <a:bodyPr/>
-                    <a:lstStyle/>
-                    <a:p>
-                      <a:pPr marL="0" marR="0" indent="0" algn="ctr" defTabSz="457105" rtl="0" eaLnBrk="1" fontAlgn="auto" latinLnBrk="0" hangingPunct="1">
-                        <a:lnSpc>
-                          <a:spcPct val="100000"/>
-                        </a:lnSpc>
-                        <a:spcBef>
-                          <a:spcPts val="0"/>
-                        </a:spcBef>
-                        <a:spcAft>
-                          <a:spcPts val="0"/>
-                        </a:spcAft>
-                        <a:buClrTx/>
-                        <a:buSzTx/>
-                        <a:buFontTx/>
-                        <a:buNone/>
-                        <a:tabLst/>
-                        <a:defRPr/>
-                      </a:pPr>
-                      <a:r>
-                        <a:rPr lang="en-US" sz="1600"/>
-                        <a:t>β</a:t>
-                      </a:r>
-                      <a:r>
-                        <a:rPr lang="en-US" sz="1600" baseline="-25000"/>
-                        <a:t>1 </a:t>
-                      </a:r>
-                      <a:r>
-                        <a:rPr lang="en-US" sz="1600" baseline="0"/>
-                        <a:t>= [-3.48, 0.48, 25.5, -0.06, -0.51, 5.64]</a:t>
-                      </a:r>
-                      <a:r>
-                        <a:rPr lang="en-US" sz="1600" baseline="-25000"/>
-                        <a:t/>
-                      </a:r>
-                      <a:br>
-                        <a:rPr lang="en-US" sz="1600" baseline="-25000"/>
-                      </a:br>
-                      <a:r>
-                        <a:rPr lang="en-US" sz="1600"/>
-                        <a:t>β</a:t>
-                      </a:r>
-                      <a:r>
-                        <a:rPr lang="en-US" sz="1600" baseline="-25000"/>
-                        <a:t>2 </a:t>
-                      </a:r>
-                      <a:r>
-                        <a:rPr lang="en-US" sz="1600" baseline="0"/>
-                        <a:t>= [17.87, -1.5, -115.9, -0.06, 3.82, 6.90]</a:t>
-                      </a:r>
-                      <a:endParaRPr lang="en-US" sz="1600" b="0"/>
-                    </a:p>
-                  </a:txBody>
-                  <a:tcPr anchor="ctr"/>
-                </a:tc>
-                <a:tc>
-                  <a:txBody>
-                    <a:bodyPr/>
-                    <a:lstStyle/>
-                    <a:p>
-                      <a:pPr algn="ctr"/>
-                      <a:r>
-                        <a:rPr lang="en-US" sz="1600"/>
-                        <a:t>1.0857</a:t>
-                      </a:r>
-                      <a:endParaRPr lang="en-US" sz="1600" b="0"/>
-                    </a:p>
-                  </a:txBody>
-                  <a:tcPr anchor="ctr"/>
-                </a:tc>
-              </a:tr>
-            </a:tbl>
-          </a:graphicData>
-        </a:graphic>
-      </p:graphicFrame>
       <p:pic>
         <p:nvPicPr>
           <p:cNvPr id="22" name="Picture 21" descr="top30_lin_reg_all_feat.eps.png"/>
@@ -9322,7 +8301,7 @@
         </p:blipFill>
         <p:spPr>
           <a:xfrm>
-            <a:off x="19491324" y="25823562"/>
+            <a:off x="19491325" y="9058824"/>
             <a:ext cx="8734427" cy="4067375"/>
           </a:xfrm>
           <a:prstGeom prst="rect">
@@ -9346,7 +8325,7 @@
         </p:blipFill>
         <p:spPr>
           <a:xfrm>
-            <a:off x="19621069" y="17818172"/>
+            <a:off x="10282767" y="17401434"/>
             <a:ext cx="8492258" cy="6114425"/>
           </a:xfrm>
           <a:prstGeom prst="rect">
@@ -9370,7 +8349,7 @@
         </p:blipFill>
         <p:spPr>
           <a:xfrm>
-            <a:off x="28731971" y="14577913"/>
+            <a:off x="19491325" y="27681874"/>
             <a:ext cx="8734426" cy="4541902"/>
           </a:xfrm>
           <a:prstGeom prst="rect">
@@ -9394,7 +8373,7 @@
         </p:blipFill>
         <p:spPr>
           <a:xfrm>
-            <a:off x="28964275" y="7146887"/>
+            <a:off x="19491326" y="21043710"/>
             <a:ext cx="8734426" cy="6638164"/>
           </a:xfrm>
           <a:prstGeom prst="rect">
@@ -9411,7 +8390,7 @@
           <p:nvPr/>
         </p:nvGraphicFramePr>
         <p:xfrm>
-          <a:off x="19621071" y="10179411"/>
+          <a:off x="10175293" y="26951194"/>
           <a:ext cx="8492257" cy="5120640"/>
         </p:xfrm>
         <a:graphic>
@@ -10630,7 +9609,7 @@
         </p:nvSpPr>
         <p:spPr>
           <a:xfrm>
-            <a:off x="10040599" y="19961754"/>
+            <a:off x="10040598" y="8108916"/>
             <a:ext cx="8734427" cy="954107"/>
           </a:xfrm>
           <a:prstGeom prst="rect">
@@ -10773,7 +9752,7 @@
         </p:blipFill>
         <p:spPr>
           <a:xfrm>
-            <a:off x="10073026" y="8020565"/>
+            <a:off x="616288" y="19681269"/>
             <a:ext cx="8718213" cy="3632589"/>
           </a:xfrm>
           <a:prstGeom prst="rect">
@@ -10789,7 +9768,7 @@
         </p:nvSpPr>
         <p:spPr>
           <a:xfrm>
-            <a:off x="10040599" y="24455817"/>
+            <a:off x="10040598" y="12602979"/>
             <a:ext cx="8734427" cy="523220"/>
           </a:xfrm>
           <a:prstGeom prst="rect">
@@ -10832,6 +9811,2092 @@
           </a:p>
         </p:txBody>
       </p:sp>
+      <p:graphicFrame>
+        <p:nvGraphicFramePr>
+          <p:cNvPr id="30" name="Table 29"/>
+          <p:cNvGraphicFramePr>
+            <a:graphicFrameLocks noGrp="1"/>
+          </p:cNvGraphicFramePr>
+          <p:nvPr/>
+        </p:nvGraphicFramePr>
+        <p:xfrm>
+          <a:off x="29175416" y="9366977"/>
+          <a:ext cx="8276168" cy="6075678"/>
+        </p:xfrm>
+        <a:graphic>
+          <a:graphicData uri="http://schemas.openxmlformats.org/drawingml/2006/table">
+            <a:tbl>
+              <a:tblPr firstRow="1" bandRow="1">
+                <a:tableStyleId>{D7AC3CCA-C797-4891-BE02-D94E43425B78}</a:tableStyleId>
+              </a:tblPr>
+              <a:tblGrid>
+                <a:gridCol w="1028700"/>
+                <a:gridCol w="1794933"/>
+                <a:gridCol w="4021667"/>
+                <a:gridCol w="1430868"/>
+              </a:tblGrid>
+              <a:tr h="601133">
+                <a:tc>
+                  <a:txBody>
+                    <a:bodyPr/>
+                    <a:lstStyle/>
+                    <a:p>
+                      <a:pPr algn="ctr"/>
+                      <a:r>
+                        <a:rPr lang="en-US" sz="1600"/>
+                        <a:t>#</a:t>
+                      </a:r>
+                      <a:r>
+                        <a:rPr lang="en-US" sz="1600" baseline="0"/>
+                        <a:t> Mixtures</a:t>
+                      </a:r>
+                      <a:endParaRPr lang="en-US" sz="1600" b="1"/>
+                    </a:p>
+                  </a:txBody>
+                  <a:tcPr anchor="ctr"/>
+                </a:tc>
+                <a:tc>
+                  <a:txBody>
+                    <a:bodyPr/>
+                    <a:lstStyle/>
+                    <a:p>
+                      <a:pPr algn="ctr"/>
+                      <a:r>
+                        <a:rPr lang="en-US" sz="1600"/>
+                        <a:t>K Means Features</a:t>
+                      </a:r>
+                      <a:endParaRPr lang="en-US" sz="1600" b="1"/>
+                    </a:p>
+                  </a:txBody>
+                  <a:tcPr anchor="ctr"/>
+                </a:tc>
+                <a:tc>
+                  <a:txBody>
+                    <a:bodyPr/>
+                    <a:lstStyle/>
+                    <a:p>
+                      <a:pPr algn="ctr"/>
+                      <a:r>
+                        <a:rPr lang="en-US" sz="2000"/>
+                        <a:t>β</a:t>
+                      </a:r>
+                      <a:r>
+                        <a:rPr lang="en-US" sz="2000" baseline="-25000"/>
+                        <a:t>1 </a:t>
+                      </a:r>
+                      <a:r>
+                        <a:rPr lang="en-US" sz="2000" baseline="0"/>
+                        <a:t>… </a:t>
+                      </a:r>
+                      <a:r>
+                        <a:rPr lang="en-US" sz="2000"/>
+                        <a:t>β</a:t>
+                      </a:r>
+                      <a:r>
+                        <a:rPr lang="en-US" sz="2000" baseline="-25000"/>
+                        <a:t>K</a:t>
+                      </a:r>
+                      <a:endParaRPr lang="en-US" sz="2000" b="1"/>
+                    </a:p>
+                  </a:txBody>
+                  <a:tcPr anchor="ctr"/>
+                </a:tc>
+                <a:tc>
+                  <a:txBody>
+                    <a:bodyPr/>
+                    <a:lstStyle/>
+                    <a:p>
+                      <a:pPr algn="ctr"/>
+                      <a:r>
+                        <a:rPr lang="en-US" sz="1600"/>
+                        <a:t>Discounted</a:t>
+                      </a:r>
+                    </a:p>
+                    <a:p>
+                      <a:pPr algn="ctr"/>
+                      <a:r>
+                        <a:rPr lang="en-US" sz="1600"/>
+                        <a:t>Cumulative</a:t>
+                      </a:r>
+                    </a:p>
+                    <a:p>
+                      <a:pPr algn="ctr"/>
+                      <a:r>
+                        <a:rPr lang="en-US" sz="1600"/>
+                        <a:t>Gain</a:t>
+                      </a:r>
+                      <a:endParaRPr lang="en-US" sz="1600" b="1"/>
+                    </a:p>
+                  </a:txBody>
+                  <a:tcPr anchor="ctr"/>
+                </a:tc>
+              </a:tr>
+              <a:tr h="601133">
+                <a:tc>
+                  <a:txBody>
+                    <a:bodyPr/>
+                    <a:lstStyle/>
+                    <a:p>
+                      <a:pPr algn="ctr"/>
+                      <a:r>
+                        <a:rPr lang="en-US" sz="1600"/>
+                        <a:t>2</a:t>
+                      </a:r>
+                      <a:endParaRPr lang="en-US" sz="1600" b="0"/>
+                    </a:p>
+                  </a:txBody>
+                  <a:tcPr anchor="ctr"/>
+                </a:tc>
+                <a:tc>
+                  <a:txBody>
+                    <a:bodyPr/>
+                    <a:lstStyle/>
+                    <a:p>
+                      <a:pPr algn="ctr"/>
+                      <a:r>
+                        <a:rPr lang="en-US" sz="1600"/>
+                        <a:t>Catches</a:t>
+                      </a:r>
+                      <a:br>
+                        <a:rPr lang="en-US" sz="1600"/>
+                      </a:br>
+                      <a:r>
+                        <a:rPr lang="en-US" sz="1600"/>
+                        <a:t>Fantasy</a:t>
+                      </a:r>
+                      <a:r>
+                        <a:rPr lang="en-US" sz="1600" baseline="0"/>
+                        <a:t> Points</a:t>
+                      </a:r>
+                      <a:endParaRPr lang="en-US" sz="1600" b="0" baseline="0"/>
+                    </a:p>
+                  </a:txBody>
+                  <a:tcPr anchor="ctr"/>
+                </a:tc>
+                <a:tc>
+                  <a:txBody>
+                    <a:bodyPr/>
+                    <a:lstStyle/>
+                    <a:p>
+                      <a:pPr algn="ctr"/>
+                      <a:r>
+                        <a:rPr lang="en-US" sz="1600"/>
+                        <a:t>β</a:t>
+                      </a:r>
+                      <a:r>
+                        <a:rPr lang="en-US" sz="1600" baseline="-25000"/>
+                        <a:t>1 </a:t>
+                      </a:r>
+                      <a:r>
+                        <a:rPr lang="en-US" sz="1600" baseline="0"/>
+                        <a:t>= [-3.57, 0.46, 26.96, -0.025, 1.91, 8.75]</a:t>
+                      </a:r>
+                      <a:r>
+                        <a:rPr lang="en-US" sz="1600" baseline="-25000"/>
+                        <a:t/>
+                      </a:r>
+                      <a:br>
+                        <a:rPr lang="en-US" sz="1600" baseline="-25000"/>
+                      </a:br>
+                      <a:r>
+                        <a:rPr lang="en-US" sz="1600"/>
+                        <a:t>β</a:t>
+                      </a:r>
+                      <a:r>
+                        <a:rPr lang="en-US" sz="1600" baseline="-25000"/>
+                        <a:t>2 </a:t>
+                      </a:r>
+                      <a:r>
+                        <a:rPr lang="en-US" sz="1600" baseline="0"/>
+                        <a:t>= [-7.38, 0.92, 41.55, -0.094, 1.61, 6.85]</a:t>
+                      </a:r>
+                      <a:endParaRPr lang="en-US" sz="1600" b="0"/>
+                    </a:p>
+                  </a:txBody>
+                  <a:tcPr anchor="ctr"/>
+                </a:tc>
+                <a:tc>
+                  <a:txBody>
+                    <a:bodyPr/>
+                    <a:lstStyle/>
+                    <a:p>
+                      <a:pPr algn="ctr"/>
+                      <a:r>
+                        <a:rPr lang="en-US" sz="1600"/>
+                        <a:t>1.7601</a:t>
+                      </a:r>
+                      <a:endParaRPr lang="en-US" sz="1600" b="0"/>
+                    </a:p>
+                  </a:txBody>
+                  <a:tcPr anchor="ctr"/>
+                </a:tc>
+              </a:tr>
+              <a:tr h="601133">
+                <a:tc>
+                  <a:txBody>
+                    <a:bodyPr/>
+                    <a:lstStyle/>
+                    <a:p>
+                      <a:pPr algn="ctr"/>
+                      <a:r>
+                        <a:rPr lang="en-US" sz="1600"/>
+                        <a:t>2</a:t>
+                      </a:r>
+                      <a:endParaRPr lang="en-US" sz="1600" b="0"/>
+                    </a:p>
+                  </a:txBody>
+                  <a:tcPr anchor="ctr"/>
+                </a:tc>
+                <a:tc>
+                  <a:txBody>
+                    <a:bodyPr/>
+                    <a:lstStyle/>
+                    <a:p>
+                      <a:pPr algn="ctr"/>
+                      <a:r>
+                        <a:rPr lang="en-US" sz="1600"/>
+                        <a:t>Fantasy Points</a:t>
+                      </a:r>
+                      <a:endParaRPr lang="en-US" sz="1600" b="0"/>
+                    </a:p>
+                  </a:txBody>
+                  <a:tcPr anchor="ctr"/>
+                </a:tc>
+                <a:tc>
+                  <a:txBody>
+                    <a:bodyPr/>
+                    <a:lstStyle/>
+                    <a:p>
+                      <a:pPr marL="0" marR="0" indent="0" algn="ctr" defTabSz="457105" rtl="0" eaLnBrk="1" fontAlgn="auto" latinLnBrk="0" hangingPunct="1">
+                        <a:lnSpc>
+                          <a:spcPct val="100000"/>
+                        </a:lnSpc>
+                        <a:spcBef>
+                          <a:spcPts val="0"/>
+                        </a:spcBef>
+                        <a:spcAft>
+                          <a:spcPts val="0"/>
+                        </a:spcAft>
+                        <a:buClrTx/>
+                        <a:buSzTx/>
+                        <a:buFontTx/>
+                        <a:buNone/>
+                        <a:tabLst/>
+                        <a:defRPr/>
+                      </a:pPr>
+                      <a:r>
+                        <a:rPr lang="en-US" sz="1600"/>
+                        <a:t>β</a:t>
+                      </a:r>
+                      <a:r>
+                        <a:rPr lang="en-US" sz="1600" baseline="-25000"/>
+                        <a:t>1 </a:t>
+                      </a:r>
+                      <a:r>
+                        <a:rPr lang="en-US" sz="1600" baseline="0"/>
+                        <a:t>= [-3.57, 0.46, 26.97, -0.025, 1.91, 8.75]</a:t>
+                      </a:r>
+                      <a:r>
+                        <a:rPr lang="en-US" sz="1600" baseline="-25000"/>
+                        <a:t/>
+                      </a:r>
+                      <a:br>
+                        <a:rPr lang="en-US" sz="1600" baseline="-25000"/>
+                      </a:br>
+                      <a:r>
+                        <a:rPr lang="en-US" sz="1600"/>
+                        <a:t>β</a:t>
+                      </a:r>
+                      <a:r>
+                        <a:rPr lang="en-US" sz="1600" baseline="-25000"/>
+                        <a:t>2 </a:t>
+                      </a:r>
+                      <a:r>
+                        <a:rPr lang="en-US" sz="1600" baseline="0"/>
+                        <a:t>= [-7.38, 0.92, 41.55, -0.094, 1.61, 6.85]</a:t>
+                      </a:r>
+                      <a:endParaRPr lang="en-US" sz="1600" b="0"/>
+                    </a:p>
+                  </a:txBody>
+                  <a:tcPr anchor="ctr"/>
+                </a:tc>
+                <a:tc>
+                  <a:txBody>
+                    <a:bodyPr/>
+                    <a:lstStyle/>
+                    <a:p>
+                      <a:pPr algn="ctr"/>
+                      <a:r>
+                        <a:rPr lang="en-US" sz="1600"/>
+                        <a:t>1.7601</a:t>
+                      </a:r>
+                      <a:endParaRPr lang="en-US" sz="1600" b="0"/>
+                    </a:p>
+                  </a:txBody>
+                  <a:tcPr anchor="ctr"/>
+                </a:tc>
+              </a:tr>
+              <a:tr h="601133">
+                <a:tc>
+                  <a:txBody>
+                    <a:bodyPr/>
+                    <a:lstStyle/>
+                    <a:p>
+                      <a:pPr algn="ctr"/>
+                      <a:r>
+                        <a:rPr lang="en-US" sz="1600"/>
+                        <a:t>3</a:t>
+                      </a:r>
+                      <a:endParaRPr lang="en-US" sz="1600" b="0"/>
+                    </a:p>
+                  </a:txBody>
+                  <a:tcPr anchor="ctr"/>
+                </a:tc>
+                <a:tc>
+                  <a:txBody>
+                    <a:bodyPr/>
+                    <a:lstStyle/>
+                    <a:p>
+                      <a:pPr algn="ctr"/>
+                      <a:r>
+                        <a:rPr lang="en-US" sz="1600"/>
+                        <a:t>Fantasy Points</a:t>
+                      </a:r>
+                      <a:endParaRPr lang="en-US" sz="1600" b="0"/>
+                    </a:p>
+                  </a:txBody>
+                  <a:tcPr anchor="ctr"/>
+                </a:tc>
+                <a:tc>
+                  <a:txBody>
+                    <a:bodyPr/>
+                    <a:lstStyle/>
+                    <a:p>
+                      <a:pPr algn="ctr"/>
+                      <a:r>
+                        <a:rPr lang="en-US" sz="1600"/>
+                        <a:t>β</a:t>
+                      </a:r>
+                      <a:r>
+                        <a:rPr lang="en-US" sz="1600" baseline="-25000"/>
+                        <a:t>1 </a:t>
+                      </a:r>
+                      <a:r>
+                        <a:rPr lang="en-US" sz="1600" baseline="0"/>
+                        <a:t>= [-1.71, 0.37, 23.83, -0.01, 2.24, 71.3]</a:t>
+                      </a:r>
+                      <a:r>
+                        <a:rPr lang="en-US" sz="1600" baseline="-25000"/>
+                        <a:t/>
+                      </a:r>
+                      <a:br>
+                        <a:rPr lang="en-US" sz="1600" baseline="-25000"/>
+                      </a:br>
+                      <a:r>
+                        <a:rPr lang="en-US" sz="1600"/>
+                        <a:t>β</a:t>
+                      </a:r>
+                      <a:r>
+                        <a:rPr lang="en-US" sz="1600" baseline="-25000"/>
+                        <a:t>2 </a:t>
+                      </a:r>
+                      <a:r>
+                        <a:rPr lang="en-US" sz="1600" baseline="0"/>
+                        <a:t>= [-0.14, 0.12, 10.48, -0.04, -7.11, 1.5]</a:t>
+                      </a:r>
+                      <a:r>
+                        <a:rPr lang="en-US" sz="1600" baseline="-25000"/>
+                        <a:t/>
+                      </a:r>
+                      <a:br>
+                        <a:rPr lang="en-US" sz="1600" baseline="-25000"/>
+                      </a:br>
+                      <a:r>
+                        <a:rPr lang="en-US" sz="1600"/>
+                        <a:t>β</a:t>
+                      </a:r>
+                      <a:r>
+                        <a:rPr lang="en-US" sz="1600" baseline="-25000"/>
+                        <a:t>3 </a:t>
+                      </a:r>
+                      <a:r>
+                        <a:rPr lang="en-US" sz="1600" baseline="0"/>
+                        <a:t>= [-3.78, 0.61, 12.37, -0.12, 10.2, 13.7]</a:t>
+                      </a:r>
+                      <a:endParaRPr lang="en-US" sz="1600" b="0"/>
+                    </a:p>
+                  </a:txBody>
+                  <a:tcPr anchor="ctr"/>
+                </a:tc>
+                <a:tc>
+                  <a:txBody>
+                    <a:bodyPr/>
+                    <a:lstStyle/>
+                    <a:p>
+                      <a:pPr algn="ctr"/>
+                      <a:r>
+                        <a:rPr lang="en-US" sz="1600"/>
+                        <a:t>1.3621</a:t>
+                      </a:r>
+                      <a:endParaRPr lang="en-US" sz="1600" b="0"/>
+                    </a:p>
+                  </a:txBody>
+                  <a:tcPr anchor="ctr"/>
+                </a:tc>
+              </a:tr>
+              <a:tr h="601133">
+                <a:tc>
+                  <a:txBody>
+                    <a:bodyPr/>
+                    <a:lstStyle/>
+                    <a:p>
+                      <a:pPr algn="ctr"/>
+                      <a:r>
+                        <a:rPr lang="en-US" sz="1600"/>
+                        <a:t>2</a:t>
+                      </a:r>
+                      <a:endParaRPr lang="en-US" sz="1600" b="0"/>
+                    </a:p>
+                  </a:txBody>
+                  <a:tcPr anchor="ctr"/>
+                </a:tc>
+                <a:tc>
+                  <a:txBody>
+                    <a:bodyPr/>
+                    <a:lstStyle/>
+                    <a:p>
+                      <a:pPr algn="ctr"/>
+                      <a:r>
+                        <a:rPr lang="en-US" sz="1600"/>
+                        <a:t>Receiving Targets</a:t>
+                      </a:r>
+                      <a:endParaRPr lang="en-US" sz="1600" b="0"/>
+                    </a:p>
+                  </a:txBody>
+                  <a:tcPr anchor="ctr"/>
+                </a:tc>
+                <a:tc>
+                  <a:txBody>
+                    <a:bodyPr/>
+                    <a:lstStyle/>
+                    <a:p>
+                      <a:pPr marL="0" marR="0" indent="0" algn="ctr" defTabSz="457105" rtl="0" eaLnBrk="1" fontAlgn="auto" latinLnBrk="0" hangingPunct="1">
+                        <a:lnSpc>
+                          <a:spcPct val="100000"/>
+                        </a:lnSpc>
+                        <a:spcBef>
+                          <a:spcPts val="0"/>
+                        </a:spcBef>
+                        <a:spcAft>
+                          <a:spcPts val="0"/>
+                        </a:spcAft>
+                        <a:buClrTx/>
+                        <a:buSzTx/>
+                        <a:buFontTx/>
+                        <a:buNone/>
+                        <a:tabLst/>
+                        <a:defRPr/>
+                      </a:pPr>
+                      <a:r>
+                        <a:rPr lang="en-US" sz="1600"/>
+                        <a:t>β</a:t>
+                      </a:r>
+                      <a:r>
+                        <a:rPr lang="en-US" sz="1600" baseline="-25000"/>
+                        <a:t>1 </a:t>
+                      </a:r>
+                      <a:r>
+                        <a:rPr lang="en-US" sz="1600" baseline="0"/>
+                        <a:t>= [-8.45, 1.17, 27.46, -0.12, 11.5, 13.35]</a:t>
+                      </a:r>
+                      <a:r>
+                        <a:rPr lang="en-US" sz="1600" baseline="-25000"/>
+                        <a:t/>
+                      </a:r>
+                      <a:br>
+                        <a:rPr lang="en-US" sz="1600" baseline="-25000"/>
+                      </a:br>
+                      <a:r>
+                        <a:rPr lang="en-US" sz="1600"/>
+                        <a:t>β</a:t>
+                      </a:r>
+                      <a:r>
+                        <a:rPr lang="en-US" sz="1600" baseline="-25000"/>
+                        <a:t>2 </a:t>
+                      </a:r>
+                      <a:r>
+                        <a:rPr lang="en-US" sz="1600" baseline="0"/>
+                        <a:t>= [-0.54, 0.2, 4.82, -0.085, -0.089, 4.20]</a:t>
+                      </a:r>
+                      <a:endParaRPr lang="en-US" sz="1600" b="0"/>
+                    </a:p>
+                  </a:txBody>
+                  <a:tcPr anchor="ctr"/>
+                </a:tc>
+                <a:tc>
+                  <a:txBody>
+                    <a:bodyPr/>
+                    <a:lstStyle/>
+                    <a:p>
+                      <a:pPr algn="ctr"/>
+                      <a:r>
+                        <a:rPr lang="en-US" sz="1600"/>
+                        <a:t>1.2053</a:t>
+                      </a:r>
+                      <a:endParaRPr lang="en-US" sz="1600" b="0"/>
+                    </a:p>
+                  </a:txBody>
+                  <a:tcPr anchor="ctr"/>
+                </a:tc>
+              </a:tr>
+              <a:tr h="601133">
+                <a:tc>
+                  <a:txBody>
+                    <a:bodyPr/>
+                    <a:lstStyle/>
+                    <a:p>
+                      <a:pPr algn="ctr"/>
+                      <a:r>
+                        <a:rPr lang="en-US" sz="1600"/>
+                        <a:t>2</a:t>
+                      </a:r>
+                      <a:endParaRPr lang="en-US" sz="1600" b="0"/>
+                    </a:p>
+                  </a:txBody>
+                  <a:tcPr anchor="ctr"/>
+                </a:tc>
+                <a:tc>
+                  <a:txBody>
+                    <a:bodyPr/>
+                    <a:lstStyle/>
+                    <a:p>
+                      <a:pPr algn="ctr"/>
+                      <a:r>
+                        <a:rPr lang="en-US" sz="1600"/>
+                        <a:t>Catches</a:t>
+                      </a:r>
+                      <a:br>
+                        <a:rPr lang="en-US" sz="1600"/>
+                      </a:br>
+                      <a:r>
+                        <a:rPr lang="en-US" sz="1600"/>
+                        <a:t>Fantasy</a:t>
+                      </a:r>
+                      <a:r>
+                        <a:rPr lang="en-US" sz="1600" baseline="0"/>
+                        <a:t> Points</a:t>
+                      </a:r>
+                    </a:p>
+                    <a:p>
+                      <a:pPr algn="ctr"/>
+                      <a:r>
+                        <a:rPr lang="en-US" sz="1600" baseline="0"/>
+                        <a:t>Targets</a:t>
+                      </a:r>
+                      <a:endParaRPr lang="en-US" sz="1600" b="0"/>
+                    </a:p>
+                  </a:txBody>
+                  <a:tcPr anchor="ctr"/>
+                </a:tc>
+                <a:tc>
+                  <a:txBody>
+                    <a:bodyPr/>
+                    <a:lstStyle/>
+                    <a:p>
+                      <a:pPr algn="ctr"/>
+                      <a:r>
+                        <a:rPr lang="en-US" sz="1600"/>
+                        <a:t>β</a:t>
+                      </a:r>
+                      <a:r>
+                        <a:rPr lang="en-US" sz="1600" baseline="-25000"/>
+                        <a:t>1 </a:t>
+                      </a:r>
+                      <a:r>
+                        <a:rPr lang="en-US" sz="1600" baseline="0"/>
+                        <a:t>= [2.71, -0.42, 0.61, -0.89, 45.02, 42.26]</a:t>
+                      </a:r>
+                      <a:r>
+                        <a:rPr lang="en-US" sz="1600" baseline="-25000"/>
+                        <a:t/>
+                      </a:r>
+                      <a:br>
+                        <a:rPr lang="en-US" sz="1600" baseline="-25000"/>
+                      </a:br>
+                      <a:r>
+                        <a:rPr lang="en-US" sz="1600"/>
+                        <a:t>β</a:t>
+                      </a:r>
+                      <a:r>
+                        <a:rPr lang="en-US" sz="1600" baseline="-25000"/>
+                        <a:t>2 </a:t>
+                      </a:r>
+                      <a:r>
+                        <a:rPr lang="en-US" sz="1600" baseline="0"/>
+                        <a:t>= [-0.70, 0.23, 4.00, -0.084, 0.83, 2.64]</a:t>
+                      </a:r>
+                      <a:endParaRPr lang="en-US" sz="1600" b="0"/>
+                    </a:p>
+                  </a:txBody>
+                  <a:tcPr anchor="ctr"/>
+                </a:tc>
+                <a:tc>
+                  <a:txBody>
+                    <a:bodyPr/>
+                    <a:lstStyle/>
+                    <a:p>
+                      <a:pPr algn="ctr"/>
+                      <a:r>
+                        <a:rPr lang="en-US" sz="1600"/>
+                        <a:t>1.1887</a:t>
+                      </a:r>
+                      <a:endParaRPr lang="en-US" sz="1600" b="0"/>
+                    </a:p>
+                  </a:txBody>
+                  <a:tcPr anchor="ctr"/>
+                </a:tc>
+              </a:tr>
+              <a:tr h="601133">
+                <a:tc>
+                  <a:txBody>
+                    <a:bodyPr/>
+                    <a:lstStyle/>
+                    <a:p>
+                      <a:pPr algn="ctr"/>
+                      <a:r>
+                        <a:rPr lang="en-US" sz="1600"/>
+                        <a:t>2</a:t>
+                      </a:r>
+                      <a:endParaRPr lang="en-US" sz="1600" b="0"/>
+                    </a:p>
+                  </a:txBody>
+                  <a:tcPr anchor="ctr"/>
+                </a:tc>
+                <a:tc>
+                  <a:txBody>
+                    <a:bodyPr/>
+                    <a:lstStyle/>
+                    <a:p>
+                      <a:pPr algn="ctr"/>
+                      <a:r>
+                        <a:rPr lang="en-US" sz="1600"/>
+                        <a:t>Catches</a:t>
+                      </a:r>
+                      <a:endParaRPr lang="en-US" sz="1600" b="0"/>
+                    </a:p>
+                  </a:txBody>
+                  <a:tcPr anchor="ctr"/>
+                </a:tc>
+                <a:tc>
+                  <a:txBody>
+                    <a:bodyPr/>
+                    <a:lstStyle/>
+                    <a:p>
+                      <a:pPr marL="0" marR="0" indent="0" algn="ctr" defTabSz="457105" rtl="0" eaLnBrk="1" fontAlgn="auto" latinLnBrk="0" hangingPunct="1">
+                        <a:lnSpc>
+                          <a:spcPct val="100000"/>
+                        </a:lnSpc>
+                        <a:spcBef>
+                          <a:spcPts val="0"/>
+                        </a:spcBef>
+                        <a:spcAft>
+                          <a:spcPts val="0"/>
+                        </a:spcAft>
+                        <a:buClrTx/>
+                        <a:buSzTx/>
+                        <a:buFontTx/>
+                        <a:buNone/>
+                        <a:tabLst/>
+                        <a:defRPr/>
+                      </a:pPr>
+                      <a:r>
+                        <a:rPr lang="en-US" sz="1600"/>
+                        <a:t>β</a:t>
+                      </a:r>
+                      <a:r>
+                        <a:rPr lang="en-US" sz="1600" baseline="-25000"/>
+                        <a:t>1 </a:t>
+                      </a:r>
+                      <a:r>
+                        <a:rPr lang="en-US" sz="1600" baseline="0"/>
+                        <a:t>= [-1.04, 0.27, 6.02, -0.083, 0.16, 3.02]</a:t>
+                      </a:r>
+                      <a:r>
+                        <a:rPr lang="en-US" sz="1600" baseline="-25000"/>
+                        <a:t/>
+                      </a:r>
+                      <a:br>
+                        <a:rPr lang="en-US" sz="1600" baseline="-25000"/>
+                      </a:br>
+                      <a:r>
+                        <a:rPr lang="en-US" sz="1600"/>
+                        <a:t>β</a:t>
+                      </a:r>
+                      <a:r>
+                        <a:rPr lang="en-US" sz="1600" baseline="-25000"/>
+                        <a:t>2 </a:t>
+                      </a:r>
+                      <a:r>
+                        <a:rPr lang="en-US" sz="1600" baseline="0"/>
+                        <a:t>= [4.98, -0.99, 68.03, -0.32, 56.68, 24.8]</a:t>
+                      </a:r>
+                      <a:endParaRPr lang="en-US" sz="1600" b="0"/>
+                    </a:p>
+                  </a:txBody>
+                  <a:tcPr anchor="ctr"/>
+                </a:tc>
+                <a:tc>
+                  <a:txBody>
+                    <a:bodyPr/>
+                    <a:lstStyle/>
+                    <a:p>
+                      <a:pPr algn="ctr"/>
+                      <a:r>
+                        <a:rPr lang="en-US" sz="1600"/>
+                        <a:t>1.1811</a:t>
+                      </a:r>
+                      <a:endParaRPr lang="en-US" sz="1600" b="0"/>
+                    </a:p>
+                  </a:txBody>
+                  <a:tcPr anchor="ctr"/>
+                </a:tc>
+              </a:tr>
+              <a:tr h="601133">
+                <a:tc>
+                  <a:txBody>
+                    <a:bodyPr/>
+                    <a:lstStyle/>
+                    <a:p>
+                      <a:pPr algn="ctr"/>
+                      <a:r>
+                        <a:rPr lang="en-US" sz="1600"/>
+                        <a:t>2</a:t>
+                      </a:r>
+                      <a:endParaRPr lang="en-US" sz="1600" b="0"/>
+                    </a:p>
+                  </a:txBody>
+                  <a:tcPr anchor="ctr"/>
+                </a:tc>
+                <a:tc>
+                  <a:txBody>
+                    <a:bodyPr/>
+                    <a:lstStyle/>
+                    <a:p>
+                      <a:pPr algn="ctr"/>
+                      <a:r>
+                        <a:rPr lang="en-US" sz="1600"/>
+                        <a:t>Touchdowns</a:t>
+                      </a:r>
+                      <a:endParaRPr lang="en-US" sz="1600" b="0"/>
+                    </a:p>
+                  </a:txBody>
+                  <a:tcPr anchor="ctr"/>
+                </a:tc>
+                <a:tc>
+                  <a:txBody>
+                    <a:bodyPr/>
+                    <a:lstStyle/>
+                    <a:p>
+                      <a:pPr marL="0" marR="0" indent="0" algn="ctr" defTabSz="457105" rtl="0" eaLnBrk="1" fontAlgn="auto" latinLnBrk="0" hangingPunct="1">
+                        <a:lnSpc>
+                          <a:spcPct val="100000"/>
+                        </a:lnSpc>
+                        <a:spcBef>
+                          <a:spcPts val="0"/>
+                        </a:spcBef>
+                        <a:spcAft>
+                          <a:spcPts val="0"/>
+                        </a:spcAft>
+                        <a:buClrTx/>
+                        <a:buSzTx/>
+                        <a:buFontTx/>
+                        <a:buNone/>
+                        <a:tabLst/>
+                        <a:defRPr/>
+                      </a:pPr>
+                      <a:r>
+                        <a:rPr lang="en-US" sz="1600"/>
+                        <a:t>β</a:t>
+                      </a:r>
+                      <a:r>
+                        <a:rPr lang="en-US" sz="1600" baseline="-25000"/>
+                        <a:t>1 </a:t>
+                      </a:r>
+                      <a:r>
+                        <a:rPr lang="en-US" sz="1600" baseline="0"/>
+                        <a:t>= [-4.09, 0.56, 24.85, -0.02, -4.31, 3.59]</a:t>
+                      </a:r>
+                      <a:r>
+                        <a:rPr lang="en-US" sz="1600" baseline="-25000"/>
+                        <a:t/>
+                      </a:r>
+                      <a:br>
+                        <a:rPr lang="en-US" sz="1600" baseline="-25000"/>
+                      </a:br>
+                      <a:r>
+                        <a:rPr lang="en-US" sz="1600"/>
+                        <a:t>β</a:t>
+                      </a:r>
+                      <a:r>
+                        <a:rPr lang="en-US" sz="1600" baseline="-25000"/>
+                        <a:t>2 </a:t>
+                      </a:r>
+                      <a:r>
+                        <a:rPr lang="en-US" sz="1600" baseline="0"/>
+                        <a:t>= [44.5, -4.44, -288, 0.11, 48.39, 52.04]</a:t>
+                      </a:r>
+                      <a:endParaRPr lang="en-US" sz="1600" b="0"/>
+                    </a:p>
+                  </a:txBody>
+                  <a:tcPr anchor="ctr"/>
+                </a:tc>
+                <a:tc>
+                  <a:txBody>
+                    <a:bodyPr/>
+                    <a:lstStyle/>
+                    <a:p>
+                      <a:pPr algn="ctr"/>
+                      <a:r>
+                        <a:rPr lang="en-US" sz="1600"/>
+                        <a:t>1.1107</a:t>
+                      </a:r>
+                      <a:endParaRPr lang="en-US" sz="1600" b="0"/>
+                    </a:p>
+                  </a:txBody>
+                  <a:tcPr anchor="ctr"/>
+                </a:tc>
+              </a:tr>
+              <a:tr h="601133">
+                <a:tc>
+                  <a:txBody>
+                    <a:bodyPr/>
+                    <a:lstStyle/>
+                    <a:p>
+                      <a:pPr algn="ctr"/>
+                      <a:r>
+                        <a:rPr lang="en-US" sz="1600"/>
+                        <a:t>2</a:t>
+                      </a:r>
+                      <a:endParaRPr lang="en-US" sz="1600" b="0"/>
+                    </a:p>
+                  </a:txBody>
+                  <a:tcPr anchor="ctr"/>
+                </a:tc>
+                <a:tc>
+                  <a:txBody>
+                    <a:bodyPr/>
+                    <a:lstStyle/>
+                    <a:p>
+                      <a:pPr algn="ctr"/>
+                      <a:r>
+                        <a:rPr lang="en-US" sz="1600"/>
+                        <a:t>Receiving Yards</a:t>
+                      </a:r>
+                      <a:endParaRPr lang="en-US" sz="1600" b="0"/>
+                    </a:p>
+                  </a:txBody>
+                  <a:tcPr anchor="ctr"/>
+                </a:tc>
+                <a:tc>
+                  <a:txBody>
+                    <a:bodyPr/>
+                    <a:lstStyle/>
+                    <a:p>
+                      <a:pPr marL="0" marR="0" indent="0" algn="ctr" defTabSz="457105" rtl="0" eaLnBrk="1" fontAlgn="auto" latinLnBrk="0" hangingPunct="1">
+                        <a:lnSpc>
+                          <a:spcPct val="100000"/>
+                        </a:lnSpc>
+                        <a:spcBef>
+                          <a:spcPts val="0"/>
+                        </a:spcBef>
+                        <a:spcAft>
+                          <a:spcPts val="0"/>
+                        </a:spcAft>
+                        <a:buClrTx/>
+                        <a:buSzTx/>
+                        <a:buFontTx/>
+                        <a:buNone/>
+                        <a:tabLst/>
+                        <a:defRPr/>
+                      </a:pPr>
+                      <a:r>
+                        <a:rPr lang="en-US" sz="1600"/>
+                        <a:t>β</a:t>
+                      </a:r>
+                      <a:r>
+                        <a:rPr lang="en-US" sz="1600" baseline="-25000"/>
+                        <a:t>1 </a:t>
+                      </a:r>
+                      <a:r>
+                        <a:rPr lang="en-US" sz="1600" baseline="0"/>
+                        <a:t>= [-3.48, 0.48, 25.5, -0.06, -0.51, 5.64]</a:t>
+                      </a:r>
+                      <a:r>
+                        <a:rPr lang="en-US" sz="1600" baseline="-25000"/>
+                        <a:t/>
+                      </a:r>
+                      <a:br>
+                        <a:rPr lang="en-US" sz="1600" baseline="-25000"/>
+                      </a:br>
+                      <a:r>
+                        <a:rPr lang="en-US" sz="1600"/>
+                        <a:t>β</a:t>
+                      </a:r>
+                      <a:r>
+                        <a:rPr lang="en-US" sz="1600" baseline="-25000"/>
+                        <a:t>2 </a:t>
+                      </a:r>
+                      <a:r>
+                        <a:rPr lang="en-US" sz="1600" baseline="0"/>
+                        <a:t>= [17.87, -1.5, -115.9, -0.06, 3.82, 6.90]</a:t>
+                      </a:r>
+                      <a:endParaRPr lang="en-US" sz="1600" b="0"/>
+                    </a:p>
+                  </a:txBody>
+                  <a:tcPr anchor="ctr"/>
+                </a:tc>
+                <a:tc>
+                  <a:txBody>
+                    <a:bodyPr/>
+                    <a:lstStyle/>
+                    <a:p>
+                      <a:pPr algn="ctr"/>
+                      <a:r>
+                        <a:rPr lang="en-US" sz="1600"/>
+                        <a:t>1.0857</a:t>
+                      </a:r>
+                      <a:endParaRPr lang="en-US" sz="1600" b="0"/>
+                    </a:p>
+                  </a:txBody>
+                  <a:tcPr anchor="ctr"/>
+                </a:tc>
+              </a:tr>
+            </a:tbl>
+          </a:graphicData>
+        </a:graphic>
+      </p:graphicFrame>
+      <p:sp>
+        <p:nvSpPr>
+          <p:cNvPr id="31" name="Text Box 7"/>
+          <p:cNvSpPr txBox="1">
+            <a:spLocks noChangeArrowheads="1"/>
+          </p:cNvSpPr>
+          <p:nvPr/>
+        </p:nvSpPr>
+        <p:spPr bwMode="auto">
+          <a:xfrm>
+            <a:off x="10040599" y="15442655"/>
+            <a:ext cx="8734426" cy="892340"/>
+          </a:xfrm>
+          <a:prstGeom prst="rect">
+            <a:avLst/>
+          </a:prstGeom>
+          <a:solidFill>
+            <a:schemeClr val="accent2"/>
+          </a:solidFill>
+          <a:ln w="9525">
+            <a:noFill/>
+            <a:miter lim="800000"/>
+            <a:headEnd/>
+            <a:tailEnd/>
+          </a:ln>
+          <a:effectLst/>
+        </p:spPr>
+        <p:txBody>
+          <a:bodyPr lIns="91248" tIns="45615" rIns="91248" bIns="45615">
+            <a:prstTxWarp prst="textNoShape">
+              <a:avLst/>
+            </a:prstTxWarp>
+            <a:spAutoFit/>
+          </a:bodyPr>
+          <a:lstStyle/>
+          <a:p>
+            <a:pPr algn="ctr" eaLnBrk="0" hangingPunct="0">
+              <a:spcBef>
+                <a:spcPct val="50000"/>
+              </a:spcBef>
+            </a:pPr>
+            <a:r>
+              <a:rPr lang="en-US" sz="5200" b="1" dirty="0" smtClean="0">
+                <a:solidFill>
+                  <a:srgbClr val="F8F8F8"/>
+                </a:solidFill>
+              </a:rPr>
+              <a:t>Linear Regression</a:t>
+            </a:r>
+            <a:endParaRPr lang="en-US" sz="5200" b="1" dirty="0">
+              <a:solidFill>
+                <a:srgbClr val="F8F8F8"/>
+              </a:solidFill>
+            </a:endParaRPr>
+          </a:p>
+        </p:txBody>
+      </p:sp>
+      <p:sp>
+        <p:nvSpPr>
+          <p:cNvPr id="33" name="Text Box 7"/>
+          <p:cNvSpPr txBox="1">
+            <a:spLocks noChangeArrowheads="1"/>
+          </p:cNvSpPr>
+          <p:nvPr/>
+        </p:nvSpPr>
+        <p:spPr bwMode="auto">
+          <a:xfrm>
+            <a:off x="19491325" y="16955264"/>
+            <a:ext cx="8734426" cy="892340"/>
+          </a:xfrm>
+          <a:prstGeom prst="rect">
+            <a:avLst/>
+          </a:prstGeom>
+          <a:solidFill>
+            <a:schemeClr val="accent2"/>
+          </a:solidFill>
+          <a:ln w="9525">
+            <a:noFill/>
+            <a:miter lim="800000"/>
+            <a:headEnd/>
+            <a:tailEnd/>
+          </a:ln>
+          <a:effectLst/>
+        </p:spPr>
+        <p:txBody>
+          <a:bodyPr lIns="91248" tIns="45615" rIns="91248" bIns="45615">
+            <a:prstTxWarp prst="textNoShape">
+              <a:avLst/>
+            </a:prstTxWarp>
+            <a:spAutoFit/>
+          </a:bodyPr>
+          <a:lstStyle/>
+          <a:p>
+            <a:pPr algn="ctr" eaLnBrk="0" hangingPunct="0">
+              <a:spcBef>
+                <a:spcPct val="50000"/>
+              </a:spcBef>
+            </a:pPr>
+            <a:r>
+              <a:rPr lang="en-US" sz="5200" b="1" dirty="0" smtClean="0">
+                <a:solidFill>
+                  <a:srgbClr val="F8F8F8"/>
+                </a:solidFill>
+              </a:rPr>
+              <a:t>K-Means Mixture Model</a:t>
+            </a:r>
+            <a:endParaRPr lang="en-US" sz="5200" b="1" dirty="0">
+              <a:solidFill>
+                <a:srgbClr val="F8F8F8"/>
+              </a:solidFill>
+            </a:endParaRPr>
+          </a:p>
+        </p:txBody>
+      </p:sp>
+      <p:sp>
+        <p:nvSpPr>
+          <p:cNvPr id="34" name="Text Box 7"/>
+          <p:cNvSpPr txBox="1">
+            <a:spLocks noChangeArrowheads="1"/>
+          </p:cNvSpPr>
+          <p:nvPr/>
+        </p:nvSpPr>
+        <p:spPr bwMode="auto">
+          <a:xfrm>
+            <a:off x="28948062" y="22623519"/>
+            <a:ext cx="8734426" cy="892340"/>
+          </a:xfrm>
+          <a:prstGeom prst="rect">
+            <a:avLst/>
+          </a:prstGeom>
+          <a:solidFill>
+            <a:schemeClr val="accent2"/>
+          </a:solidFill>
+          <a:ln w="9525">
+            <a:noFill/>
+            <a:miter lim="800000"/>
+            <a:headEnd/>
+            <a:tailEnd/>
+          </a:ln>
+          <a:effectLst/>
+        </p:spPr>
+        <p:txBody>
+          <a:bodyPr lIns="91248" tIns="45615" rIns="91248" bIns="45615">
+            <a:prstTxWarp prst="textNoShape">
+              <a:avLst/>
+            </a:prstTxWarp>
+            <a:spAutoFit/>
+          </a:bodyPr>
+          <a:lstStyle/>
+          <a:p>
+            <a:pPr algn="ctr" eaLnBrk="0" hangingPunct="0">
+              <a:spcBef>
+                <a:spcPct val="50000"/>
+              </a:spcBef>
+            </a:pPr>
+            <a:r>
+              <a:rPr lang="en-US" sz="5200" b="1" dirty="0" smtClean="0">
+                <a:solidFill>
+                  <a:srgbClr val="F8F8F8"/>
+                </a:solidFill>
+              </a:rPr>
+              <a:t>Conclusion</a:t>
+            </a:r>
+            <a:endParaRPr lang="en-US" sz="5200" b="1" dirty="0">
+              <a:solidFill>
+                <a:srgbClr val="F8F8F8"/>
+              </a:solidFill>
+            </a:endParaRPr>
+          </a:p>
+        </p:txBody>
+      </p:sp>
+      <p:graphicFrame>
+        <p:nvGraphicFramePr>
+          <p:cNvPr id="35" name="Table 34"/>
+          <p:cNvGraphicFramePr>
+            <a:graphicFrameLocks noGrp="1"/>
+          </p:cNvGraphicFramePr>
+          <p:nvPr/>
+        </p:nvGraphicFramePr>
+        <p:xfrm>
+          <a:off x="29175416" y="16334995"/>
+          <a:ext cx="8276168" cy="6075678"/>
+        </p:xfrm>
+        <a:graphic>
+          <a:graphicData uri="http://schemas.openxmlformats.org/drawingml/2006/table">
+            <a:tbl>
+              <a:tblPr firstRow="1" bandRow="1">
+                <a:tableStyleId>{D7AC3CCA-C797-4891-BE02-D94E43425B78}</a:tableStyleId>
+              </a:tblPr>
+              <a:tblGrid>
+                <a:gridCol w="1028700"/>
+                <a:gridCol w="1794933"/>
+                <a:gridCol w="4021667"/>
+                <a:gridCol w="1430868"/>
+              </a:tblGrid>
+              <a:tr h="601133">
+                <a:tc>
+                  <a:txBody>
+                    <a:bodyPr/>
+                    <a:lstStyle/>
+                    <a:p>
+                      <a:pPr algn="ctr"/>
+                      <a:r>
+                        <a:rPr lang="en-US" sz="1600"/>
+                        <a:t>#</a:t>
+                      </a:r>
+                      <a:r>
+                        <a:rPr lang="en-US" sz="1600" baseline="0"/>
+                        <a:t> Mixtures</a:t>
+                      </a:r>
+                      <a:endParaRPr lang="en-US" sz="1600" b="1"/>
+                    </a:p>
+                  </a:txBody>
+                  <a:tcPr anchor="ctr"/>
+                </a:tc>
+                <a:tc>
+                  <a:txBody>
+                    <a:bodyPr/>
+                    <a:lstStyle/>
+                    <a:p>
+                      <a:pPr algn="ctr"/>
+                      <a:r>
+                        <a:rPr lang="en-US" sz="1600"/>
+                        <a:t>K Means Features</a:t>
+                      </a:r>
+                      <a:endParaRPr lang="en-US" sz="1600" b="1"/>
+                    </a:p>
+                  </a:txBody>
+                  <a:tcPr anchor="ctr"/>
+                </a:tc>
+                <a:tc>
+                  <a:txBody>
+                    <a:bodyPr/>
+                    <a:lstStyle/>
+                    <a:p>
+                      <a:pPr algn="ctr"/>
+                      <a:r>
+                        <a:rPr lang="en-US" sz="2000"/>
+                        <a:t>β</a:t>
+                      </a:r>
+                      <a:r>
+                        <a:rPr lang="en-US" sz="2000" baseline="-25000"/>
+                        <a:t>1 </a:t>
+                      </a:r>
+                      <a:r>
+                        <a:rPr lang="en-US" sz="2000" baseline="0"/>
+                        <a:t>… </a:t>
+                      </a:r>
+                      <a:r>
+                        <a:rPr lang="en-US" sz="2000"/>
+                        <a:t>β</a:t>
+                      </a:r>
+                      <a:r>
+                        <a:rPr lang="en-US" sz="2000" baseline="-25000"/>
+                        <a:t>K</a:t>
+                      </a:r>
+                      <a:endParaRPr lang="en-US" sz="2000" b="1"/>
+                    </a:p>
+                  </a:txBody>
+                  <a:tcPr anchor="ctr"/>
+                </a:tc>
+                <a:tc>
+                  <a:txBody>
+                    <a:bodyPr/>
+                    <a:lstStyle/>
+                    <a:p>
+                      <a:pPr algn="ctr"/>
+                      <a:r>
+                        <a:rPr lang="en-US" sz="1600"/>
+                        <a:t>Discounted</a:t>
+                      </a:r>
+                    </a:p>
+                    <a:p>
+                      <a:pPr algn="ctr"/>
+                      <a:r>
+                        <a:rPr lang="en-US" sz="1600"/>
+                        <a:t>Cumulative</a:t>
+                      </a:r>
+                    </a:p>
+                    <a:p>
+                      <a:pPr algn="ctr"/>
+                      <a:r>
+                        <a:rPr lang="en-US" sz="1600"/>
+                        <a:t>Gain</a:t>
+                      </a:r>
+                      <a:endParaRPr lang="en-US" sz="1600" b="1"/>
+                    </a:p>
+                  </a:txBody>
+                  <a:tcPr anchor="ctr"/>
+                </a:tc>
+              </a:tr>
+              <a:tr h="601133">
+                <a:tc>
+                  <a:txBody>
+                    <a:bodyPr/>
+                    <a:lstStyle/>
+                    <a:p>
+                      <a:pPr algn="ctr"/>
+                      <a:r>
+                        <a:rPr lang="en-US" sz="1600"/>
+                        <a:t>2</a:t>
+                      </a:r>
+                      <a:endParaRPr lang="en-US" sz="1600" b="0"/>
+                    </a:p>
+                  </a:txBody>
+                  <a:tcPr anchor="ctr"/>
+                </a:tc>
+                <a:tc>
+                  <a:txBody>
+                    <a:bodyPr/>
+                    <a:lstStyle/>
+                    <a:p>
+                      <a:pPr algn="ctr"/>
+                      <a:r>
+                        <a:rPr lang="en-US" sz="1600"/>
+                        <a:t>Catches</a:t>
+                      </a:r>
+                      <a:br>
+                        <a:rPr lang="en-US" sz="1600"/>
+                      </a:br>
+                      <a:r>
+                        <a:rPr lang="en-US" sz="1600"/>
+                        <a:t>Fantasy</a:t>
+                      </a:r>
+                      <a:r>
+                        <a:rPr lang="en-US" sz="1600" baseline="0"/>
+                        <a:t> Points</a:t>
+                      </a:r>
+                    </a:p>
+                    <a:p>
+                      <a:pPr algn="ctr"/>
+                      <a:r>
+                        <a:rPr lang="en-US" sz="1600" baseline="0"/>
+                        <a:t>Targets</a:t>
+                      </a:r>
+                      <a:endParaRPr lang="en-US" sz="1600" b="0"/>
+                    </a:p>
+                  </a:txBody>
+                  <a:tcPr anchor="ctr"/>
+                </a:tc>
+                <a:tc>
+                  <a:txBody>
+                    <a:bodyPr/>
+                    <a:lstStyle/>
+                    <a:p>
+                      <a:pPr marL="0" marR="0" indent="0" algn="ctr" defTabSz="457105" rtl="0" eaLnBrk="1" fontAlgn="auto" latinLnBrk="0" hangingPunct="1">
+                        <a:lnSpc>
+                          <a:spcPct val="100000"/>
+                        </a:lnSpc>
+                        <a:spcBef>
+                          <a:spcPts val="0"/>
+                        </a:spcBef>
+                        <a:spcAft>
+                          <a:spcPts val="0"/>
+                        </a:spcAft>
+                        <a:buClrTx/>
+                        <a:buSzTx/>
+                        <a:buFontTx/>
+                        <a:buNone/>
+                        <a:tabLst/>
+                        <a:defRPr/>
+                      </a:pPr>
+                      <a:r>
+                        <a:rPr lang="en-US" sz="1600"/>
+                        <a:t>β</a:t>
+                      </a:r>
+                      <a:r>
+                        <a:rPr lang="en-US" sz="1600" baseline="-25000"/>
+                        <a:t>1 </a:t>
+                      </a:r>
+                      <a:r>
+                        <a:rPr lang="en-US" sz="1600" baseline="0"/>
+                        <a:t>=[1.51, -2.99]</a:t>
+                      </a:r>
+                      <a:r>
+                        <a:rPr lang="en-US" sz="1600" baseline="-25000"/>
+                        <a:t/>
+                      </a:r>
+                      <a:br>
+                        <a:rPr lang="en-US" sz="1600" baseline="-25000"/>
+                      </a:br>
+                      <a:r>
+                        <a:rPr lang="en-US" sz="1600"/>
+                        <a:t>β</a:t>
+                      </a:r>
+                      <a:r>
+                        <a:rPr lang="en-US" sz="1600" baseline="-25000"/>
+                        <a:t>2 </a:t>
+                      </a:r>
+                      <a:r>
+                        <a:rPr lang="en-US" sz="1600" baseline="0"/>
+                        <a:t>= [1.87, -13.66]</a:t>
+                      </a:r>
+                      <a:endParaRPr lang="en-US" sz="1600" b="0"/>
+                    </a:p>
+                  </a:txBody>
+                  <a:tcPr anchor="ctr"/>
+                </a:tc>
+                <a:tc>
+                  <a:txBody>
+                    <a:bodyPr/>
+                    <a:lstStyle/>
+                    <a:p>
+                      <a:pPr algn="ctr"/>
+                      <a:r>
+                        <a:rPr lang="en-US" sz="1600" b="0"/>
+                        <a:t>1.8063</a:t>
+                      </a:r>
+                    </a:p>
+                  </a:txBody>
+                  <a:tcPr anchor="ctr"/>
+                </a:tc>
+              </a:tr>
+              <a:tr h="601133">
+                <a:tc>
+                  <a:txBody>
+                    <a:bodyPr/>
+                    <a:lstStyle/>
+                    <a:p>
+                      <a:pPr algn="ctr"/>
+                      <a:r>
+                        <a:rPr lang="en-US" sz="1600" b="0"/>
+                        <a:t>2</a:t>
+                      </a:r>
+                    </a:p>
+                  </a:txBody>
+                  <a:tcPr anchor="ctr"/>
+                </a:tc>
+                <a:tc>
+                  <a:txBody>
+                    <a:bodyPr/>
+                    <a:lstStyle/>
+                    <a:p>
+                      <a:pPr algn="ctr"/>
+                      <a:r>
+                        <a:rPr lang="en-US" sz="1600" b="0"/>
+                        <a:t>Fantasy Points</a:t>
+                      </a:r>
+                    </a:p>
+                  </a:txBody>
+                  <a:tcPr anchor="ctr"/>
+                </a:tc>
+                <a:tc>
+                  <a:txBody>
+                    <a:bodyPr/>
+                    <a:lstStyle/>
+                    <a:p>
+                      <a:pPr marL="0" marR="0" indent="0" algn="ctr" defTabSz="457105" rtl="0" eaLnBrk="1" fontAlgn="auto" latinLnBrk="0" hangingPunct="1">
+                        <a:lnSpc>
+                          <a:spcPct val="100000"/>
+                        </a:lnSpc>
+                        <a:spcBef>
+                          <a:spcPts val="0"/>
+                        </a:spcBef>
+                        <a:spcAft>
+                          <a:spcPts val="0"/>
+                        </a:spcAft>
+                        <a:buClrTx/>
+                        <a:buSzTx/>
+                        <a:buFontTx/>
+                        <a:buNone/>
+                        <a:tabLst/>
+                        <a:defRPr/>
+                      </a:pPr>
+                      <a:r>
+                        <a:rPr lang="en-US" sz="1600" b="0"/>
+                        <a:t>β</a:t>
+                      </a:r>
+                      <a:r>
+                        <a:rPr lang="en-US" sz="1600" b="0" baseline="-25000"/>
+                        <a:t>1 </a:t>
+                      </a:r>
+                      <a:r>
+                        <a:rPr lang="en-US" sz="1600" b="0" baseline="0"/>
+                        <a:t>=[1.81, -11.58]</a:t>
+                      </a:r>
+                      <a:r>
+                        <a:rPr lang="en-US" sz="1600" b="0" baseline="-25000"/>
+                        <a:t/>
+                      </a:r>
+                      <a:br>
+                        <a:rPr lang="en-US" sz="1600" b="0" baseline="-25000"/>
+                      </a:br>
+                      <a:r>
+                        <a:rPr lang="en-US" sz="1600" b="0"/>
+                        <a:t>β</a:t>
+                      </a:r>
+                      <a:r>
+                        <a:rPr lang="en-US" sz="1600" b="0" baseline="-25000"/>
+                        <a:t>2 </a:t>
+                      </a:r>
+                      <a:r>
+                        <a:rPr lang="en-US" sz="1600" b="0" baseline="0"/>
+                        <a:t>= [1.59, -5.52]</a:t>
+                      </a:r>
+                      <a:endParaRPr lang="en-US" sz="1600" b="0"/>
+                    </a:p>
+                  </a:txBody>
+                  <a:tcPr anchor="ctr"/>
+                </a:tc>
+                <a:tc>
+                  <a:txBody>
+                    <a:bodyPr/>
+                    <a:lstStyle/>
+                    <a:p>
+                      <a:pPr algn="ctr"/>
+                      <a:r>
+                        <a:rPr lang="en-US" sz="1600" b="0"/>
+                        <a:t>1.7925</a:t>
+                      </a:r>
+                    </a:p>
+                  </a:txBody>
+                  <a:tcPr anchor="ctr"/>
+                </a:tc>
+              </a:tr>
+              <a:tr h="601133">
+                <a:tc>
+                  <a:txBody>
+                    <a:bodyPr/>
+                    <a:lstStyle/>
+                    <a:p>
+                      <a:pPr algn="ctr"/>
+                      <a:r>
+                        <a:rPr lang="en-US" sz="1600"/>
+                        <a:t>2</a:t>
+                      </a:r>
+                      <a:endParaRPr lang="en-US" sz="1600" b="0"/>
+                    </a:p>
+                  </a:txBody>
+                  <a:tcPr anchor="ctr"/>
+                </a:tc>
+                <a:tc>
+                  <a:txBody>
+                    <a:bodyPr/>
+                    <a:lstStyle/>
+                    <a:p>
+                      <a:pPr algn="ctr"/>
+                      <a:r>
+                        <a:rPr lang="en-US" sz="1600"/>
+                        <a:t>Catches</a:t>
+                      </a:r>
+                      <a:br>
+                        <a:rPr lang="en-US" sz="1600"/>
+                      </a:br>
+                      <a:r>
+                        <a:rPr lang="en-US" sz="1600"/>
+                        <a:t>Fantasy</a:t>
+                      </a:r>
+                      <a:r>
+                        <a:rPr lang="en-US" sz="1600" baseline="0"/>
+                        <a:t> Points</a:t>
+                      </a:r>
+                      <a:endParaRPr lang="en-US" sz="1600" b="0" baseline="0"/>
+                    </a:p>
+                  </a:txBody>
+                  <a:tcPr anchor="ctr"/>
+                </a:tc>
+                <a:tc>
+                  <a:txBody>
+                    <a:bodyPr/>
+                    <a:lstStyle/>
+                    <a:p>
+                      <a:pPr algn="ctr"/>
+                      <a:r>
+                        <a:rPr lang="en-US" sz="1600"/>
+                        <a:t>β</a:t>
+                      </a:r>
+                      <a:r>
+                        <a:rPr lang="en-US" sz="1600" baseline="-25000"/>
+                        <a:t>1 </a:t>
+                      </a:r>
+                      <a:r>
+                        <a:rPr lang="en-US" sz="1600" baseline="0"/>
+                        <a:t>=[1.74, -7.77]</a:t>
+                      </a:r>
+                      <a:r>
+                        <a:rPr lang="en-US" sz="1600" baseline="-25000"/>
+                        <a:t/>
+                      </a:r>
+                      <a:br>
+                        <a:rPr lang="en-US" sz="1600" baseline="-25000"/>
+                      </a:br>
+                      <a:r>
+                        <a:rPr lang="en-US" sz="1600"/>
+                        <a:t>β</a:t>
+                      </a:r>
+                      <a:r>
+                        <a:rPr lang="en-US" sz="1600" baseline="-25000"/>
+                        <a:t>2 </a:t>
+                      </a:r>
+                      <a:r>
+                        <a:rPr lang="en-US" sz="1600" baseline="0"/>
+                        <a:t>= [1.82, -12.13]</a:t>
+                      </a:r>
+                      <a:endParaRPr lang="en-US" sz="1600" b="0"/>
+                    </a:p>
+                  </a:txBody>
+                  <a:tcPr anchor="ctr"/>
+                </a:tc>
+                <a:tc>
+                  <a:txBody>
+                    <a:bodyPr/>
+                    <a:lstStyle/>
+                    <a:p>
+                      <a:pPr algn="ctr"/>
+                      <a:r>
+                        <a:rPr lang="en-US" sz="1600" b="0"/>
+                        <a:t>1.7880</a:t>
+                      </a:r>
+                    </a:p>
+                  </a:txBody>
+                  <a:tcPr anchor="ctr"/>
+                </a:tc>
+              </a:tr>
+              <a:tr h="601133">
+                <a:tc>
+                  <a:txBody>
+                    <a:bodyPr/>
+                    <a:lstStyle/>
+                    <a:p>
+                      <a:pPr algn="ctr"/>
+                      <a:r>
+                        <a:rPr lang="en-US" sz="1600"/>
+                        <a:t>2</a:t>
+                      </a:r>
+                      <a:endParaRPr lang="en-US" sz="1600" b="0"/>
+                    </a:p>
+                  </a:txBody>
+                  <a:tcPr anchor="ctr"/>
+                </a:tc>
+                <a:tc>
+                  <a:txBody>
+                    <a:bodyPr/>
+                    <a:lstStyle/>
+                    <a:p>
+                      <a:pPr algn="ctr"/>
+                      <a:r>
+                        <a:rPr lang="en-US" sz="1600"/>
+                        <a:t>Catches</a:t>
+                      </a:r>
+                      <a:endParaRPr lang="en-US" sz="1600" b="0"/>
+                    </a:p>
+                  </a:txBody>
+                  <a:tcPr anchor="ctr"/>
+                </a:tc>
+                <a:tc>
+                  <a:txBody>
+                    <a:bodyPr/>
+                    <a:lstStyle/>
+                    <a:p>
+                      <a:pPr algn="ctr"/>
+                      <a:r>
+                        <a:rPr lang="en-US" sz="1600"/>
+                        <a:t>β</a:t>
+                      </a:r>
+                      <a:r>
+                        <a:rPr lang="en-US" sz="1600" baseline="-25000"/>
+                        <a:t>1 </a:t>
+                      </a:r>
+                      <a:r>
+                        <a:rPr lang="en-US" sz="1600" baseline="0"/>
+                        <a:t>=[1.91, -13.53]</a:t>
+                      </a:r>
+                      <a:r>
+                        <a:rPr lang="en-US" sz="1600" baseline="-25000"/>
+                        <a:t/>
+                      </a:r>
+                      <a:br>
+                        <a:rPr lang="en-US" sz="1600" baseline="-25000"/>
+                      </a:br>
+                      <a:r>
+                        <a:rPr lang="en-US" sz="1600"/>
+                        <a:t>β</a:t>
+                      </a:r>
+                      <a:r>
+                        <a:rPr lang="en-US" sz="1600" baseline="-25000"/>
+                        <a:t>2 </a:t>
+                      </a:r>
+                      <a:r>
+                        <a:rPr lang="en-US" sz="1600" baseline="0"/>
+                        <a:t>= [1.58, -6.30]</a:t>
+                      </a:r>
+                      <a:endParaRPr lang="en-US" sz="1600" b="0"/>
+                    </a:p>
+                  </a:txBody>
+                  <a:tcPr anchor="ctr"/>
+                </a:tc>
+                <a:tc>
+                  <a:txBody>
+                    <a:bodyPr/>
+                    <a:lstStyle/>
+                    <a:p>
+                      <a:pPr algn="ctr"/>
+                      <a:r>
+                        <a:rPr lang="en-US" sz="1600" b="0"/>
+                        <a:t>1.7877</a:t>
+                      </a:r>
+                    </a:p>
+                  </a:txBody>
+                  <a:tcPr anchor="ctr"/>
+                </a:tc>
+              </a:tr>
+              <a:tr h="601133">
+                <a:tc>
+                  <a:txBody>
+                    <a:bodyPr/>
+                    <a:lstStyle/>
+                    <a:p>
+                      <a:pPr algn="ctr"/>
+                      <a:r>
+                        <a:rPr lang="en-US" sz="1600"/>
+                        <a:t>2</a:t>
+                      </a:r>
+                      <a:endParaRPr lang="en-US" sz="1600" b="0"/>
+                    </a:p>
+                  </a:txBody>
+                  <a:tcPr anchor="ctr"/>
+                </a:tc>
+                <a:tc>
+                  <a:txBody>
+                    <a:bodyPr/>
+                    <a:lstStyle/>
+                    <a:p>
+                      <a:pPr algn="ctr"/>
+                      <a:r>
+                        <a:rPr lang="en-US" sz="1600"/>
+                        <a:t>Receiving Targets</a:t>
+                      </a:r>
+                      <a:endParaRPr lang="en-US" sz="1600" b="0"/>
+                    </a:p>
+                  </a:txBody>
+                  <a:tcPr anchor="ctr"/>
+                </a:tc>
+                <a:tc>
+                  <a:txBody>
+                    <a:bodyPr/>
+                    <a:lstStyle/>
+                    <a:p>
+                      <a:pPr marL="0" marR="0" indent="0" algn="ctr" defTabSz="457105" rtl="0" eaLnBrk="1" fontAlgn="auto" latinLnBrk="0" hangingPunct="1">
+                        <a:lnSpc>
+                          <a:spcPct val="100000"/>
+                        </a:lnSpc>
+                        <a:spcBef>
+                          <a:spcPts val="0"/>
+                        </a:spcBef>
+                        <a:spcAft>
+                          <a:spcPts val="0"/>
+                        </a:spcAft>
+                        <a:buClrTx/>
+                        <a:buSzTx/>
+                        <a:buFontTx/>
+                        <a:buNone/>
+                        <a:tabLst/>
+                        <a:defRPr/>
+                      </a:pPr>
+                      <a:r>
+                        <a:rPr lang="en-US" sz="1600"/>
+                        <a:t>β</a:t>
+                      </a:r>
+                      <a:r>
+                        <a:rPr lang="en-US" sz="1600" baseline="-25000"/>
+                        <a:t>1 </a:t>
+                      </a:r>
+                      <a:r>
+                        <a:rPr lang="en-US" sz="1600" baseline="0"/>
+                        <a:t>=[1.24, 0.69]</a:t>
+                      </a:r>
+                      <a:r>
+                        <a:rPr lang="en-US" sz="1600" baseline="-25000"/>
+                        <a:t/>
+                      </a:r>
+                      <a:br>
+                        <a:rPr lang="en-US" sz="1600" baseline="-25000"/>
+                      </a:br>
+                      <a:r>
+                        <a:rPr lang="en-US" sz="1600"/>
+                        <a:t>β</a:t>
+                      </a:r>
+                      <a:r>
+                        <a:rPr lang="en-US" sz="1600" baseline="-25000"/>
+                        <a:t>2 </a:t>
+                      </a:r>
+                      <a:r>
+                        <a:rPr lang="en-US" sz="1600" baseline="0"/>
+                        <a:t>= [2.04, -16.12]</a:t>
+                      </a:r>
+                      <a:endParaRPr lang="en-US" sz="1600" b="0"/>
+                    </a:p>
+                  </a:txBody>
+                  <a:tcPr anchor="ctr"/>
+                </a:tc>
+                <a:tc>
+                  <a:txBody>
+                    <a:bodyPr/>
+                    <a:lstStyle/>
+                    <a:p>
+                      <a:pPr algn="ctr"/>
+                      <a:r>
+                        <a:rPr lang="en-US" sz="1600" b="0"/>
+                        <a:t>1.7863</a:t>
+                      </a:r>
+                    </a:p>
+                  </a:txBody>
+                  <a:tcPr anchor="ctr"/>
+                </a:tc>
+              </a:tr>
+              <a:tr h="601133">
+                <a:tc>
+                  <a:txBody>
+                    <a:bodyPr/>
+                    <a:lstStyle/>
+                    <a:p>
+                      <a:pPr algn="ctr"/>
+                      <a:r>
+                        <a:rPr lang="en-US" sz="1600"/>
+                        <a:t>2</a:t>
+                      </a:r>
+                      <a:endParaRPr lang="en-US" sz="1600" b="0"/>
+                    </a:p>
+                  </a:txBody>
+                  <a:tcPr anchor="ctr"/>
+                </a:tc>
+                <a:tc>
+                  <a:txBody>
+                    <a:bodyPr/>
+                    <a:lstStyle/>
+                    <a:p>
+                      <a:pPr algn="ctr"/>
+                      <a:r>
+                        <a:rPr lang="en-US" sz="1600"/>
+                        <a:t>Receiving Yards</a:t>
+                      </a:r>
+                      <a:endParaRPr lang="en-US" sz="1600" b="0"/>
+                    </a:p>
+                  </a:txBody>
+                  <a:tcPr anchor="ctr"/>
+                </a:tc>
+                <a:tc>
+                  <a:txBody>
+                    <a:bodyPr/>
+                    <a:lstStyle/>
+                    <a:p>
+                      <a:pPr algn="ctr"/>
+                      <a:r>
+                        <a:rPr lang="en-US" sz="1600"/>
+                        <a:t>β</a:t>
+                      </a:r>
+                      <a:r>
+                        <a:rPr lang="en-US" sz="1600" baseline="-25000"/>
+                        <a:t>1 </a:t>
+                      </a:r>
+                      <a:r>
+                        <a:rPr lang="en-US" sz="1600" baseline="0"/>
+                        <a:t>=[1.64, -10.13]</a:t>
+                      </a:r>
+                      <a:r>
+                        <a:rPr lang="en-US" sz="1600" baseline="-25000"/>
+                        <a:t/>
+                      </a:r>
+                      <a:br>
+                        <a:rPr lang="en-US" sz="1600" baseline="-25000"/>
+                      </a:br>
+                      <a:r>
+                        <a:rPr lang="en-US" sz="1600"/>
+                        <a:t>β</a:t>
+                      </a:r>
+                      <a:r>
+                        <a:rPr lang="en-US" sz="1600" baseline="-25000"/>
+                        <a:t>2 </a:t>
+                      </a:r>
+                      <a:r>
+                        <a:rPr lang="en-US" sz="1600" baseline="0"/>
+                        <a:t>= [1.49, 1.46]</a:t>
+                      </a:r>
+                      <a:endParaRPr lang="en-US" sz="1600" b="0"/>
+                    </a:p>
+                  </a:txBody>
+                  <a:tcPr anchor="ctr"/>
+                </a:tc>
+                <a:tc>
+                  <a:txBody>
+                    <a:bodyPr/>
+                    <a:lstStyle/>
+                    <a:p>
+                      <a:pPr algn="ctr"/>
+                      <a:r>
+                        <a:rPr lang="en-US" sz="1600" b="0"/>
+                        <a:t>1.7814</a:t>
+                      </a:r>
+                    </a:p>
+                  </a:txBody>
+                  <a:tcPr anchor="ctr"/>
+                </a:tc>
+              </a:tr>
+              <a:tr h="601133">
+                <a:tc>
+                  <a:txBody>
+                    <a:bodyPr/>
+                    <a:lstStyle/>
+                    <a:p>
+                      <a:pPr algn="ctr"/>
+                      <a:r>
+                        <a:rPr lang="en-US" sz="1600"/>
+                        <a:t>2</a:t>
+                      </a:r>
+                      <a:endParaRPr lang="en-US" sz="1600" b="0"/>
+                    </a:p>
+                  </a:txBody>
+                  <a:tcPr anchor="ctr"/>
+                </a:tc>
+                <a:tc>
+                  <a:txBody>
+                    <a:bodyPr/>
+                    <a:lstStyle/>
+                    <a:p>
+                      <a:pPr algn="ctr"/>
+                      <a:r>
+                        <a:rPr lang="en-US" sz="1600"/>
+                        <a:t>Touchdowns</a:t>
+                      </a:r>
+                      <a:endParaRPr lang="en-US" sz="1600" b="0"/>
+                    </a:p>
+                  </a:txBody>
+                  <a:tcPr anchor="ctr"/>
+                </a:tc>
+                <a:tc>
+                  <a:txBody>
+                    <a:bodyPr/>
+                    <a:lstStyle/>
+                    <a:p>
+                      <a:pPr algn="ctr"/>
+                      <a:r>
+                        <a:rPr lang="en-US" sz="1600"/>
+                        <a:t>β</a:t>
+                      </a:r>
+                      <a:r>
+                        <a:rPr lang="en-US" sz="1600" baseline="-25000"/>
+                        <a:t>1 </a:t>
+                      </a:r>
+                      <a:r>
+                        <a:rPr lang="en-US" sz="1600" baseline="0"/>
+                        <a:t>=[4.41, -46.74]</a:t>
+                      </a:r>
+                      <a:r>
+                        <a:rPr lang="en-US" sz="1600" baseline="-25000"/>
+                        <a:t/>
+                      </a:r>
+                      <a:br>
+                        <a:rPr lang="en-US" sz="1600" baseline="-25000"/>
+                      </a:br>
+                      <a:r>
+                        <a:rPr lang="en-US" sz="1600"/>
+                        <a:t>β</a:t>
+                      </a:r>
+                      <a:r>
+                        <a:rPr lang="en-US" sz="1600" baseline="-25000"/>
+                        <a:t>2 </a:t>
+                      </a:r>
+                      <a:r>
+                        <a:rPr lang="en-US" sz="1600" baseline="0"/>
+                        <a:t>= [1.67, -11.34]</a:t>
+                      </a:r>
+                      <a:endParaRPr lang="en-US" sz="1600" b="0"/>
+                    </a:p>
+                  </a:txBody>
+                  <a:tcPr anchor="ctr"/>
+                </a:tc>
+                <a:tc>
+                  <a:txBody>
+                    <a:bodyPr/>
+                    <a:lstStyle/>
+                    <a:p>
+                      <a:pPr algn="ctr"/>
+                      <a:r>
+                        <a:rPr lang="en-US" sz="1600" b="0"/>
+                        <a:t>1.7747</a:t>
+                      </a:r>
+                    </a:p>
+                  </a:txBody>
+                  <a:tcPr anchor="ctr"/>
+                </a:tc>
+              </a:tr>
+              <a:tr h="601133">
+                <a:tc>
+                  <a:txBody>
+                    <a:bodyPr/>
+                    <a:lstStyle/>
+                    <a:p>
+                      <a:pPr algn="ctr"/>
+                      <a:r>
+                        <a:rPr lang="en-US" sz="1600"/>
+                        <a:t>3</a:t>
+                      </a:r>
+                      <a:endParaRPr lang="en-US" sz="1600" b="0"/>
+                    </a:p>
+                  </a:txBody>
+                  <a:tcPr anchor="ctr"/>
+                </a:tc>
+                <a:tc>
+                  <a:txBody>
+                    <a:bodyPr/>
+                    <a:lstStyle/>
+                    <a:p>
+                      <a:pPr algn="ctr"/>
+                      <a:r>
+                        <a:rPr lang="en-US" sz="1600"/>
+                        <a:t>Fantasy Points</a:t>
+                      </a:r>
+                      <a:endParaRPr lang="en-US" sz="1600" b="0"/>
+                    </a:p>
+                  </a:txBody>
+                  <a:tcPr anchor="ctr"/>
+                </a:tc>
+                <a:tc>
+                  <a:txBody>
+                    <a:bodyPr/>
+                    <a:lstStyle/>
+                    <a:p>
+                      <a:pPr marL="0" marR="0" indent="0" algn="ctr" defTabSz="457105" rtl="0" eaLnBrk="1" fontAlgn="auto" latinLnBrk="0" hangingPunct="1">
+                        <a:lnSpc>
+                          <a:spcPct val="100000"/>
+                        </a:lnSpc>
+                        <a:spcBef>
+                          <a:spcPts val="0"/>
+                        </a:spcBef>
+                        <a:spcAft>
+                          <a:spcPts val="0"/>
+                        </a:spcAft>
+                        <a:buClrTx/>
+                        <a:buSzTx/>
+                        <a:buFontTx/>
+                        <a:buNone/>
+                        <a:tabLst/>
+                        <a:defRPr/>
+                      </a:pPr>
+                      <a:r>
+                        <a:rPr lang="en-US" sz="1600"/>
+                        <a:t>β</a:t>
+                      </a:r>
+                      <a:r>
+                        <a:rPr lang="en-US" sz="1600" baseline="-25000"/>
+                        <a:t>1 </a:t>
+                      </a:r>
+                      <a:r>
+                        <a:rPr lang="en-US" sz="1600" baseline="0"/>
+                        <a:t>=[2.03, -15.99]</a:t>
+                      </a:r>
+                      <a:r>
+                        <a:rPr lang="en-US" sz="1600" baseline="-25000"/>
+                        <a:t/>
+                      </a:r>
+                      <a:br>
+                        <a:rPr lang="en-US" sz="1600" baseline="-25000"/>
+                      </a:br>
+                      <a:r>
+                        <a:rPr lang="en-US" sz="1600"/>
+                        <a:t>β</a:t>
+                      </a:r>
+                      <a:r>
+                        <a:rPr lang="en-US" sz="1600" baseline="-25000"/>
+                        <a:t>2 </a:t>
+                      </a:r>
+                      <a:r>
+                        <a:rPr lang="en-US" sz="1600" baseline="0"/>
+                        <a:t>= [1.74, -7.77]</a:t>
+                      </a:r>
+                      <a:endParaRPr lang="en-US" sz="1600" b="0"/>
+                    </a:p>
+                    <a:p>
+                      <a:pPr marL="0" marR="0" indent="0" algn="ctr" defTabSz="457105" rtl="0" eaLnBrk="1" fontAlgn="auto" latinLnBrk="0" hangingPunct="1">
+                        <a:lnSpc>
+                          <a:spcPct val="100000"/>
+                        </a:lnSpc>
+                        <a:spcBef>
+                          <a:spcPts val="0"/>
+                        </a:spcBef>
+                        <a:spcAft>
+                          <a:spcPts val="0"/>
+                        </a:spcAft>
+                        <a:buClrTx/>
+                        <a:buSzTx/>
+                        <a:buFontTx/>
+                        <a:buNone/>
+                        <a:tabLst/>
+                        <a:defRPr/>
+                      </a:pPr>
+                      <a:r>
+                        <a:rPr lang="en-US" sz="1600"/>
+                        <a:t>β</a:t>
+                      </a:r>
+                      <a:r>
+                        <a:rPr lang="en-US" sz="1600" baseline="-25000"/>
+                        <a:t>3 </a:t>
+                      </a:r>
+                      <a:r>
+                        <a:rPr lang="en-US" sz="1600" baseline="0"/>
+                        <a:t>=[4.12, -42.5]</a:t>
+                      </a:r>
+                      <a:endParaRPr lang="en-US" sz="1600" b="0"/>
+                    </a:p>
+                  </a:txBody>
+                  <a:tcPr anchor="ctr"/>
+                </a:tc>
+                <a:tc>
+                  <a:txBody>
+                    <a:bodyPr/>
+                    <a:lstStyle/>
+                    <a:p>
+                      <a:pPr algn="ctr"/>
+                      <a:r>
+                        <a:rPr lang="en-US" sz="1600" b="0"/>
+                        <a:t>1.4428</a:t>
+                      </a:r>
+                    </a:p>
+                  </a:txBody>
+                  <a:tcPr anchor="ctr"/>
+                </a:tc>
+              </a:tr>
+            </a:tbl>
+          </a:graphicData>
+        </a:graphic>
+      </p:graphicFrame>
     </p:spTree>
   </p:cSld>
   <p:clrMapOvr>

</xml_diff>

<commit_message>
Added 2012 espn/yahoo dcg as a reference
</commit_message>
<xml_diff>
--- a/poster/jpo4_poster.pptx
+++ b/poster/jpo4_poster.pptx
@@ -7904,7 +7904,7 @@
         </p:nvSpPr>
         <p:spPr bwMode="auto">
           <a:xfrm>
-            <a:off x="600075" y="13701516"/>
+            <a:off x="600075" y="15442655"/>
             <a:ext cx="8734426" cy="892340"/>
           </a:xfrm>
           <a:prstGeom prst="rect">
@@ -8161,7 +8161,7 @@
                   <a:srgbClr val="F8F8F8"/>
                 </a:solidFill>
               </a:rPr>
-              <a:t>Results</a:t>
+              <a:t>K-Means Mixture Model</a:t>
             </a:r>
             <a:endParaRPr lang="en-US" sz="5200" b="1" dirty="0">
               <a:solidFill>
@@ -9820,8 +9820,8 @@
           <p:nvPr/>
         </p:nvGraphicFramePr>
         <p:xfrm>
-          <a:off x="29175416" y="9366977"/>
-          <a:ext cx="8276168" cy="6075678"/>
+          <a:off x="29175397" y="9063023"/>
+          <a:ext cx="8276169" cy="5632024"/>
         </p:xfrm>
         <a:graphic>
           <a:graphicData uri="http://schemas.openxmlformats.org/drawingml/2006/table">
@@ -9830,10 +9830,10 @@
                 <a:tableStyleId>{D7AC3CCA-C797-4891-BE02-D94E43425B78}</a:tableStyleId>
               </a:tblPr>
               <a:tblGrid>
-                <a:gridCol w="1028700"/>
-                <a:gridCol w="1794933"/>
-                <a:gridCol w="4021667"/>
-                <a:gridCol w="1430868"/>
+                <a:gridCol w="1497475"/>
+                <a:gridCol w="2612876"/>
+                <a:gridCol w="2082909"/>
+                <a:gridCol w="2082909"/>
               </a:tblGrid>
               <a:tr h="601133">
                 <a:tc>
@@ -9877,26 +9877,10 @@
                     <a:p>
                       <a:pPr algn="ctr"/>
                       <a:r>
-                        <a:rPr lang="en-US" sz="2000"/>
-                        <a:t>β</a:t>
-                      </a:r>
-                      <a:r>
-                        <a:rPr lang="en-US" sz="2000" baseline="-25000"/>
-                        <a:t>1 </a:t>
-                      </a:r>
-                      <a:r>
-                        <a:rPr lang="en-US" sz="2000" baseline="0"/>
-                        <a:t>… </a:t>
-                      </a:r>
-                      <a:r>
-                        <a:rPr lang="en-US" sz="2000"/>
-                        <a:t>β</a:t>
-                      </a:r>
-                      <a:r>
-                        <a:rPr lang="en-US" sz="2000" baseline="-25000"/>
-                        <a:t>K</a:t>
-                      </a:r>
-                      <a:endParaRPr lang="en-US" sz="2000" b="1"/>
+                        <a:rPr lang="en-US" sz="1600"/>
+                        <a:t>DCG (6 Features)</a:t>
+                      </a:r>
+                      <a:endParaRPr lang="en-US" sz="1600" b="1"/>
                     </a:p>
                   </a:txBody>
                   <a:tcPr anchor="ctr"/>
@@ -9908,22 +9892,12 @@
                     <a:p>
                       <a:pPr algn="ctr"/>
                       <a:r>
-                        <a:rPr lang="en-US" sz="1600"/>
-                        <a:t>Discounted</a:t>
-                      </a:r>
-                    </a:p>
-                    <a:p>
-                      <a:pPr algn="ctr"/>
-                      <a:r>
-                        <a:rPr lang="en-US" sz="1600"/>
-                        <a:t>Cumulative</a:t>
-                      </a:r>
-                    </a:p>
-                    <a:p>
-                      <a:pPr algn="ctr"/>
-                      <a:r>
-                        <a:rPr lang="en-US" sz="1600"/>
-                        <a:t>Gain</a:t>
+                        <a:rPr lang="en-US" sz="1600" b="1"/>
+                        <a:t>DCG</a:t>
+                      </a:r>
+                      <a:r>
+                        <a:rPr lang="en-US" sz="1600" b="1" baseline="0"/>
+                        <a:t> (2 Features)</a:t>
                       </a:r>
                       <a:endParaRPr lang="en-US" sz="1600" b="1"/>
                     </a:p>
@@ -9981,34 +9955,7 @@
                       <a:pPr algn="ctr"/>
                       <a:r>
                         <a:rPr lang="en-US" sz="1600"/>
-                        <a:t>β</a:t>
-                      </a:r>
-                      <a:r>
-                        <a:rPr lang="en-US" sz="1600" baseline="-25000"/>
-                        <a:t>1 </a:t>
-                      </a:r>
-                      <a:r>
-                        <a:rPr lang="en-US" sz="1600" baseline="0"/>
-                        <a:t>= [-3.57, 0.46, 26.96, -0.025, 1.91, 8.75]</a:t>
-                      </a:r>
-                      <a:r>
-                        <a:rPr lang="en-US" sz="1600" baseline="-25000"/>
-                        <a:t/>
-                      </a:r>
-                      <a:br>
-                        <a:rPr lang="en-US" sz="1600" baseline="-25000"/>
-                      </a:br>
-                      <a:r>
-                        <a:rPr lang="en-US" sz="1600"/>
-                        <a:t>β</a:t>
-                      </a:r>
-                      <a:r>
-                        <a:rPr lang="en-US" sz="1600" baseline="-25000"/>
-                        <a:t>2 </a:t>
-                      </a:r>
-                      <a:r>
-                        <a:rPr lang="en-US" sz="1600" baseline="0"/>
-                        <a:t>= [-7.38, 0.92, 41.55, -0.094, 1.61, 6.85]</a:t>
+                        <a:t>1.7601</a:t>
                       </a:r>
                       <a:endParaRPr lang="en-US" sz="1600" b="0"/>
                     </a:p>
@@ -10022,10 +9969,9 @@
                     <a:p>
                       <a:pPr algn="ctr"/>
                       <a:r>
-                        <a:rPr lang="en-US" sz="1600"/>
-                        <a:t>1.7601</a:t>
-                      </a:r>
-                      <a:endParaRPr lang="en-US" sz="1600" b="0"/>
+                        <a:rPr lang="en-US" sz="1600" b="0"/>
+                        <a:t>1.8063</a:t>
+                      </a:r>
                     </a:p>
                   </a:txBody>
                   <a:tcPr anchor="ctr"/>
@@ -10067,53 +10013,10 @@
                     <a:bodyPr/>
                     <a:lstStyle/>
                     <a:p>
-                      <a:pPr marL="0" marR="0" indent="0" algn="ctr" defTabSz="457105" rtl="0" eaLnBrk="1" fontAlgn="auto" latinLnBrk="0" hangingPunct="1">
-                        <a:lnSpc>
-                          <a:spcPct val="100000"/>
-                        </a:lnSpc>
-                        <a:spcBef>
-                          <a:spcPts val="0"/>
-                        </a:spcBef>
-                        <a:spcAft>
-                          <a:spcPts val="0"/>
-                        </a:spcAft>
-                        <a:buClrTx/>
-                        <a:buSzTx/>
-                        <a:buFontTx/>
-                        <a:buNone/>
-                        <a:tabLst/>
-                        <a:defRPr/>
-                      </a:pPr>
+                      <a:pPr algn="ctr"/>
                       <a:r>
                         <a:rPr lang="en-US" sz="1600"/>
-                        <a:t>β</a:t>
-                      </a:r>
-                      <a:r>
-                        <a:rPr lang="en-US" sz="1600" baseline="-25000"/>
-                        <a:t>1 </a:t>
-                      </a:r>
-                      <a:r>
-                        <a:rPr lang="en-US" sz="1600" baseline="0"/>
-                        <a:t>= [-3.57, 0.46, 26.97, -0.025, 1.91, 8.75]</a:t>
-                      </a:r>
-                      <a:r>
-                        <a:rPr lang="en-US" sz="1600" baseline="-25000"/>
-                        <a:t/>
-                      </a:r>
-                      <a:br>
-                        <a:rPr lang="en-US" sz="1600" baseline="-25000"/>
-                      </a:br>
-                      <a:r>
-                        <a:rPr lang="en-US" sz="1600"/>
-                        <a:t>β</a:t>
-                      </a:r>
-                      <a:r>
-                        <a:rPr lang="en-US" sz="1600" baseline="-25000"/>
-                        <a:t>2 </a:t>
-                      </a:r>
-                      <a:r>
-                        <a:rPr lang="en-US" sz="1600" baseline="0"/>
-                        <a:t>= [-7.38, 0.92, 41.55, -0.094, 1.61, 6.85]</a:t>
+                        <a:t>1.7601</a:t>
                       </a:r>
                       <a:endParaRPr lang="en-US" sz="1600" b="0"/>
                     </a:p>
@@ -10127,10 +10030,9 @@
                     <a:p>
                       <a:pPr algn="ctr"/>
                       <a:r>
-                        <a:rPr lang="en-US" sz="1600"/>
-                        <a:t>1.7601</a:t>
-                      </a:r>
-                      <a:endParaRPr lang="en-US" sz="1600" b="0"/>
+                        <a:rPr lang="en-US" sz="1600" b="0"/>
+                        <a:t>1.7925</a:t>
+                      </a:r>
                     </a:p>
                   </a:txBody>
                   <a:tcPr anchor="ctr"/>
@@ -10175,53 +10077,7 @@
                       <a:pPr algn="ctr"/>
                       <a:r>
                         <a:rPr lang="en-US" sz="1600"/>
-                        <a:t>β</a:t>
-                      </a:r>
-                      <a:r>
-                        <a:rPr lang="en-US" sz="1600" baseline="-25000"/>
-                        <a:t>1 </a:t>
-                      </a:r>
-                      <a:r>
-                        <a:rPr lang="en-US" sz="1600" baseline="0"/>
-                        <a:t>= [-1.71, 0.37, 23.83, -0.01, 2.24, 71.3]</a:t>
-                      </a:r>
-                      <a:r>
-                        <a:rPr lang="en-US" sz="1600" baseline="-25000"/>
-                        <a:t/>
-                      </a:r>
-                      <a:br>
-                        <a:rPr lang="en-US" sz="1600" baseline="-25000"/>
-                      </a:br>
-                      <a:r>
-                        <a:rPr lang="en-US" sz="1600"/>
-                        <a:t>β</a:t>
-                      </a:r>
-                      <a:r>
-                        <a:rPr lang="en-US" sz="1600" baseline="-25000"/>
-                        <a:t>2 </a:t>
-                      </a:r>
-                      <a:r>
-                        <a:rPr lang="en-US" sz="1600" baseline="0"/>
-                        <a:t>= [-0.14, 0.12, 10.48, -0.04, -7.11, 1.5]</a:t>
-                      </a:r>
-                      <a:r>
-                        <a:rPr lang="en-US" sz="1600" baseline="-25000"/>
-                        <a:t/>
-                      </a:r>
-                      <a:br>
-                        <a:rPr lang="en-US" sz="1600" baseline="-25000"/>
-                      </a:br>
-                      <a:r>
-                        <a:rPr lang="en-US" sz="1600"/>
-                        <a:t>β</a:t>
-                      </a:r>
-                      <a:r>
-                        <a:rPr lang="en-US" sz="1600" baseline="-25000"/>
-                        <a:t>3 </a:t>
-                      </a:r>
-                      <a:r>
-                        <a:rPr lang="en-US" sz="1600" baseline="0"/>
-                        <a:t>= [-3.78, 0.61, 12.37, -0.12, 10.2, 13.7]</a:t>
+                        <a:t>1.3621</a:t>
                       </a:r>
                       <a:endParaRPr lang="en-US" sz="1600" b="0"/>
                     </a:p>
@@ -10235,10 +10091,9 @@
                     <a:p>
                       <a:pPr algn="ctr"/>
                       <a:r>
-                        <a:rPr lang="en-US" sz="1600"/>
-                        <a:t>1.3621</a:t>
-                      </a:r>
-                      <a:endParaRPr lang="en-US" sz="1600" b="0"/>
+                        <a:rPr lang="en-US" sz="1600" b="0"/>
+                        <a:t>1.7880</a:t>
+                      </a:r>
                     </a:p>
                   </a:txBody>
                   <a:tcPr anchor="ctr"/>
@@ -10280,53 +10135,10 @@
                     <a:bodyPr/>
                     <a:lstStyle/>
                     <a:p>
-                      <a:pPr marL="0" marR="0" indent="0" algn="ctr" defTabSz="457105" rtl="0" eaLnBrk="1" fontAlgn="auto" latinLnBrk="0" hangingPunct="1">
-                        <a:lnSpc>
-                          <a:spcPct val="100000"/>
-                        </a:lnSpc>
-                        <a:spcBef>
-                          <a:spcPts val="0"/>
-                        </a:spcBef>
-                        <a:spcAft>
-                          <a:spcPts val="0"/>
-                        </a:spcAft>
-                        <a:buClrTx/>
-                        <a:buSzTx/>
-                        <a:buFontTx/>
-                        <a:buNone/>
-                        <a:tabLst/>
-                        <a:defRPr/>
-                      </a:pPr>
+                      <a:pPr algn="ctr"/>
                       <a:r>
                         <a:rPr lang="en-US" sz="1600"/>
-                        <a:t>β</a:t>
-                      </a:r>
-                      <a:r>
-                        <a:rPr lang="en-US" sz="1600" baseline="-25000"/>
-                        <a:t>1 </a:t>
-                      </a:r>
-                      <a:r>
-                        <a:rPr lang="en-US" sz="1600" baseline="0"/>
-                        <a:t>= [-8.45, 1.17, 27.46, -0.12, 11.5, 13.35]</a:t>
-                      </a:r>
-                      <a:r>
-                        <a:rPr lang="en-US" sz="1600" baseline="-25000"/>
-                        <a:t/>
-                      </a:r>
-                      <a:br>
-                        <a:rPr lang="en-US" sz="1600" baseline="-25000"/>
-                      </a:br>
-                      <a:r>
-                        <a:rPr lang="en-US" sz="1600"/>
-                        <a:t>β</a:t>
-                      </a:r>
-                      <a:r>
-                        <a:rPr lang="en-US" sz="1600" baseline="-25000"/>
-                        <a:t>2 </a:t>
-                      </a:r>
-                      <a:r>
-                        <a:rPr lang="en-US" sz="1600" baseline="0"/>
-                        <a:t>= [-0.54, 0.2, 4.82, -0.085, -0.089, 4.20]</a:t>
+                        <a:t>1.2053</a:t>
                       </a:r>
                       <a:endParaRPr lang="en-US" sz="1600" b="0"/>
                     </a:p>
@@ -10340,10 +10152,9 @@
                     <a:p>
                       <a:pPr algn="ctr"/>
                       <a:r>
-                        <a:rPr lang="en-US" sz="1600"/>
-                        <a:t>1.2053</a:t>
-                      </a:r>
-                      <a:endParaRPr lang="en-US" sz="1600" b="0"/>
+                        <a:rPr lang="en-US" sz="1600" b="0"/>
+                        <a:t>1.7877</a:t>
+                      </a:r>
                     </a:p>
                   </a:txBody>
                   <a:tcPr anchor="ctr"/>
@@ -10406,34 +10217,7 @@
                       <a:pPr algn="ctr"/>
                       <a:r>
                         <a:rPr lang="en-US" sz="1600"/>
-                        <a:t>β</a:t>
-                      </a:r>
-                      <a:r>
-                        <a:rPr lang="en-US" sz="1600" baseline="-25000"/>
-                        <a:t>1 </a:t>
-                      </a:r>
-                      <a:r>
-                        <a:rPr lang="en-US" sz="1600" baseline="0"/>
-                        <a:t>= [2.71, -0.42, 0.61, -0.89, 45.02, 42.26]</a:t>
-                      </a:r>
-                      <a:r>
-                        <a:rPr lang="en-US" sz="1600" baseline="-25000"/>
-                        <a:t/>
-                      </a:r>
-                      <a:br>
-                        <a:rPr lang="en-US" sz="1600" baseline="-25000"/>
-                      </a:br>
-                      <a:r>
-                        <a:rPr lang="en-US" sz="1600"/>
-                        <a:t>β</a:t>
-                      </a:r>
-                      <a:r>
-                        <a:rPr lang="en-US" sz="1600" baseline="-25000"/>
-                        <a:t>2 </a:t>
-                      </a:r>
-                      <a:r>
-                        <a:rPr lang="en-US" sz="1600" baseline="0"/>
-                        <a:t>= [-0.70, 0.23, 4.00, -0.084, 0.83, 2.64]</a:t>
+                        <a:t>1.1887</a:t>
                       </a:r>
                       <a:endParaRPr lang="en-US" sz="1600" b="0"/>
                     </a:p>
@@ -10447,10 +10231,9 @@
                     <a:p>
                       <a:pPr algn="ctr"/>
                       <a:r>
-                        <a:rPr lang="en-US" sz="1600"/>
-                        <a:t>1.1887</a:t>
-                      </a:r>
-                      <a:endParaRPr lang="en-US" sz="1600" b="0"/>
+                        <a:rPr lang="en-US" sz="1600" b="0"/>
+                        <a:t>1.7863</a:t>
+                      </a:r>
                     </a:p>
                   </a:txBody>
                   <a:tcPr anchor="ctr"/>
@@ -10492,53 +10275,10 @@
                     <a:bodyPr/>
                     <a:lstStyle/>
                     <a:p>
-                      <a:pPr marL="0" marR="0" indent="0" algn="ctr" defTabSz="457105" rtl="0" eaLnBrk="1" fontAlgn="auto" latinLnBrk="0" hangingPunct="1">
-                        <a:lnSpc>
-                          <a:spcPct val="100000"/>
-                        </a:lnSpc>
-                        <a:spcBef>
-                          <a:spcPts val="0"/>
-                        </a:spcBef>
-                        <a:spcAft>
-                          <a:spcPts val="0"/>
-                        </a:spcAft>
-                        <a:buClrTx/>
-                        <a:buSzTx/>
-                        <a:buFontTx/>
-                        <a:buNone/>
-                        <a:tabLst/>
-                        <a:defRPr/>
-                      </a:pPr>
+                      <a:pPr algn="ctr"/>
                       <a:r>
                         <a:rPr lang="en-US" sz="1600"/>
-                        <a:t>β</a:t>
-                      </a:r>
-                      <a:r>
-                        <a:rPr lang="en-US" sz="1600" baseline="-25000"/>
-                        <a:t>1 </a:t>
-                      </a:r>
-                      <a:r>
-                        <a:rPr lang="en-US" sz="1600" baseline="0"/>
-                        <a:t>= [-1.04, 0.27, 6.02, -0.083, 0.16, 3.02]</a:t>
-                      </a:r>
-                      <a:r>
-                        <a:rPr lang="en-US" sz="1600" baseline="-25000"/>
-                        <a:t/>
-                      </a:r>
-                      <a:br>
-                        <a:rPr lang="en-US" sz="1600" baseline="-25000"/>
-                      </a:br>
-                      <a:r>
-                        <a:rPr lang="en-US" sz="1600"/>
-                        <a:t>β</a:t>
-                      </a:r>
-                      <a:r>
-                        <a:rPr lang="en-US" sz="1600" baseline="-25000"/>
-                        <a:t>2 </a:t>
-                      </a:r>
-                      <a:r>
-                        <a:rPr lang="en-US" sz="1600" baseline="0"/>
-                        <a:t>= [4.98, -0.99, 68.03, -0.32, 56.68, 24.8]</a:t>
+                        <a:t>1.1811</a:t>
                       </a:r>
                       <a:endParaRPr lang="en-US" sz="1600" b="0"/>
                     </a:p>
@@ -10552,10 +10292,9 @@
                     <a:p>
                       <a:pPr algn="ctr"/>
                       <a:r>
-                        <a:rPr lang="en-US" sz="1600"/>
-                        <a:t>1.1811</a:t>
-                      </a:r>
-                      <a:endParaRPr lang="en-US" sz="1600" b="0"/>
+                        <a:rPr lang="en-US" sz="1600" b="0"/>
+                        <a:t>1.7814</a:t>
+                      </a:r>
                     </a:p>
                   </a:txBody>
                   <a:tcPr anchor="ctr"/>
@@ -10597,53 +10336,10 @@
                     <a:bodyPr/>
                     <a:lstStyle/>
                     <a:p>
-                      <a:pPr marL="0" marR="0" indent="0" algn="ctr" defTabSz="457105" rtl="0" eaLnBrk="1" fontAlgn="auto" latinLnBrk="0" hangingPunct="1">
-                        <a:lnSpc>
-                          <a:spcPct val="100000"/>
-                        </a:lnSpc>
-                        <a:spcBef>
-                          <a:spcPts val="0"/>
-                        </a:spcBef>
-                        <a:spcAft>
-                          <a:spcPts val="0"/>
-                        </a:spcAft>
-                        <a:buClrTx/>
-                        <a:buSzTx/>
-                        <a:buFontTx/>
-                        <a:buNone/>
-                        <a:tabLst/>
-                        <a:defRPr/>
-                      </a:pPr>
+                      <a:pPr algn="ctr"/>
                       <a:r>
                         <a:rPr lang="en-US" sz="1600"/>
-                        <a:t>β</a:t>
-                      </a:r>
-                      <a:r>
-                        <a:rPr lang="en-US" sz="1600" baseline="-25000"/>
-                        <a:t>1 </a:t>
-                      </a:r>
-                      <a:r>
-                        <a:rPr lang="en-US" sz="1600" baseline="0"/>
-                        <a:t>= [-4.09, 0.56, 24.85, -0.02, -4.31, 3.59]</a:t>
-                      </a:r>
-                      <a:r>
-                        <a:rPr lang="en-US" sz="1600" baseline="-25000"/>
-                        <a:t/>
-                      </a:r>
-                      <a:br>
-                        <a:rPr lang="en-US" sz="1600" baseline="-25000"/>
-                      </a:br>
-                      <a:r>
-                        <a:rPr lang="en-US" sz="1600"/>
-                        <a:t>β</a:t>
-                      </a:r>
-                      <a:r>
-                        <a:rPr lang="en-US" sz="1600" baseline="-25000"/>
-                        <a:t>2 </a:t>
-                      </a:r>
-                      <a:r>
-                        <a:rPr lang="en-US" sz="1600" baseline="0"/>
-                        <a:t>= [44.5, -4.44, -288, 0.11, 48.39, 52.04]</a:t>
+                        <a:t>1.1107</a:t>
                       </a:r>
                       <a:endParaRPr lang="en-US" sz="1600" b="0"/>
                     </a:p>
@@ -10657,10 +10353,9 @@
                     <a:p>
                       <a:pPr algn="ctr"/>
                       <a:r>
-                        <a:rPr lang="en-US" sz="1600"/>
-                        <a:t>1.1107</a:t>
-                      </a:r>
-                      <a:endParaRPr lang="en-US" sz="1600" b="0"/>
+                        <a:rPr lang="en-US" sz="1600" b="0"/>
+                        <a:t>1.7747</a:t>
+                      </a:r>
                     </a:p>
                   </a:txBody>
                   <a:tcPr anchor="ctr"/>
@@ -10702,53 +10397,10 @@
                     <a:bodyPr/>
                     <a:lstStyle/>
                     <a:p>
-                      <a:pPr marL="0" marR="0" indent="0" algn="ctr" defTabSz="457105" rtl="0" eaLnBrk="1" fontAlgn="auto" latinLnBrk="0" hangingPunct="1">
-                        <a:lnSpc>
-                          <a:spcPct val="100000"/>
-                        </a:lnSpc>
-                        <a:spcBef>
-                          <a:spcPts val="0"/>
-                        </a:spcBef>
-                        <a:spcAft>
-                          <a:spcPts val="0"/>
-                        </a:spcAft>
-                        <a:buClrTx/>
-                        <a:buSzTx/>
-                        <a:buFontTx/>
-                        <a:buNone/>
-                        <a:tabLst/>
-                        <a:defRPr/>
-                      </a:pPr>
+                      <a:pPr algn="ctr"/>
                       <a:r>
                         <a:rPr lang="en-US" sz="1600"/>
-                        <a:t>β</a:t>
-                      </a:r>
-                      <a:r>
-                        <a:rPr lang="en-US" sz="1600" baseline="-25000"/>
-                        <a:t>1 </a:t>
-                      </a:r>
-                      <a:r>
-                        <a:rPr lang="en-US" sz="1600" baseline="0"/>
-                        <a:t>= [-3.48, 0.48, 25.5, -0.06, -0.51, 5.64]</a:t>
-                      </a:r>
-                      <a:r>
-                        <a:rPr lang="en-US" sz="1600" baseline="-25000"/>
-                        <a:t/>
-                      </a:r>
-                      <a:br>
-                        <a:rPr lang="en-US" sz="1600" baseline="-25000"/>
-                      </a:br>
-                      <a:r>
-                        <a:rPr lang="en-US" sz="1600"/>
-                        <a:t>β</a:t>
-                      </a:r>
-                      <a:r>
-                        <a:rPr lang="en-US" sz="1600" baseline="-25000"/>
-                        <a:t>2 </a:t>
-                      </a:r>
-                      <a:r>
-                        <a:rPr lang="en-US" sz="1600" baseline="0"/>
-                        <a:t>= [17.87, -1.5, -115.9, -0.06, 3.82, 6.90]</a:t>
+                        <a:t>1.0857</a:t>
                       </a:r>
                       <a:endParaRPr lang="en-US" sz="1600" b="0"/>
                     </a:p>
@@ -10762,10 +10414,9 @@
                     <a:p>
                       <a:pPr algn="ctr"/>
                       <a:r>
-                        <a:rPr lang="en-US" sz="1600"/>
-                        <a:t>1.0857</a:t>
-                      </a:r>
-                      <a:endParaRPr lang="en-US" sz="1600" b="0"/>
+                        <a:rPr lang="en-US" sz="1600" b="0"/>
+                        <a:t>1.4428</a:t>
+                      </a:r>
                     </a:p>
                   </a:txBody>
                   <a:tcPr anchor="ctr"/>
@@ -10946,17 +10597,74 @@
           </a:p>
         </p:txBody>
       </p:sp>
+      <p:sp>
+        <p:nvSpPr>
+          <p:cNvPr id="36" name="Text Box 7"/>
+          <p:cNvSpPr txBox="1">
+            <a:spLocks noChangeArrowheads="1"/>
+          </p:cNvSpPr>
+          <p:nvPr/>
+        </p:nvSpPr>
+        <p:spPr bwMode="auto">
+          <a:xfrm>
+            <a:off x="28948062" y="15442655"/>
+            <a:ext cx="8734426" cy="892340"/>
+          </a:xfrm>
+          <a:prstGeom prst="rect">
+            <a:avLst/>
+          </a:prstGeom>
+          <a:solidFill>
+            <a:schemeClr val="accent2"/>
+          </a:solidFill>
+          <a:ln w="9525">
+            <a:noFill/>
+            <a:miter lim="800000"/>
+            <a:headEnd/>
+            <a:tailEnd/>
+          </a:ln>
+          <a:effectLst/>
+        </p:spPr>
+        <p:txBody>
+          <a:bodyPr lIns="91248" tIns="45615" rIns="91248" bIns="45615">
+            <a:prstTxWarp prst="textNoShape">
+              <a:avLst/>
+            </a:prstTxWarp>
+            <a:spAutoFit/>
+          </a:bodyPr>
+          <a:lstStyle/>
+          <a:p>
+            <a:pPr algn="ctr" eaLnBrk="0" hangingPunct="0">
+              <a:spcBef>
+                <a:spcPct val="50000"/>
+              </a:spcBef>
+            </a:pPr>
+            <a:r>
+              <a:rPr lang="en-US" sz="5200" b="1" dirty="0" smtClean="0">
+                <a:solidFill>
+                  <a:srgbClr val="F8F8F8"/>
+                </a:solidFill>
+              </a:rPr>
+              <a:t>Something Else</a:t>
+            </a:r>
+            <a:endParaRPr lang="en-US" sz="5200" b="1" dirty="0">
+              <a:solidFill>
+                <a:srgbClr val="F8F8F8"/>
+              </a:solidFill>
+            </a:endParaRPr>
+          </a:p>
+        </p:txBody>
+      </p:sp>
       <p:graphicFrame>
         <p:nvGraphicFramePr>
-          <p:cNvPr id="35" name="Table 34"/>
+          <p:cNvPr id="39" name="Table 38"/>
           <p:cNvGraphicFramePr>
             <a:graphicFrameLocks noGrp="1"/>
           </p:cNvGraphicFramePr>
           <p:nvPr/>
         </p:nvGraphicFramePr>
         <p:xfrm>
-          <a:off x="29175416" y="16334995"/>
-          <a:ext cx="8276168" cy="6075678"/>
+          <a:off x="842242" y="25121554"/>
+          <a:ext cx="8187457" cy="1803399"/>
         </p:xfrm>
         <a:graphic>
           <a:graphicData uri="http://schemas.openxmlformats.org/drawingml/2006/table">
@@ -10965,10 +10673,8 @@
                 <a:tableStyleId>{D7AC3CCA-C797-4891-BE02-D94E43425B78}</a:tableStyleId>
               </a:tblPr>
               <a:tblGrid>
-                <a:gridCol w="1028700"/>
-                <a:gridCol w="1794933"/>
-                <a:gridCol w="4021667"/>
-                <a:gridCol w="1430868"/>
+                <a:gridCol w="3170958"/>
+                <a:gridCol w="5016499"/>
               </a:tblGrid>
               <a:tr h="601133">
                 <a:tc>
@@ -10978,14 +10684,9 @@
                     <a:p>
                       <a:pPr algn="ctr"/>
                       <a:r>
-                        <a:rPr lang="en-US" sz="1600"/>
-                        <a:t>#</a:t>
-                      </a:r>
-                      <a:r>
-                        <a:rPr lang="en-US" sz="1600" baseline="0"/>
-                        <a:t> Mixtures</a:t>
-                      </a:r>
-                      <a:endParaRPr lang="en-US" sz="1600" b="1"/>
+                        <a:rPr lang="en-US" sz="1600" b="1"/>
+                        <a:t>Expert</a:t>
+                      </a:r>
                     </a:p>
                   </a:txBody>
                   <a:tcPr anchor="ctr"/>
@@ -10998,67 +10699,7 @@
                       <a:pPr algn="ctr"/>
                       <a:r>
                         <a:rPr lang="en-US" sz="1600"/>
-                        <a:t>K Means Features</a:t>
-                      </a:r>
-                      <a:endParaRPr lang="en-US" sz="1600" b="1"/>
-                    </a:p>
-                  </a:txBody>
-                  <a:tcPr anchor="ctr"/>
-                </a:tc>
-                <a:tc>
-                  <a:txBody>
-                    <a:bodyPr/>
-                    <a:lstStyle/>
-                    <a:p>
-                      <a:pPr algn="ctr"/>
-                      <a:r>
-                        <a:rPr lang="en-US" sz="2000"/>
-                        <a:t>β</a:t>
-                      </a:r>
-                      <a:r>
-                        <a:rPr lang="en-US" sz="2000" baseline="-25000"/>
-                        <a:t>1 </a:t>
-                      </a:r>
-                      <a:r>
-                        <a:rPr lang="en-US" sz="2000" baseline="0"/>
-                        <a:t>… </a:t>
-                      </a:r>
-                      <a:r>
-                        <a:rPr lang="en-US" sz="2000"/>
-                        <a:t>β</a:t>
-                      </a:r>
-                      <a:r>
-                        <a:rPr lang="en-US" sz="2000" baseline="-25000"/>
-                        <a:t>K</a:t>
-                      </a:r>
-                      <a:endParaRPr lang="en-US" sz="2000" b="1"/>
-                    </a:p>
-                  </a:txBody>
-                  <a:tcPr anchor="ctr"/>
-                </a:tc>
-                <a:tc>
-                  <a:txBody>
-                    <a:bodyPr/>
-                    <a:lstStyle/>
-                    <a:p>
-                      <a:pPr algn="ctr"/>
-                      <a:r>
-                        <a:rPr lang="en-US" sz="1600"/>
-                        <a:t>Discounted</a:t>
-                      </a:r>
-                    </a:p>
-                    <a:p>
-                      <a:pPr algn="ctr"/>
-                      <a:r>
-                        <a:rPr lang="en-US" sz="1600"/>
-                        <a:t>Cumulative</a:t>
-                      </a:r>
-                    </a:p>
-                    <a:p>
-                      <a:pPr algn="ctr"/>
-                      <a:r>
-                        <a:rPr lang="en-US" sz="1600"/>
-                        <a:t>Gain</a:t>
+                        <a:t>Discounted Cumulative Gain for 2012 Predictions</a:t>
                       </a:r>
                       <a:endParaRPr lang="en-US" sz="1600" b="1"/>
                     </a:p>
@@ -11067,54 +10708,6 @@
                 </a:tc>
               </a:tr>
               <a:tr h="601133">
-                <a:tc>
-                  <a:txBody>
-                    <a:bodyPr/>
-                    <a:lstStyle/>
-                    <a:p>
-                      <a:pPr algn="ctr"/>
-                      <a:r>
-                        <a:rPr lang="en-US" sz="1600"/>
-                        <a:t>2</a:t>
-                      </a:r>
-                      <a:endParaRPr lang="en-US" sz="1600" b="0"/>
-                    </a:p>
-                  </a:txBody>
-                  <a:tcPr anchor="ctr"/>
-                </a:tc>
-                <a:tc>
-                  <a:txBody>
-                    <a:bodyPr/>
-                    <a:lstStyle/>
-                    <a:p>
-                      <a:pPr algn="ctr"/>
-                      <a:r>
-                        <a:rPr lang="en-US" sz="1600"/>
-                        <a:t>Catches</a:t>
-                      </a:r>
-                      <a:br>
-                        <a:rPr lang="en-US" sz="1600"/>
-                      </a:br>
-                      <a:r>
-                        <a:rPr lang="en-US" sz="1600"/>
-                        <a:t>Fantasy</a:t>
-                      </a:r>
-                      <a:r>
-                        <a:rPr lang="en-US" sz="1600" baseline="0"/>
-                        <a:t> Points</a:t>
-                      </a:r>
-                    </a:p>
-                    <a:p>
-                      <a:pPr algn="ctr"/>
-                      <a:r>
-                        <a:rPr lang="en-US" sz="1600" baseline="0"/>
-                        <a:t>Targets</a:t>
-                      </a:r>
-                      <a:endParaRPr lang="en-US" sz="1600" b="0"/>
-                    </a:p>
-                  </a:txBody>
-                  <a:tcPr anchor="ctr"/>
-                </a:tc>
                 <a:tc>
                   <a:txBody>
                     <a:bodyPr/>
@@ -11139,36 +10732,13 @@
                       </a:pPr>
                       <a:r>
                         <a:rPr lang="en-US" sz="1600"/>
-                        <a:t>β</a:t>
-                      </a:r>
-                      <a:r>
-                        <a:rPr lang="en-US" sz="1600" baseline="-25000"/>
-                        <a:t>1 </a:t>
+                        <a:t>ESPN</a:t>
                       </a:r>
                       <a:r>
                         <a:rPr lang="en-US" sz="1600" baseline="0"/>
-                        <a:t>=[1.51, -2.99]</a:t>
-                      </a:r>
-                      <a:r>
-                        <a:rPr lang="en-US" sz="1600" baseline="-25000"/>
-                        <a:t/>
-                      </a:r>
-                      <a:br>
-                        <a:rPr lang="en-US" sz="1600" baseline="-25000"/>
-                      </a:br>
-                      <a:r>
-                        <a:rPr lang="en-US" sz="1600"/>
-                        <a:t>β</a:t>
-                      </a:r>
-                      <a:r>
-                        <a:rPr lang="en-US" sz="1600" baseline="-25000"/>
-                        <a:t>2 </a:t>
-                      </a:r>
-                      <a:r>
-                        <a:rPr lang="en-US" sz="1600" baseline="0"/>
-                        <a:t>= [1.87, -13.66]</a:t>
-                      </a:r>
-                      <a:endParaRPr lang="en-US" sz="1600" b="0"/>
+                        <a:t> Expert (Matthew Berry)</a:t>
+                      </a:r>
+                      <a:endParaRPr lang="en-US" sz="1600" b="1"/>
                     </a:p>
                   </a:txBody>
                   <a:tcPr anchor="ctr"/>
@@ -11181,7 +10751,7 @@
                       <a:pPr algn="ctr"/>
                       <a:r>
                         <a:rPr lang="en-US" sz="1600" b="0"/>
-                        <a:t>1.8063</a:t>
+                        <a:t>1.7991</a:t>
                       </a:r>
                     </a:p>
                   </a:txBody>
@@ -11197,7 +10767,7 @@
                       <a:pPr algn="ctr"/>
                       <a:r>
                         <a:rPr lang="en-US" sz="1600" b="0"/>
-                        <a:t>2</a:t>
+                        <a:t>Yahoo Team of Experts</a:t>
                       </a:r>
                     </a:p>
                   </a:txBody>
@@ -11211,682 +10781,7 @@
                       <a:pPr algn="ctr"/>
                       <a:r>
                         <a:rPr lang="en-US" sz="1600" b="0"/>
-                        <a:t>Fantasy Points</a:t>
-                      </a:r>
-                    </a:p>
-                  </a:txBody>
-                  <a:tcPr anchor="ctr"/>
-                </a:tc>
-                <a:tc>
-                  <a:txBody>
-                    <a:bodyPr/>
-                    <a:lstStyle/>
-                    <a:p>
-                      <a:pPr marL="0" marR="0" indent="0" algn="ctr" defTabSz="457105" rtl="0" eaLnBrk="1" fontAlgn="auto" latinLnBrk="0" hangingPunct="1">
-                        <a:lnSpc>
-                          <a:spcPct val="100000"/>
-                        </a:lnSpc>
-                        <a:spcBef>
-                          <a:spcPts val="0"/>
-                        </a:spcBef>
-                        <a:spcAft>
-                          <a:spcPts val="0"/>
-                        </a:spcAft>
-                        <a:buClrTx/>
-                        <a:buSzTx/>
-                        <a:buFontTx/>
-                        <a:buNone/>
-                        <a:tabLst/>
-                        <a:defRPr/>
-                      </a:pPr>
-                      <a:r>
-                        <a:rPr lang="en-US" sz="1600" b="0"/>
-                        <a:t>β</a:t>
-                      </a:r>
-                      <a:r>
-                        <a:rPr lang="en-US" sz="1600" b="0" baseline="-25000"/>
-                        <a:t>1 </a:t>
-                      </a:r>
-                      <a:r>
-                        <a:rPr lang="en-US" sz="1600" b="0" baseline="0"/>
-                        <a:t>=[1.81, -11.58]</a:t>
-                      </a:r>
-                      <a:r>
-                        <a:rPr lang="en-US" sz="1600" b="0" baseline="-25000"/>
-                        <a:t/>
-                      </a:r>
-                      <a:br>
-                        <a:rPr lang="en-US" sz="1600" b="0" baseline="-25000"/>
-                      </a:br>
-                      <a:r>
-                        <a:rPr lang="en-US" sz="1600" b="0"/>
-                        <a:t>β</a:t>
-                      </a:r>
-                      <a:r>
-                        <a:rPr lang="en-US" sz="1600" b="0" baseline="-25000"/>
-                        <a:t>2 </a:t>
-                      </a:r>
-                      <a:r>
-                        <a:rPr lang="en-US" sz="1600" b="0" baseline="0"/>
-                        <a:t>= [1.59, -5.52]</a:t>
-                      </a:r>
-                      <a:endParaRPr lang="en-US" sz="1600" b="0"/>
-                    </a:p>
-                  </a:txBody>
-                  <a:tcPr anchor="ctr"/>
-                </a:tc>
-                <a:tc>
-                  <a:txBody>
-                    <a:bodyPr/>
-                    <a:lstStyle/>
-                    <a:p>
-                      <a:pPr algn="ctr"/>
-                      <a:r>
-                        <a:rPr lang="en-US" sz="1600" b="0"/>
-                        <a:t>1.7925</a:t>
-                      </a:r>
-                    </a:p>
-                  </a:txBody>
-                  <a:tcPr anchor="ctr"/>
-                </a:tc>
-              </a:tr>
-              <a:tr h="601133">
-                <a:tc>
-                  <a:txBody>
-                    <a:bodyPr/>
-                    <a:lstStyle/>
-                    <a:p>
-                      <a:pPr algn="ctr"/>
-                      <a:r>
-                        <a:rPr lang="en-US" sz="1600"/>
-                        <a:t>2</a:t>
-                      </a:r>
-                      <a:endParaRPr lang="en-US" sz="1600" b="0"/>
-                    </a:p>
-                  </a:txBody>
-                  <a:tcPr anchor="ctr"/>
-                </a:tc>
-                <a:tc>
-                  <a:txBody>
-                    <a:bodyPr/>
-                    <a:lstStyle/>
-                    <a:p>
-                      <a:pPr algn="ctr"/>
-                      <a:r>
-                        <a:rPr lang="en-US" sz="1600"/>
-                        <a:t>Catches</a:t>
-                      </a:r>
-                      <a:br>
-                        <a:rPr lang="en-US" sz="1600"/>
-                      </a:br>
-                      <a:r>
-                        <a:rPr lang="en-US" sz="1600"/>
-                        <a:t>Fantasy</a:t>
-                      </a:r>
-                      <a:r>
-                        <a:rPr lang="en-US" sz="1600" baseline="0"/>
-                        <a:t> Points</a:t>
-                      </a:r>
-                      <a:endParaRPr lang="en-US" sz="1600" b="0" baseline="0"/>
-                    </a:p>
-                  </a:txBody>
-                  <a:tcPr anchor="ctr"/>
-                </a:tc>
-                <a:tc>
-                  <a:txBody>
-                    <a:bodyPr/>
-                    <a:lstStyle/>
-                    <a:p>
-                      <a:pPr algn="ctr"/>
-                      <a:r>
-                        <a:rPr lang="en-US" sz="1600"/>
-                        <a:t>β</a:t>
-                      </a:r>
-                      <a:r>
-                        <a:rPr lang="en-US" sz="1600" baseline="-25000"/>
-                        <a:t>1 </a:t>
-                      </a:r>
-                      <a:r>
-                        <a:rPr lang="en-US" sz="1600" baseline="0"/>
-                        <a:t>=[1.74, -7.77]</a:t>
-                      </a:r>
-                      <a:r>
-                        <a:rPr lang="en-US" sz="1600" baseline="-25000"/>
-                        <a:t/>
-                      </a:r>
-                      <a:br>
-                        <a:rPr lang="en-US" sz="1600" baseline="-25000"/>
-                      </a:br>
-                      <a:r>
-                        <a:rPr lang="en-US" sz="1600"/>
-                        <a:t>β</a:t>
-                      </a:r>
-                      <a:r>
-                        <a:rPr lang="en-US" sz="1600" baseline="-25000"/>
-                        <a:t>2 </a:t>
-                      </a:r>
-                      <a:r>
-                        <a:rPr lang="en-US" sz="1600" baseline="0"/>
-                        <a:t>= [1.82, -12.13]</a:t>
-                      </a:r>
-                      <a:endParaRPr lang="en-US" sz="1600" b="0"/>
-                    </a:p>
-                  </a:txBody>
-                  <a:tcPr anchor="ctr"/>
-                </a:tc>
-                <a:tc>
-                  <a:txBody>
-                    <a:bodyPr/>
-                    <a:lstStyle/>
-                    <a:p>
-                      <a:pPr algn="ctr"/>
-                      <a:r>
-                        <a:rPr lang="en-US" sz="1600" b="0"/>
-                        <a:t>1.7880</a:t>
-                      </a:r>
-                    </a:p>
-                  </a:txBody>
-                  <a:tcPr anchor="ctr"/>
-                </a:tc>
-              </a:tr>
-              <a:tr h="601133">
-                <a:tc>
-                  <a:txBody>
-                    <a:bodyPr/>
-                    <a:lstStyle/>
-                    <a:p>
-                      <a:pPr algn="ctr"/>
-                      <a:r>
-                        <a:rPr lang="en-US" sz="1600"/>
-                        <a:t>2</a:t>
-                      </a:r>
-                      <a:endParaRPr lang="en-US" sz="1600" b="0"/>
-                    </a:p>
-                  </a:txBody>
-                  <a:tcPr anchor="ctr"/>
-                </a:tc>
-                <a:tc>
-                  <a:txBody>
-                    <a:bodyPr/>
-                    <a:lstStyle/>
-                    <a:p>
-                      <a:pPr algn="ctr"/>
-                      <a:r>
-                        <a:rPr lang="en-US" sz="1600"/>
-                        <a:t>Catches</a:t>
-                      </a:r>
-                      <a:endParaRPr lang="en-US" sz="1600" b="0"/>
-                    </a:p>
-                  </a:txBody>
-                  <a:tcPr anchor="ctr"/>
-                </a:tc>
-                <a:tc>
-                  <a:txBody>
-                    <a:bodyPr/>
-                    <a:lstStyle/>
-                    <a:p>
-                      <a:pPr algn="ctr"/>
-                      <a:r>
-                        <a:rPr lang="en-US" sz="1600"/>
-                        <a:t>β</a:t>
-                      </a:r>
-                      <a:r>
-                        <a:rPr lang="en-US" sz="1600" baseline="-25000"/>
-                        <a:t>1 </a:t>
-                      </a:r>
-                      <a:r>
-                        <a:rPr lang="en-US" sz="1600" baseline="0"/>
-                        <a:t>=[1.91, -13.53]</a:t>
-                      </a:r>
-                      <a:r>
-                        <a:rPr lang="en-US" sz="1600" baseline="-25000"/>
-                        <a:t/>
-                      </a:r>
-                      <a:br>
-                        <a:rPr lang="en-US" sz="1600" baseline="-25000"/>
-                      </a:br>
-                      <a:r>
-                        <a:rPr lang="en-US" sz="1600"/>
-                        <a:t>β</a:t>
-                      </a:r>
-                      <a:r>
-                        <a:rPr lang="en-US" sz="1600" baseline="-25000"/>
-                        <a:t>2 </a:t>
-                      </a:r>
-                      <a:r>
-                        <a:rPr lang="en-US" sz="1600" baseline="0"/>
-                        <a:t>= [1.58, -6.30]</a:t>
-                      </a:r>
-                      <a:endParaRPr lang="en-US" sz="1600" b="0"/>
-                    </a:p>
-                  </a:txBody>
-                  <a:tcPr anchor="ctr"/>
-                </a:tc>
-                <a:tc>
-                  <a:txBody>
-                    <a:bodyPr/>
-                    <a:lstStyle/>
-                    <a:p>
-                      <a:pPr algn="ctr"/>
-                      <a:r>
-                        <a:rPr lang="en-US" sz="1600" b="0"/>
-                        <a:t>1.7877</a:t>
-                      </a:r>
-                    </a:p>
-                  </a:txBody>
-                  <a:tcPr anchor="ctr"/>
-                </a:tc>
-              </a:tr>
-              <a:tr h="601133">
-                <a:tc>
-                  <a:txBody>
-                    <a:bodyPr/>
-                    <a:lstStyle/>
-                    <a:p>
-                      <a:pPr algn="ctr"/>
-                      <a:r>
-                        <a:rPr lang="en-US" sz="1600"/>
-                        <a:t>2</a:t>
-                      </a:r>
-                      <a:endParaRPr lang="en-US" sz="1600" b="0"/>
-                    </a:p>
-                  </a:txBody>
-                  <a:tcPr anchor="ctr"/>
-                </a:tc>
-                <a:tc>
-                  <a:txBody>
-                    <a:bodyPr/>
-                    <a:lstStyle/>
-                    <a:p>
-                      <a:pPr algn="ctr"/>
-                      <a:r>
-                        <a:rPr lang="en-US" sz="1600"/>
-                        <a:t>Receiving Targets</a:t>
-                      </a:r>
-                      <a:endParaRPr lang="en-US" sz="1600" b="0"/>
-                    </a:p>
-                  </a:txBody>
-                  <a:tcPr anchor="ctr"/>
-                </a:tc>
-                <a:tc>
-                  <a:txBody>
-                    <a:bodyPr/>
-                    <a:lstStyle/>
-                    <a:p>
-                      <a:pPr marL="0" marR="0" indent="0" algn="ctr" defTabSz="457105" rtl="0" eaLnBrk="1" fontAlgn="auto" latinLnBrk="0" hangingPunct="1">
-                        <a:lnSpc>
-                          <a:spcPct val="100000"/>
-                        </a:lnSpc>
-                        <a:spcBef>
-                          <a:spcPts val="0"/>
-                        </a:spcBef>
-                        <a:spcAft>
-                          <a:spcPts val="0"/>
-                        </a:spcAft>
-                        <a:buClrTx/>
-                        <a:buSzTx/>
-                        <a:buFontTx/>
-                        <a:buNone/>
-                        <a:tabLst/>
-                        <a:defRPr/>
-                      </a:pPr>
-                      <a:r>
-                        <a:rPr lang="en-US" sz="1600"/>
-                        <a:t>β</a:t>
-                      </a:r>
-                      <a:r>
-                        <a:rPr lang="en-US" sz="1600" baseline="-25000"/>
-                        <a:t>1 </a:t>
-                      </a:r>
-                      <a:r>
-                        <a:rPr lang="en-US" sz="1600" baseline="0"/>
-                        <a:t>=[1.24, 0.69]</a:t>
-                      </a:r>
-                      <a:r>
-                        <a:rPr lang="en-US" sz="1600" baseline="-25000"/>
-                        <a:t/>
-                      </a:r>
-                      <a:br>
-                        <a:rPr lang="en-US" sz="1600" baseline="-25000"/>
-                      </a:br>
-                      <a:r>
-                        <a:rPr lang="en-US" sz="1600"/>
-                        <a:t>β</a:t>
-                      </a:r>
-                      <a:r>
-                        <a:rPr lang="en-US" sz="1600" baseline="-25000"/>
-                        <a:t>2 </a:t>
-                      </a:r>
-                      <a:r>
-                        <a:rPr lang="en-US" sz="1600" baseline="0"/>
-                        <a:t>= [2.04, -16.12]</a:t>
-                      </a:r>
-                      <a:endParaRPr lang="en-US" sz="1600" b="0"/>
-                    </a:p>
-                  </a:txBody>
-                  <a:tcPr anchor="ctr"/>
-                </a:tc>
-                <a:tc>
-                  <a:txBody>
-                    <a:bodyPr/>
-                    <a:lstStyle/>
-                    <a:p>
-                      <a:pPr algn="ctr"/>
-                      <a:r>
-                        <a:rPr lang="en-US" sz="1600" b="0"/>
-                        <a:t>1.7863</a:t>
-                      </a:r>
-                    </a:p>
-                  </a:txBody>
-                  <a:tcPr anchor="ctr"/>
-                </a:tc>
-              </a:tr>
-              <a:tr h="601133">
-                <a:tc>
-                  <a:txBody>
-                    <a:bodyPr/>
-                    <a:lstStyle/>
-                    <a:p>
-                      <a:pPr algn="ctr"/>
-                      <a:r>
-                        <a:rPr lang="en-US" sz="1600"/>
-                        <a:t>2</a:t>
-                      </a:r>
-                      <a:endParaRPr lang="en-US" sz="1600" b="0"/>
-                    </a:p>
-                  </a:txBody>
-                  <a:tcPr anchor="ctr"/>
-                </a:tc>
-                <a:tc>
-                  <a:txBody>
-                    <a:bodyPr/>
-                    <a:lstStyle/>
-                    <a:p>
-                      <a:pPr algn="ctr"/>
-                      <a:r>
-                        <a:rPr lang="en-US" sz="1600"/>
-                        <a:t>Receiving Yards</a:t>
-                      </a:r>
-                      <a:endParaRPr lang="en-US" sz="1600" b="0"/>
-                    </a:p>
-                  </a:txBody>
-                  <a:tcPr anchor="ctr"/>
-                </a:tc>
-                <a:tc>
-                  <a:txBody>
-                    <a:bodyPr/>
-                    <a:lstStyle/>
-                    <a:p>
-                      <a:pPr algn="ctr"/>
-                      <a:r>
-                        <a:rPr lang="en-US" sz="1600"/>
-                        <a:t>β</a:t>
-                      </a:r>
-                      <a:r>
-                        <a:rPr lang="en-US" sz="1600" baseline="-25000"/>
-                        <a:t>1 </a:t>
-                      </a:r>
-                      <a:r>
-                        <a:rPr lang="en-US" sz="1600" baseline="0"/>
-                        <a:t>=[1.64, -10.13]</a:t>
-                      </a:r>
-                      <a:r>
-                        <a:rPr lang="en-US" sz="1600" baseline="-25000"/>
-                        <a:t/>
-                      </a:r>
-                      <a:br>
-                        <a:rPr lang="en-US" sz="1600" baseline="-25000"/>
-                      </a:br>
-                      <a:r>
-                        <a:rPr lang="en-US" sz="1600"/>
-                        <a:t>β</a:t>
-                      </a:r>
-                      <a:r>
-                        <a:rPr lang="en-US" sz="1600" baseline="-25000"/>
-                        <a:t>2 </a:t>
-                      </a:r>
-                      <a:r>
-                        <a:rPr lang="en-US" sz="1600" baseline="0"/>
-                        <a:t>= [1.49, 1.46]</a:t>
-                      </a:r>
-                      <a:endParaRPr lang="en-US" sz="1600" b="0"/>
-                    </a:p>
-                  </a:txBody>
-                  <a:tcPr anchor="ctr"/>
-                </a:tc>
-                <a:tc>
-                  <a:txBody>
-                    <a:bodyPr/>
-                    <a:lstStyle/>
-                    <a:p>
-                      <a:pPr algn="ctr"/>
-                      <a:r>
-                        <a:rPr lang="en-US" sz="1600" b="0"/>
-                        <a:t>1.7814</a:t>
-                      </a:r>
-                    </a:p>
-                  </a:txBody>
-                  <a:tcPr anchor="ctr"/>
-                </a:tc>
-              </a:tr>
-              <a:tr h="601133">
-                <a:tc>
-                  <a:txBody>
-                    <a:bodyPr/>
-                    <a:lstStyle/>
-                    <a:p>
-                      <a:pPr algn="ctr"/>
-                      <a:r>
-                        <a:rPr lang="en-US" sz="1600"/>
-                        <a:t>2</a:t>
-                      </a:r>
-                      <a:endParaRPr lang="en-US" sz="1600" b="0"/>
-                    </a:p>
-                  </a:txBody>
-                  <a:tcPr anchor="ctr"/>
-                </a:tc>
-                <a:tc>
-                  <a:txBody>
-                    <a:bodyPr/>
-                    <a:lstStyle/>
-                    <a:p>
-                      <a:pPr algn="ctr"/>
-                      <a:r>
-                        <a:rPr lang="en-US" sz="1600"/>
-                        <a:t>Touchdowns</a:t>
-                      </a:r>
-                      <a:endParaRPr lang="en-US" sz="1600" b="0"/>
-                    </a:p>
-                  </a:txBody>
-                  <a:tcPr anchor="ctr"/>
-                </a:tc>
-                <a:tc>
-                  <a:txBody>
-                    <a:bodyPr/>
-                    <a:lstStyle/>
-                    <a:p>
-                      <a:pPr algn="ctr"/>
-                      <a:r>
-                        <a:rPr lang="en-US" sz="1600"/>
-                        <a:t>β</a:t>
-                      </a:r>
-                      <a:r>
-                        <a:rPr lang="en-US" sz="1600" baseline="-25000"/>
-                        <a:t>1 </a:t>
-                      </a:r>
-                      <a:r>
-                        <a:rPr lang="en-US" sz="1600" baseline="0"/>
-                        <a:t>=[4.41, -46.74]</a:t>
-                      </a:r>
-                      <a:r>
-                        <a:rPr lang="en-US" sz="1600" baseline="-25000"/>
-                        <a:t/>
-                      </a:r>
-                      <a:br>
-                        <a:rPr lang="en-US" sz="1600" baseline="-25000"/>
-                      </a:br>
-                      <a:r>
-                        <a:rPr lang="en-US" sz="1600"/>
-                        <a:t>β</a:t>
-                      </a:r>
-                      <a:r>
-                        <a:rPr lang="en-US" sz="1600" baseline="-25000"/>
-                        <a:t>2 </a:t>
-                      </a:r>
-                      <a:r>
-                        <a:rPr lang="en-US" sz="1600" baseline="0"/>
-                        <a:t>= [1.67, -11.34]</a:t>
-                      </a:r>
-                      <a:endParaRPr lang="en-US" sz="1600" b="0"/>
-                    </a:p>
-                  </a:txBody>
-                  <a:tcPr anchor="ctr"/>
-                </a:tc>
-                <a:tc>
-                  <a:txBody>
-                    <a:bodyPr/>
-                    <a:lstStyle/>
-                    <a:p>
-                      <a:pPr algn="ctr"/>
-                      <a:r>
-                        <a:rPr lang="en-US" sz="1600" b="0"/>
-                        <a:t>1.7747</a:t>
-                      </a:r>
-                    </a:p>
-                  </a:txBody>
-                  <a:tcPr anchor="ctr"/>
-                </a:tc>
-              </a:tr>
-              <a:tr h="601133">
-                <a:tc>
-                  <a:txBody>
-                    <a:bodyPr/>
-                    <a:lstStyle/>
-                    <a:p>
-                      <a:pPr algn="ctr"/>
-                      <a:r>
-                        <a:rPr lang="en-US" sz="1600"/>
-                        <a:t>3</a:t>
-                      </a:r>
-                      <a:endParaRPr lang="en-US" sz="1600" b="0"/>
-                    </a:p>
-                  </a:txBody>
-                  <a:tcPr anchor="ctr"/>
-                </a:tc>
-                <a:tc>
-                  <a:txBody>
-                    <a:bodyPr/>
-                    <a:lstStyle/>
-                    <a:p>
-                      <a:pPr algn="ctr"/>
-                      <a:r>
-                        <a:rPr lang="en-US" sz="1600"/>
-                        <a:t>Fantasy Points</a:t>
-                      </a:r>
-                      <a:endParaRPr lang="en-US" sz="1600" b="0"/>
-                    </a:p>
-                  </a:txBody>
-                  <a:tcPr anchor="ctr"/>
-                </a:tc>
-                <a:tc>
-                  <a:txBody>
-                    <a:bodyPr/>
-                    <a:lstStyle/>
-                    <a:p>
-                      <a:pPr marL="0" marR="0" indent="0" algn="ctr" defTabSz="457105" rtl="0" eaLnBrk="1" fontAlgn="auto" latinLnBrk="0" hangingPunct="1">
-                        <a:lnSpc>
-                          <a:spcPct val="100000"/>
-                        </a:lnSpc>
-                        <a:spcBef>
-                          <a:spcPts val="0"/>
-                        </a:spcBef>
-                        <a:spcAft>
-                          <a:spcPts val="0"/>
-                        </a:spcAft>
-                        <a:buClrTx/>
-                        <a:buSzTx/>
-                        <a:buFontTx/>
-                        <a:buNone/>
-                        <a:tabLst/>
-                        <a:defRPr/>
-                      </a:pPr>
-                      <a:r>
-                        <a:rPr lang="en-US" sz="1600"/>
-                        <a:t>β</a:t>
-                      </a:r>
-                      <a:r>
-                        <a:rPr lang="en-US" sz="1600" baseline="-25000"/>
-                        <a:t>1 </a:t>
-                      </a:r>
-                      <a:r>
-                        <a:rPr lang="en-US" sz="1600" baseline="0"/>
-                        <a:t>=[2.03, -15.99]</a:t>
-                      </a:r>
-                      <a:r>
-                        <a:rPr lang="en-US" sz="1600" baseline="-25000"/>
-                        <a:t/>
-                      </a:r>
-                      <a:br>
-                        <a:rPr lang="en-US" sz="1600" baseline="-25000"/>
-                      </a:br>
-                      <a:r>
-                        <a:rPr lang="en-US" sz="1600"/>
-                        <a:t>β</a:t>
-                      </a:r>
-                      <a:r>
-                        <a:rPr lang="en-US" sz="1600" baseline="-25000"/>
-                        <a:t>2 </a:t>
-                      </a:r>
-                      <a:r>
-                        <a:rPr lang="en-US" sz="1600" baseline="0"/>
-                        <a:t>= [1.74, -7.77]</a:t>
-                      </a:r>
-                      <a:endParaRPr lang="en-US" sz="1600" b="0"/>
-                    </a:p>
-                    <a:p>
-                      <a:pPr marL="0" marR="0" indent="0" algn="ctr" defTabSz="457105" rtl="0" eaLnBrk="1" fontAlgn="auto" latinLnBrk="0" hangingPunct="1">
-                        <a:lnSpc>
-                          <a:spcPct val="100000"/>
-                        </a:lnSpc>
-                        <a:spcBef>
-                          <a:spcPts val="0"/>
-                        </a:spcBef>
-                        <a:spcAft>
-                          <a:spcPts val="0"/>
-                        </a:spcAft>
-                        <a:buClrTx/>
-                        <a:buSzTx/>
-                        <a:buFontTx/>
-                        <a:buNone/>
-                        <a:tabLst/>
-                        <a:defRPr/>
-                      </a:pPr>
-                      <a:r>
-                        <a:rPr lang="en-US" sz="1600"/>
-                        <a:t>β</a:t>
-                      </a:r>
-                      <a:r>
-                        <a:rPr lang="en-US" sz="1600" baseline="-25000"/>
-                        <a:t>3 </a:t>
-                      </a:r>
-                      <a:r>
-                        <a:rPr lang="en-US" sz="1600" baseline="0"/>
-                        <a:t>=[4.12, -42.5]</a:t>
-                      </a:r>
-                      <a:endParaRPr lang="en-US" sz="1600" b="0"/>
-                    </a:p>
-                  </a:txBody>
-                  <a:tcPr anchor="ctr"/>
-                </a:tc>
-                <a:tc>
-                  <a:txBody>
-                    <a:bodyPr/>
-                    <a:lstStyle/>
-                    <a:p>
-                      <a:pPr algn="ctr"/>
-                      <a:r>
-                        <a:rPr lang="en-US" sz="1600" b="0"/>
-                        <a:t>1.4428</a:t>
+                        <a:t>1.8100</a:t>
                       </a:r>
                     </a:p>
                   </a:txBody>

</xml_diff>

<commit_message>
finished 1st panel of poster
</commit_message>
<xml_diff>
--- a/poster/jpo4_poster.pptx
+++ b/poster/jpo4_poster.pptx
@@ -214,7 +214,7 @@
             </a:lvl1pPr>
           </a:lstStyle>
           <a:p>
-            <a:endParaRPr lang="en-US"/>
+            <a:endParaRPr lang="en-US" dirty="0"/>
           </a:p>
         </p:txBody>
       </p:sp>
@@ -259,7 +259,7 @@
             </a:lvl1pPr>
           </a:lstStyle>
           <a:p>
-            <a:endParaRPr lang="en-US"/>
+            <a:endParaRPr lang="en-US" dirty="0"/>
           </a:p>
         </p:txBody>
       </p:sp>
@@ -405,7 +405,7 @@
             </a:lvl1pPr>
           </a:lstStyle>
           <a:p>
-            <a:endParaRPr lang="en-US"/>
+            <a:endParaRPr lang="en-US" dirty="0"/>
           </a:p>
         </p:txBody>
       </p:sp>
@@ -455,14 +455,14 @@
               <a:pPr/>
               <a:t>‹#›</a:t>
             </a:fld>
-            <a:endParaRPr lang="en-US"/>
+            <a:endParaRPr lang="en-US" dirty="0"/>
           </a:p>
         </p:txBody>
       </p:sp>
     </p:spTree>
     <p:extLst>
       <p:ext uri="{BB962C8B-B14F-4D97-AF65-F5344CB8AC3E}">
-        <p14:creationId xmlns="" xmlns:a="http://schemas.openxmlformats.org/drawingml/2006/main" xmlns:r="http://schemas.openxmlformats.org/officeDocument/2006/relationships" xmlns:p="http://schemas.openxmlformats.org/presentationml/2006/main" xmlns:p14="http://schemas.microsoft.com/office/powerpoint/2010/main" xmlns:mv="urn:schemas-microsoft-com:mac:vml" xmlns:mc="http://schemas.openxmlformats.org/markup-compatibility/2006" val="2638942905"/>
+        <p14:creationId xmlns:mc="http://schemas.openxmlformats.org/markup-compatibility/2006" xmlns:mv="urn:schemas-microsoft-com:mac:vml" xmlns:p14="http://schemas.microsoft.com/office/powerpoint/2010/main" xmlns:p="http://schemas.openxmlformats.org/presentationml/2006/main" xmlns:r="http://schemas.openxmlformats.org/officeDocument/2006/relationships" xmlns:a="http://schemas.openxmlformats.org/drawingml/2006/main" xmlns="" val="2638942905"/>
       </p:ext>
     </p:extLst>
   </p:cSld>
@@ -2409,7 +2409,7 @@
             </a:lvl9pPr>
           </a:lstStyle>
           <a:p>
-            <a:endParaRPr lang="en-US"/>
+            <a:endParaRPr lang="en-US" dirty="0"/>
           </a:p>
         </p:txBody>
       </p:sp>
@@ -4119,7 +4119,7 @@
             </a:lvl9pPr>
           </a:lstStyle>
           <a:p>
-            <a:endParaRPr lang="en-US"/>
+            <a:endParaRPr lang="en-US" dirty="0"/>
           </a:p>
         </p:txBody>
       </p:sp>
@@ -5367,7 +5367,7 @@
             </a:lvl9pPr>
           </a:lstStyle>
           <a:p>
-            <a:endParaRPr lang="en-US"/>
+            <a:endParaRPr lang="en-US" dirty="0"/>
           </a:p>
         </p:txBody>
       </p:sp>
@@ -5547,7 +5547,9 @@
           </a:bodyPr>
           <a:lstStyle/>
           <a:p>
-            <a:endParaRPr lang="en-US" dirty="0"/>
+            <a:endParaRPr lang="en-US" dirty="0">
+              <a:latin typeface="+mn-lt"/>
+            </a:endParaRPr>
           </a:p>
         </p:txBody>
       </p:sp>
@@ -5670,14 +5672,14 @@
           <a:p>
             <a:pPr lvl="0"/>
             <a:r>
-              <a:rPr lang="en-US"/>
+              <a:rPr lang="en-US" dirty="0"/>
               <a:t>Click to edit Master text styles</a:t>
             </a:r>
           </a:p>
           <a:p>
             <a:pPr lvl="1"/>
             <a:r>
-              <a:rPr lang="en-US"/>
+              <a:rPr lang="en-US" dirty="0"/>
               <a:t>Second level</a:t>
             </a:r>
           </a:p>
@@ -5718,7 +5720,7 @@
           </a:bodyPr>
           <a:lstStyle/>
           <a:p>
-            <a:endParaRPr lang="en-US"/>
+            <a:endParaRPr lang="en-US" dirty="0"/>
           </a:p>
         </p:txBody>
       </p:sp>
@@ -5759,7 +5761,9 @@
           </a:bodyPr>
           <a:lstStyle/>
           <a:p>
-            <a:endParaRPr lang="en-US"/>
+            <a:endParaRPr lang="en-US" dirty="0">
+              <a:latin typeface="+mn-lt"/>
+            </a:endParaRPr>
           </a:p>
         </p:txBody>
       </p:sp>
@@ -5800,7 +5804,9 @@
           </a:bodyPr>
           <a:lstStyle/>
           <a:p>
-            <a:endParaRPr lang="en-US"/>
+            <a:endParaRPr lang="en-US" dirty="0">
+              <a:latin typeface="+mn-lt"/>
+            </a:endParaRPr>
           </a:p>
         </p:txBody>
       </p:sp>
@@ -5841,7 +5847,9 @@
           </a:bodyPr>
           <a:lstStyle/>
           <a:p>
-            <a:endParaRPr lang="en-US"/>
+            <a:endParaRPr lang="en-US" dirty="0">
+              <a:latin typeface="+mn-lt"/>
+            </a:endParaRPr>
           </a:p>
         </p:txBody>
       </p:sp>
@@ -6300,7 +6308,7 @@
           </a:bodyPr>
           <a:lstStyle/>
           <a:p>
-            <a:endParaRPr lang="en-US"/>
+            <a:endParaRPr lang="en-US" dirty="0"/>
           </a:p>
         </p:txBody>
       </p:sp>
@@ -6341,7 +6349,7 @@
           </a:bodyPr>
           <a:lstStyle/>
           <a:p>
-            <a:endParaRPr lang="en-US"/>
+            <a:endParaRPr lang="en-US" dirty="0"/>
           </a:p>
         </p:txBody>
       </p:sp>
@@ -6380,7 +6388,7 @@
           </a:bodyPr>
           <a:lstStyle/>
           <a:p>
-            <a:endParaRPr lang="en-US"/>
+            <a:endParaRPr lang="en-US" dirty="0"/>
           </a:p>
         </p:txBody>
       </p:sp>
@@ -6446,7 +6454,7 @@
               </a:spcBef>
             </a:pPr>
             <a:r>
-              <a:rPr lang="en-US" sz="1100" b="1" dirty="0" err="1">
+              <a:rPr lang="en-US" sz="1100" b="1" dirty="0">
                 <a:solidFill>
                   <a:schemeClr val="bg2"/>
                 </a:solidFill>
@@ -6454,12 +6462,6 @@
               </a:rPr>
               <a:t>www.PosterPresentations.com</a:t>
             </a:r>
-            <a:endParaRPr lang="en-US" sz="1100" b="1" dirty="0">
-              <a:solidFill>
-                <a:schemeClr val="bg2"/>
-              </a:solidFill>
-              <a:latin typeface="Arial" charset="0"/>
-            </a:endParaRPr>
           </a:p>
         </p:txBody>
       </p:sp>
@@ -6591,7 +6593,7 @@
           </a:bodyPr>
           <a:lstStyle/>
           <a:p>
-            <a:endParaRPr lang="en-US"/>
+            <a:endParaRPr lang="en-US" dirty="0"/>
           </a:p>
         </p:txBody>
       </p:sp>
@@ -6632,7 +6634,7 @@
           </a:bodyPr>
           <a:lstStyle/>
           <a:p>
-            <a:endParaRPr lang="en-US"/>
+            <a:endParaRPr lang="en-US" dirty="0"/>
           </a:p>
         </p:txBody>
       </p:sp>
@@ -6673,7 +6675,7 @@
           </a:bodyPr>
           <a:lstStyle/>
           <a:p>
-            <a:endParaRPr lang="en-US"/>
+            <a:endParaRPr lang="en-US" dirty="0"/>
           </a:p>
         </p:txBody>
       </p:sp>
@@ -7132,7 +7134,7 @@
           </a:bodyPr>
           <a:lstStyle/>
           <a:p>
-            <a:endParaRPr lang="en-US"/>
+            <a:endParaRPr lang="en-US" dirty="0"/>
           </a:p>
         </p:txBody>
       </p:sp>
@@ -7173,7 +7175,7 @@
           </a:bodyPr>
           <a:lstStyle/>
           <a:p>
-            <a:endParaRPr lang="en-US"/>
+            <a:endParaRPr lang="en-US" dirty="0"/>
           </a:p>
         </p:txBody>
       </p:sp>
@@ -7212,7 +7214,7 @@
           </a:bodyPr>
           <a:lstStyle/>
           <a:p>
-            <a:endParaRPr lang="en-US"/>
+            <a:endParaRPr lang="en-US" dirty="0"/>
           </a:p>
         </p:txBody>
       </p:sp>
@@ -7278,7 +7280,7 @@
               </a:spcBef>
             </a:pPr>
             <a:r>
-              <a:rPr lang="en-US" sz="1100" b="1" dirty="0" err="1">
+              <a:rPr lang="en-US" sz="1100" b="1" dirty="0">
                 <a:solidFill>
                   <a:schemeClr val="bg2"/>
                 </a:solidFill>
@@ -7286,12 +7288,6 @@
               </a:rPr>
               <a:t>www.PosterPresentations.com</a:t>
             </a:r>
-            <a:endParaRPr lang="en-US" sz="1100" b="1" dirty="0">
-              <a:solidFill>
-                <a:schemeClr val="bg2"/>
-              </a:solidFill>
-              <a:latin typeface="Arial" charset="0"/>
-            </a:endParaRPr>
           </a:p>
         </p:txBody>
       </p:sp>
@@ -7423,7 +7419,7 @@
           </a:bodyPr>
           <a:lstStyle/>
           <a:p>
-            <a:endParaRPr lang="en-US"/>
+            <a:endParaRPr lang="en-US" dirty="0"/>
           </a:p>
         </p:txBody>
       </p:sp>
@@ -7904,7 +7900,7 @@
         </p:nvSpPr>
         <p:spPr bwMode="auto">
           <a:xfrm>
-            <a:off x="600075" y="16620961"/>
+            <a:off x="609262" y="16787037"/>
             <a:ext cx="8734426" cy="892340"/>
           </a:xfrm>
           <a:prstGeom prst="rect">
@@ -8230,7 +8226,7 @@
       </p:sp>
       <p:pic>
         <p:nvPicPr>
-          <p:cNvPr id="22" name="Picture 21" descr="top30_lin_reg_all_feat.eps.png"/>
+          <p:cNvPr id="23" name="Picture 22" descr="rmse_plus_dcg.png"/>
           <p:cNvPicPr>
             <a:picLocks noChangeAspect="1"/>
           </p:cNvPicPr>
@@ -8238,30 +8234,6 @@
         </p:nvPicPr>
         <p:blipFill>
           <a:blip r:embed="rId5"/>
-          <a:stretch>
-            <a:fillRect/>
-          </a:stretch>
-        </p:blipFill>
-        <p:spPr>
-          <a:xfrm>
-            <a:off x="10040597" y="27758842"/>
-            <a:ext cx="8734427" cy="4067375"/>
-          </a:xfrm>
-          <a:prstGeom prst="rect">
-            <a:avLst/>
-          </a:prstGeom>
-        </p:spPr>
-      </p:pic>
-      <p:pic>
-        <p:nvPicPr>
-          <p:cNvPr id="23" name="Picture 22" descr="rmse_plus_dcg.png"/>
-          <p:cNvPicPr>
-            <a:picLocks noChangeAspect="1"/>
-          </p:cNvPicPr>
-          <p:nvPr/>
-        </p:nvPicPr>
-        <p:blipFill>
-          <a:blip r:embed="rId6"/>
           <a:stretch>
             <a:fillRect/>
           </a:stretch>
@@ -8285,7 +8257,7 @@
           <p:nvPr/>
         </p:nvPicPr>
         <p:blipFill>
-          <a:blip r:embed="rId7"/>
+          <a:blip r:embed="rId6"/>
           <a:stretch>
             <a:fillRect/>
           </a:stretch>
@@ -8309,7 +8281,7 @@
           <p:nvPr/>
         </p:nvPicPr>
         <p:blipFill>
-          <a:blip r:embed="rId8"/>
+          <a:blip r:embed="rId7"/>
           <a:stretch>
             <a:fillRect/>
           </a:stretch>
@@ -8348,114 +8320,146 @@
           <a:p>
             <a:pPr algn="ctr"/>
             <a:r>
-              <a:rPr lang="en-US"/>
-              <a:t>β = [ w</a:t>
-            </a:r>
-            <a:r>
-              <a:rPr lang="en-US" baseline="-25000"/>
+              <a:rPr lang="en-US" dirty="0" err="1"/>
+              <a:t>β</a:t>
+            </a:r>
+            <a:r>
+              <a:rPr lang="en-US" dirty="0"/>
+              <a:t> = [ </a:t>
+            </a:r>
+            <a:r>
+              <a:rPr lang="en-US" dirty="0" err="1"/>
+              <a:t>w</a:t>
+            </a:r>
+            <a:r>
+              <a:rPr lang="en-US" baseline="-25000" dirty="0" err="1"/>
               <a:t>FantasyPts</a:t>
             </a:r>
             <a:r>
-              <a:rPr lang="en-US"/>
+              <a:rPr lang="en-US" dirty="0"/>
+              <a:t> </a:t>
+            </a:r>
+            <a:r>
+              <a:rPr lang="en-US" dirty="0" err="1"/>
+              <a:t>w</a:t>
+            </a:r>
+            <a:r>
+              <a:rPr lang="en-US" baseline="-25000" dirty="0" err="1"/>
+              <a:t>RecYds</a:t>
+            </a:r>
+            <a:r>
+              <a:rPr lang="en-US" dirty="0"/>
+              <a:t> </a:t>
+            </a:r>
+            <a:r>
+              <a:rPr lang="en-US" dirty="0" err="1"/>
+              <a:t>w</a:t>
+            </a:r>
+            <a:r>
+              <a:rPr lang="en-US" baseline="-25000" dirty="0" err="1"/>
+              <a:t>RecTDs</a:t>
+            </a:r>
+            <a:r>
+              <a:rPr lang="en-US" dirty="0"/>
+              <a:t> </a:t>
+            </a:r>
+            <a:r>
+              <a:rPr lang="en-US" dirty="0" err="1"/>
+              <a:t>w</a:t>
+            </a:r>
+            <a:r>
+              <a:rPr lang="en-US" baseline="-25000" dirty="0" err="1"/>
+              <a:t>Targets</a:t>
+            </a:r>
+            <a:r>
+              <a:rPr lang="en-US" dirty="0"/>
+              <a:t> </a:t>
+            </a:r>
+            <a:r>
+              <a:rPr lang="en-US" dirty="0" err="1"/>
+              <a:t>w</a:t>
+            </a:r>
+            <a:r>
+              <a:rPr lang="en-US" baseline="-25000" dirty="0" err="1"/>
+              <a:t>Catches</a:t>
+            </a:r>
+            <a:r>
+              <a:rPr lang="en-US" dirty="0"/>
               <a:t> w</a:t>
             </a:r>
             <a:r>
-              <a:rPr lang="en-US" baseline="-25000"/>
-              <a:t>RecYds</a:t>
-            </a:r>
-            <a:r>
-              <a:rPr lang="en-US"/>
+              <a:rPr lang="en-US" baseline="-25000" dirty="0"/>
+              <a:t>Δ1yrRecYds</a:t>
+            </a:r>
+            <a:r>
+              <a:rPr lang="en-US" dirty="0"/>
               <a:t> w</a:t>
             </a:r>
             <a:r>
-              <a:rPr lang="en-US" baseline="-25000"/>
-              <a:t>RecTDs</a:t>
-            </a:r>
-            <a:r>
-              <a:rPr lang="en-US"/>
+              <a:rPr lang="en-US" baseline="-25000" dirty="0"/>
+              <a:t>Δ1yrRecTDs</a:t>
+            </a:r>
+            <a:r>
+              <a:rPr lang="en-US" dirty="0"/>
               <a:t> w</a:t>
             </a:r>
             <a:r>
-              <a:rPr lang="en-US" baseline="-25000"/>
-              <a:t>Targets</a:t>
-            </a:r>
-            <a:r>
-              <a:rPr lang="en-US"/>
+              <a:rPr lang="en-US" baseline="-25000" dirty="0"/>
+              <a:t>Δ2yrRecYds</a:t>
+            </a:r>
+            <a:r>
+              <a:rPr lang="en-US" dirty="0"/>
               <a:t> w</a:t>
             </a:r>
             <a:r>
-              <a:rPr lang="en-US" baseline="-25000"/>
-              <a:t>Catches</a:t>
-            </a:r>
-            <a:r>
-              <a:rPr lang="en-US"/>
+              <a:rPr lang="en-US" baseline="-25000" dirty="0"/>
+              <a:t>Δ2yrRecYds</a:t>
+            </a:r>
+            <a:r>
+              <a:rPr lang="en-US" dirty="0"/>
               <a:t> w</a:t>
             </a:r>
             <a:r>
-              <a:rPr lang="en-US" baseline="-25000"/>
-              <a:t>Δ1yrRecYds</a:t>
-            </a:r>
-            <a:r>
-              <a:rPr lang="en-US"/>
+              <a:rPr lang="en-US" baseline="-25000" dirty="0"/>
+              <a:t>Δ3yrRecYds</a:t>
+            </a:r>
+            <a:r>
+              <a:rPr lang="en-US" dirty="0"/>
               <a:t> w</a:t>
             </a:r>
             <a:r>
-              <a:rPr lang="en-US" baseline="-25000"/>
-              <a:t>Δ1yrRecTDs</a:t>
-            </a:r>
-            <a:r>
-              <a:rPr lang="en-US"/>
-              <a:t> w</a:t>
-            </a:r>
-            <a:r>
-              <a:rPr lang="en-US" baseline="-25000"/>
-              <a:t>Δ2yrRecYds</a:t>
-            </a:r>
-            <a:r>
-              <a:rPr lang="en-US"/>
-              <a:t> w</a:t>
-            </a:r>
-            <a:r>
-              <a:rPr lang="en-US" baseline="-25000"/>
-              <a:t>Δ2yrRecYds</a:t>
-            </a:r>
-            <a:r>
-              <a:rPr lang="en-US"/>
-              <a:t> w</a:t>
-            </a:r>
-            <a:r>
-              <a:rPr lang="en-US" baseline="-25000"/>
+              <a:rPr lang="en-US" baseline="-25000" dirty="0"/>
               <a:t>Δ3yrRecYds</a:t>
             </a:r>
             <a:r>
-              <a:rPr lang="en-US"/>
-              <a:t> w</a:t>
-            </a:r>
-            <a:r>
-              <a:rPr lang="en-US" baseline="-25000"/>
-              <a:t>Δ3yrRecYds</a:t>
-            </a:r>
-            <a:r>
-              <a:rPr lang="en-US"/>
-              <a:t> w</a:t>
-            </a:r>
-            <a:r>
-              <a:rPr lang="en-US" baseline="-25000"/>
+              <a:rPr lang="en-US" dirty="0"/>
+              <a:t> </a:t>
+            </a:r>
+            <a:r>
+              <a:rPr lang="en-US" dirty="0" err="1"/>
+              <a:t>w</a:t>
+            </a:r>
+            <a:r>
+              <a:rPr lang="en-US" baseline="-25000" dirty="0" err="1"/>
               <a:t>ESPN</a:t>
             </a:r>
             <a:r>
-              <a:rPr lang="en-US"/>
-              <a:t> w</a:t>
-            </a:r>
-            <a:r>
-              <a:rPr lang="en-US" baseline="-25000"/>
+              <a:rPr lang="en-US" dirty="0"/>
+              <a:t> </a:t>
+            </a:r>
+            <a:r>
+              <a:rPr lang="en-US" dirty="0" err="1"/>
+              <a:t>w</a:t>
+            </a:r>
+            <a:r>
+              <a:rPr lang="en-US" baseline="-25000" dirty="0" err="1"/>
               <a:t>Yahoo</a:t>
             </a:r>
             <a:r>
-              <a:rPr lang="en-US"/>
+              <a:rPr lang="en-US" dirty="0"/>
               <a:t> ]</a:t>
             </a:r>
-            <a:endParaRPr lang="en-US" baseline="-25000"/>
+            <a:endParaRPr lang="en-US" baseline="-25000" dirty="0"/>
           </a:p>
         </p:txBody>
       </p:sp>
@@ -8468,14 +8472,14 @@
           <p:nvPr/>
         </p:nvPicPr>
         <p:blipFill>
-          <a:blip r:embed="rId9"/>
+          <a:blip r:embed="rId8"/>
           <a:stretch>
             <a:fillRect/>
           </a:stretch>
         </p:blipFill>
         <p:spPr>
           <a:xfrm>
-            <a:off x="600075" y="23591039"/>
+            <a:off x="600075" y="25826434"/>
             <a:ext cx="8718213" cy="3632589"/>
           </a:xfrm>
           <a:prstGeom prst="rect">
@@ -9325,8 +9329,8 @@
           <p:nvPr/>
         </p:nvGraphicFramePr>
         <p:xfrm>
-          <a:off x="723713" y="28651182"/>
-          <a:ext cx="8492257" cy="1803399"/>
+          <a:off x="727075" y="30276800"/>
+          <a:ext cx="8492257" cy="1330590"/>
         </p:xfrm>
         <a:graphic>
           <a:graphicData uri="http://schemas.openxmlformats.org/drawingml/2006/table">
@@ -9338,7 +9342,7 @@
                 <a:gridCol w="3289005"/>
                 <a:gridCol w="5203252"/>
               </a:tblGrid>
-              <a:tr h="601133">
+              <a:tr h="443530">
                 <a:tc>
                   <a:txBody>
                     <a:bodyPr/>
@@ -9346,7 +9350,7 @@
                     <a:p>
                       <a:pPr algn="ctr"/>
                       <a:r>
-                        <a:rPr lang="en-US" sz="1600" b="1"/>
+                        <a:rPr lang="en-US" sz="1600" b="1" dirty="0"/>
                         <a:t>Expert</a:t>
                       </a:r>
                     </a:p>
@@ -9360,16 +9364,16 @@
                     <a:p>
                       <a:pPr algn="ctr"/>
                       <a:r>
-                        <a:rPr lang="en-US" sz="1600"/>
+                        <a:rPr lang="en-US" sz="1600" dirty="0"/>
                         <a:t>Discounted Cumulative Gain for 2012 Predictions</a:t>
                       </a:r>
-                      <a:endParaRPr lang="en-US" sz="1600" b="1"/>
+                      <a:endParaRPr lang="en-US" sz="1600" b="1" dirty="0"/>
                     </a:p>
                   </a:txBody>
                   <a:tcPr anchor="ctr"/>
                 </a:tc>
               </a:tr>
-              <a:tr h="601133">
+              <a:tr h="443530">
                 <a:tc>
                   <a:txBody>
                     <a:bodyPr/>
@@ -9420,7 +9424,7 @@
                   <a:tcPr anchor="ctr"/>
                 </a:tc>
               </a:tr>
-              <a:tr h="601133">
+              <a:tr h="443530">
                 <a:tc>
                   <a:txBody>
                     <a:bodyPr/>
@@ -9428,7 +9432,7 @@
                     <a:p>
                       <a:pPr algn="ctr"/>
                       <a:r>
-                        <a:rPr lang="en-US" sz="1600" b="0"/>
+                        <a:rPr lang="en-US" sz="1600" b="0" dirty="0"/>
                         <a:t>Yahoo Team of Experts</a:t>
                       </a:r>
                     </a:p>
@@ -9442,7 +9446,7 @@
                     <a:p>
                       <a:pPr algn="ctr"/>
                       <a:r>
-                        <a:rPr lang="en-US" sz="1600" b="0"/>
+                        <a:rPr lang="en-US" sz="1600" b="0" dirty="0"/>
                         <a:t>1.8100</a:t>
                       </a:r>
                     </a:p>
@@ -10712,7 +10716,7 @@
           <p:nvPr/>
         </p:nvPicPr>
         <p:blipFill>
-          <a:blip r:embed="rId10"/>
+          <a:blip r:embed="rId9"/>
           <a:stretch>
             <a:fillRect/>
           </a:stretch>
@@ -10878,8 +10882,8 @@
         </p:nvSpPr>
         <p:spPr>
           <a:xfrm>
-            <a:off x="888999" y="7631862"/>
-            <a:ext cx="8166101" cy="8402300"/>
+            <a:off x="888999" y="11385918"/>
+            <a:ext cx="8166101" cy="5324535"/>
           </a:xfrm>
           <a:prstGeom prst="rect">
             <a:avLst/>
@@ -10894,31 +10898,7 @@
           <a:p>
             <a:pPr algn="just"/>
             <a:r>
-              <a:rPr lang="en-US" sz="2000" b="1">
-                <a:latin typeface="+mn-lt"/>
-              </a:rPr>
-              <a:t>What is fantasy football?</a:t>
-            </a:r>
-          </a:p>
-          <a:p>
-            <a:pPr algn="just"/>
-            <a:r>
-              <a:rPr lang="en-US" sz="2000">
-                <a:latin typeface="+mn-lt"/>
-              </a:rPr>
-              <a:t>Fantasy football is a fast growing, multi-billion dollar industry centered around projecting which players will perform well. Points are awarded when a player scores a touchdown, gains yards running, or catches a pass. Each owner (person playing fantasy football) picks their team at the beginning of the year, typically through a snake style draft where players are taken one after another. Correctly predicting which players will play well greatly improves your team's year-long performance, whereas wasting a high pick on a low achiever can ruin your season. This paper focuses on an optimal strategy for predicting which NFL wide receivers will have the best fantasy football season using data available prior to the beginning of the season.</a:t>
-            </a:r>
-          </a:p>
-          <a:p>
-            <a:pPr algn="just"/>
-            <a:endParaRPr lang="en-US" sz="2000">
-              <a:latin typeface="+mn-lt"/>
-            </a:endParaRPr>
-          </a:p>
-          <a:p>
-            <a:pPr algn="just"/>
-            <a:r>
-              <a:rPr lang="en-US" sz="2000" b="1">
+              <a:rPr lang="en-US" sz="2000" b="1" dirty="0">
                 <a:latin typeface="+mn-lt"/>
                 <a:cs typeface=""/>
               </a:rPr>
@@ -10926,77 +10906,96 @@
             </a:r>
           </a:p>
           <a:p>
-            <a:pPr lvl="1" algn="just">
+            <a:pPr lvl="1">
               <a:buFont typeface="Arial"/>
               <a:buChar char="•"/>
             </a:pPr>
             <a:r>
-              <a:rPr lang="en-US" sz="2000">
+              <a:rPr lang="en-US" sz="2000" dirty="0">
+                <a:latin typeface="+mn-lt"/>
+              </a:rPr>
+              <a:t> </a:t>
+            </a:r>
+            <a:r>
+              <a:rPr lang="en-US" sz="2000" u="sng" dirty="0">
+                <a:latin typeface="+mn-lt"/>
+              </a:rPr>
+              <a:t>Profit</a:t>
+            </a:r>
+            <a:r>
+              <a:rPr lang="en-US" sz="2000" dirty="0">
+                <a:latin typeface="+mn-lt"/>
+              </a:rPr>
+              <a:t>: $15 billion per year is spent on fantasy football.</a:t>
+            </a:r>
+            <a:r>
+              <a:rPr lang="en-US" sz="2000" dirty="0">
+                <a:latin typeface="+mn-lt"/>
+                <a:cs typeface=""/>
+              </a:rPr>
+              <a:t>  </a:t>
+            </a:r>
+          </a:p>
+          <a:p>
+            <a:pPr lvl="1">
+              <a:buFont typeface="Arial"/>
+              <a:buChar char="•"/>
+            </a:pPr>
+            <a:r>
+              <a:rPr lang="en-US" sz="2000" dirty="0">
                 <a:latin typeface="+mn-lt"/>
                 <a:cs typeface=""/>
               </a:rPr>
               <a:t> </a:t>
             </a:r>
             <a:r>
-              <a:rPr lang="en-US" sz="2000" u="sng">
+              <a:rPr lang="en-US" sz="2000" u="sng" dirty="0">
                 <a:latin typeface="+mn-lt"/>
                 <a:cs typeface=""/>
               </a:rPr>
-              <a:t>Victory</a:t>
-            </a:r>
-            <a:r>
-              <a:rPr lang="en-US" sz="2000">
+              <a:t>Popularity</a:t>
+            </a:r>
+            <a:r>
+              <a:rPr lang="en-US" sz="2000" dirty="0">
                 <a:latin typeface="+mn-lt"/>
                 <a:cs typeface=""/>
               </a:rPr>
-              <a:t>: There is no better way to help ensure victory in a fantasy league than to make good choices during the fantasy draft. </a:t>
-            </a:r>
-          </a:p>
-          <a:p>
-            <a:pPr lvl="1" algn="just">
+              <a:t>: According to the Fantasy Sports Trade Association, 10% of the US population plays fantasy football.</a:t>
+            </a:r>
+          </a:p>
+          <a:p>
+            <a:pPr lvl="1">
               <a:buFont typeface="Arial"/>
               <a:buChar char="•"/>
             </a:pPr>
             <a:r>
-              <a:rPr lang="en-US" sz="2000">
+              <a:rPr lang="en-US" sz="2000" dirty="0">
                 <a:latin typeface="+mn-lt"/>
                 <a:cs typeface=""/>
               </a:rPr>
               <a:t> </a:t>
             </a:r>
             <a:r>
-              <a:rPr lang="en-US" sz="2000" u="sng">
+              <a:rPr lang="en-US" sz="2000" u="sng" dirty="0">
                 <a:latin typeface="+mn-lt"/>
                 <a:cs typeface=""/>
               </a:rPr>
-              <a:t>Popularity</a:t>
-            </a:r>
-            <a:r>
-              <a:rPr lang="en-US" sz="2000">
+              <a:t>Difficulty</a:t>
+            </a:r>
+            <a:r>
+              <a:rPr lang="en-US" sz="2000" dirty="0">
                 <a:latin typeface="+mn-lt"/>
                 <a:cs typeface=""/>
               </a:rPr>
-              <a:t>: According to the Fantasy Sports Trade Association (FSTA), 32 million Americans are playing fantasy football this year. That is over 10% of the US population.</a:t>
-            </a:r>
-          </a:p>
-          <a:p>
-            <a:pPr lvl="1" algn="just">
+              <a:t>: Ranking players is difficult, even the experts are rarely correct (see Figure 1). A small edge can therefore go a long ways.</a:t>
+            </a:r>
+          </a:p>
+          <a:p>
+            <a:pPr algn="just">
               <a:buFont typeface="Arial"/>
               <a:buChar char="•"/>
             </a:pPr>
-            <a:r>
-              <a:rPr lang="en-US" sz="2000">
-                <a:latin typeface="+mn-lt"/>
-              </a:rPr>
-              <a:t> The FSTA estimates that these 32 million Americans spend over 15 billion dollars on fantasy football.</a:t>
-            </a:r>
-          </a:p>
-          <a:p>
-            <a:pPr lvl="1" algn="just">
-              <a:buFont typeface="Arial"/>
-              <a:buChar char="•"/>
-            </a:pPr>
-            <a:endParaRPr lang="en-US" sz="2000">
+            <a:endParaRPr lang="en-US" sz="2000" dirty="0">
               <a:latin typeface="+mn-lt"/>
               <a:cs typeface=""/>
             </a:endParaRPr>
@@ -11004,25 +11003,43 @@
           <a:p>
             <a:pPr algn="just"/>
             <a:r>
-              <a:rPr lang="en-US" sz="2000" b="1">
+              <a:rPr lang="en-US" sz="2000" b="1" dirty="0">
                 <a:latin typeface="+mn-lt"/>
-                <a:cs typeface=""/>
               </a:rPr>
-              <a:t>Why predict wide receiver performances?</a:t>
-            </a:r>
-            <a:endParaRPr lang="en-US" sz="2000">
+              <a:t>How does fantasy football work?</a:t>
+            </a:r>
+          </a:p>
+          <a:p>
+            <a:pPr algn="just"/>
+            <a:r>
+              <a:rPr lang="en-US" sz="2000" dirty="0">
+                <a:latin typeface="+mn-lt"/>
+              </a:rPr>
+              <a:t>Points are awarded when a player scores a touchdown or gains yards. Each owner picks their team at the beginning of the year. Correctly predicting which players will play well greatly improves your team's year-long performance. This paper focuses on an optimal strategy for predicting which NFL wide receivers will have the best fantasy football season using data available prior to the beginning of the season.</a:t>
+            </a:r>
+          </a:p>
+          <a:p>
+            <a:pPr algn="just"/>
+            <a:endParaRPr lang="en-US" sz="2000" dirty="0">
               <a:latin typeface="+mn-lt"/>
-              <a:cs typeface=""/>
             </a:endParaRPr>
           </a:p>
           <a:p>
             <a:pPr algn="just"/>
             <a:r>
-              <a:rPr lang="en-US" sz="2000">
+              <a:rPr lang="en-US" sz="2000" b="1" dirty="0">
                 <a:latin typeface="+mn-lt"/>
-                <a:cs typeface=""/>
               </a:rPr>
-              <a:t>Wide receiver is the deepest position in fantasy football. Choosing quality wide receivers with confidence on draft day will allow more chances to be taken on the more injury prone or risky position picks such as running backs and quarterbacks.</a:t>
+              <a:t>Goal</a:t>
+            </a:r>
+          </a:p>
+          <a:p>
+            <a:pPr algn="just"/>
+            <a:r>
+              <a:rPr lang="en-US" sz="2000" dirty="0">
+                <a:latin typeface="+mn-lt"/>
+              </a:rPr>
+              <a:t>Prediction of NFL receivers’ end of season fantasy point ranking.</a:t>
             </a:r>
           </a:p>
         </p:txBody>
@@ -11035,7 +11052,1259 @@
         </p:nvSpPr>
         <p:spPr>
           <a:xfrm>
-            <a:off x="888999" y="17799267"/>
+            <a:off x="898186" y="17799860"/>
+            <a:ext cx="8166101" cy="707886"/>
+          </a:xfrm>
+          <a:prstGeom prst="rect">
+            <a:avLst/>
+          </a:prstGeom>
+          <a:noFill/>
+        </p:spPr>
+        <p:txBody>
+          <a:bodyPr wrap="square" rtlCol="0">
+            <a:spAutoFit/>
+          </a:bodyPr>
+          <a:lstStyle/>
+          <a:p>
+            <a:pPr algn="just"/>
+            <a:r>
+              <a:rPr lang="en-US" sz="2000" dirty="0">
+                <a:latin typeface="+mn-lt"/>
+                <a:cs typeface=""/>
+              </a:rPr>
+              <a:t>The following key statistics were gathered for every single active wide receiver in the NFL from 2007 until 2012.</a:t>
+            </a:r>
+          </a:p>
+        </p:txBody>
+      </p:sp>
+      <p:pic>
+        <p:nvPicPr>
+          <p:cNvPr id="22" name="Picture 21" descr="top30_lin_reg_all_feat.eps.png"/>
+          <p:cNvPicPr>
+            <a:picLocks noChangeAspect="1"/>
+          </p:cNvPicPr>
+          <p:nvPr/>
+        </p:nvPicPr>
+        <p:blipFill>
+          <a:blip r:embed="rId10"/>
+          <a:stretch>
+            <a:fillRect/>
+          </a:stretch>
+        </p:blipFill>
+        <p:spPr>
+          <a:xfrm>
+            <a:off x="600075" y="6613746"/>
+            <a:ext cx="8718213" cy="4067375"/>
+          </a:xfrm>
+          <a:prstGeom prst="rect">
+            <a:avLst/>
+          </a:prstGeom>
+        </p:spPr>
+      </p:pic>
+      <p:sp>
+        <p:nvSpPr>
+          <p:cNvPr id="44" name="TextBox 43"/>
+          <p:cNvSpPr txBox="1"/>
+          <p:nvPr/>
+        </p:nvSpPr>
+        <p:spPr>
+          <a:xfrm>
+            <a:off x="888463" y="10617621"/>
+            <a:ext cx="8150942" cy="584776"/>
+          </a:xfrm>
+          <a:prstGeom prst="rect">
+            <a:avLst/>
+          </a:prstGeom>
+          <a:noFill/>
+        </p:spPr>
+        <p:txBody>
+          <a:bodyPr wrap="square" rtlCol="0">
+            <a:spAutoFit/>
+          </a:bodyPr>
+          <a:lstStyle/>
+          <a:p>
+            <a:pPr algn="ctr"/>
+            <a:r>
+              <a:rPr lang="en-US" sz="1600" dirty="0"/>
+              <a:t>Figure 1: Total end-of-year fantasy points scored by ESPN / Yahoo’s preseason top 30, compared to the actual top 30 and the featured reduced linear regression algorithm. This shows that ranking is very difficult.</a:t>
+            </a:r>
+          </a:p>
+        </p:txBody>
+      </p:sp>
+      <p:graphicFrame>
+        <p:nvGraphicFramePr>
+          <p:cNvPr id="46" name="Table 45"/>
+          <p:cNvGraphicFramePr>
+            <a:graphicFrameLocks noGrp="1"/>
+          </p:cNvGraphicFramePr>
+          <p:nvPr/>
+        </p:nvGraphicFramePr>
+        <p:xfrm>
+          <a:off x="2101704" y="19000010"/>
+          <a:ext cx="5973233" cy="3589924"/>
+        </p:xfrm>
+        <a:graphic>
+          <a:graphicData uri="http://schemas.openxmlformats.org/drawingml/2006/table">
+            <a:tbl>
+              <a:tblPr firstRow="1" bandRow="1">
+                <a:tableStyleId>{BDBED569-4797-4DF1-A0F4-6AAB3CD982D8}</a:tableStyleId>
+              </a:tblPr>
+              <a:tblGrid>
+                <a:gridCol w="5973233"/>
+              </a:tblGrid>
+              <a:tr h="276148">
+                <a:tc>
+                  <a:txBody>
+                    <a:bodyPr/>
+                    <a:lstStyle/>
+                    <a:p>
+                      <a:pPr marL="0" marR="0" indent="0" algn="l" defTabSz="457105" rtl="0" eaLnBrk="1" fontAlgn="auto" latinLnBrk="0" hangingPunct="1">
+                        <a:lnSpc>
+                          <a:spcPct val="100000"/>
+                        </a:lnSpc>
+                        <a:spcBef>
+                          <a:spcPts val="0"/>
+                        </a:spcBef>
+                        <a:spcAft>
+                          <a:spcPts val="0"/>
+                        </a:spcAft>
+                        <a:buClrTx/>
+                        <a:buSzTx/>
+                        <a:buFontTx/>
+                        <a:buNone/>
+                        <a:tabLst/>
+                        <a:defRPr/>
+                      </a:pPr>
+                      <a:r>
+                        <a:rPr lang="en-US" sz="1400" b="1" dirty="0">
+                          <a:latin typeface="+mn-lt"/>
+                          <a:cs typeface=""/>
+                        </a:rPr>
+                        <a:t>Receiving Yards</a:t>
+                      </a:r>
+                    </a:p>
+                  </a:txBody>
+                  <a:tcPr marT="9144" marB="9144">
+                    <a:lnL w="12700" cap="flat" cmpd="sng" algn="ctr">
+                      <a:solidFill>
+                        <a:srgbClr val="000000"/>
+                      </a:solidFill>
+                      <a:prstDash val="solid"/>
+                      <a:round/>
+                      <a:headEnd type="none" w="med" len="med"/>
+                      <a:tailEnd type="none" w="med" len="med"/>
+                    </a:lnL>
+                    <a:lnR w="12700" cap="flat" cmpd="sng" algn="ctr">
+                      <a:solidFill>
+                        <a:srgbClr val="000000"/>
+                      </a:solidFill>
+                      <a:prstDash val="solid"/>
+                      <a:round/>
+                      <a:headEnd type="none" w="med" len="med"/>
+                      <a:tailEnd type="none" w="med" len="med"/>
+                    </a:lnR>
+                    <a:lnT w="12700" cap="flat" cmpd="sng" algn="ctr">
+                      <a:solidFill>
+                        <a:srgbClr val="000000"/>
+                      </a:solidFill>
+                      <a:prstDash val="solid"/>
+                      <a:round/>
+                      <a:headEnd type="none" w="med" len="med"/>
+                      <a:tailEnd type="none" w="med" len="med"/>
+                    </a:lnT>
+                    <a:lnB w="12700" cap="flat" cmpd="sng" algn="ctr">
+                      <a:solidFill>
+                        <a:srgbClr val="000000"/>
+                      </a:solidFill>
+                      <a:prstDash val="solid"/>
+                      <a:round/>
+                      <a:headEnd type="none" w="med" len="med"/>
+                      <a:tailEnd type="none" w="med" len="med"/>
+                    </a:lnB>
+                    <a:noFill/>
+                  </a:tcPr>
+                </a:tc>
+              </a:tr>
+              <a:tr h="276148">
+                <a:tc>
+                  <a:txBody>
+                    <a:bodyPr/>
+                    <a:lstStyle/>
+                    <a:p>
+                      <a:pPr marL="0" marR="0" indent="0" algn="l" defTabSz="457105" rtl="0" eaLnBrk="1" fontAlgn="auto" latinLnBrk="0" hangingPunct="1">
+                        <a:lnSpc>
+                          <a:spcPct val="100000"/>
+                        </a:lnSpc>
+                        <a:spcBef>
+                          <a:spcPts val="0"/>
+                        </a:spcBef>
+                        <a:spcAft>
+                          <a:spcPts val="0"/>
+                        </a:spcAft>
+                        <a:buClrTx/>
+                        <a:buSzTx/>
+                        <a:buFontTx/>
+                        <a:buNone/>
+                        <a:tabLst/>
+                        <a:defRPr/>
+                      </a:pPr>
+                      <a:r>
+                        <a:rPr lang="en-US" sz="1400" b="1" dirty="0">
+                          <a:latin typeface="+mn-lt"/>
+                          <a:cs typeface=""/>
+                        </a:rPr>
+                        <a:t>Receiving Touchdowns</a:t>
+                      </a:r>
+                      <a:endParaRPr lang="en-US" sz="1400" dirty="0">
+                        <a:latin typeface="+mn-lt"/>
+                        <a:cs typeface=""/>
+                      </a:endParaRPr>
+                    </a:p>
+                  </a:txBody>
+                  <a:tcPr marT="9144" marB="9144">
+                    <a:lnL w="12700" cap="flat" cmpd="sng" algn="ctr">
+                      <a:solidFill>
+                        <a:srgbClr val="000000"/>
+                      </a:solidFill>
+                      <a:prstDash val="solid"/>
+                      <a:round/>
+                      <a:headEnd type="none" w="med" len="med"/>
+                      <a:tailEnd type="none" w="med" len="med"/>
+                    </a:lnL>
+                    <a:lnR w="12700" cap="flat" cmpd="sng" algn="ctr">
+                      <a:solidFill>
+                        <a:srgbClr val="000000"/>
+                      </a:solidFill>
+                      <a:prstDash val="solid"/>
+                      <a:round/>
+                      <a:headEnd type="none" w="med" len="med"/>
+                      <a:tailEnd type="none" w="med" len="med"/>
+                    </a:lnR>
+                    <a:lnT w="12700" cap="flat" cmpd="sng" algn="ctr">
+                      <a:solidFill>
+                        <a:srgbClr val="000000"/>
+                      </a:solidFill>
+                      <a:prstDash val="solid"/>
+                      <a:round/>
+                      <a:headEnd type="none" w="med" len="med"/>
+                      <a:tailEnd type="none" w="med" len="med"/>
+                    </a:lnT>
+                    <a:lnB w="12700" cap="flat" cmpd="sng" algn="ctr">
+                      <a:solidFill>
+                        <a:srgbClr val="000000"/>
+                      </a:solidFill>
+                      <a:prstDash val="solid"/>
+                      <a:round/>
+                      <a:headEnd type="none" w="med" len="med"/>
+                      <a:tailEnd type="none" w="med" len="med"/>
+                    </a:lnB>
+                    <a:noFill/>
+                  </a:tcPr>
+                </a:tc>
+              </a:tr>
+              <a:tr h="276148">
+                <a:tc>
+                  <a:txBody>
+                    <a:bodyPr/>
+                    <a:lstStyle/>
+                    <a:p>
+                      <a:pPr marL="0" marR="0" indent="0" algn="l" defTabSz="457105" rtl="0" eaLnBrk="1" fontAlgn="auto" latinLnBrk="0" hangingPunct="1">
+                        <a:lnSpc>
+                          <a:spcPct val="100000"/>
+                        </a:lnSpc>
+                        <a:spcBef>
+                          <a:spcPts val="0"/>
+                        </a:spcBef>
+                        <a:spcAft>
+                          <a:spcPts val="0"/>
+                        </a:spcAft>
+                        <a:buClrTx/>
+                        <a:buSzTx/>
+                        <a:buFontTx/>
+                        <a:buNone/>
+                        <a:tabLst/>
+                        <a:defRPr/>
+                      </a:pPr>
+                      <a:r>
+                        <a:rPr lang="en-US" sz="1400" b="1" dirty="0">
+                          <a:latin typeface="+mn-lt"/>
+                          <a:cs typeface=""/>
+                        </a:rPr>
+                        <a:t>Receiving Targets</a:t>
+                      </a:r>
+                    </a:p>
+                  </a:txBody>
+                  <a:tcPr marT="9144" marB="9144">
+                    <a:lnL w="12700" cap="flat" cmpd="sng" algn="ctr">
+                      <a:solidFill>
+                        <a:srgbClr val="000000"/>
+                      </a:solidFill>
+                      <a:prstDash val="solid"/>
+                      <a:round/>
+                      <a:headEnd type="none" w="med" len="med"/>
+                      <a:tailEnd type="none" w="med" len="med"/>
+                    </a:lnL>
+                    <a:lnR w="12700" cap="flat" cmpd="sng" algn="ctr">
+                      <a:solidFill>
+                        <a:srgbClr val="000000"/>
+                      </a:solidFill>
+                      <a:prstDash val="solid"/>
+                      <a:round/>
+                      <a:headEnd type="none" w="med" len="med"/>
+                      <a:tailEnd type="none" w="med" len="med"/>
+                    </a:lnR>
+                    <a:lnT w="12700" cap="flat" cmpd="sng" algn="ctr">
+                      <a:solidFill>
+                        <a:srgbClr val="000000"/>
+                      </a:solidFill>
+                      <a:prstDash val="solid"/>
+                      <a:round/>
+                      <a:headEnd type="none" w="med" len="med"/>
+                      <a:tailEnd type="none" w="med" len="med"/>
+                    </a:lnT>
+                    <a:lnB w="12700" cap="flat" cmpd="sng" algn="ctr">
+                      <a:solidFill>
+                        <a:srgbClr val="000000"/>
+                      </a:solidFill>
+                      <a:prstDash val="solid"/>
+                      <a:round/>
+                      <a:headEnd type="none" w="med" len="med"/>
+                      <a:tailEnd type="none" w="med" len="med"/>
+                    </a:lnB>
+                    <a:noFill/>
+                  </a:tcPr>
+                </a:tc>
+              </a:tr>
+              <a:tr h="276148">
+                <a:tc>
+                  <a:txBody>
+                    <a:bodyPr/>
+                    <a:lstStyle/>
+                    <a:p>
+                      <a:pPr marL="0" marR="0" indent="0" algn="l" defTabSz="457105" rtl="0" eaLnBrk="1" fontAlgn="auto" latinLnBrk="0" hangingPunct="1">
+                        <a:lnSpc>
+                          <a:spcPct val="100000"/>
+                        </a:lnSpc>
+                        <a:spcBef>
+                          <a:spcPts val="0"/>
+                        </a:spcBef>
+                        <a:spcAft>
+                          <a:spcPts val="0"/>
+                        </a:spcAft>
+                        <a:buClrTx/>
+                        <a:buSzTx/>
+                        <a:buFontTx/>
+                        <a:buNone/>
+                        <a:tabLst/>
+                        <a:defRPr/>
+                      </a:pPr>
+                      <a:r>
+                        <a:rPr lang="en-US" sz="1400" b="1" dirty="0">
+                          <a:latin typeface="+mn-lt"/>
+                          <a:cs typeface=""/>
+                        </a:rPr>
+                        <a:t>Receiving Catches</a:t>
+                      </a:r>
+                    </a:p>
+                  </a:txBody>
+                  <a:tcPr marT="9144" marB="9144">
+                    <a:lnL w="12700" cap="flat" cmpd="sng" algn="ctr">
+                      <a:solidFill>
+                        <a:srgbClr val="000000"/>
+                      </a:solidFill>
+                      <a:prstDash val="solid"/>
+                      <a:round/>
+                      <a:headEnd type="none" w="med" len="med"/>
+                      <a:tailEnd type="none" w="med" len="med"/>
+                    </a:lnL>
+                    <a:lnR w="12700" cap="flat" cmpd="sng" algn="ctr">
+                      <a:solidFill>
+                        <a:srgbClr val="000000"/>
+                      </a:solidFill>
+                      <a:prstDash val="solid"/>
+                      <a:round/>
+                      <a:headEnd type="none" w="med" len="med"/>
+                      <a:tailEnd type="none" w="med" len="med"/>
+                    </a:lnR>
+                    <a:lnT w="12700" cap="flat" cmpd="sng" algn="ctr">
+                      <a:solidFill>
+                        <a:srgbClr val="000000"/>
+                      </a:solidFill>
+                      <a:prstDash val="solid"/>
+                      <a:round/>
+                      <a:headEnd type="none" w="med" len="med"/>
+                      <a:tailEnd type="none" w="med" len="med"/>
+                    </a:lnT>
+                    <a:lnB w="12700" cap="flat" cmpd="sng" algn="ctr">
+                      <a:solidFill>
+                        <a:srgbClr val="000000"/>
+                      </a:solidFill>
+                      <a:prstDash val="solid"/>
+                      <a:round/>
+                      <a:headEnd type="none" w="med" len="med"/>
+                      <a:tailEnd type="none" w="med" len="med"/>
+                    </a:lnB>
+                    <a:noFill/>
+                  </a:tcPr>
+                </a:tc>
+              </a:tr>
+              <a:tr h="276148">
+                <a:tc>
+                  <a:txBody>
+                    <a:bodyPr/>
+                    <a:lstStyle/>
+                    <a:p>
+                      <a:pPr marL="0" marR="0" indent="0" algn="l" defTabSz="457105" rtl="0" eaLnBrk="1" fontAlgn="auto" latinLnBrk="0" hangingPunct="1">
+                        <a:lnSpc>
+                          <a:spcPct val="100000"/>
+                        </a:lnSpc>
+                        <a:spcBef>
+                          <a:spcPts val="0"/>
+                        </a:spcBef>
+                        <a:spcAft>
+                          <a:spcPts val="0"/>
+                        </a:spcAft>
+                        <a:buClrTx/>
+                        <a:buSzTx/>
+                        <a:buFontTx/>
+                        <a:buNone/>
+                        <a:tabLst/>
+                        <a:defRPr/>
+                      </a:pPr>
+                      <a:r>
+                        <a:rPr lang="en-US" sz="1400" b="1" dirty="0">
+                          <a:latin typeface="+mn-lt"/>
+                          <a:cs typeface=""/>
+                        </a:rPr>
+                        <a:t>ESPN Preseason Ranking</a:t>
+                      </a:r>
+                    </a:p>
+                  </a:txBody>
+                  <a:tcPr marT="9144" marB="9144">
+                    <a:lnL w="12700" cap="flat" cmpd="sng" algn="ctr">
+                      <a:solidFill>
+                        <a:srgbClr val="000000"/>
+                      </a:solidFill>
+                      <a:prstDash val="solid"/>
+                      <a:round/>
+                      <a:headEnd type="none" w="med" len="med"/>
+                      <a:tailEnd type="none" w="med" len="med"/>
+                    </a:lnL>
+                    <a:lnR w="12700" cap="flat" cmpd="sng" algn="ctr">
+                      <a:solidFill>
+                        <a:srgbClr val="000000"/>
+                      </a:solidFill>
+                      <a:prstDash val="solid"/>
+                      <a:round/>
+                      <a:headEnd type="none" w="med" len="med"/>
+                      <a:tailEnd type="none" w="med" len="med"/>
+                    </a:lnR>
+                    <a:lnT w="12700" cap="flat" cmpd="sng" algn="ctr">
+                      <a:solidFill>
+                        <a:srgbClr val="000000"/>
+                      </a:solidFill>
+                      <a:prstDash val="solid"/>
+                      <a:round/>
+                      <a:headEnd type="none" w="med" len="med"/>
+                      <a:tailEnd type="none" w="med" len="med"/>
+                    </a:lnT>
+                    <a:lnB w="12700" cap="flat" cmpd="sng" algn="ctr">
+                      <a:solidFill>
+                        <a:srgbClr val="000000"/>
+                      </a:solidFill>
+                      <a:prstDash val="solid"/>
+                      <a:round/>
+                      <a:headEnd type="none" w="med" len="med"/>
+                      <a:tailEnd type="none" w="med" len="med"/>
+                    </a:lnB>
+                    <a:noFill/>
+                  </a:tcPr>
+                </a:tc>
+              </a:tr>
+              <a:tr h="276148">
+                <a:tc>
+                  <a:txBody>
+                    <a:bodyPr/>
+                    <a:lstStyle/>
+                    <a:p>
+                      <a:pPr marL="0" marR="0" indent="0" algn="l" defTabSz="457105" rtl="0" eaLnBrk="1" fontAlgn="auto" latinLnBrk="0" hangingPunct="1">
+                        <a:lnSpc>
+                          <a:spcPct val="100000"/>
+                        </a:lnSpc>
+                        <a:spcBef>
+                          <a:spcPts val="0"/>
+                        </a:spcBef>
+                        <a:spcAft>
+                          <a:spcPts val="0"/>
+                        </a:spcAft>
+                        <a:buClrTx/>
+                        <a:buSzTx/>
+                        <a:buFontTx/>
+                        <a:buNone/>
+                        <a:tabLst/>
+                        <a:defRPr/>
+                      </a:pPr>
+                      <a:r>
+                        <a:rPr lang="en-US" sz="1400" b="1" dirty="0">
+                          <a:latin typeface="+mn-lt"/>
+                          <a:cs typeface=""/>
+                        </a:rPr>
+                        <a:t>Yahoo Preseason Ranking</a:t>
+                      </a:r>
+                      <a:endParaRPr lang="en-US" sz="1400" dirty="0">
+                        <a:latin typeface="+mn-lt"/>
+                        <a:cs typeface=""/>
+                      </a:endParaRPr>
+                    </a:p>
+                  </a:txBody>
+                  <a:tcPr marT="9144" marB="9144">
+                    <a:lnL w="12700" cap="flat" cmpd="sng" algn="ctr">
+                      <a:solidFill>
+                        <a:srgbClr val="000000"/>
+                      </a:solidFill>
+                      <a:prstDash val="solid"/>
+                      <a:round/>
+                      <a:headEnd type="none" w="med" len="med"/>
+                      <a:tailEnd type="none" w="med" len="med"/>
+                    </a:lnL>
+                    <a:lnR w="12700" cap="flat" cmpd="sng" algn="ctr">
+                      <a:solidFill>
+                        <a:srgbClr val="000000"/>
+                      </a:solidFill>
+                      <a:prstDash val="solid"/>
+                      <a:round/>
+                      <a:headEnd type="none" w="med" len="med"/>
+                      <a:tailEnd type="none" w="med" len="med"/>
+                    </a:lnR>
+                    <a:lnT w="12700" cap="flat" cmpd="sng" algn="ctr">
+                      <a:solidFill>
+                        <a:srgbClr val="000000"/>
+                      </a:solidFill>
+                      <a:prstDash val="solid"/>
+                      <a:round/>
+                      <a:headEnd type="none" w="med" len="med"/>
+                      <a:tailEnd type="none" w="med" len="med"/>
+                    </a:lnT>
+                    <a:lnB w="12700" cap="flat" cmpd="sng" algn="ctr">
+                      <a:solidFill>
+                        <a:srgbClr val="000000"/>
+                      </a:solidFill>
+                      <a:prstDash val="solid"/>
+                      <a:round/>
+                      <a:headEnd type="none" w="med" len="med"/>
+                      <a:tailEnd type="none" w="med" len="med"/>
+                    </a:lnB>
+                    <a:noFill/>
+                  </a:tcPr>
+                </a:tc>
+              </a:tr>
+              <a:tr h="276148">
+                <a:tc>
+                  <a:txBody>
+                    <a:bodyPr/>
+                    <a:lstStyle/>
+                    <a:p>
+                      <a:pPr marL="0" marR="0" indent="0" algn="l" defTabSz="457105" rtl="0" eaLnBrk="1" fontAlgn="auto" latinLnBrk="0" hangingPunct="1">
+                        <a:lnSpc>
+                          <a:spcPct val="100000"/>
+                        </a:lnSpc>
+                        <a:spcBef>
+                          <a:spcPts val="0"/>
+                        </a:spcBef>
+                        <a:spcAft>
+                          <a:spcPts val="0"/>
+                        </a:spcAft>
+                        <a:buClrTx/>
+                        <a:buSzTx/>
+                        <a:buFontTx/>
+                        <a:buNone/>
+                        <a:tabLst/>
+                        <a:defRPr/>
+                      </a:pPr>
+                      <a:r>
+                        <a:rPr lang="en-US" sz="1400" b="1" dirty="0">
+                          <a:latin typeface="+mn-lt"/>
+                          <a:cs typeface=""/>
+                        </a:rPr>
+                        <a:t>Δ 1 year Receiving Yards</a:t>
+                      </a:r>
+                      <a:r>
+                        <a:rPr lang="en-US" sz="1400" dirty="0">
+                          <a:latin typeface="+mn-lt"/>
+                          <a:cs typeface=""/>
+                        </a:rPr>
+                        <a:t>: (Yards in year Y-1) – (Yards in year Y-2)</a:t>
+                      </a:r>
+                    </a:p>
+                  </a:txBody>
+                  <a:tcPr marT="9144" marB="9144">
+                    <a:lnL w="12700" cap="flat" cmpd="sng" algn="ctr">
+                      <a:solidFill>
+                        <a:srgbClr val="000000"/>
+                      </a:solidFill>
+                      <a:prstDash val="solid"/>
+                      <a:round/>
+                      <a:headEnd type="none" w="med" len="med"/>
+                      <a:tailEnd type="none" w="med" len="med"/>
+                    </a:lnL>
+                    <a:lnR w="12700" cap="flat" cmpd="sng" algn="ctr">
+                      <a:solidFill>
+                        <a:srgbClr val="000000"/>
+                      </a:solidFill>
+                      <a:prstDash val="solid"/>
+                      <a:round/>
+                      <a:headEnd type="none" w="med" len="med"/>
+                      <a:tailEnd type="none" w="med" len="med"/>
+                    </a:lnR>
+                    <a:lnT w="12700" cap="flat" cmpd="sng" algn="ctr">
+                      <a:solidFill>
+                        <a:srgbClr val="000000"/>
+                      </a:solidFill>
+                      <a:prstDash val="solid"/>
+                      <a:round/>
+                      <a:headEnd type="none" w="med" len="med"/>
+                      <a:tailEnd type="none" w="med" len="med"/>
+                    </a:lnT>
+                    <a:lnB w="12700" cap="flat" cmpd="sng" algn="ctr">
+                      <a:solidFill>
+                        <a:srgbClr val="000000"/>
+                      </a:solidFill>
+                      <a:prstDash val="solid"/>
+                      <a:round/>
+                      <a:headEnd type="none" w="med" len="med"/>
+                      <a:tailEnd type="none" w="med" len="med"/>
+                    </a:lnB>
+                    <a:noFill/>
+                  </a:tcPr>
+                </a:tc>
+              </a:tr>
+              <a:tr h="276148">
+                <a:tc>
+                  <a:txBody>
+                    <a:bodyPr/>
+                    <a:lstStyle/>
+                    <a:p>
+                      <a:pPr marL="0" marR="0" indent="0" algn="l" defTabSz="457105" rtl="0" eaLnBrk="1" fontAlgn="auto" latinLnBrk="0" hangingPunct="1">
+                        <a:lnSpc>
+                          <a:spcPct val="100000"/>
+                        </a:lnSpc>
+                        <a:spcBef>
+                          <a:spcPts val="0"/>
+                        </a:spcBef>
+                        <a:spcAft>
+                          <a:spcPts val="0"/>
+                        </a:spcAft>
+                        <a:buClrTx/>
+                        <a:buSzTx/>
+                        <a:buFontTx/>
+                        <a:buNone/>
+                        <a:tabLst/>
+                        <a:defRPr/>
+                      </a:pPr>
+                      <a:r>
+                        <a:rPr lang="en-US" sz="1400" b="1" dirty="0">
+                          <a:latin typeface="+mn-lt"/>
+                          <a:cs typeface=""/>
+                        </a:rPr>
+                        <a:t>Δ 1 year Receiving TDs</a:t>
+                      </a:r>
+                      <a:r>
+                        <a:rPr lang="en-US" sz="1400" dirty="0">
+                          <a:latin typeface="+mn-lt"/>
+                          <a:cs typeface=""/>
+                        </a:rPr>
+                        <a:t>: (TDs in year Y-1) – (TDs in year Y-2)</a:t>
+                      </a:r>
+                    </a:p>
+                  </a:txBody>
+                  <a:tcPr marT="9144" marB="9144">
+                    <a:lnL w="12700" cap="flat" cmpd="sng" algn="ctr">
+                      <a:solidFill>
+                        <a:srgbClr val="000000"/>
+                      </a:solidFill>
+                      <a:prstDash val="solid"/>
+                      <a:round/>
+                      <a:headEnd type="none" w="med" len="med"/>
+                      <a:tailEnd type="none" w="med" len="med"/>
+                    </a:lnL>
+                    <a:lnR w="12700" cap="flat" cmpd="sng" algn="ctr">
+                      <a:solidFill>
+                        <a:srgbClr val="000000"/>
+                      </a:solidFill>
+                      <a:prstDash val="solid"/>
+                      <a:round/>
+                      <a:headEnd type="none" w="med" len="med"/>
+                      <a:tailEnd type="none" w="med" len="med"/>
+                    </a:lnR>
+                    <a:lnT w="12700" cap="flat" cmpd="sng" algn="ctr">
+                      <a:solidFill>
+                        <a:srgbClr val="000000"/>
+                      </a:solidFill>
+                      <a:prstDash val="solid"/>
+                      <a:round/>
+                      <a:headEnd type="none" w="med" len="med"/>
+                      <a:tailEnd type="none" w="med" len="med"/>
+                    </a:lnT>
+                    <a:lnB w="12700" cap="flat" cmpd="sng" algn="ctr">
+                      <a:solidFill>
+                        <a:srgbClr val="000000"/>
+                      </a:solidFill>
+                      <a:prstDash val="solid"/>
+                      <a:round/>
+                      <a:headEnd type="none" w="med" len="med"/>
+                      <a:tailEnd type="none" w="med" len="med"/>
+                    </a:lnB>
+                    <a:noFill/>
+                  </a:tcPr>
+                </a:tc>
+              </a:tr>
+              <a:tr h="276148">
+                <a:tc>
+                  <a:txBody>
+                    <a:bodyPr/>
+                    <a:lstStyle/>
+                    <a:p>
+                      <a:pPr marL="0" marR="0" indent="0" algn="l" defTabSz="457105" rtl="0" eaLnBrk="1" fontAlgn="auto" latinLnBrk="0" hangingPunct="1">
+                        <a:lnSpc>
+                          <a:spcPct val="100000"/>
+                        </a:lnSpc>
+                        <a:spcBef>
+                          <a:spcPts val="0"/>
+                        </a:spcBef>
+                        <a:spcAft>
+                          <a:spcPts val="0"/>
+                        </a:spcAft>
+                        <a:buClrTx/>
+                        <a:buSzTx/>
+                        <a:buFontTx/>
+                        <a:buNone/>
+                        <a:tabLst/>
+                        <a:defRPr/>
+                      </a:pPr>
+                      <a:r>
+                        <a:rPr lang="en-US" sz="1400" b="1" dirty="0">
+                          <a:latin typeface="+mn-lt"/>
+                          <a:cs typeface=""/>
+                        </a:rPr>
+                        <a:t>Δ 2 year Receiving Yards</a:t>
+                      </a:r>
+                      <a:r>
+                        <a:rPr lang="en-US" sz="1400" dirty="0">
+                          <a:latin typeface="+mn-lt"/>
+                          <a:cs typeface=""/>
+                        </a:rPr>
+                        <a:t>: (Yards in year Y-1) – (Yards in year Y-3)</a:t>
+                      </a:r>
+                    </a:p>
+                  </a:txBody>
+                  <a:tcPr marT="9144" marB="9144">
+                    <a:lnL w="12700" cap="flat" cmpd="sng" algn="ctr">
+                      <a:solidFill>
+                        <a:srgbClr val="000000"/>
+                      </a:solidFill>
+                      <a:prstDash val="solid"/>
+                      <a:round/>
+                      <a:headEnd type="none" w="med" len="med"/>
+                      <a:tailEnd type="none" w="med" len="med"/>
+                    </a:lnL>
+                    <a:lnR w="12700" cap="flat" cmpd="sng" algn="ctr">
+                      <a:solidFill>
+                        <a:srgbClr val="000000"/>
+                      </a:solidFill>
+                      <a:prstDash val="solid"/>
+                      <a:round/>
+                      <a:headEnd type="none" w="med" len="med"/>
+                      <a:tailEnd type="none" w="med" len="med"/>
+                    </a:lnR>
+                    <a:lnT w="12700" cap="flat" cmpd="sng" algn="ctr">
+                      <a:solidFill>
+                        <a:srgbClr val="000000"/>
+                      </a:solidFill>
+                      <a:prstDash val="solid"/>
+                      <a:round/>
+                      <a:headEnd type="none" w="med" len="med"/>
+                      <a:tailEnd type="none" w="med" len="med"/>
+                    </a:lnT>
+                    <a:lnB w="12700" cap="flat" cmpd="sng" algn="ctr">
+                      <a:solidFill>
+                        <a:srgbClr val="000000"/>
+                      </a:solidFill>
+                      <a:prstDash val="solid"/>
+                      <a:round/>
+                      <a:headEnd type="none" w="med" len="med"/>
+                      <a:tailEnd type="none" w="med" len="med"/>
+                    </a:lnB>
+                    <a:noFill/>
+                  </a:tcPr>
+                </a:tc>
+              </a:tr>
+              <a:tr h="276148">
+                <a:tc>
+                  <a:txBody>
+                    <a:bodyPr/>
+                    <a:lstStyle/>
+                    <a:p>
+                      <a:pPr marL="0" marR="0" indent="0" algn="l" defTabSz="457105" rtl="0" eaLnBrk="1" fontAlgn="auto" latinLnBrk="0" hangingPunct="1">
+                        <a:lnSpc>
+                          <a:spcPct val="100000"/>
+                        </a:lnSpc>
+                        <a:spcBef>
+                          <a:spcPts val="0"/>
+                        </a:spcBef>
+                        <a:spcAft>
+                          <a:spcPts val="0"/>
+                        </a:spcAft>
+                        <a:buClrTx/>
+                        <a:buSzTx/>
+                        <a:buFontTx/>
+                        <a:buNone/>
+                        <a:tabLst/>
+                        <a:defRPr/>
+                      </a:pPr>
+                      <a:r>
+                        <a:rPr lang="en-US" sz="1400" b="1" dirty="0">
+                          <a:latin typeface="+mn-lt"/>
+                          <a:cs typeface=""/>
+                        </a:rPr>
+                        <a:t>Δ 2 year Receiving TDs</a:t>
+                      </a:r>
+                      <a:r>
+                        <a:rPr lang="en-US" sz="1400" dirty="0">
+                          <a:latin typeface="+mn-lt"/>
+                          <a:cs typeface=""/>
+                        </a:rPr>
+                        <a:t>: (TDs in year Y-1) – (TDs in year Y-3)</a:t>
+                      </a:r>
+                      <a:endParaRPr lang="en-US" sz="1400" b="1" dirty="0">
+                        <a:latin typeface="+mn-lt"/>
+                        <a:cs typeface=""/>
+                      </a:endParaRPr>
+                    </a:p>
+                  </a:txBody>
+                  <a:tcPr marT="9144" marB="9144">
+                    <a:lnL w="12700" cap="flat" cmpd="sng" algn="ctr">
+                      <a:solidFill>
+                        <a:srgbClr val="000000"/>
+                      </a:solidFill>
+                      <a:prstDash val="solid"/>
+                      <a:round/>
+                      <a:headEnd type="none" w="med" len="med"/>
+                      <a:tailEnd type="none" w="med" len="med"/>
+                    </a:lnL>
+                    <a:lnR w="12700" cap="flat" cmpd="sng" algn="ctr">
+                      <a:solidFill>
+                        <a:srgbClr val="000000"/>
+                      </a:solidFill>
+                      <a:prstDash val="solid"/>
+                      <a:round/>
+                      <a:headEnd type="none" w="med" len="med"/>
+                      <a:tailEnd type="none" w="med" len="med"/>
+                    </a:lnR>
+                    <a:lnT w="12700" cap="flat" cmpd="sng" algn="ctr">
+                      <a:solidFill>
+                        <a:srgbClr val="000000"/>
+                      </a:solidFill>
+                      <a:prstDash val="solid"/>
+                      <a:round/>
+                      <a:headEnd type="none" w="med" len="med"/>
+                      <a:tailEnd type="none" w="med" len="med"/>
+                    </a:lnT>
+                    <a:lnB w="12700" cap="flat" cmpd="sng" algn="ctr">
+                      <a:solidFill>
+                        <a:srgbClr val="000000"/>
+                      </a:solidFill>
+                      <a:prstDash val="solid"/>
+                      <a:round/>
+                      <a:headEnd type="none" w="med" len="med"/>
+                      <a:tailEnd type="none" w="med" len="med"/>
+                    </a:lnB>
+                    <a:noFill/>
+                  </a:tcPr>
+                </a:tc>
+              </a:tr>
+              <a:tr h="276148">
+                <a:tc>
+                  <a:txBody>
+                    <a:bodyPr/>
+                    <a:lstStyle/>
+                    <a:p>
+                      <a:pPr marL="0" marR="0" indent="0" algn="l" defTabSz="457105" rtl="0" eaLnBrk="1" fontAlgn="auto" latinLnBrk="0" hangingPunct="1">
+                        <a:lnSpc>
+                          <a:spcPct val="100000"/>
+                        </a:lnSpc>
+                        <a:spcBef>
+                          <a:spcPts val="0"/>
+                        </a:spcBef>
+                        <a:spcAft>
+                          <a:spcPts val="0"/>
+                        </a:spcAft>
+                        <a:buClrTx/>
+                        <a:buSzTx/>
+                        <a:buFontTx/>
+                        <a:buNone/>
+                        <a:tabLst/>
+                        <a:defRPr/>
+                      </a:pPr>
+                      <a:r>
+                        <a:rPr lang="en-US" sz="1400" b="1" dirty="0">
+                          <a:latin typeface="+mn-lt"/>
+                          <a:cs typeface=""/>
+                        </a:rPr>
+                        <a:t>Δ 3 year Receiving Yards</a:t>
+                      </a:r>
+                      <a:r>
+                        <a:rPr lang="en-US" sz="1400" dirty="0">
+                          <a:latin typeface="+mn-lt"/>
+                          <a:cs typeface=""/>
+                        </a:rPr>
+                        <a:t>: (Yards in year Y-1) – (Yards in year Y-4)</a:t>
+                      </a:r>
+                    </a:p>
+                  </a:txBody>
+                  <a:tcPr marT="9144" marB="9144">
+                    <a:lnL w="12700" cap="flat" cmpd="sng" algn="ctr">
+                      <a:solidFill>
+                        <a:srgbClr val="000000"/>
+                      </a:solidFill>
+                      <a:prstDash val="solid"/>
+                      <a:round/>
+                      <a:headEnd type="none" w="med" len="med"/>
+                      <a:tailEnd type="none" w="med" len="med"/>
+                    </a:lnL>
+                    <a:lnR w="12700" cap="flat" cmpd="sng" algn="ctr">
+                      <a:solidFill>
+                        <a:srgbClr val="000000"/>
+                      </a:solidFill>
+                      <a:prstDash val="solid"/>
+                      <a:round/>
+                      <a:headEnd type="none" w="med" len="med"/>
+                      <a:tailEnd type="none" w="med" len="med"/>
+                    </a:lnR>
+                    <a:lnT w="12700" cap="flat" cmpd="sng" algn="ctr">
+                      <a:solidFill>
+                        <a:srgbClr val="000000"/>
+                      </a:solidFill>
+                      <a:prstDash val="solid"/>
+                      <a:round/>
+                      <a:headEnd type="none" w="med" len="med"/>
+                      <a:tailEnd type="none" w="med" len="med"/>
+                    </a:lnT>
+                    <a:lnB w="12700" cap="flat" cmpd="sng" algn="ctr">
+                      <a:solidFill>
+                        <a:srgbClr val="000000"/>
+                      </a:solidFill>
+                      <a:prstDash val="solid"/>
+                      <a:round/>
+                      <a:headEnd type="none" w="med" len="med"/>
+                      <a:tailEnd type="none" w="med" len="med"/>
+                    </a:lnB>
+                    <a:noFill/>
+                  </a:tcPr>
+                </a:tc>
+              </a:tr>
+              <a:tr h="276148">
+                <a:tc>
+                  <a:txBody>
+                    <a:bodyPr/>
+                    <a:lstStyle/>
+                    <a:p>
+                      <a:pPr marL="0" marR="0" indent="0" algn="l" defTabSz="457105" rtl="0" eaLnBrk="1" fontAlgn="auto" latinLnBrk="0" hangingPunct="1">
+                        <a:lnSpc>
+                          <a:spcPct val="100000"/>
+                        </a:lnSpc>
+                        <a:spcBef>
+                          <a:spcPts val="0"/>
+                        </a:spcBef>
+                        <a:spcAft>
+                          <a:spcPts val="0"/>
+                        </a:spcAft>
+                        <a:buClrTx/>
+                        <a:buSzTx/>
+                        <a:buFontTx/>
+                        <a:buNone/>
+                        <a:tabLst/>
+                        <a:defRPr/>
+                      </a:pPr>
+                      <a:r>
+                        <a:rPr lang="en-US" sz="1400" b="1" dirty="0">
+                          <a:latin typeface="+mn-lt"/>
+                          <a:cs typeface=""/>
+                        </a:rPr>
+                        <a:t>Δ 3 year Receiving TDs</a:t>
+                      </a:r>
+                      <a:r>
+                        <a:rPr lang="en-US" sz="1400" dirty="0">
+                          <a:latin typeface="+mn-lt"/>
+                          <a:cs typeface=""/>
+                        </a:rPr>
+                        <a:t>: (TDs in year Y-1) – (TDs in year Y-4)</a:t>
+                      </a:r>
+                    </a:p>
+                  </a:txBody>
+                  <a:tcPr marT="9144" marB="9144">
+                    <a:lnL w="12700" cap="flat" cmpd="sng" algn="ctr">
+                      <a:solidFill>
+                        <a:srgbClr val="000000"/>
+                      </a:solidFill>
+                      <a:prstDash val="solid"/>
+                      <a:round/>
+                      <a:headEnd type="none" w="med" len="med"/>
+                      <a:tailEnd type="none" w="med" len="med"/>
+                    </a:lnL>
+                    <a:lnR w="12700" cap="flat" cmpd="sng" algn="ctr">
+                      <a:solidFill>
+                        <a:srgbClr val="000000"/>
+                      </a:solidFill>
+                      <a:prstDash val="solid"/>
+                      <a:round/>
+                      <a:headEnd type="none" w="med" len="med"/>
+                      <a:tailEnd type="none" w="med" len="med"/>
+                    </a:lnR>
+                    <a:lnT w="12700" cap="flat" cmpd="sng" algn="ctr">
+                      <a:solidFill>
+                        <a:srgbClr val="000000"/>
+                      </a:solidFill>
+                      <a:prstDash val="solid"/>
+                      <a:round/>
+                      <a:headEnd type="none" w="med" len="med"/>
+                      <a:tailEnd type="none" w="med" len="med"/>
+                    </a:lnT>
+                    <a:lnB w="12700" cap="flat" cmpd="sng" algn="ctr">
+                      <a:solidFill>
+                        <a:srgbClr val="000000"/>
+                      </a:solidFill>
+                      <a:prstDash val="solid"/>
+                      <a:round/>
+                      <a:headEnd type="none" w="med" len="med"/>
+                      <a:tailEnd type="none" w="med" len="med"/>
+                    </a:lnB>
+                    <a:noFill/>
+                  </a:tcPr>
+                </a:tc>
+              </a:tr>
+              <a:tr h="276148">
+                <a:tc>
+                  <a:txBody>
+                    <a:bodyPr/>
+                    <a:lstStyle/>
+                    <a:p>
+                      <a:pPr marL="0" marR="0" indent="0" algn="l" defTabSz="457105" rtl="0" eaLnBrk="1" fontAlgn="auto" latinLnBrk="0" hangingPunct="1">
+                        <a:lnSpc>
+                          <a:spcPct val="100000"/>
+                        </a:lnSpc>
+                        <a:spcBef>
+                          <a:spcPts val="0"/>
+                        </a:spcBef>
+                        <a:spcAft>
+                          <a:spcPts val="0"/>
+                        </a:spcAft>
+                        <a:buClrTx/>
+                        <a:buSzTx/>
+                        <a:buFontTx/>
+                        <a:buNone/>
+                        <a:tabLst/>
+                        <a:defRPr/>
+                      </a:pPr>
+                      <a:r>
+                        <a:rPr lang="en-US" sz="1400" b="1" dirty="0">
+                          <a:latin typeface="+mn-lt"/>
+                          <a:cs typeface=""/>
+                        </a:rPr>
+                        <a:t>Fantasy Points in Previous Year</a:t>
+                      </a:r>
+                      <a:r>
+                        <a:rPr lang="en-US" sz="1400" dirty="0">
+                          <a:latin typeface="+mn-lt"/>
+                          <a:cs typeface=""/>
+                        </a:rPr>
+                        <a:t>: 6 </a:t>
+                      </a:r>
+                      <a:r>
+                        <a:rPr lang="en-US" sz="1400" dirty="0">
+                          <a:latin typeface="Wingdings"/>
+                          <a:ea typeface="Wingdings"/>
+                          <a:cs typeface="Wingdings"/>
+                        </a:rPr>
+                        <a:t></a:t>
+                      </a:r>
+                      <a:r>
+                        <a:rPr lang="en-US" sz="1400" dirty="0">
+                          <a:latin typeface="+mn-lt"/>
+                          <a:cs typeface=""/>
+                        </a:rPr>
+                        <a:t> TDs + 0.1 </a:t>
+                      </a:r>
+                      <a:r>
+                        <a:rPr lang="en-US" sz="1400" dirty="0">
+                          <a:latin typeface="Wingdings"/>
+                          <a:ea typeface="Wingdings"/>
+                          <a:cs typeface="Wingdings"/>
+                        </a:rPr>
+                        <a:t></a:t>
+                      </a:r>
+                      <a:r>
+                        <a:rPr lang="en-US" sz="1400" b="1" dirty="0">
+                          <a:latin typeface="+mn-lt"/>
+                          <a:cs typeface=""/>
+                        </a:rPr>
+                        <a:t> </a:t>
+                      </a:r>
+                      <a:r>
+                        <a:rPr lang="en-US" sz="1400" dirty="0">
+                          <a:latin typeface="+mn-lt"/>
+                          <a:cs typeface=""/>
+                        </a:rPr>
+                        <a:t>Yards</a:t>
+                      </a:r>
+                      <a:endParaRPr lang="en-US" sz="1400" b="1" dirty="0">
+                        <a:latin typeface="+mn-lt"/>
+                        <a:cs typeface=""/>
+                      </a:endParaRPr>
+                    </a:p>
+                  </a:txBody>
+                  <a:tcPr marT="9144" marB="9144">
+                    <a:lnL w="12700" cap="flat" cmpd="sng" algn="ctr">
+                      <a:solidFill>
+                        <a:srgbClr val="000000"/>
+                      </a:solidFill>
+                      <a:prstDash val="solid"/>
+                      <a:round/>
+                      <a:headEnd type="none" w="med" len="med"/>
+                      <a:tailEnd type="none" w="med" len="med"/>
+                    </a:lnL>
+                    <a:lnR w="12700" cap="flat" cmpd="sng" algn="ctr">
+                      <a:solidFill>
+                        <a:srgbClr val="000000"/>
+                      </a:solidFill>
+                      <a:prstDash val="solid"/>
+                      <a:round/>
+                      <a:headEnd type="none" w="med" len="med"/>
+                      <a:tailEnd type="none" w="med" len="med"/>
+                    </a:lnR>
+                    <a:lnT w="12700" cap="flat" cmpd="sng" algn="ctr">
+                      <a:solidFill>
+                        <a:srgbClr val="000000"/>
+                      </a:solidFill>
+                      <a:prstDash val="solid"/>
+                      <a:round/>
+                      <a:headEnd type="none" w="med" len="med"/>
+                      <a:tailEnd type="none" w="med" len="med"/>
+                    </a:lnT>
+                    <a:lnB w="12700" cap="flat" cmpd="sng" algn="ctr">
+                      <a:solidFill>
+                        <a:srgbClr val="000000"/>
+                      </a:solidFill>
+                      <a:prstDash val="solid"/>
+                      <a:round/>
+                      <a:headEnd type="none" w="med" len="med"/>
+                      <a:tailEnd type="none" w="med" len="med"/>
+                    </a:lnB>
+                    <a:noFill/>
+                  </a:tcPr>
+                </a:tc>
+              </a:tr>
+            </a:tbl>
+          </a:graphicData>
+        </a:graphic>
+      </p:graphicFrame>
+      <p:sp>
+        <p:nvSpPr>
+          <p:cNvPr id="48" name="TextBox 47"/>
+          <p:cNvSpPr txBox="1"/>
+          <p:nvPr/>
+        </p:nvSpPr>
+        <p:spPr>
+          <a:xfrm rot="16200000">
+            <a:off x="548164" y="20024895"/>
+            <a:ext cx="2583860" cy="523220"/>
+          </a:xfrm>
+          <a:prstGeom prst="rect">
+            <a:avLst/>
+          </a:prstGeom>
+          <a:noFill/>
+        </p:spPr>
+        <p:txBody>
+          <a:bodyPr wrap="none" rtlCol="0">
+            <a:spAutoFit/>
+          </a:bodyPr>
+          <a:lstStyle/>
+          <a:p>
+            <a:r>
+              <a:rPr lang="en-US" dirty="0">
+                <a:latin typeface="Wingdings"/>
+                <a:ea typeface="Wingdings"/>
+                <a:cs typeface="Wingdings"/>
+              </a:rPr>
+              <a:t></a:t>
+            </a:r>
+            <a:r>
+              <a:rPr lang="en-US" dirty="0">
+                <a:latin typeface="+mn-lt"/>
+                <a:ea typeface="Wingdings"/>
+                <a:cs typeface="Wingdings"/>
+              </a:rPr>
+              <a:t> </a:t>
+            </a:r>
+            <a:r>
+              <a:rPr lang="en-US" dirty="0">
+                <a:latin typeface="+mn-lt"/>
+              </a:rPr>
+              <a:t>13 Features</a:t>
+            </a:r>
+          </a:p>
+        </p:txBody>
+      </p:sp>
+      <p:sp>
+        <p:nvSpPr>
+          <p:cNvPr id="50" name="TextBox 49"/>
+          <p:cNvSpPr txBox="1"/>
+          <p:nvPr/>
+        </p:nvSpPr>
+        <p:spPr>
+          <a:xfrm>
+            <a:off x="2101704" y="18538345"/>
+            <a:ext cx="3669995" cy="461665"/>
+          </a:xfrm>
+          <a:prstGeom prst="rect">
+            <a:avLst/>
+          </a:prstGeom>
+          <a:noFill/>
+        </p:spPr>
+        <p:txBody>
+          <a:bodyPr wrap="none" rtlCol="0">
+            <a:spAutoFit/>
+          </a:bodyPr>
+          <a:lstStyle/>
+          <a:p>
+            <a:r>
+              <a:rPr lang="en-US" sz="2400" dirty="0">
+                <a:latin typeface="+mn-lt"/>
+              </a:rPr>
+              <a:t>700+ Players Per Year </a:t>
+            </a:r>
+            <a:r>
+              <a:rPr lang="en-US" sz="2400" dirty="0">
+                <a:latin typeface="Wingdings"/>
+                <a:ea typeface="Wingdings"/>
+                <a:cs typeface="Wingdings"/>
+              </a:rPr>
+              <a:t></a:t>
+            </a:r>
+            <a:endParaRPr lang="en-US" sz="2400" dirty="0">
+              <a:latin typeface="+mn-lt"/>
+            </a:endParaRPr>
+          </a:p>
+        </p:txBody>
+      </p:sp>
+      <p:sp>
+        <p:nvSpPr>
+          <p:cNvPr id="51" name="TextBox 50"/>
+          <p:cNvSpPr txBox="1"/>
+          <p:nvPr/>
+        </p:nvSpPr>
+        <p:spPr>
+          <a:xfrm>
+            <a:off x="898186" y="22879226"/>
             <a:ext cx="8166101" cy="1631216"/>
           </a:xfrm>
           <a:prstGeom prst="rect">
@@ -11051,16 +12320,13 @@
           <a:p>
             <a:pPr algn="just"/>
             <a:r>
-              <a:rPr lang="en-US" sz="2000">
+              <a:rPr lang="en-US" sz="2000" b="1" dirty="0">
                 <a:latin typeface="+mn-lt"/>
                 <a:cs typeface=""/>
               </a:rPr>
-              <a:t>The dataset consists of key statistics for every single active wide receiver in the NFL from 2007 until 2012.</a:t>
-            </a:r>
-          </a:p>
-          <a:p>
-            <a:pPr algn="just"/>
-            <a:endParaRPr lang="en-US" sz="2000">
+              <a:t>Performance Criteria</a:t>
+            </a:r>
+            <a:endParaRPr lang="en-US" sz="2000" dirty="0">
               <a:latin typeface="+mn-lt"/>
               <a:cs typeface=""/>
             </a:endParaRPr>
@@ -11068,20 +12334,16 @@
           <a:p>
             <a:pPr algn="just"/>
             <a:r>
-              <a:rPr lang="en-US" sz="2000" b="1">
+              <a:rPr lang="en-US" sz="2000" dirty="0">
                 <a:latin typeface="+mn-lt"/>
                 <a:cs typeface=""/>
               </a:rPr>
-              <a:t>Fantasy Points</a:t>
-            </a:r>
-            <a:r>
-              <a:rPr lang="en-US" sz="2000">
-                <a:latin typeface="+mn-lt"/>
-                <a:cs typeface=""/>
-              </a:rPr>
-              <a:t>: How many fantasy points they earned this year. Standard, non-PPR scoring is assumed.</a:t>
-            </a:r>
-            <a:endParaRPr lang="en-US" sz="2000" b="1">
+              <a:t>Discounted cumulative gain (DCG) will be used to reward ranking good players highly and penalize ranking good players low. A higher DCG is better.</a:t>
+            </a:r>
+          </a:p>
+          <a:p>
+            <a:pPr algn="just"/>
+            <a:endParaRPr lang="en-US" sz="2000" dirty="0">
               <a:latin typeface="+mn-lt"/>
               <a:cs typeface=""/>
             </a:endParaRPr>
@@ -11090,24 +12352,137 @@
       </p:sp>
       <p:graphicFrame>
         <p:nvGraphicFramePr>
-          <p:cNvPr id="36" name="Object 35"/>
+          <p:cNvPr id="52" name="Object 51"/>
           <p:cNvGraphicFramePr>
             <a:graphicFrameLocks noChangeAspect="1"/>
           </p:cNvGraphicFramePr>
           <p:nvPr/>
         </p:nvGraphicFramePr>
         <p:xfrm>
-          <a:off x="989013" y="6878638"/>
-          <a:ext cx="7916862" cy="449262"/>
+          <a:off x="2101704" y="23985107"/>
+          <a:ext cx="2548081" cy="743190"/>
         </p:xfrm>
         <a:graphic>
           <a:graphicData uri="http://schemas.openxmlformats.org/presentationml/2006/ole">
-            <p:oleObj spid="_x0000_s38915" name="Equation" r:id="rId11" imgW="1841500" imgH="139700" progId="Equation.3">
+            <p:oleObj spid="_x0000_s38916" name="Equation" r:id="rId11" imgW="1524000" imgH="444500" progId="Equation.3">
               <p:embed/>
             </p:oleObj>
           </a:graphicData>
         </a:graphic>
       </p:graphicFrame>
+      <p:sp>
+        <p:nvSpPr>
+          <p:cNvPr id="53" name="TextBox 52"/>
+          <p:cNvSpPr txBox="1"/>
+          <p:nvPr/>
+        </p:nvSpPr>
+        <p:spPr>
+          <a:xfrm>
+            <a:off x="872786" y="25022416"/>
+            <a:ext cx="8166101" cy="707886"/>
+          </a:xfrm>
+          <a:prstGeom prst="rect">
+            <a:avLst/>
+          </a:prstGeom>
+          <a:noFill/>
+        </p:spPr>
+        <p:txBody>
+          <a:bodyPr wrap="square" rtlCol="0">
+            <a:spAutoFit/>
+          </a:bodyPr>
+          <a:lstStyle/>
+          <a:p>
+            <a:pPr algn="just"/>
+            <a:r>
+              <a:rPr lang="en-US" sz="2000" dirty="0">
+                <a:latin typeface="+mn-lt"/>
+                <a:cs typeface=""/>
+              </a:rPr>
+              <a:t>Below we can visually view our data, as well as the inconsistency of professional rankings. These will serve as our benchmarks.</a:t>
+            </a:r>
+          </a:p>
+        </p:txBody>
+      </p:sp>
+      <p:graphicFrame>
+        <p:nvGraphicFramePr>
+          <p:cNvPr id="38917" name="Object 5"/>
+          <p:cNvGraphicFramePr>
+            <a:graphicFrameLocks noChangeAspect="1"/>
+          </p:cNvGraphicFramePr>
+          <p:nvPr/>
+        </p:nvGraphicFramePr>
+        <p:xfrm>
+          <a:off x="5335588" y="24044381"/>
+          <a:ext cx="3016250" cy="658812"/>
+        </p:xfrm>
+        <a:graphic>
+          <a:graphicData uri="http://schemas.openxmlformats.org/presentationml/2006/ole">
+            <p:oleObj spid="_x0000_s38917" name="Equation" r:id="rId12" imgW="1803400" imgH="393700" progId="Equation.3">
+              <p:embed/>
+            </p:oleObj>
+          </a:graphicData>
+        </a:graphic>
+      </p:graphicFrame>
+      <p:sp>
+        <p:nvSpPr>
+          <p:cNvPr id="54" name="TextBox 53"/>
+          <p:cNvSpPr txBox="1"/>
+          <p:nvPr/>
+        </p:nvSpPr>
+        <p:spPr>
+          <a:xfrm>
+            <a:off x="913345" y="29408223"/>
+            <a:ext cx="8150942" cy="584776"/>
+          </a:xfrm>
+          <a:prstGeom prst="rect">
+            <a:avLst/>
+          </a:prstGeom>
+          <a:noFill/>
+        </p:spPr>
+        <p:txBody>
+          <a:bodyPr wrap="square" rtlCol="0">
+            <a:spAutoFit/>
+          </a:bodyPr>
+          <a:lstStyle/>
+          <a:p>
+            <a:pPr algn="ctr"/>
+            <a:r>
+              <a:rPr lang="en-US" sz="1600" dirty="0"/>
+              <a:t>Figure 2: DCG of ESPN / Yahoo preseason rankings over the years, along with a naïve method of using the previous year’s final rankings as the next year’s preseason rankings.</a:t>
+            </a:r>
+          </a:p>
+        </p:txBody>
+      </p:sp>
+      <p:sp>
+        <p:nvSpPr>
+          <p:cNvPr id="55" name="TextBox 54"/>
+          <p:cNvSpPr txBox="1"/>
+          <p:nvPr/>
+        </p:nvSpPr>
+        <p:spPr>
+          <a:xfrm>
+            <a:off x="885486" y="31660524"/>
+            <a:ext cx="8150942" cy="338554"/>
+          </a:xfrm>
+          <a:prstGeom prst="rect">
+            <a:avLst/>
+          </a:prstGeom>
+          <a:noFill/>
+        </p:spPr>
+        <p:txBody>
+          <a:bodyPr wrap="square" rtlCol="0">
+            <a:spAutoFit/>
+          </a:bodyPr>
+          <a:lstStyle/>
+          <a:p>
+            <a:pPr algn="ctr"/>
+            <a:r>
+              <a:rPr lang="en-US" sz="1600" dirty="0"/>
+              <a:t>Figure 3: The numeric DCG of ESPN and Yahoo in 2012. This is the benchmark used for this research.</a:t>
+            </a:r>
+          </a:p>
+        </p:txBody>
+      </p:sp>
     </p:spTree>
   </p:cSld>
   <p:clrMapOvr>

</xml_diff>

<commit_message>
first 3 panels of poster finished
</commit_message>
<xml_diff>
--- a/poster/jpo4_poster.pptx
+++ b/poster/jpo4_poster.pptx
@@ -8226,7 +8226,7 @@
       </p:sp>
       <p:pic>
         <p:nvPicPr>
-          <p:cNvPr id="23" name="Picture 22" descr="rmse_plus_dcg.png"/>
+          <p:cNvPr id="25" name="Picture 24" descr="kmeans3.eps.png"/>
           <p:cNvPicPr>
             <a:picLocks noChangeAspect="1"/>
           </p:cNvPicPr>
@@ -8240,31 +8240,7 @@
         </p:blipFill>
         <p:spPr>
           <a:xfrm>
-            <a:off x="10282767" y="17514895"/>
-            <a:ext cx="8492258" cy="6114425"/>
-          </a:xfrm>
-          <a:prstGeom prst="rect">
-            <a:avLst/>
-          </a:prstGeom>
-        </p:spPr>
-      </p:pic>
-      <p:pic>
-        <p:nvPicPr>
-          <p:cNvPr id="25" name="Picture 24" descr="kmeans3.eps.png"/>
-          <p:cNvPicPr>
-            <a:picLocks noChangeAspect="1"/>
-          </p:cNvPicPr>
-          <p:nvPr/>
-        </p:nvPicPr>
-        <p:blipFill>
-          <a:blip r:embed="rId6"/>
-          <a:stretch>
-            <a:fillRect/>
-          </a:stretch>
-        </p:blipFill>
-        <p:spPr>
-          <a:xfrm>
-            <a:off x="19491326" y="16334995"/>
+            <a:off x="19491326" y="16245073"/>
             <a:ext cx="8734426" cy="4541902"/>
           </a:xfrm>
           <a:prstGeom prst="rect">
@@ -8281,14 +8257,14 @@
           <p:nvPr/>
         </p:nvPicPr>
         <p:blipFill>
-          <a:blip r:embed="rId7"/>
+          <a:blip r:embed="rId6"/>
           <a:stretch>
             <a:fillRect/>
           </a:stretch>
         </p:blipFill>
         <p:spPr>
           <a:xfrm>
-            <a:off x="19491324" y="8411039"/>
+            <a:off x="19491326" y="9014412"/>
             <a:ext cx="8734426" cy="6638164"/>
           </a:xfrm>
           <a:prstGeom prst="rect">
@@ -8305,7 +8281,7 @@
           <p:nvPr/>
         </p:nvPicPr>
         <p:blipFill>
-          <a:blip r:embed="rId8"/>
+          <a:blip r:embed="rId7"/>
           <a:stretch>
             <a:fillRect/>
           </a:stretch>
@@ -8329,7 +8305,7 @@
           <p:nvPr/>
         </p:nvGraphicFramePr>
         <p:xfrm>
-          <a:off x="19609857" y="25407334"/>
+          <a:off x="19609857" y="24627843"/>
           <a:ext cx="8492257" cy="5632024"/>
         </p:xfrm>
         <a:graphic>
@@ -8371,10 +8347,10 @@
                     <a:p>
                       <a:pPr algn="ctr"/>
                       <a:r>
-                        <a:rPr lang="en-US" sz="1600"/>
+                        <a:rPr lang="en-US" sz="1600" dirty="0"/>
                         <a:t>K Means Features</a:t>
                       </a:r>
-                      <a:endParaRPr lang="en-US" sz="1600" b="1"/>
+                      <a:endParaRPr lang="en-US" sz="1600" b="1" dirty="0"/>
                     </a:p>
                   </a:txBody>
                   <a:tcPr anchor="ctr"/>
@@ -8893,10 +8869,10 @@
                     <a:p>
                       <a:pPr algn="ctr"/>
                       <a:r>
-                        <a:rPr lang="en-US" sz="1600"/>
+                        <a:rPr lang="en-US" sz="1600" dirty="0"/>
                         <a:t>Receiving Yards</a:t>
                       </a:r>
-                      <a:endParaRPr lang="en-US" sz="1600" b="0"/>
+                      <a:endParaRPr lang="en-US" sz="1600" b="0" dirty="0"/>
                     </a:p>
                   </a:txBody>
                   <a:tcPr anchor="ctr"/>
@@ -8908,10 +8884,10 @@
                     <a:p>
                       <a:pPr algn="ctr"/>
                       <a:r>
-                        <a:rPr lang="en-US" sz="1600"/>
+                        <a:rPr lang="en-US" sz="1600" dirty="0"/>
                         <a:t>1.0857</a:t>
                       </a:r>
-                      <a:endParaRPr lang="en-US" sz="1600" b="0"/>
+                      <a:endParaRPr lang="en-US" sz="1600" b="0" dirty="0"/>
                     </a:p>
                   </a:txBody>
                   <a:tcPr anchor="ctr"/>
@@ -8923,7 +8899,7 @@
                     <a:p>
                       <a:pPr algn="ctr"/>
                       <a:r>
-                        <a:rPr lang="en-US" sz="1600" b="0"/>
+                        <a:rPr lang="en-US" sz="1600" b="0" dirty="0"/>
                         <a:t>1.4428</a:t>
                       </a:r>
                     </a:p>
@@ -8945,7 +8921,7 @@
         </p:nvSpPr>
         <p:spPr bwMode="auto">
           <a:xfrm>
-            <a:off x="10059841" y="15818113"/>
+            <a:off x="10059841" y="14833142"/>
             <a:ext cx="8734426" cy="892340"/>
           </a:xfrm>
           <a:prstGeom prst="rect">
@@ -9282,8 +9258,8 @@
           <p:nvPr/>
         </p:nvGraphicFramePr>
         <p:xfrm>
-          <a:off x="10007412" y="27466732"/>
-          <a:ext cx="8492257" cy="5120640"/>
+          <a:off x="10179632" y="26715504"/>
+          <a:ext cx="8492257" cy="4898813"/>
         </p:xfrm>
         <a:graphic>
           <a:graphicData uri="http://schemas.openxmlformats.org/drawingml/2006/table">
@@ -9334,24 +9310,10 @@
                     <a:p>
                       <a:pPr algn="ctr"/>
                       <a:r>
-                        <a:rPr lang="en-US" sz="1600"/>
-                        <a:t>Discounted</a:t>
-                      </a:r>
-                    </a:p>
-                    <a:p>
-                      <a:pPr algn="ctr"/>
-                      <a:r>
-                        <a:rPr lang="en-US" sz="1600"/>
-                        <a:t>Cumulative</a:t>
-                      </a:r>
-                    </a:p>
-                    <a:p>
-                      <a:pPr algn="ctr"/>
-                      <a:r>
-                        <a:rPr lang="en-US" sz="1600"/>
-                        <a:t>Gain</a:t>
-                      </a:r>
-                      <a:endParaRPr lang="en-US" sz="1600" b="1"/>
+                        <a:rPr lang="en-US" sz="1600" dirty="0"/>
+                        <a:t>DCG</a:t>
+                      </a:r>
+                      <a:endParaRPr lang="en-US" sz="1600" b="1" dirty="0"/>
                     </a:p>
                   </a:txBody>
                   <a:tcPr anchor="ctr"/>
@@ -10506,7 +10468,7 @@
           <p:nvPr/>
         </p:nvPicPr>
         <p:blipFill>
-          <a:blip r:embed="rId9"/>
+          <a:blip r:embed="rId8"/>
           <a:stretch>
             <a:fillRect/>
           </a:stretch>
@@ -10531,7 +10493,7 @@
         </p:nvGraphicFramePr>
         <p:xfrm>
           <a:off x="29073799" y="15433294"/>
-          <a:ext cx="8492257" cy="1803401"/>
+          <a:ext cx="8492257" cy="1353743"/>
         </p:xfrm>
         <a:graphic>
           <a:graphicData uri="http://schemas.openxmlformats.org/drawingml/2006/table">
@@ -10543,7 +10505,7 @@
                 <a:gridCol w="4449914"/>
                 <a:gridCol w="4042343"/>
               </a:tblGrid>
-              <a:tr h="601133">
+              <a:tr h="451247">
                 <a:tc>
                   <a:txBody>
                     <a:bodyPr/>
@@ -10591,7 +10553,7 @@
                   <a:tcPr anchor="ctr"/>
                 </a:tc>
               </a:tr>
-              <a:tr h="601134">
+              <a:tr h="451248">
                 <a:tc>
                   <a:txBody>
                     <a:bodyPr/>
@@ -10599,7 +10561,7 @@
                     <a:p>
                       <a:pPr algn="ctr"/>
                       <a:r>
-                        <a:rPr lang="en-US" sz="1600" b="0"/>
+                        <a:rPr lang="en-US" sz="1600" b="0" dirty="0"/>
                         <a:t>4</a:t>
                       </a:r>
                     </a:p>
@@ -10622,7 +10584,7 @@
                   <a:tcPr anchor="ctr"/>
                 </a:tc>
               </a:tr>
-              <a:tr h="601134">
+              <a:tr h="451248">
                 <a:tc>
                   <a:txBody>
                     <a:bodyPr/>
@@ -10630,7 +10592,7 @@
                     <a:p>
                       <a:pPr algn="ctr"/>
                       <a:r>
-                        <a:rPr lang="en-US" sz="1600" b="0"/>
+                        <a:rPr lang="en-US" sz="1600" b="0" dirty="0"/>
                         <a:t>10</a:t>
                       </a:r>
                     </a:p>
@@ -10648,7 +10610,7 @@
                     <a:p>
                       <a:pPr algn="ctr"/>
                       <a:r>
-                        <a:rPr lang="en-US" sz="1600" b="0"/>
+                        <a:rPr lang="en-US" sz="1600" b="0" dirty="0"/>
                         <a:t>1.8132</a:t>
                       </a:r>
                     </a:p>
@@ -10829,7 +10791,7 @@
               <a:rPr lang="en-US" sz="2000" dirty="0">
                 <a:latin typeface="+mn-lt"/>
               </a:rPr>
-              <a:t>Prediction of NFL receivers’ end-of-season fantasy point ranking.</a:t>
+              <a:t>A top 30 list of NFL WRs ordered by predicted fantasy point output.</a:t>
             </a:r>
           </a:p>
         </p:txBody>
@@ -10876,7 +10838,7 @@
           <p:nvPr/>
         </p:nvPicPr>
         <p:blipFill>
-          <a:blip r:embed="rId10"/>
+          <a:blip r:embed="rId9"/>
           <a:stretch>
             <a:fillRect/>
           </a:stretch>
@@ -12154,7 +12116,7 @@
         </p:xfrm>
         <a:graphic>
           <a:graphicData uri="http://schemas.openxmlformats.org/presentationml/2006/ole">
-            <p:oleObj spid="_x0000_s38916" name="Equation" r:id="rId11" imgW="1524000" imgH="444500" progId="Equation.3">
+            <p:oleObj spid="_x0000_s38916" name="Equation" r:id="rId10" imgW="1524000" imgH="444500" progId="Equation.3">
               <p:embed/>
             </p:oleObj>
           </a:graphicData>
@@ -12207,7 +12169,7 @@
         </p:xfrm>
         <a:graphic>
           <a:graphicData uri="http://schemas.openxmlformats.org/presentationml/2006/ole">
-            <p:oleObj spid="_x0000_s38917" name="Equation" r:id="rId12" imgW="1803400" imgH="393700" progId="Equation.3">
+            <p:oleObj spid="_x0000_s38917" name="Equation" r:id="rId11" imgW="1803400" imgH="393700" progId="Equation.3">
               <p:embed/>
             </p:oleObj>
           </a:graphicData>
@@ -12281,8 +12243,8 @@
         </p:nvSpPr>
         <p:spPr>
           <a:xfrm>
-            <a:off x="10333568" y="6674608"/>
-            <a:ext cx="8166101" cy="8987076"/>
+            <a:off x="10218116" y="6674608"/>
+            <a:ext cx="8576151" cy="8371522"/>
           </a:xfrm>
           <a:prstGeom prst="rect">
             <a:avLst/>
@@ -12309,7 +12271,10 @@
             </a:endParaRPr>
           </a:p>
           <a:p>
-            <a:pPr lvl="1"/>
+            <a:pPr marL="914305" lvl="1" indent="-457200">
+              <a:buFont typeface="Arial"/>
+              <a:buChar char="•"/>
+            </a:pPr>
             <a:r>
               <a:rPr lang="en-US" sz="2000" dirty="0" err="1">
                 <a:latin typeface="+mn-lt"/>
@@ -12459,13 +12424,13 @@
             </a:r>
           </a:p>
           <a:p>
-            <a:pPr lvl="1"/>
+            <a:pPr marL="914305" lvl="1" indent="-457200"/>
             <a:r>
               <a:rPr lang="en-US" sz="2000" dirty="0">
                 <a:latin typeface="+mn-lt"/>
                 <a:cs typeface=""/>
               </a:rPr>
-              <a:t>w</a:t>
+              <a:t>              w</a:t>
             </a:r>
             <a:r>
               <a:rPr lang="en-US" sz="2000" baseline="-25000" dirty="0">
@@ -12571,7 +12536,10 @@
             </a:endParaRPr>
           </a:p>
           <a:p>
-            <a:pPr lvl="1"/>
+            <a:pPr marL="914305" lvl="1" indent="-457200">
+              <a:buFont typeface="Arial"/>
+              <a:buChar char="•"/>
+            </a:pPr>
             <a:r>
               <a:rPr lang="en-US" sz="2000" dirty="0">
                 <a:latin typeface="+mn-lt"/>
@@ -12675,7 +12643,10 @@
             </a:r>
           </a:p>
           <a:p>
-            <a:pPr lvl="1"/>
+            <a:pPr marL="914305" lvl="1" indent="-457200">
+              <a:buFont typeface="Arial"/>
+              <a:buChar char="•"/>
+            </a:pPr>
             <a:r>
               <a:rPr lang="en-US" sz="2000" dirty="0" smtClean="0">
                 <a:latin typeface="+mn-lt"/>
@@ -12698,8 +12669,6 @@
               </a:rPr>
               <a:t> X</a:t>
             </a:r>
-          </a:p>
-          <a:p>
             <a:endParaRPr lang="en-US" sz="2000" b="1" dirty="0" smtClean="0">
               <a:latin typeface="+mn-lt"/>
               <a:cs typeface=""/>
@@ -12715,17 +12684,23 @@
             </a:r>
           </a:p>
           <a:p>
-            <a:pPr lvl="1"/>
+            <a:pPr marL="914305" lvl="1" indent="-457200">
+              <a:buFont typeface="Arial"/>
+              <a:buChar char="•"/>
+            </a:pPr>
             <a:r>
               <a:rPr lang="en-US" sz="2000" dirty="0" smtClean="0">
                 <a:latin typeface="+mn-lt"/>
                 <a:cs typeface=""/>
               </a:rPr>
-              <a:t>Unimportant features, as determined by weight, will be removed to create an L-dimensional β.</a:t>
-            </a:r>
-          </a:p>
-          <a:p>
-            <a:pPr lvl="1"/>
+              <a:t>Unimportant features, as determined by weight, will be removed to create an L-dimensional β for linear regression.</a:t>
+            </a:r>
+          </a:p>
+          <a:p>
+            <a:pPr marL="914305" lvl="1" indent="-457200">
+              <a:buFont typeface="Arial"/>
+              <a:buChar char="•"/>
+            </a:pPr>
             <a:r>
               <a:rPr lang="en-US" sz="2000" dirty="0" err="1">
                 <a:latin typeface="+mn-lt"/>
@@ -12768,8 +12743,6 @@
               </a:rPr>
               <a:t> ]</a:t>
             </a:r>
-          </a:p>
-          <a:p>
             <a:endParaRPr lang="en-US" sz="2000" b="1" dirty="0">
               <a:latin typeface="+mn-lt"/>
             </a:endParaRPr>
@@ -12783,7 +12756,10 @@
             </a:r>
           </a:p>
           <a:p>
-            <a:pPr lvl="1"/>
+            <a:pPr marL="914305" lvl="1" indent="-457200">
+              <a:buFont typeface="Arial"/>
+              <a:buChar char="•"/>
+            </a:pPr>
             <a:r>
               <a:rPr lang="en-US" sz="2000" dirty="0">
                 <a:latin typeface="+mn-lt"/>
@@ -12792,7 +12768,10 @@
             </a:r>
           </a:p>
           <a:p>
-            <a:pPr lvl="1"/>
+            <a:pPr marL="914305" lvl="1" indent="-457200">
+              <a:buFont typeface="Arial"/>
+              <a:buChar char="•"/>
+            </a:pPr>
             <a:r>
               <a:rPr lang="en-US" sz="2000" dirty="0" err="1">
                 <a:latin typeface="+mn-lt"/>
@@ -12843,21 +12822,24 @@
             </a:r>
           </a:p>
           <a:p>
-            <a:pPr lvl="1"/>
+            <a:pPr marL="800005" lvl="1" indent="-342900"/>
             <a:r>
               <a:rPr lang="en-US" sz="1800" dirty="0">
                 <a:latin typeface="Wingdings"/>
                 <a:ea typeface="Wingdings"/>
                 <a:cs typeface="Wingdings"/>
               </a:rPr>
-              <a:t>   </a:t>
+              <a:t>    </a:t>
             </a:r>
             <a:endParaRPr lang="en-US" sz="1800" dirty="0">
               <a:latin typeface="+mn-lt"/>
             </a:endParaRPr>
           </a:p>
           <a:p>
-            <a:pPr lvl="1"/>
+            <a:pPr marL="914305" lvl="1" indent="-457200">
+              <a:buFont typeface="Arial"/>
+              <a:buChar char="•"/>
+            </a:pPr>
             <a:r>
               <a:rPr lang="en-US" sz="2000" dirty="0" err="1">
                 <a:latin typeface="+mn-lt"/>
@@ -12908,11 +12890,6 @@
             </a:r>
           </a:p>
           <a:p>
-            <a:endParaRPr lang="en-US" sz="2000" dirty="0">
-              <a:latin typeface="+mn-lt"/>
-            </a:endParaRPr>
-          </a:p>
-          <a:p>
             <a:r>
               <a:rPr lang="en-US" sz="2000" b="1" dirty="0">
                 <a:latin typeface="+mn-lt"/>
@@ -12921,21 +12898,27 @@
             </a:r>
           </a:p>
           <a:p>
-            <a:pPr lvl="1"/>
+            <a:pPr lvl="1">
+              <a:buFont typeface="Arial"/>
+              <a:buChar char="•"/>
+            </a:pPr>
             <a:r>
               <a:rPr lang="en-US" sz="2000" dirty="0">
                 <a:latin typeface="+mn-lt"/>
               </a:rPr>
-              <a:t>PCA will be used to estimate the regression coefficients. Different numbers of principle components will be experimented with.</a:t>
-            </a:r>
-          </a:p>
-          <a:p>
-            <a:pPr lvl="1"/>
+              <a:t> 	PCA will be used to estimate the regression coefficients. Different 	numbers of principle components will be experimented with.</a:t>
+            </a:r>
+          </a:p>
+          <a:p>
+            <a:pPr lvl="1">
+              <a:buFont typeface="Arial"/>
+              <a:buChar char="•"/>
+            </a:pPr>
             <a:r>
               <a:rPr lang="en-US" sz="2000" dirty="0">
                 <a:latin typeface="+mn-lt"/>
               </a:rPr>
-              <a:t>PCA(X) </a:t>
+              <a:t> 	PCA(X) </a:t>
             </a:r>
             <a:r>
               <a:rPr lang="en-US" sz="2000" dirty="0">
@@ -12974,12 +12957,15 @@
             </a:endParaRPr>
           </a:p>
           <a:p>
-            <a:pPr lvl="1"/>
+            <a:pPr lvl="1">
+              <a:buFont typeface="Arial"/>
+              <a:buChar char="•"/>
+            </a:pPr>
             <a:r>
               <a:rPr lang="en-US" sz="2000" dirty="0">
                 <a:latin typeface="+mn-lt"/>
               </a:rPr>
-              <a:t>Ω</a:t>
+              <a:t> 	Ω</a:t>
             </a:r>
             <a:r>
               <a:rPr lang="en-US" sz="2000" baseline="-25000" dirty="0">
@@ -12995,12 +12981,15 @@
             </a:r>
           </a:p>
           <a:p>
-            <a:pPr lvl="1"/>
+            <a:pPr lvl="1">
+              <a:buFont typeface="Arial"/>
+              <a:buChar char="•"/>
+            </a:pPr>
             <a:r>
               <a:rPr lang="en-US" sz="2000" dirty="0">
                 <a:latin typeface="+mn-lt"/>
               </a:rPr>
-              <a:t>Λ</a:t>
+              <a:t> 	Λ</a:t>
             </a:r>
             <a:r>
               <a:rPr lang="en-US" sz="2000" baseline="-25000" dirty="0">
@@ -13016,13 +13005,16 @@
             </a:r>
           </a:p>
           <a:p>
-            <a:pPr lvl="1"/>
+            <a:pPr lvl="1">
+              <a:buFont typeface="Arial"/>
+              <a:buChar char="•"/>
+            </a:pPr>
             <a:r>
               <a:rPr lang="en-US" sz="2000" dirty="0">
                 <a:latin typeface="+mn-lt"/>
                 <a:cs typeface=""/>
               </a:rPr>
-              <a:t>β = (</a:t>
+              <a:t> 	β = (</a:t>
             </a:r>
             <a:r>
               <a:rPr lang="en-US" sz="2000" dirty="0">
@@ -13152,23 +13144,29 @@
             </a:r>
           </a:p>
           <a:p>
-            <a:pPr lvl="1"/>
+            <a:pPr lvl="1">
+              <a:buFont typeface="Arial"/>
+              <a:buChar char="•"/>
+            </a:pPr>
             <a:r>
               <a:rPr lang="en-US" sz="2000" dirty="0" smtClean="0">
                 <a:latin typeface="+mn-lt"/>
                 <a:cs typeface=""/>
               </a:rPr>
-              <a:t>Transform to regression coefficients for uncentered variables</a:t>
-            </a:r>
-          </a:p>
-          <a:p>
-            <a:pPr lvl="1"/>
+              <a:t> 	Transform to regression coefficients for uncentered variables</a:t>
+            </a:r>
+          </a:p>
+          <a:p>
+            <a:pPr lvl="1">
+              <a:buFont typeface="Arial"/>
+              <a:buChar char="•"/>
+            </a:pPr>
             <a:r>
               <a:rPr lang="en-US" sz="2000" dirty="0">
                 <a:latin typeface="+mn-lt"/>
                 <a:cs typeface=""/>
               </a:rPr>
-              <a:t>β = [ μ – μ </a:t>
+              <a:t> 	β = [ μ – μ </a:t>
             </a:r>
             <a:r>
               <a:rPr lang="en-US" sz="2000" dirty="0">
@@ -13247,12 +13245,15 @@
             </a:r>
           </a:p>
           <a:p>
-            <a:pPr lvl="1"/>
+            <a:pPr lvl="1">
+              <a:buFont typeface="Arial"/>
+              <a:buChar char="•"/>
+            </a:pPr>
             <a:r>
               <a:rPr lang="en-US" sz="2000" dirty="0" smtClean="0">
                 <a:cs typeface=""/>
               </a:rPr>
-              <a:t>Y = [ ones | X ] </a:t>
+              <a:t> 	Y = [ ones | X ] </a:t>
             </a:r>
             <a:r>
               <a:rPr lang="en-US" sz="2000" dirty="0" smtClean="0">
@@ -13289,7 +13290,7 @@
         </p:nvSpPr>
         <p:spPr bwMode="auto">
           <a:xfrm>
-            <a:off x="10059841" y="25233642"/>
+            <a:off x="10059841" y="24045411"/>
             <a:ext cx="8734426" cy="892340"/>
           </a:xfrm>
           <a:prstGeom prst="rect">
@@ -13333,6 +13334,452 @@
                 <a:srgbClr val="F8F8F8"/>
               </a:solidFill>
             </a:endParaRPr>
+          </a:p>
+        </p:txBody>
+      </p:sp>
+      <p:pic>
+        <p:nvPicPr>
+          <p:cNvPr id="49" name="Picture 48" descr="lin_reg_learning_curve.eps.png"/>
+          <p:cNvPicPr>
+            <a:picLocks noChangeAspect="1"/>
+          </p:cNvPicPr>
+          <p:nvPr/>
+        </p:nvPicPr>
+        <p:blipFill>
+          <a:blip r:embed="rId12"/>
+          <a:stretch>
+            <a:fillRect/>
+          </a:stretch>
+        </p:blipFill>
+        <p:spPr>
+          <a:xfrm>
+            <a:off x="10059841" y="16377339"/>
+            <a:ext cx="8715184" cy="7130605"/>
+          </a:xfrm>
+          <a:prstGeom prst="rect">
+            <a:avLst/>
+          </a:prstGeom>
+        </p:spPr>
+      </p:pic>
+      <p:sp>
+        <p:nvSpPr>
+          <p:cNvPr id="57" name="TextBox 56"/>
+          <p:cNvSpPr txBox="1"/>
+          <p:nvPr/>
+        </p:nvSpPr>
+        <p:spPr>
+          <a:xfrm>
+            <a:off x="10352810" y="23371702"/>
+            <a:ext cx="8150942" cy="584776"/>
+          </a:xfrm>
+          <a:prstGeom prst="rect">
+            <a:avLst/>
+          </a:prstGeom>
+          <a:noFill/>
+        </p:spPr>
+        <p:txBody>
+          <a:bodyPr wrap="square" rtlCol="0">
+            <a:spAutoFit/>
+          </a:bodyPr>
+          <a:lstStyle/>
+          <a:p>
+            <a:pPr algn="ctr"/>
+            <a:r>
+              <a:rPr lang="en-US" sz="1600" dirty="0"/>
+              <a:t>Figure 4: Linear regression versus accuracy as a function of training set size. As the RMSE between point predictions and actual end-of-year points decreases, the DCG of the resultant ranking increases. </a:t>
+            </a:r>
+          </a:p>
+        </p:txBody>
+      </p:sp>
+      <p:sp>
+        <p:nvSpPr>
+          <p:cNvPr id="59" name="TextBox 58"/>
+          <p:cNvSpPr txBox="1"/>
+          <p:nvPr/>
+        </p:nvSpPr>
+        <p:spPr>
+          <a:xfrm>
+            <a:off x="10333568" y="25207279"/>
+            <a:ext cx="8166101" cy="1323439"/>
+          </a:xfrm>
+          <a:prstGeom prst="rect">
+            <a:avLst/>
+          </a:prstGeom>
+          <a:noFill/>
+        </p:spPr>
+        <p:txBody>
+          <a:bodyPr wrap="square" rtlCol="0">
+            <a:spAutoFit/>
+          </a:bodyPr>
+          <a:lstStyle/>
+          <a:p>
+            <a:pPr algn="just"/>
+            <a:r>
+              <a:rPr lang="en-US" sz="2000" dirty="0">
+                <a:latin typeface="+mn-lt"/>
+                <a:cs typeface=""/>
+              </a:rPr>
+              <a:t>The best results are obtained by using a subset of 13 total features. The DCG for this 2-feature case is 1.7896, still short of what is achieved by ESPN and Yahoo, but very close, and better than the naïve ranking method proposed previously.</a:t>
+            </a:r>
+          </a:p>
+        </p:txBody>
+      </p:sp>
+      <p:sp>
+        <p:nvSpPr>
+          <p:cNvPr id="60" name="TextBox 59"/>
+          <p:cNvSpPr txBox="1"/>
+          <p:nvPr/>
+        </p:nvSpPr>
+        <p:spPr>
+          <a:xfrm>
+            <a:off x="10333568" y="15725482"/>
+            <a:ext cx="8166101" cy="707886"/>
+          </a:xfrm>
+          <a:prstGeom prst="rect">
+            <a:avLst/>
+          </a:prstGeom>
+          <a:noFill/>
+        </p:spPr>
+        <p:txBody>
+          <a:bodyPr wrap="square" rtlCol="0">
+            <a:spAutoFit/>
+          </a:bodyPr>
+          <a:lstStyle/>
+          <a:p>
+            <a:pPr algn="just"/>
+            <a:r>
+              <a:rPr lang="en-US" sz="2000" dirty="0">
+                <a:latin typeface="+mn-lt"/>
+                <a:cs typeface=""/>
+              </a:rPr>
+              <a:t>Using linear regression, predicted point totals are calculated for each player. Players are then ranked by predicted points for the final output.</a:t>
+            </a:r>
+          </a:p>
+        </p:txBody>
+      </p:sp>
+      <p:sp>
+        <p:nvSpPr>
+          <p:cNvPr id="61" name="TextBox 60"/>
+          <p:cNvSpPr txBox="1"/>
+          <p:nvPr/>
+        </p:nvSpPr>
+        <p:spPr>
+          <a:xfrm>
+            <a:off x="10352810" y="31665116"/>
+            <a:ext cx="8150942" cy="338554"/>
+          </a:xfrm>
+          <a:prstGeom prst="rect">
+            <a:avLst/>
+          </a:prstGeom>
+          <a:noFill/>
+        </p:spPr>
+        <p:txBody>
+          <a:bodyPr wrap="square" rtlCol="0">
+            <a:spAutoFit/>
+          </a:bodyPr>
+          <a:lstStyle/>
+          <a:p>
+            <a:pPr algn="ctr"/>
+            <a:r>
+              <a:rPr lang="en-US" sz="1600" dirty="0"/>
+              <a:t>Figure 5: Results of feature reduction on linear regression.</a:t>
+            </a:r>
+          </a:p>
+        </p:txBody>
+      </p:sp>
+      <p:sp>
+        <p:nvSpPr>
+          <p:cNvPr id="62" name="TextBox 61"/>
+          <p:cNvSpPr txBox="1"/>
+          <p:nvPr/>
+        </p:nvSpPr>
+        <p:spPr>
+          <a:xfrm>
+            <a:off x="19762835" y="6732334"/>
+            <a:ext cx="8166101" cy="2554545"/>
+          </a:xfrm>
+          <a:prstGeom prst="rect">
+            <a:avLst/>
+          </a:prstGeom>
+          <a:noFill/>
+        </p:spPr>
+        <p:txBody>
+          <a:bodyPr wrap="square" rtlCol="0">
+            <a:spAutoFit/>
+          </a:bodyPr>
+          <a:lstStyle/>
+          <a:p>
+            <a:pPr algn="just"/>
+            <a:r>
+              <a:rPr lang="en-US" sz="2000" dirty="0">
+                <a:latin typeface="+mn-lt"/>
+                <a:cs typeface=""/>
+              </a:rPr>
+              <a:t>There are many types of receivers in the NFL, including those who play in the slot and catch lots of short passes, those who play out wide and catch very few longer passes, and all-stars who do it all. This insight prompts clustering receivers by type prior to prediction.</a:t>
+            </a:r>
+          </a:p>
+          <a:p>
+            <a:pPr algn="just"/>
+            <a:endParaRPr lang="en-US" sz="2000" dirty="0">
+              <a:latin typeface="+mn-lt"/>
+              <a:cs typeface=""/>
+            </a:endParaRPr>
+          </a:p>
+          <a:p>
+            <a:pPr algn="just"/>
+            <a:r>
+              <a:rPr lang="en-US" sz="2000" b="1" dirty="0">
+                <a:latin typeface="+mn-lt"/>
+                <a:cs typeface=""/>
+              </a:rPr>
+              <a:t>K-Means Clustering</a:t>
+            </a:r>
+            <a:endParaRPr lang="en-US" sz="2000" dirty="0">
+              <a:latin typeface="+mn-lt"/>
+              <a:cs typeface=""/>
+            </a:endParaRPr>
+          </a:p>
+          <a:p>
+            <a:pPr algn="just"/>
+            <a:r>
+              <a:rPr lang="en-US" sz="2000" dirty="0">
+                <a:latin typeface="+mn-lt"/>
+                <a:cs typeface=""/>
+              </a:rPr>
+              <a:t>K-Means will be used to cluster receivers based on various groups of 2 and 3 features. </a:t>
+            </a:r>
+          </a:p>
+        </p:txBody>
+      </p:sp>
+      <p:sp>
+        <p:nvSpPr>
+          <p:cNvPr id="63" name="TextBox 62"/>
+          <p:cNvSpPr txBox="1"/>
+          <p:nvPr/>
+        </p:nvSpPr>
+        <p:spPr>
+          <a:xfrm>
+            <a:off x="19777994" y="15503096"/>
+            <a:ext cx="8150942" cy="584776"/>
+          </a:xfrm>
+          <a:prstGeom prst="rect">
+            <a:avLst/>
+          </a:prstGeom>
+          <a:noFill/>
+        </p:spPr>
+        <p:txBody>
+          <a:bodyPr wrap="square" rtlCol="0">
+            <a:spAutoFit/>
+          </a:bodyPr>
+          <a:lstStyle/>
+          <a:p>
+            <a:pPr algn="ctr"/>
+            <a:r>
+              <a:rPr lang="en-US" sz="1600" dirty="0"/>
+              <a:t>Figure 6: 2D K-Means clustering by previous year catches and fantasy points. Note how this tends to separate high production, elite WRs in blue from role players and secondary receivers in red.</a:t>
+            </a:r>
+          </a:p>
+        </p:txBody>
+      </p:sp>
+      <p:sp>
+        <p:nvSpPr>
+          <p:cNvPr id="64" name="TextBox 63"/>
+          <p:cNvSpPr txBox="1"/>
+          <p:nvPr/>
+        </p:nvSpPr>
+        <p:spPr>
+          <a:xfrm>
+            <a:off x="19777994" y="20713908"/>
+            <a:ext cx="8150942" cy="338554"/>
+          </a:xfrm>
+          <a:prstGeom prst="rect">
+            <a:avLst/>
+          </a:prstGeom>
+          <a:noFill/>
+        </p:spPr>
+        <p:txBody>
+          <a:bodyPr wrap="square" rtlCol="0">
+            <a:spAutoFit/>
+          </a:bodyPr>
+          <a:lstStyle/>
+          <a:p>
+            <a:pPr algn="ctr"/>
+            <a:r>
+              <a:rPr lang="en-US" sz="1600" dirty="0"/>
+              <a:t>Figure 7: 3D K-Means clustering by previous year catches, fantasy points, and targets.</a:t>
+            </a:r>
+          </a:p>
+        </p:txBody>
+      </p:sp>
+      <p:sp>
+        <p:nvSpPr>
+          <p:cNvPr id="66" name="TextBox 65"/>
+          <p:cNvSpPr txBox="1"/>
+          <p:nvPr/>
+        </p:nvSpPr>
+        <p:spPr>
+          <a:xfrm>
+            <a:off x="19777994" y="21021757"/>
+            <a:ext cx="8166101" cy="3477875"/>
+          </a:xfrm>
+          <a:prstGeom prst="rect">
+            <a:avLst/>
+          </a:prstGeom>
+          <a:noFill/>
+        </p:spPr>
+        <p:txBody>
+          <a:bodyPr wrap="square" rtlCol="0">
+            <a:spAutoFit/>
+          </a:bodyPr>
+          <a:lstStyle/>
+          <a:p>
+            <a:pPr algn="just"/>
+            <a:r>
+              <a:rPr lang="en-US" sz="2000" b="1" dirty="0">
+                <a:latin typeface="+mn-lt"/>
+                <a:cs typeface=""/>
+              </a:rPr>
+              <a:t>Mixture Model</a:t>
+            </a:r>
+            <a:endParaRPr lang="en-US" sz="2000" dirty="0">
+              <a:latin typeface="+mn-lt"/>
+              <a:cs typeface=""/>
+            </a:endParaRPr>
+          </a:p>
+          <a:p>
+            <a:pPr algn="just"/>
+            <a:r>
+              <a:rPr lang="en-US" sz="2000" dirty="0">
+                <a:latin typeface="+mn-lt"/>
+                <a:cs typeface=""/>
+              </a:rPr>
+              <a:t>Linear regression is performed on each K-Means grouping individually to produce each player’s projected fantasy points for 2012.</a:t>
+            </a:r>
+          </a:p>
+          <a:p>
+            <a:pPr algn="just"/>
+            <a:endParaRPr lang="en-US" sz="2000" dirty="0">
+              <a:latin typeface="+mn-lt"/>
+              <a:cs typeface=""/>
+            </a:endParaRPr>
+          </a:p>
+          <a:p>
+            <a:pPr algn="just"/>
+            <a:r>
+              <a:rPr lang="en-US" sz="2000" b="1" dirty="0">
+                <a:latin typeface="+mn-lt"/>
+                <a:cs typeface=""/>
+              </a:rPr>
+              <a:t>Feature Reduction</a:t>
+            </a:r>
+            <a:endParaRPr lang="en-US" sz="2000" dirty="0">
+              <a:latin typeface="+mn-lt"/>
+              <a:cs typeface=""/>
+            </a:endParaRPr>
+          </a:p>
+          <a:p>
+            <a:pPr algn="just"/>
+            <a:r>
+              <a:rPr lang="en-US" sz="2000" dirty="0">
+                <a:latin typeface="+mn-lt"/>
+                <a:cs typeface=""/>
+              </a:rPr>
+              <a:t>Using the results from the feature reduction section, the experiment is repeated for 2 and 6 features.</a:t>
+            </a:r>
+          </a:p>
+          <a:p>
+            <a:pPr algn="just"/>
+            <a:endParaRPr lang="en-US" sz="2000" dirty="0">
+              <a:latin typeface="+mn-lt"/>
+              <a:cs typeface=""/>
+            </a:endParaRPr>
+          </a:p>
+          <a:p>
+            <a:pPr algn="just"/>
+            <a:r>
+              <a:rPr lang="en-US" sz="2000" b="1" dirty="0">
+                <a:latin typeface="+mn-lt"/>
+                <a:cs typeface=""/>
+              </a:rPr>
+              <a:t>Combination</a:t>
+            </a:r>
+            <a:endParaRPr lang="en-US" sz="2000" dirty="0">
+              <a:latin typeface="+mn-lt"/>
+              <a:cs typeface=""/>
+            </a:endParaRPr>
+          </a:p>
+          <a:p>
+            <a:pPr algn="just"/>
+            <a:r>
+              <a:rPr lang="en-US" sz="2000" dirty="0">
+                <a:latin typeface="+mn-lt"/>
+                <a:cs typeface=""/>
+              </a:rPr>
+              <a:t>The players, regardless of mixture, are then recombined to be ranked by the DCG algorithm. </a:t>
+            </a:r>
+          </a:p>
+        </p:txBody>
+      </p:sp>
+      <p:sp>
+        <p:nvSpPr>
+          <p:cNvPr id="67" name="TextBox 66"/>
+          <p:cNvSpPr txBox="1"/>
+          <p:nvPr/>
+        </p:nvSpPr>
+        <p:spPr>
+          <a:xfrm>
+            <a:off x="19762835" y="30743371"/>
+            <a:ext cx="8166101" cy="1323439"/>
+          </a:xfrm>
+          <a:prstGeom prst="rect">
+            <a:avLst/>
+          </a:prstGeom>
+          <a:noFill/>
+        </p:spPr>
+        <p:txBody>
+          <a:bodyPr wrap="square" rtlCol="0">
+            <a:spAutoFit/>
+          </a:bodyPr>
+          <a:lstStyle/>
+          <a:p>
+            <a:pPr algn="just"/>
+            <a:r>
+              <a:rPr lang="en-US" sz="2000" dirty="0">
+                <a:latin typeface="+mn-lt"/>
+                <a:cs typeface=""/>
+              </a:rPr>
+              <a:t>The best results are obtained by using 2D K-means on catches and previous year fantasy points to define our mixture model, and then using 2 features, points and TDs, for regression. The DCG is 1.8063, better than ESPN but not quite as good as Yahoo.</a:t>
+            </a:r>
+          </a:p>
+        </p:txBody>
+      </p:sp>
+      <p:sp>
+        <p:nvSpPr>
+          <p:cNvPr id="68" name="TextBox 67"/>
+          <p:cNvSpPr txBox="1"/>
+          <p:nvPr/>
+        </p:nvSpPr>
+        <p:spPr>
+          <a:xfrm>
+            <a:off x="19793153" y="30303219"/>
+            <a:ext cx="8150942" cy="338554"/>
+          </a:xfrm>
+          <a:prstGeom prst="rect">
+            <a:avLst/>
+          </a:prstGeom>
+          <a:noFill/>
+        </p:spPr>
+        <p:txBody>
+          <a:bodyPr wrap="square" rtlCol="0">
+            <a:spAutoFit/>
+          </a:bodyPr>
+          <a:lstStyle/>
+          <a:p>
+            <a:pPr algn="ctr"/>
+            <a:r>
+              <a:rPr lang="en-US" sz="1600" dirty="0"/>
+              <a:t>Figure 8: K-Means mixture model results through several types of runs.</a:t>
+            </a:r>
           </a:p>
         </p:txBody>
       </p:sp>

</xml_diff>

<commit_message>
v1 of poster finishedgit add -u
</commit_message>
<xml_diff>
--- a/poster/jpo4_poster.pptx
+++ b/poster/jpo4_poster.pptx
@@ -7900,7 +7900,7 @@
         </p:nvSpPr>
         <p:spPr bwMode="auto">
           <a:xfrm>
-            <a:off x="609262" y="16787037"/>
+            <a:off x="609262" y="17142637"/>
             <a:ext cx="8734426" cy="892340"/>
           </a:xfrm>
           <a:prstGeom prst="rect">
@@ -8177,7 +8177,7 @@
         </p:nvSpPr>
         <p:spPr bwMode="auto">
           <a:xfrm>
-            <a:off x="28948063" y="27758842"/>
+            <a:off x="28948063" y="27508696"/>
             <a:ext cx="8734426" cy="892340"/>
           </a:xfrm>
           <a:prstGeom prst="rect">
@@ -8305,8 +8305,8 @@
           <p:nvPr/>
         </p:nvGraphicFramePr>
         <p:xfrm>
-          <a:off x="19609857" y="24627843"/>
-          <a:ext cx="8492257" cy="5632024"/>
+          <a:off x="19609857" y="24792944"/>
+          <a:ext cx="8492257" cy="5376939"/>
         </p:xfrm>
         <a:graphic>
           <a:graphicData uri="http://schemas.openxmlformats.org/drawingml/2006/table">
@@ -8320,7 +8320,7 @@
                 <a:gridCol w="2137293"/>
                 <a:gridCol w="2137293"/>
               </a:tblGrid>
-              <a:tr h="601133">
+              <a:tr h="567837">
                 <a:tc>
                   <a:txBody>
                     <a:bodyPr/>
@@ -8390,7 +8390,7 @@
                   <a:tcPr anchor="ctr"/>
                 </a:tc>
               </a:tr>
-              <a:tr h="601133">
+              <a:tr h="574254">
                 <a:tc>
                   <a:txBody>
                     <a:bodyPr/>
@@ -8462,7 +8462,7 @@
                   <a:tcPr anchor="ctr"/>
                 </a:tc>
               </a:tr>
-              <a:tr h="601133">
+              <a:tr h="567837">
                 <a:tc>
                   <a:txBody>
                     <a:bodyPr/>
@@ -8523,7 +8523,7 @@
                   <a:tcPr anchor="ctr"/>
                 </a:tc>
               </a:tr>
-              <a:tr h="601133">
+              <a:tr h="567837">
                 <a:tc>
                   <a:txBody>
                     <a:bodyPr/>
@@ -8584,7 +8584,7 @@
                   <a:tcPr anchor="ctr"/>
                 </a:tc>
               </a:tr>
-              <a:tr h="601133">
+              <a:tr h="567837">
                 <a:tc>
                   <a:txBody>
                     <a:bodyPr/>
@@ -8645,7 +8645,7 @@
                   <a:tcPr anchor="ctr"/>
                 </a:tc>
               </a:tr>
-              <a:tr h="601133">
+              <a:tr h="816044">
                 <a:tc>
                   <a:txBody>
                     <a:bodyPr/>
@@ -8724,7 +8724,7 @@
                   <a:tcPr anchor="ctr"/>
                 </a:tc>
               </a:tr>
-              <a:tr h="601133">
+              <a:tr h="567837">
                 <a:tc>
                   <a:txBody>
                     <a:bodyPr/>
@@ -8785,7 +8785,7 @@
                   <a:tcPr anchor="ctr"/>
                 </a:tc>
               </a:tr>
-              <a:tr h="601133">
+              <a:tr h="567837">
                 <a:tc>
                   <a:txBody>
                     <a:bodyPr/>
@@ -8846,7 +8846,7 @@
                   <a:tcPr anchor="ctr"/>
                 </a:tc>
               </a:tr>
-              <a:tr h="601133">
+              <a:tr h="567837">
                 <a:tc>
                   <a:txBody>
                     <a:bodyPr/>
@@ -9035,7 +9035,7 @@
         </p:nvSpPr>
         <p:spPr bwMode="auto">
           <a:xfrm>
-            <a:off x="28948062" y="20063199"/>
+            <a:off x="28948062" y="17615406"/>
             <a:ext cx="8734426" cy="892340"/>
           </a:xfrm>
           <a:prstGeom prst="rect">
@@ -9220,35 +9220,6 @@
           </a:graphicData>
         </a:graphic>
       </p:graphicFrame>
-      <p:sp>
-        <p:nvSpPr>
-          <p:cNvPr id="40" name="TextBox 39"/>
-          <p:cNvSpPr txBox="1"/>
-          <p:nvPr/>
-        </p:nvSpPr>
-        <p:spPr>
-          <a:xfrm>
-            <a:off x="29175397" y="25407334"/>
-            <a:ext cx="7453432" cy="523220"/>
-          </a:xfrm>
-          <a:prstGeom prst="rect">
-            <a:avLst/>
-          </a:prstGeom>
-          <a:noFill/>
-        </p:spPr>
-        <p:txBody>
-          <a:bodyPr wrap="none" rtlCol="0">
-            <a:spAutoFit/>
-          </a:bodyPr>
-          <a:lstStyle/>
-          <a:p>
-            <a:r>
-              <a:rPr lang="en-US"/>
-              <a:t>Show ESPN, Yahoo, My best, Actual. Then color code it</a:t>
-            </a:r>
-          </a:p>
-        </p:txBody>
-      </p:sp>
       <p:graphicFrame>
         <p:nvGraphicFramePr>
           <p:cNvPr id="41" name="Table 40"/>
@@ -10475,7 +10446,7 @@
         </p:blipFill>
         <p:spPr>
           <a:xfrm>
-            <a:off x="28948062" y="7631862"/>
+            <a:off x="28948063" y="7503720"/>
             <a:ext cx="8734427" cy="6550820"/>
           </a:xfrm>
           <a:prstGeom prst="rect">
@@ -10492,7 +10463,7 @@
           <p:nvPr/>
         </p:nvGraphicFramePr>
         <p:xfrm>
-          <a:off x="29073799" y="15433294"/>
+          <a:off x="29073799" y="15756496"/>
           <a:ext cx="8492257" cy="1353743"/>
         </p:xfrm>
         <a:graphic>
@@ -10635,7 +10606,7 @@
         <p:spPr>
           <a:xfrm>
             <a:off x="888999" y="11385918"/>
-            <a:ext cx="8166101" cy="5324535"/>
+            <a:ext cx="8166101" cy="5632311"/>
           </a:xfrm>
           <a:prstGeom prst="rect">
             <a:avLst/>
@@ -10791,7 +10762,7 @@
               <a:rPr lang="en-US" sz="2000" dirty="0">
                 <a:latin typeface="+mn-lt"/>
               </a:rPr>
-              <a:t>A top 30 list of NFL WRs ordered by predicted fantasy point output.</a:t>
+              <a:t>A top 30 list of NFL WRs ordered by predicted fantasy point output in the 2012 season, using only data available prior to the 2012 season.</a:t>
             </a:r>
           </a:p>
         </p:txBody>
@@ -10804,7 +10775,7 @@
         </p:nvSpPr>
         <p:spPr>
           <a:xfrm>
-            <a:off x="898186" y="17799860"/>
+            <a:off x="898186" y="18155460"/>
             <a:ext cx="8166101" cy="707886"/>
           </a:xfrm>
           <a:prstGeom prst="rect">
@@ -10892,7 +10863,7 @@
           <p:nvPr/>
         </p:nvGraphicFramePr>
         <p:xfrm>
-          <a:off x="2101704" y="19000010"/>
+          <a:off x="2101704" y="19355610"/>
           <a:ext cx="5973233" cy="3589924"/>
         </p:xfrm>
         <a:graphic>
@@ -11967,7 +11938,7 @@
         </p:nvSpPr>
         <p:spPr>
           <a:xfrm rot="16200000">
-            <a:off x="548164" y="20024895"/>
+            <a:off x="548164" y="20380495"/>
             <a:ext cx="2583860" cy="523220"/>
           </a:xfrm>
           <a:prstGeom prst="rect">
@@ -12014,7 +11985,7 @@
         </p:nvSpPr>
         <p:spPr>
           <a:xfrm>
-            <a:off x="2101704" y="18538345"/>
+            <a:off x="2101704" y="18893945"/>
             <a:ext cx="3669995" cy="461665"/>
           </a:xfrm>
           <a:prstGeom prst="rect">
@@ -12056,7 +12027,7 @@
         </p:nvSpPr>
         <p:spPr>
           <a:xfrm>
-            <a:off x="898186" y="22879226"/>
+            <a:off x="898186" y="23082426"/>
             <a:ext cx="8166101" cy="1631216"/>
           </a:xfrm>
           <a:prstGeom prst="rect">
@@ -12111,7 +12082,7 @@
           <p:nvPr/>
         </p:nvGraphicFramePr>
         <p:xfrm>
-          <a:off x="2101704" y="23985107"/>
+          <a:off x="2101704" y="24188307"/>
           <a:ext cx="2548081" cy="743190"/>
         </p:xfrm>
         <a:graphic>
@@ -12164,7 +12135,7 @@
           <p:nvPr/>
         </p:nvGraphicFramePr>
         <p:xfrm>
-          <a:off x="5335588" y="24044381"/>
+          <a:off x="5335588" y="24247581"/>
           <a:ext cx="3016250" cy="658812"/>
         </p:xfrm>
         <a:graphic>
@@ -12263,7 +12234,7 @@
                 <a:latin typeface="+mn-lt"/>
                 <a:cs typeface=""/>
               </a:rPr>
-              <a:t>(1) Linear Regression</a:t>
+              <a:t>1) Linear Regression</a:t>
             </a:r>
             <a:endParaRPr lang="en-US" sz="2000" dirty="0">
               <a:latin typeface="+mn-lt"/>
@@ -12680,7 +12651,7 @@
                 <a:latin typeface="+mn-lt"/>
                 <a:cs typeface=""/>
               </a:rPr>
-              <a:t>(2) Feature Reduction</a:t>
+              <a:t>2) Feature Reduction</a:t>
             </a:r>
           </a:p>
           <a:p>
@@ -12752,7 +12723,7 @@
               <a:rPr lang="en-US" sz="2000" b="1" dirty="0">
                 <a:latin typeface="+mn-lt"/>
               </a:rPr>
-              <a:t>(3) K-Means Mixture Model</a:t>
+              <a:t>3) K-Means Mixture Model</a:t>
             </a:r>
           </a:p>
           <a:p>
@@ -12894,7 +12865,7 @@
               <a:rPr lang="en-US" sz="2000" b="1" dirty="0">
                 <a:latin typeface="+mn-lt"/>
               </a:rPr>
-              <a:t>(4) PCA Regression</a:t>
+              <a:t>4) PCA Regression</a:t>
             </a:r>
           </a:p>
           <a:p>
@@ -13619,7 +13590,7 @@
         </p:nvSpPr>
         <p:spPr>
           <a:xfrm>
-            <a:off x="19777994" y="21021757"/>
+            <a:off x="19777994" y="21123357"/>
             <a:ext cx="8166101" cy="3477875"/>
           </a:xfrm>
           <a:prstGeom prst="rect">
@@ -13728,7 +13699,7 @@
         </p:nvSpPr>
         <p:spPr>
           <a:xfrm>
-            <a:off x="19762835" y="30743371"/>
+            <a:off x="19762835" y="30650239"/>
             <a:ext cx="8166101" cy="1323439"/>
           </a:xfrm>
           <a:prstGeom prst="rect">
@@ -13761,7 +13732,7 @@
         </p:nvSpPr>
         <p:spPr>
           <a:xfrm>
-            <a:off x="19793153" y="30303219"/>
+            <a:off x="19793153" y="30196423"/>
             <a:ext cx="8150942" cy="338554"/>
           </a:xfrm>
           <a:prstGeom prst="rect">
@@ -13780,6 +13751,1558 @@
               <a:rPr lang="en-US" sz="1600" dirty="0"/>
               <a:t>Figure 8: K-Means mixture model results through several types of runs.</a:t>
             </a:r>
+          </a:p>
+        </p:txBody>
+      </p:sp>
+      <p:sp>
+        <p:nvSpPr>
+          <p:cNvPr id="69" name="TextBox 68"/>
+          <p:cNvSpPr txBox="1"/>
+          <p:nvPr/>
+        </p:nvSpPr>
+        <p:spPr>
+          <a:xfrm>
+            <a:off x="29209455" y="6732334"/>
+            <a:ext cx="8166101" cy="707886"/>
+          </a:xfrm>
+          <a:prstGeom prst="rect">
+            <a:avLst/>
+          </a:prstGeom>
+          <a:noFill/>
+        </p:spPr>
+        <p:txBody>
+          <a:bodyPr wrap="square" rtlCol="0">
+            <a:spAutoFit/>
+          </a:bodyPr>
+          <a:lstStyle/>
+          <a:p>
+            <a:pPr algn="just"/>
+            <a:r>
+              <a:rPr lang="en-US" sz="2000" dirty="0">
+                <a:latin typeface="+mn-lt"/>
+                <a:cs typeface=""/>
+              </a:rPr>
+              <a:t>The results of PCA show that the majority of the variance in our data is explained by the first 4 principle components.</a:t>
+            </a:r>
+          </a:p>
+        </p:txBody>
+      </p:sp>
+      <p:sp>
+        <p:nvSpPr>
+          <p:cNvPr id="70" name="TextBox 69"/>
+          <p:cNvSpPr txBox="1"/>
+          <p:nvPr/>
+        </p:nvSpPr>
+        <p:spPr>
+          <a:xfrm>
+            <a:off x="29224614" y="13952940"/>
+            <a:ext cx="8150942" cy="584776"/>
+          </a:xfrm>
+          <a:prstGeom prst="rect">
+            <a:avLst/>
+          </a:prstGeom>
+          <a:noFill/>
+        </p:spPr>
+        <p:txBody>
+          <a:bodyPr wrap="square" rtlCol="0">
+            <a:spAutoFit/>
+          </a:bodyPr>
+          <a:lstStyle/>
+          <a:p>
+            <a:pPr algn="ctr"/>
+            <a:r>
+              <a:rPr lang="en-US" sz="1600" dirty="0"/>
+              <a:t>Figure 9: PCA and PCA regression run with varying numbers of principle components. Note how the DCG goes up as we choose enough principle components to explain the majority of the variance.</a:t>
+            </a:r>
+          </a:p>
+        </p:txBody>
+      </p:sp>
+      <p:sp>
+        <p:nvSpPr>
+          <p:cNvPr id="71" name="TextBox 70"/>
+          <p:cNvSpPr txBox="1"/>
+          <p:nvPr/>
+        </p:nvSpPr>
+        <p:spPr>
+          <a:xfrm>
+            <a:off x="29224614" y="14795210"/>
+            <a:ext cx="8166101" cy="707886"/>
+          </a:xfrm>
+          <a:prstGeom prst="rect">
+            <a:avLst/>
+          </a:prstGeom>
+          <a:noFill/>
+        </p:spPr>
+        <p:txBody>
+          <a:bodyPr wrap="square" rtlCol="0">
+            <a:spAutoFit/>
+          </a:bodyPr>
+          <a:lstStyle/>
+          <a:p>
+            <a:pPr algn="just"/>
+            <a:r>
+              <a:rPr lang="en-US" sz="2000" dirty="0">
+                <a:latin typeface="+mn-lt"/>
+                <a:cs typeface=""/>
+              </a:rPr>
+              <a:t>Using PCA regression with 10 principle components, we are able to out-perform the experts at both Yahoo and ESPN.</a:t>
+            </a:r>
+          </a:p>
+        </p:txBody>
+      </p:sp>
+      <p:sp>
+        <p:nvSpPr>
+          <p:cNvPr id="72" name="TextBox 71"/>
+          <p:cNvSpPr txBox="1"/>
+          <p:nvPr/>
+        </p:nvSpPr>
+        <p:spPr>
+          <a:xfrm>
+            <a:off x="29224614" y="17113484"/>
+            <a:ext cx="8150942" cy="338554"/>
+          </a:xfrm>
+          <a:prstGeom prst="rect">
+            <a:avLst/>
+          </a:prstGeom>
+          <a:noFill/>
+        </p:spPr>
+        <p:txBody>
+          <a:bodyPr wrap="square" rtlCol="0">
+            <a:spAutoFit/>
+          </a:bodyPr>
+          <a:lstStyle/>
+          <a:p>
+            <a:pPr algn="ctr"/>
+            <a:r>
+              <a:rPr lang="en-US" sz="1600" dirty="0"/>
+              <a:t>Figure 10: The PCA results are better than standard linear regression and the mixture model approach.</a:t>
+            </a:r>
+          </a:p>
+        </p:txBody>
+      </p:sp>
+      <p:sp>
+        <p:nvSpPr>
+          <p:cNvPr id="73" name="TextBox 72"/>
+          <p:cNvSpPr txBox="1"/>
+          <p:nvPr/>
+        </p:nvSpPr>
+        <p:spPr>
+          <a:xfrm>
+            <a:off x="29224614" y="18684167"/>
+            <a:ext cx="8166101" cy="1323439"/>
+          </a:xfrm>
+          <a:prstGeom prst="rect">
+            <a:avLst/>
+          </a:prstGeom>
+          <a:noFill/>
+        </p:spPr>
+        <p:txBody>
+          <a:bodyPr wrap="square" rtlCol="0">
+            <a:spAutoFit/>
+          </a:bodyPr>
+          <a:lstStyle/>
+          <a:p>
+            <a:pPr algn="just"/>
+            <a:r>
+              <a:rPr lang="en-US" sz="2000" dirty="0">
+                <a:latin typeface="+mn-lt"/>
+                <a:cs typeface=""/>
+              </a:rPr>
+              <a:t>Several machine learning approaches to ranking NFL receivers are shown. The best results come from PCA regression with 10 principle components. This method outperforms the experts at ESPN and Yahoo for the 2012 season.</a:t>
+            </a:r>
+          </a:p>
+        </p:txBody>
+      </p:sp>
+      <p:graphicFrame>
+        <p:nvGraphicFramePr>
+          <p:cNvPr id="74" name="Table 73"/>
+          <p:cNvGraphicFramePr>
+            <a:graphicFrameLocks noGrp="1"/>
+          </p:cNvGraphicFramePr>
+          <p:nvPr/>
+        </p:nvGraphicFramePr>
+        <p:xfrm>
+          <a:off x="29073798" y="20178177"/>
+          <a:ext cx="8492256" cy="6809738"/>
+        </p:xfrm>
+        <a:graphic>
+          <a:graphicData uri="http://schemas.openxmlformats.org/drawingml/2006/table">
+            <a:tbl>
+              <a:tblPr firstRow="1" bandRow="1">
+                <a:tableStyleId>{5A111915-BE36-4E01-A7E5-04B1672EAD32}</a:tableStyleId>
+              </a:tblPr>
+              <a:tblGrid>
+                <a:gridCol w="2123064"/>
+                <a:gridCol w="2123064"/>
+                <a:gridCol w="2123064"/>
+                <a:gridCol w="2123064"/>
+              </a:tblGrid>
+              <a:tr h="317500">
+                <a:tc>
+                  <a:txBody>
+                    <a:bodyPr/>
+                    <a:lstStyle/>
+                    <a:p>
+                      <a:r>
+                        <a:rPr lang="en-US" sz="1400" dirty="0">
+                          <a:solidFill>
+                            <a:srgbClr val="000000"/>
+                          </a:solidFill>
+                        </a:rPr>
+                        <a:t>Actual</a:t>
+                      </a:r>
+                    </a:p>
+                  </a:txBody>
+                  <a:tcPr>
+                    <a:lnL w="12700" cap="flat" cmpd="sng" algn="ctr">
+                      <a:solidFill>
+                        <a:srgbClr val="000000"/>
+                      </a:solidFill>
+                      <a:prstDash val="solid"/>
+                      <a:round/>
+                      <a:headEnd type="none" w="med" len="med"/>
+                      <a:tailEnd type="none" w="med" len="med"/>
+                    </a:lnL>
+                    <a:lnR w="12700" cap="flat" cmpd="sng" algn="ctr">
+                      <a:solidFill>
+                        <a:srgbClr val="000000"/>
+                      </a:solidFill>
+                      <a:prstDash val="solid"/>
+                      <a:round/>
+                      <a:headEnd type="none" w="med" len="med"/>
+                      <a:tailEnd type="none" w="med" len="med"/>
+                    </a:lnR>
+                    <a:lnT w="12700" cap="flat" cmpd="sng" algn="ctr">
+                      <a:solidFill>
+                        <a:srgbClr val="000000"/>
+                      </a:solidFill>
+                      <a:prstDash val="solid"/>
+                      <a:round/>
+                      <a:headEnd type="none" w="med" len="med"/>
+                      <a:tailEnd type="none" w="med" len="med"/>
+                    </a:lnT>
+                    <a:lnB w="12700" cap="flat" cmpd="sng" algn="ctr">
+                      <a:solidFill>
+                        <a:srgbClr val="000000"/>
+                      </a:solidFill>
+                      <a:prstDash val="solid"/>
+                      <a:round/>
+                      <a:headEnd type="none" w="med" len="med"/>
+                      <a:tailEnd type="none" w="med" len="med"/>
+                    </a:lnB>
+                  </a:tcPr>
+                </a:tc>
+                <a:tc>
+                  <a:txBody>
+                    <a:bodyPr/>
+                    <a:lstStyle/>
+                    <a:p>
+                      <a:r>
+                        <a:rPr lang="en-US" sz="1400" dirty="0">
+                          <a:solidFill>
+                            <a:srgbClr val="000000"/>
+                          </a:solidFill>
+                        </a:rPr>
+                        <a:t>PCA Regression</a:t>
+                      </a:r>
+                    </a:p>
+                  </a:txBody>
+                  <a:tcPr>
+                    <a:lnL w="12700" cap="flat" cmpd="sng" algn="ctr">
+                      <a:solidFill>
+                        <a:srgbClr val="000000"/>
+                      </a:solidFill>
+                      <a:prstDash val="solid"/>
+                      <a:round/>
+                      <a:headEnd type="none" w="med" len="med"/>
+                      <a:tailEnd type="none" w="med" len="med"/>
+                    </a:lnL>
+                    <a:lnR w="12700" cap="flat" cmpd="sng" algn="ctr">
+                      <a:solidFill>
+                        <a:srgbClr val="000000"/>
+                      </a:solidFill>
+                      <a:prstDash val="solid"/>
+                      <a:round/>
+                      <a:headEnd type="none" w="med" len="med"/>
+                      <a:tailEnd type="none" w="med" len="med"/>
+                    </a:lnR>
+                    <a:lnT w="12700" cap="flat" cmpd="sng" algn="ctr">
+                      <a:solidFill>
+                        <a:srgbClr val="000000"/>
+                      </a:solidFill>
+                      <a:prstDash val="solid"/>
+                      <a:round/>
+                      <a:headEnd type="none" w="med" len="med"/>
+                      <a:tailEnd type="none" w="med" len="med"/>
+                    </a:lnT>
+                    <a:lnB w="12700" cap="flat" cmpd="sng" algn="ctr">
+                      <a:solidFill>
+                        <a:srgbClr val="000000"/>
+                      </a:solidFill>
+                      <a:prstDash val="solid"/>
+                      <a:round/>
+                      <a:headEnd type="none" w="med" len="med"/>
+                      <a:tailEnd type="none" w="med" len="med"/>
+                    </a:lnB>
+                  </a:tcPr>
+                </a:tc>
+                <a:tc>
+                  <a:txBody>
+                    <a:bodyPr/>
+                    <a:lstStyle/>
+                    <a:p>
+                      <a:r>
+                        <a:rPr lang="en-US" sz="1400" dirty="0">
+                          <a:solidFill>
+                            <a:srgbClr val="000000"/>
+                          </a:solidFill>
+                        </a:rPr>
+                        <a:t>ESPN</a:t>
+                      </a:r>
+                    </a:p>
+                  </a:txBody>
+                  <a:tcPr>
+                    <a:lnL w="12700" cap="flat" cmpd="sng" algn="ctr">
+                      <a:solidFill>
+                        <a:srgbClr val="000000"/>
+                      </a:solidFill>
+                      <a:prstDash val="solid"/>
+                      <a:round/>
+                      <a:headEnd type="none" w="med" len="med"/>
+                      <a:tailEnd type="none" w="med" len="med"/>
+                    </a:lnL>
+                    <a:lnR w="12700" cap="flat" cmpd="sng" algn="ctr">
+                      <a:solidFill>
+                        <a:srgbClr val="000000"/>
+                      </a:solidFill>
+                      <a:prstDash val="solid"/>
+                      <a:round/>
+                      <a:headEnd type="none" w="med" len="med"/>
+                      <a:tailEnd type="none" w="med" len="med"/>
+                    </a:lnR>
+                    <a:lnT w="12700" cap="flat" cmpd="sng" algn="ctr">
+                      <a:solidFill>
+                        <a:srgbClr val="000000"/>
+                      </a:solidFill>
+                      <a:prstDash val="solid"/>
+                      <a:round/>
+                      <a:headEnd type="none" w="med" len="med"/>
+                      <a:tailEnd type="none" w="med" len="med"/>
+                    </a:lnT>
+                    <a:lnB w="12700" cap="flat" cmpd="sng" algn="ctr">
+                      <a:solidFill>
+                        <a:srgbClr val="000000"/>
+                      </a:solidFill>
+                      <a:prstDash val="solid"/>
+                      <a:round/>
+                      <a:headEnd type="none" w="med" len="med"/>
+                      <a:tailEnd type="none" w="med" len="med"/>
+                    </a:lnB>
+                  </a:tcPr>
+                </a:tc>
+                <a:tc>
+                  <a:txBody>
+                    <a:bodyPr/>
+                    <a:lstStyle/>
+                    <a:p>
+                      <a:r>
+                        <a:rPr lang="en-US" sz="1400" dirty="0">
+                          <a:solidFill>
+                            <a:srgbClr val="000000"/>
+                          </a:solidFill>
+                        </a:rPr>
+                        <a:t>Yahoo</a:t>
+                      </a:r>
+                    </a:p>
+                  </a:txBody>
+                  <a:tcPr>
+                    <a:lnL w="12700" cap="flat" cmpd="sng" algn="ctr">
+                      <a:solidFill>
+                        <a:srgbClr val="000000"/>
+                      </a:solidFill>
+                      <a:prstDash val="solid"/>
+                      <a:round/>
+                      <a:headEnd type="none" w="med" len="med"/>
+                      <a:tailEnd type="none" w="med" len="med"/>
+                    </a:lnL>
+                    <a:lnR w="12700" cap="flat" cmpd="sng" algn="ctr">
+                      <a:solidFill>
+                        <a:srgbClr val="000000"/>
+                      </a:solidFill>
+                      <a:prstDash val="solid"/>
+                      <a:round/>
+                      <a:headEnd type="none" w="med" len="med"/>
+                      <a:tailEnd type="none" w="med" len="med"/>
+                    </a:lnR>
+                    <a:lnT w="12700" cap="flat" cmpd="sng" algn="ctr">
+                      <a:solidFill>
+                        <a:srgbClr val="000000"/>
+                      </a:solidFill>
+                      <a:prstDash val="solid"/>
+                      <a:round/>
+                      <a:headEnd type="none" w="med" len="med"/>
+                      <a:tailEnd type="none" w="med" len="med"/>
+                    </a:lnT>
+                    <a:lnB w="12700" cap="flat" cmpd="sng" algn="ctr">
+                      <a:solidFill>
+                        <a:srgbClr val="000000"/>
+                      </a:solidFill>
+                      <a:prstDash val="solid"/>
+                      <a:round/>
+                      <a:headEnd type="none" w="med" len="med"/>
+                      <a:tailEnd type="none" w="med" len="med"/>
+                    </a:lnB>
+                  </a:tcPr>
+                </a:tc>
+              </a:tr>
+              <a:tr h="370840">
+                <a:tc>
+                  <a:txBody>
+                    <a:bodyPr/>
+                    <a:lstStyle/>
+                    <a:p>
+                      <a:r>
+                        <a:rPr lang="en-US" sz="1400" dirty="0"/>
+                        <a:t>Johnson | Calvin     </a:t>
+                      </a:r>
+                    </a:p>
+                    <a:p>
+                      <a:r>
+                        <a:rPr lang="en-US" sz="1400" dirty="0"/>
+                        <a:t>Marshall | Brandon   </a:t>
+                      </a:r>
+                    </a:p>
+                    <a:p>
+                      <a:r>
+                        <a:rPr lang="en-US" sz="1400" dirty="0"/>
+                        <a:t>Bryant | Dez         </a:t>
+                      </a:r>
+                    </a:p>
+                    <a:p>
+                      <a:r>
+                        <a:rPr lang="en-US" sz="1400" dirty="0"/>
+                        <a:t>Green | A.J.         </a:t>
+                      </a:r>
+                    </a:p>
+                    <a:p>
+                      <a:r>
+                        <a:rPr lang="en-US" sz="1400" dirty="0"/>
+                        <a:t>Thomas | Demaryius   </a:t>
+                      </a:r>
+                    </a:p>
+                    <a:p>
+                      <a:r>
+                        <a:rPr lang="en-US" sz="1400" dirty="0"/>
+                        <a:t>Jackson | Vincent    </a:t>
+                      </a:r>
+                    </a:p>
+                    <a:p>
+                      <a:r>
+                        <a:rPr lang="en-US" sz="1400" dirty="0"/>
+                        <a:t>Decker | Eric        </a:t>
+                      </a:r>
+                    </a:p>
+                    <a:p>
+                      <a:r>
+                        <a:rPr lang="en-US" sz="1400" dirty="0"/>
+                        <a:t>Johnson | Andre      </a:t>
+                      </a:r>
+                    </a:p>
+                    <a:p>
+                      <a:r>
+                        <a:rPr lang="en-US" sz="1400" dirty="0"/>
+                        <a:t>Jones | Julio        </a:t>
+                      </a:r>
+                    </a:p>
+                    <a:p>
+                      <a:r>
+                        <a:rPr lang="en-US" sz="1400" dirty="0"/>
+                        <a:t>White | Roddy        </a:t>
+                      </a:r>
+                    </a:p>
+                    <a:p>
+                      <a:r>
+                        <a:rPr lang="en-US" sz="1400" dirty="0"/>
+                        <a:t>Colston | Marques    </a:t>
+                      </a:r>
+                    </a:p>
+                    <a:p>
+                      <a:r>
+                        <a:rPr lang="en-US" sz="1400" dirty="0"/>
+                        <a:t>Welker | Wes         </a:t>
+                      </a:r>
+                    </a:p>
+                    <a:p>
+                      <a:r>
+                        <a:rPr lang="en-US" sz="1400" dirty="0"/>
+                        <a:t>Cruz | Victor        </a:t>
+                      </a:r>
+                    </a:p>
+                    <a:p>
+                      <a:r>
+                        <a:rPr lang="en-US" sz="1400" dirty="0"/>
+                        <a:t>Crabtree | Michael   </a:t>
+                      </a:r>
+                    </a:p>
+                    <a:p>
+                      <a:r>
+                        <a:rPr lang="en-US" sz="1400" dirty="0"/>
+                        <a:t>Wayne | Reggie       </a:t>
+                      </a:r>
+                    </a:p>
+                    <a:p>
+                      <a:r>
+                        <a:rPr lang="en-US" sz="1400" dirty="0"/>
+                        <a:t>Jones | James        </a:t>
+                      </a:r>
+                    </a:p>
+                    <a:p>
+                      <a:r>
+                        <a:rPr lang="en-US" sz="1400" dirty="0"/>
+                        <a:t>Cobb | Randall       </a:t>
+                      </a:r>
+                    </a:p>
+                    <a:p>
+                      <a:r>
+                        <a:rPr lang="en-US" sz="1400" dirty="0"/>
+                        <a:t>Williams | Mike (TB) </a:t>
+                      </a:r>
+                    </a:p>
+                    <a:p>
+                      <a:r>
+                        <a:rPr lang="en-US" sz="1400" dirty="0"/>
+                        <a:t>Smith | Steve (Car)  </a:t>
+                      </a:r>
+                    </a:p>
+                    <a:p>
+                      <a:r>
+                        <a:rPr lang="en-US" sz="1400" dirty="0"/>
+                        <a:t>Johnson | Steve      </a:t>
+                      </a:r>
+                    </a:p>
+                    <a:p>
+                      <a:r>
+                        <a:rPr lang="en-US" sz="1400" dirty="0"/>
+                        <a:t>Moore | Lance        </a:t>
+                      </a:r>
+                    </a:p>
+                    <a:p>
+                      <a:r>
+                        <a:rPr lang="en-US" sz="1400" dirty="0"/>
+                        <a:t>Shorts | Cecil       </a:t>
+                      </a:r>
+                    </a:p>
+                    <a:p>
+                      <a:r>
+                        <a:rPr lang="en-US" sz="1400" dirty="0"/>
+                        <a:t>Smith | Torrey       </a:t>
+                      </a:r>
+                    </a:p>
+                    <a:p>
+                      <a:r>
+                        <a:rPr lang="en-US" sz="1400" dirty="0"/>
+                        <a:t>Wallace | Mike       </a:t>
+                      </a:r>
+                    </a:p>
+                    <a:p>
+                      <a:r>
+                        <a:rPr lang="en-US" sz="1400" dirty="0"/>
+                        <a:t>Hilton | T.Y.        </a:t>
+                      </a:r>
+                    </a:p>
+                    <a:p>
+                      <a:r>
+                        <a:rPr lang="en-US" sz="1400" dirty="0"/>
+                        <a:t>Austin | Miles       </a:t>
+                      </a:r>
+                    </a:p>
+                    <a:p>
+                      <a:r>
+                        <a:rPr lang="en-US" sz="1400" dirty="0"/>
+                        <a:t>Maclin | Jeremy      </a:t>
+                      </a:r>
+                    </a:p>
+                    <a:p>
+                      <a:r>
+                        <a:rPr lang="en-US" sz="1400" dirty="0"/>
+                        <a:t>Blackmon | Justin    </a:t>
+                      </a:r>
+                    </a:p>
+                    <a:p>
+                      <a:r>
+                        <a:rPr lang="en-US" sz="1400" dirty="0"/>
+                        <a:t>Rice | Sidney        </a:t>
+                      </a:r>
+                    </a:p>
+                    <a:p>
+                      <a:r>
+                        <a:rPr lang="en-US" sz="1400" dirty="0"/>
+                        <a:t>Nelson | Jordy </a:t>
+                      </a:r>
+                    </a:p>
+                  </a:txBody>
+                  <a:tcPr>
+                    <a:lnL w="12700" cap="flat" cmpd="sng" algn="ctr">
+                      <a:solidFill>
+                        <a:srgbClr val="000000"/>
+                      </a:solidFill>
+                      <a:prstDash val="solid"/>
+                      <a:round/>
+                      <a:headEnd type="none" w="med" len="med"/>
+                      <a:tailEnd type="none" w="med" len="med"/>
+                    </a:lnL>
+                    <a:lnR w="12700" cap="flat" cmpd="sng" algn="ctr">
+                      <a:solidFill>
+                        <a:srgbClr val="000000"/>
+                      </a:solidFill>
+                      <a:prstDash val="solid"/>
+                      <a:round/>
+                      <a:headEnd type="none" w="med" len="med"/>
+                      <a:tailEnd type="none" w="med" len="med"/>
+                    </a:lnR>
+                    <a:lnT w="12700" cap="flat" cmpd="sng" algn="ctr">
+                      <a:solidFill>
+                        <a:srgbClr val="000000"/>
+                      </a:solidFill>
+                      <a:prstDash val="solid"/>
+                      <a:round/>
+                      <a:headEnd type="none" w="med" len="med"/>
+                      <a:tailEnd type="none" w="med" len="med"/>
+                    </a:lnT>
+                    <a:lnB w="12700" cap="flat" cmpd="sng" algn="ctr">
+                      <a:solidFill>
+                        <a:srgbClr val="000000"/>
+                      </a:solidFill>
+                      <a:prstDash val="solid"/>
+                      <a:round/>
+                      <a:headEnd type="none" w="med" len="med"/>
+                      <a:tailEnd type="none" w="med" len="med"/>
+                    </a:lnB>
+                  </a:tcPr>
+                </a:tc>
+                <a:tc>
+                  <a:txBody>
+                    <a:bodyPr/>
+                    <a:lstStyle/>
+                    <a:p>
+                      <a:r>
+                        <a:rPr lang="en-US" sz="1400" dirty="0"/>
+                        <a:t>Johnson | Calvin     </a:t>
+                      </a:r>
+                    </a:p>
+                    <a:p>
+                      <a:r>
+                        <a:rPr lang="en-US" sz="1400" dirty="0"/>
+                        <a:t>Welker | Wes         </a:t>
+                      </a:r>
+                    </a:p>
+                    <a:p>
+                      <a:r>
+                        <a:rPr lang="en-US" sz="1400" dirty="0"/>
+                        <a:t>Johnson | Andre      </a:t>
+                      </a:r>
+                    </a:p>
+                    <a:p>
+                      <a:r>
+                        <a:rPr lang="en-US" sz="1400" dirty="0"/>
+                        <a:t>Jennings | Greg      </a:t>
+                      </a:r>
+                    </a:p>
+                    <a:p>
+                      <a:r>
+                        <a:rPr lang="en-US" sz="1400" dirty="0"/>
+                        <a:t>Fitzgerald | Larry   </a:t>
+                      </a:r>
+                    </a:p>
+                    <a:p>
+                      <a:r>
+                        <a:rPr lang="en-US" sz="1400" dirty="0"/>
+                        <a:t>White | Roddy        </a:t>
+                      </a:r>
+                    </a:p>
+                    <a:p>
+                      <a:r>
+                        <a:rPr lang="en-US" sz="1400" dirty="0"/>
+                        <a:t>Wallace | Mike       </a:t>
+                      </a:r>
+                    </a:p>
+                    <a:p>
+                      <a:r>
+                        <a:rPr lang="en-US" sz="1400" dirty="0"/>
+                        <a:t>Nicks | Hakeem       </a:t>
+                      </a:r>
+                    </a:p>
+                    <a:p>
+                      <a:r>
+                        <a:rPr lang="en-US" sz="1400" dirty="0"/>
+                        <a:t>Cruz | Victor        </a:t>
+                      </a:r>
+                    </a:p>
+                    <a:p>
+                      <a:r>
+                        <a:rPr lang="en-US" sz="1400" dirty="0"/>
+                        <a:t>Green | A.J.         </a:t>
+                      </a:r>
+                    </a:p>
+                    <a:p>
+                      <a:r>
+                        <a:rPr lang="en-US" sz="1400" dirty="0"/>
+                        <a:t>Jones | Julio        </a:t>
+                      </a:r>
+                    </a:p>
+                    <a:p>
+                      <a:r>
+                        <a:rPr lang="en-US" sz="1400" dirty="0"/>
+                        <a:t>Colston | Marques    </a:t>
+                      </a:r>
+                    </a:p>
+                    <a:p>
+                      <a:r>
+                        <a:rPr lang="en-US" sz="1400" dirty="0"/>
+                        <a:t>Nelson | Jordy       </a:t>
+                      </a:r>
+                    </a:p>
+                    <a:p>
+                      <a:r>
+                        <a:rPr lang="en-US" sz="1400" dirty="0"/>
+                        <a:t>Marshall | Brandon   </a:t>
+                      </a:r>
+                    </a:p>
+                    <a:p>
+                      <a:r>
+                        <a:rPr lang="en-US" sz="1400" dirty="0"/>
+                        <a:t>Smith | Steve (Car)  </a:t>
+                      </a:r>
+                    </a:p>
+                    <a:p>
+                      <a:r>
+                        <a:rPr lang="en-US" sz="1400" dirty="0"/>
+                        <a:t>Bryant | Dez         </a:t>
+                      </a:r>
+                    </a:p>
+                    <a:p>
+                      <a:r>
+                        <a:rPr lang="en-US" sz="1400" dirty="0"/>
+                        <a:t>Harvin | Percy       </a:t>
+                      </a:r>
+                    </a:p>
+                    <a:p>
+                      <a:r>
+                        <a:rPr lang="en-US" sz="1400" dirty="0"/>
+                        <a:t>Bowe | Dwayne        </a:t>
+                      </a:r>
+                    </a:p>
+                    <a:p>
+                      <a:r>
+                        <a:rPr lang="en-US" sz="1400" dirty="0"/>
+                        <a:t>Lloyd | Brandon      </a:t>
+                      </a:r>
+                    </a:p>
+                    <a:p>
+                      <a:r>
+                        <a:rPr lang="en-US" sz="1400" dirty="0"/>
+                        <a:t>Jackson | Vincent    </a:t>
+                      </a:r>
+                    </a:p>
+                    <a:p>
+                      <a:r>
+                        <a:rPr lang="en-US" sz="1400" dirty="0"/>
+                        <a:t>Maclin | Jeremy      </a:t>
+                      </a:r>
+                    </a:p>
+                    <a:p>
+                      <a:r>
+                        <a:rPr lang="en-US" sz="1400" dirty="0"/>
+                        <a:t>Johnson | Steve      </a:t>
+                      </a:r>
+                    </a:p>
+                    <a:p>
+                      <a:r>
+                        <a:rPr lang="en-US" sz="1400" dirty="0"/>
+                        <a:t>Austin | Miles       </a:t>
+                      </a:r>
+                    </a:p>
+                    <a:p>
+                      <a:r>
+                        <a:rPr lang="en-US" sz="1400" dirty="0"/>
+                        <a:t>Brown | Antonio      </a:t>
+                      </a:r>
+                    </a:p>
+                    <a:p>
+                      <a:r>
+                        <a:rPr lang="en-US" sz="1400" dirty="0"/>
+                        <a:t>Jackson | DeSean     </a:t>
+                      </a:r>
+                    </a:p>
+                    <a:p>
+                      <a:r>
+                        <a:rPr lang="en-US" sz="1400" dirty="0"/>
+                        <a:t>Garcon | Pierre      </a:t>
+                      </a:r>
+                    </a:p>
+                    <a:p>
+                      <a:r>
+                        <a:rPr lang="en-US" sz="1400" dirty="0"/>
+                        <a:t>Meachem | Robert     </a:t>
+                      </a:r>
+                    </a:p>
+                    <a:p>
+                      <a:r>
+                        <a:rPr lang="en-US" sz="1400" dirty="0"/>
+                        <a:t>Thomas | Demaryius   </a:t>
+                      </a:r>
+                    </a:p>
+                    <a:p>
+                      <a:r>
+                        <a:rPr lang="en-US" sz="1400" dirty="0"/>
+                        <a:t>Decker | Eric        </a:t>
+                      </a:r>
+                    </a:p>
+                    <a:p>
+                      <a:r>
+                        <a:rPr lang="en-US" sz="1400" dirty="0"/>
+                        <a:t>Smith | Torrey </a:t>
+                      </a:r>
+                    </a:p>
+                  </a:txBody>
+                  <a:tcPr>
+                    <a:lnL w="12700" cap="flat" cmpd="sng" algn="ctr">
+                      <a:solidFill>
+                        <a:srgbClr val="000000"/>
+                      </a:solidFill>
+                      <a:prstDash val="solid"/>
+                      <a:round/>
+                      <a:headEnd type="none" w="med" len="med"/>
+                      <a:tailEnd type="none" w="med" len="med"/>
+                    </a:lnL>
+                    <a:lnR w="12700" cap="flat" cmpd="sng" algn="ctr">
+                      <a:solidFill>
+                        <a:srgbClr val="000000"/>
+                      </a:solidFill>
+                      <a:prstDash val="solid"/>
+                      <a:round/>
+                      <a:headEnd type="none" w="med" len="med"/>
+                      <a:tailEnd type="none" w="med" len="med"/>
+                    </a:lnR>
+                    <a:lnT w="12700" cap="flat" cmpd="sng" algn="ctr">
+                      <a:solidFill>
+                        <a:srgbClr val="000000"/>
+                      </a:solidFill>
+                      <a:prstDash val="solid"/>
+                      <a:round/>
+                      <a:headEnd type="none" w="med" len="med"/>
+                      <a:tailEnd type="none" w="med" len="med"/>
+                    </a:lnT>
+                    <a:lnB w="12700" cap="flat" cmpd="sng" algn="ctr">
+                      <a:solidFill>
+                        <a:srgbClr val="000000"/>
+                      </a:solidFill>
+                      <a:prstDash val="solid"/>
+                      <a:round/>
+                      <a:headEnd type="none" w="med" len="med"/>
+                      <a:tailEnd type="none" w="med" len="med"/>
+                    </a:lnB>
+                  </a:tcPr>
+                </a:tc>
+                <a:tc>
+                  <a:txBody>
+                    <a:bodyPr/>
+                    <a:lstStyle/>
+                    <a:p>
+                      <a:r>
+                        <a:rPr lang="en-US" sz="1400" dirty="0"/>
+                        <a:t>Johnson | Calvin     </a:t>
+                      </a:r>
+                    </a:p>
+                    <a:p>
+                      <a:r>
+                        <a:rPr lang="en-US" sz="1400" dirty="0"/>
+                        <a:t>Fitzgerald | Larry   </a:t>
+                      </a:r>
+                    </a:p>
+                    <a:p>
+                      <a:r>
+                        <a:rPr lang="en-US" sz="1400" dirty="0"/>
+                        <a:t>Johnson | Andre      </a:t>
+                      </a:r>
+                    </a:p>
+                    <a:p>
+                      <a:r>
+                        <a:rPr lang="en-US" sz="1400" dirty="0"/>
+                        <a:t>White | </a:t>
+                      </a:r>
+                      <a:r>
+                        <a:rPr lang="en-US" sz="1400" dirty="0" err="1"/>
+                        <a:t>Roddy</a:t>
+                      </a:r>
+                      <a:r>
+                        <a:rPr lang="en-US" sz="1400" dirty="0"/>
+                        <a:t>        </a:t>
+                      </a:r>
+                    </a:p>
+                    <a:p>
+                      <a:r>
+                        <a:rPr lang="en-US" sz="1400" dirty="0"/>
+                        <a:t>Jennings | Greg      </a:t>
+                      </a:r>
+                    </a:p>
+                    <a:p>
+                      <a:r>
+                        <a:rPr lang="en-US" sz="1400" dirty="0"/>
+                        <a:t>Wallace | Mike       </a:t>
+                      </a:r>
+                    </a:p>
+                    <a:p>
+                      <a:r>
+                        <a:rPr lang="en-US" sz="1400" dirty="0"/>
+                        <a:t>Welker | Wes         </a:t>
+                      </a:r>
+                    </a:p>
+                    <a:p>
+                      <a:r>
+                        <a:rPr lang="en-US" sz="1400" dirty="0"/>
+                        <a:t>Nicks | Hakeem       </a:t>
+                      </a:r>
+                    </a:p>
+                    <a:p>
+                      <a:r>
+                        <a:rPr lang="en-US" sz="1400" dirty="0"/>
+                        <a:t>Green | A.J.         </a:t>
+                      </a:r>
+                    </a:p>
+                    <a:p>
+                      <a:r>
+                        <a:rPr lang="en-US" sz="1400" dirty="0"/>
+                        <a:t>Cruz | Victor        </a:t>
+                      </a:r>
+                    </a:p>
+                    <a:p>
+                      <a:r>
+                        <a:rPr lang="en-US" sz="1400" dirty="0"/>
+                        <a:t>Jones | Julio        </a:t>
+                      </a:r>
+                    </a:p>
+                    <a:p>
+                      <a:r>
+                        <a:rPr lang="en-US" sz="1400" dirty="0"/>
+                        <a:t>Marshall | Brandon   </a:t>
+                      </a:r>
+                    </a:p>
+                    <a:p>
+                      <a:r>
+                        <a:rPr lang="en-US" sz="1400" dirty="0"/>
+                        <a:t>Nelson | </a:t>
+                      </a:r>
+                      <a:r>
+                        <a:rPr lang="en-US" sz="1400" dirty="0" err="1"/>
+                        <a:t>Jordy</a:t>
+                      </a:r>
+                      <a:r>
+                        <a:rPr lang="en-US" sz="1400" dirty="0"/>
+                        <a:t>       </a:t>
+                      </a:r>
+                    </a:p>
+                    <a:p>
+                      <a:r>
+                        <a:rPr lang="en-US" sz="1400" dirty="0"/>
+                        <a:t>Smith | Steve (Car)  </a:t>
+                      </a:r>
+                    </a:p>
+                    <a:p>
+                      <a:r>
+                        <a:rPr lang="en-US" sz="1400" dirty="0"/>
+                        <a:t>Bryant | </a:t>
+                      </a:r>
+                      <a:r>
+                        <a:rPr lang="en-US" sz="1400" dirty="0" err="1"/>
+                        <a:t>Dez</a:t>
+                      </a:r>
+                      <a:r>
+                        <a:rPr lang="en-US" sz="1400" dirty="0"/>
+                        <a:t>         </a:t>
+                      </a:r>
+                    </a:p>
+                    <a:p>
+                      <a:r>
+                        <a:rPr lang="en-US" sz="1400" dirty="0" err="1"/>
+                        <a:t>Colston</a:t>
+                      </a:r>
+                      <a:r>
+                        <a:rPr lang="en-US" sz="1400" dirty="0"/>
+                        <a:t> | Marques    </a:t>
+                      </a:r>
+                    </a:p>
+                    <a:p>
+                      <a:r>
+                        <a:rPr lang="en-US" sz="1400" dirty="0"/>
+                        <a:t>Lloyd | Brandon      </a:t>
+                      </a:r>
+                    </a:p>
+                    <a:p>
+                      <a:r>
+                        <a:rPr lang="en-US" sz="1400" dirty="0"/>
+                        <a:t>Jackson | Vincent    </a:t>
+                      </a:r>
+                    </a:p>
+                    <a:p>
+                      <a:r>
+                        <a:rPr lang="en-US" sz="1400" dirty="0" err="1"/>
+                        <a:t>Harvin</a:t>
+                      </a:r>
+                      <a:r>
+                        <a:rPr lang="en-US" sz="1400" dirty="0"/>
+                        <a:t> | Percy       </a:t>
+                      </a:r>
+                    </a:p>
+                    <a:p>
+                      <a:r>
+                        <a:rPr lang="en-US" sz="1400" dirty="0"/>
+                        <a:t>Bowe | Dwayne        </a:t>
+                      </a:r>
+                    </a:p>
+                    <a:p>
+                      <a:r>
+                        <a:rPr lang="en-US" sz="1400" dirty="0" err="1"/>
+                        <a:t>Maclin</a:t>
+                      </a:r>
+                      <a:r>
+                        <a:rPr lang="en-US" sz="1400" dirty="0"/>
+                        <a:t> | Jeremy      </a:t>
+                      </a:r>
+                    </a:p>
+                    <a:p>
+                      <a:r>
+                        <a:rPr lang="en-US" sz="1400" dirty="0"/>
+                        <a:t>Johnson | Steve      </a:t>
+                      </a:r>
+                    </a:p>
+                    <a:p>
+                      <a:r>
+                        <a:rPr lang="en-US" sz="1400" dirty="0"/>
+                        <a:t>Austin | Miles       </a:t>
+                      </a:r>
+                    </a:p>
+                    <a:p>
+                      <a:r>
+                        <a:rPr lang="en-US" sz="1400" dirty="0"/>
+                        <a:t>Thomas | </a:t>
+                      </a:r>
+                      <a:r>
+                        <a:rPr lang="en-US" sz="1400" dirty="0" err="1"/>
+                        <a:t>Demaryius</a:t>
+                      </a:r>
+                      <a:r>
+                        <a:rPr lang="en-US" sz="1400" dirty="0"/>
+                        <a:t>   </a:t>
+                      </a:r>
+                    </a:p>
+                    <a:p>
+                      <a:r>
+                        <a:rPr lang="en-US" sz="1400" dirty="0"/>
+                        <a:t>Brown | Antonio      </a:t>
+                      </a:r>
+                    </a:p>
+                    <a:p>
+                      <a:r>
+                        <a:rPr lang="en-US" sz="1400" dirty="0"/>
+                        <a:t>Decker | Eric        </a:t>
+                      </a:r>
+                    </a:p>
+                    <a:p>
+                      <a:r>
+                        <a:rPr lang="en-US" sz="1400" dirty="0"/>
+                        <a:t>Jackson | </a:t>
+                      </a:r>
+                      <a:r>
+                        <a:rPr lang="en-US" sz="1400" dirty="0" err="1"/>
+                        <a:t>DeSean</a:t>
+                      </a:r>
+                      <a:r>
+                        <a:rPr lang="en-US" sz="1400" dirty="0"/>
+                        <a:t>     </a:t>
+                      </a:r>
+                    </a:p>
+                    <a:p>
+                      <a:r>
+                        <a:rPr lang="en-US" sz="1400" dirty="0" err="1"/>
+                        <a:t>Meachem</a:t>
+                      </a:r>
+                      <a:r>
+                        <a:rPr lang="en-US" sz="1400" dirty="0"/>
+                        <a:t> | Robert     </a:t>
+                      </a:r>
+                    </a:p>
+                    <a:p>
+                      <a:r>
+                        <a:rPr lang="en-US" sz="1400" dirty="0"/>
+                        <a:t>Garcon | Pierre      </a:t>
+                      </a:r>
+                    </a:p>
+                    <a:p>
+                      <a:r>
+                        <a:rPr lang="en-US" sz="1400" dirty="0"/>
+                        <a:t>Smith | Torrey </a:t>
+                      </a:r>
+                    </a:p>
+                  </a:txBody>
+                  <a:tcPr>
+                    <a:lnL w="12700" cap="flat" cmpd="sng" algn="ctr">
+                      <a:solidFill>
+                        <a:srgbClr val="000000"/>
+                      </a:solidFill>
+                      <a:prstDash val="solid"/>
+                      <a:round/>
+                      <a:headEnd type="none" w="med" len="med"/>
+                      <a:tailEnd type="none" w="med" len="med"/>
+                    </a:lnL>
+                    <a:lnR w="12700" cap="flat" cmpd="sng" algn="ctr">
+                      <a:solidFill>
+                        <a:srgbClr val="000000"/>
+                      </a:solidFill>
+                      <a:prstDash val="solid"/>
+                      <a:round/>
+                      <a:headEnd type="none" w="med" len="med"/>
+                      <a:tailEnd type="none" w="med" len="med"/>
+                    </a:lnR>
+                    <a:lnT w="12700" cap="flat" cmpd="sng" algn="ctr">
+                      <a:solidFill>
+                        <a:srgbClr val="000000"/>
+                      </a:solidFill>
+                      <a:prstDash val="solid"/>
+                      <a:round/>
+                      <a:headEnd type="none" w="med" len="med"/>
+                      <a:tailEnd type="none" w="med" len="med"/>
+                    </a:lnT>
+                    <a:lnB w="12700" cap="flat" cmpd="sng" algn="ctr">
+                      <a:solidFill>
+                        <a:srgbClr val="000000"/>
+                      </a:solidFill>
+                      <a:prstDash val="solid"/>
+                      <a:round/>
+                      <a:headEnd type="none" w="med" len="med"/>
+                      <a:tailEnd type="none" w="med" len="med"/>
+                    </a:lnB>
+                  </a:tcPr>
+                </a:tc>
+                <a:tc>
+                  <a:txBody>
+                    <a:bodyPr/>
+                    <a:lstStyle/>
+                    <a:p>
+                      <a:r>
+                        <a:rPr lang="en-US" sz="1400" dirty="0"/>
+                        <a:t>Johnson | Calvin     </a:t>
+                      </a:r>
+                    </a:p>
+                    <a:p>
+                      <a:r>
+                        <a:rPr lang="en-US" sz="1400" dirty="0"/>
+                        <a:t>Fitzgerald | Larry   </a:t>
+                      </a:r>
+                    </a:p>
+                    <a:p>
+                      <a:r>
+                        <a:rPr lang="en-US" sz="1400" dirty="0"/>
+                        <a:t>Jennings | Greg      </a:t>
+                      </a:r>
+                    </a:p>
+                    <a:p>
+                      <a:r>
+                        <a:rPr lang="en-US" sz="1400" dirty="0"/>
+                        <a:t>White | Roddy        </a:t>
+                      </a:r>
+                    </a:p>
+                    <a:p>
+                      <a:r>
+                        <a:rPr lang="en-US" sz="1400" dirty="0"/>
+                        <a:t>Cruz | Victor        </a:t>
+                      </a:r>
+                    </a:p>
+                    <a:p>
+                      <a:r>
+                        <a:rPr lang="en-US" sz="1400" dirty="0"/>
+                        <a:t>Johnson | Andre      </a:t>
+                      </a:r>
+                    </a:p>
+                    <a:p>
+                      <a:r>
+                        <a:rPr lang="en-US" sz="1400" dirty="0"/>
+                        <a:t>Marshall | Brandon   </a:t>
+                      </a:r>
+                    </a:p>
+                    <a:p>
+                      <a:r>
+                        <a:rPr lang="en-US" sz="1400" dirty="0"/>
+                        <a:t>Green | A.J.         </a:t>
+                      </a:r>
+                    </a:p>
+                    <a:p>
+                      <a:r>
+                        <a:rPr lang="en-US" sz="1400" dirty="0"/>
+                        <a:t>Wallace | Mike       </a:t>
+                      </a:r>
+                    </a:p>
+                    <a:p>
+                      <a:r>
+                        <a:rPr lang="en-US" sz="1400" dirty="0"/>
+                        <a:t>Jones | Julio        </a:t>
+                      </a:r>
+                    </a:p>
+                    <a:p>
+                      <a:r>
+                        <a:rPr lang="en-US" sz="1400" dirty="0"/>
+                        <a:t>Welker | Wes         </a:t>
+                      </a:r>
+                    </a:p>
+                    <a:p>
+                      <a:r>
+                        <a:rPr lang="en-US" sz="1400" dirty="0"/>
+                        <a:t>Nelson | Jordy       </a:t>
+                      </a:r>
+                    </a:p>
+                    <a:p>
+                      <a:r>
+                        <a:rPr lang="en-US" sz="1400" dirty="0"/>
+                        <a:t>Smith | Steve (Car)  </a:t>
+                      </a:r>
+                    </a:p>
+                    <a:p>
+                      <a:r>
+                        <a:rPr lang="en-US" sz="1400" dirty="0"/>
+                        <a:t>Nicks | Hakeem       </a:t>
+                      </a:r>
+                    </a:p>
+                    <a:p>
+                      <a:r>
+                        <a:rPr lang="en-US" sz="1400" dirty="0"/>
+                        <a:t>Austin | Miles       </a:t>
+                      </a:r>
+                    </a:p>
+                    <a:p>
+                      <a:r>
+                        <a:rPr lang="en-US" sz="1400" dirty="0"/>
+                        <a:t>Thomas | Demaryius   </a:t>
+                      </a:r>
+                    </a:p>
+                    <a:p>
+                      <a:r>
+                        <a:rPr lang="en-US" sz="1400" dirty="0"/>
+                        <a:t>Colston | Marques    </a:t>
+                      </a:r>
+                    </a:p>
+                    <a:p>
+                      <a:r>
+                        <a:rPr lang="en-US" sz="1400" dirty="0"/>
+                        <a:t>Maclin | Jeremy      </a:t>
+                      </a:r>
+                    </a:p>
+                    <a:p>
+                      <a:r>
+                        <a:rPr lang="en-US" sz="1400" dirty="0"/>
+                        <a:t>Harvin | Percy       </a:t>
+                      </a:r>
+                    </a:p>
+                    <a:p>
+                      <a:r>
+                        <a:rPr lang="en-US" sz="1400" dirty="0"/>
+                        <a:t>Bryant | Dez         </a:t>
+                      </a:r>
+                    </a:p>
+                    <a:p>
+                      <a:r>
+                        <a:rPr lang="en-US" sz="1400" dirty="0"/>
+                        <a:t>Bowe | Dwayne        </a:t>
+                      </a:r>
+                    </a:p>
+                    <a:p>
+                      <a:r>
+                        <a:rPr lang="en-US" sz="1400" dirty="0"/>
+                        <a:t>Lloyd | Brandon      </a:t>
+                      </a:r>
+                    </a:p>
+                    <a:p>
+                      <a:r>
+                        <a:rPr lang="en-US" sz="1400" dirty="0"/>
+                        <a:t>Britt | Kenny        </a:t>
+                      </a:r>
+                    </a:p>
+                    <a:p>
+                      <a:r>
+                        <a:rPr lang="en-US" sz="1400" dirty="0"/>
+                        <a:t>Johnson | Steve      </a:t>
+                      </a:r>
+                    </a:p>
+                    <a:p>
+                      <a:r>
+                        <a:rPr lang="en-US" sz="1400" dirty="0"/>
+                        <a:t>Jackson | Vincent    </a:t>
+                      </a:r>
+                    </a:p>
+                    <a:p>
+                      <a:r>
+                        <a:rPr lang="en-US" sz="1400" dirty="0"/>
+                        <a:t>Jackson | DeSean     </a:t>
+                      </a:r>
+                    </a:p>
+                    <a:p>
+                      <a:r>
+                        <a:rPr lang="en-US" sz="1400" dirty="0"/>
+                        <a:t>Brown | Antonio      </a:t>
+                      </a:r>
+                    </a:p>
+                    <a:p>
+                      <a:r>
+                        <a:rPr lang="en-US" sz="1400" dirty="0"/>
+                        <a:t>Decker | Eric        </a:t>
+                      </a:r>
+                    </a:p>
+                    <a:p>
+                      <a:r>
+                        <a:rPr lang="en-US" sz="1400" dirty="0"/>
+                        <a:t>Smith | Torrey       </a:t>
+                      </a:r>
+                    </a:p>
+                    <a:p>
+                      <a:r>
+                        <a:rPr lang="en-US" sz="1400" dirty="0"/>
+                        <a:t>Meachem | Robert</a:t>
+                      </a:r>
+                    </a:p>
+                  </a:txBody>
+                  <a:tcPr>
+                    <a:lnL w="12700" cap="flat" cmpd="sng" algn="ctr">
+                      <a:solidFill>
+                        <a:srgbClr val="000000"/>
+                      </a:solidFill>
+                      <a:prstDash val="solid"/>
+                      <a:round/>
+                      <a:headEnd type="none" w="med" len="med"/>
+                      <a:tailEnd type="none" w="med" len="med"/>
+                    </a:lnL>
+                    <a:lnR w="12700" cap="flat" cmpd="sng" algn="ctr">
+                      <a:solidFill>
+                        <a:srgbClr val="000000"/>
+                      </a:solidFill>
+                      <a:prstDash val="solid"/>
+                      <a:round/>
+                      <a:headEnd type="none" w="med" len="med"/>
+                      <a:tailEnd type="none" w="med" len="med"/>
+                    </a:lnR>
+                    <a:lnT w="12700" cap="flat" cmpd="sng" algn="ctr">
+                      <a:solidFill>
+                        <a:srgbClr val="000000"/>
+                      </a:solidFill>
+                      <a:prstDash val="solid"/>
+                      <a:round/>
+                      <a:headEnd type="none" w="med" len="med"/>
+                      <a:tailEnd type="none" w="med" len="med"/>
+                    </a:lnT>
+                    <a:lnB w="12700" cap="flat" cmpd="sng" algn="ctr">
+                      <a:solidFill>
+                        <a:srgbClr val="000000"/>
+                      </a:solidFill>
+                      <a:prstDash val="solid"/>
+                      <a:round/>
+                      <a:headEnd type="none" w="med" len="med"/>
+                      <a:tailEnd type="none" w="med" len="med"/>
+                    </a:lnB>
+                  </a:tcPr>
+                </a:tc>
+              </a:tr>
+            </a:tbl>
+          </a:graphicData>
+        </a:graphic>
+      </p:graphicFrame>
+      <p:sp>
+        <p:nvSpPr>
+          <p:cNvPr id="75" name="TextBox 74"/>
+          <p:cNvSpPr txBox="1"/>
+          <p:nvPr/>
+        </p:nvSpPr>
+        <p:spPr>
+          <a:xfrm>
+            <a:off x="29239773" y="26987915"/>
+            <a:ext cx="8150942" cy="338554"/>
+          </a:xfrm>
+          <a:prstGeom prst="rect">
+            <a:avLst/>
+          </a:prstGeom>
+          <a:noFill/>
+        </p:spPr>
+        <p:txBody>
+          <a:bodyPr wrap="square" rtlCol="0">
+            <a:spAutoFit/>
+          </a:bodyPr>
+          <a:lstStyle/>
+          <a:p>
+            <a:pPr algn="ctr"/>
+            <a:r>
+              <a:rPr lang="en-US" sz="1600" dirty="0"/>
+              <a:t>Figure 11: Final outputs compared. Using PCA Regression would have beat ESPN and Yahoo in 2012.</a:t>
+            </a:r>
+          </a:p>
+        </p:txBody>
+      </p:sp>
+      <p:sp>
+        <p:nvSpPr>
+          <p:cNvPr id="76" name="TextBox 75"/>
+          <p:cNvSpPr txBox="1"/>
+          <p:nvPr/>
+        </p:nvSpPr>
+        <p:spPr>
+          <a:xfrm>
+            <a:off x="29209455" y="28380930"/>
+            <a:ext cx="8166101" cy="3970318"/>
+          </a:xfrm>
+          <a:prstGeom prst="rect">
+            <a:avLst/>
+          </a:prstGeom>
+          <a:noFill/>
+        </p:spPr>
+        <p:txBody>
+          <a:bodyPr wrap="square" rtlCol="0">
+            <a:spAutoFit/>
+          </a:bodyPr>
+          <a:lstStyle/>
+          <a:p>
+            <a:pPr marL="342900" indent="-342900" algn="just">
+              <a:buFont typeface="+mj-lt"/>
+              <a:buAutoNum type="arabicParenR"/>
+            </a:pPr>
+            <a:r>
+              <a:rPr lang="en-US" sz="1400" dirty="0">
+                <a:latin typeface="+mn-lt"/>
+                <a:cs typeface=""/>
+              </a:rPr>
+              <a:t>“Fantasy Football Homepage.” ESPN.com. 2007 – 2012.</a:t>
+            </a:r>
+          </a:p>
+          <a:p>
+            <a:pPr marL="342900" indent="-342900" algn="just">
+              <a:buFont typeface="+mj-lt"/>
+              <a:buAutoNum type="arabicParenR"/>
+            </a:pPr>
+            <a:r>
+              <a:rPr lang="en-US" sz="1400" dirty="0">
+                <a:latin typeface="+mn-lt"/>
+                <a:cs typeface=""/>
+              </a:rPr>
+              <a:t>“Fantasy Football Homepage.” Yahoo.com. 2007 – 2012.</a:t>
+            </a:r>
+          </a:p>
+          <a:p>
+            <a:pPr marL="342900" indent="-342900" algn="just">
+              <a:buFont typeface="+mj-lt"/>
+              <a:buAutoNum type="arabicParenR"/>
+            </a:pPr>
+            <a:r>
+              <a:rPr lang="en-US" sz="1400" dirty="0">
+                <a:latin typeface="+mn-lt"/>
+                <a:cs typeface=""/>
+              </a:rPr>
+              <a:t>Kapina, Nitin. “Predicting Fantasy Football Performance With Machine Learning Techniques.” Final Project for Andrew Ng’s AI Course. December 14, 2012.</a:t>
+            </a:r>
+          </a:p>
+          <a:p>
+            <a:pPr marL="342900" indent="-342900" algn="just">
+              <a:buFont typeface="+mj-lt"/>
+              <a:buAutoNum type="arabicParenR"/>
+            </a:pPr>
+            <a:r>
+              <a:rPr lang="en-US" sz="1400" dirty="0">
+                <a:latin typeface="+mn-lt"/>
+                <a:cs typeface=""/>
+              </a:rPr>
+              <a:t>Mathews, Tim, et. al. “Competing with Humans at Fantasy Football: Team Formation in Large Partially-Observable Domain.” Association for the Advancement of Artificial Intelligence, 2012.</a:t>
+            </a:r>
+          </a:p>
+          <a:p>
+            <a:pPr marL="342900" indent="-342900" algn="just">
+              <a:buFont typeface="+mj-lt"/>
+              <a:buAutoNum type="arabicParenR"/>
+            </a:pPr>
+            <a:r>
+              <a:rPr lang="en-US" sz="1400" dirty="0">
+                <a:latin typeface="+mn-lt"/>
+                <a:cs typeface=""/>
+              </a:rPr>
+              <a:t>Farquhar, Lee, et. al. “Types of Fantasy Sports Users and Their Motivations.” Journal of Computer-Mediated Communication, 2007.</a:t>
+            </a:r>
+          </a:p>
+          <a:p>
+            <a:pPr marL="342900" indent="-342900" algn="just">
+              <a:buFont typeface="+mj-lt"/>
+              <a:buAutoNum type="arabicParenR"/>
+            </a:pPr>
+            <a:r>
+              <a:rPr lang="en-US" sz="1400" dirty="0">
+                <a:latin typeface="+mn-lt"/>
+                <a:cs typeface=""/>
+              </a:rPr>
+              <a:t>Wood, Frank. “Principle Component Analysis.” Tutorial PDF. December 2009.</a:t>
+            </a:r>
+          </a:p>
+          <a:p>
+            <a:pPr marL="342900" indent="-342900" algn="just">
+              <a:buFont typeface="+mj-lt"/>
+              <a:buAutoNum type="arabicParenR"/>
+            </a:pPr>
+            <a:r>
+              <a:rPr lang="en-US" sz="1400" dirty="0">
+                <a:latin typeface="+mn-lt"/>
+                <a:cs typeface=""/>
+              </a:rPr>
+              <a:t>Torres-Reyna, Oscar. “Linear Regression, version 6.0” Data and Statistical Services, Princeton University.</a:t>
+            </a:r>
+          </a:p>
+          <a:p>
+            <a:pPr marL="342900" indent="-342900" algn="just">
+              <a:buFont typeface="+mj-lt"/>
+              <a:buAutoNum type="arabicParenR"/>
+            </a:pPr>
+            <a:r>
+              <a:rPr lang="en-US" sz="1400" dirty="0">
+                <a:latin typeface="+mn-lt"/>
+                <a:cs typeface=""/>
+              </a:rPr>
+              <a:t>Rasmussen, Carl Edward. “The Infinite Gaussian Mixture Model.” Advances in Neural Information Processing Systems, 2012.</a:t>
+            </a:r>
+          </a:p>
+          <a:p>
+            <a:pPr marL="342900" indent="-342900" algn="just">
+              <a:buFont typeface="+mj-lt"/>
+              <a:buAutoNum type="arabicParenR"/>
+            </a:pPr>
+            <a:r>
+              <a:rPr lang="en-US" sz="1400" dirty="0">
+                <a:latin typeface="+mn-lt"/>
+                <a:cs typeface=""/>
+              </a:rPr>
+              <a:t>McLachlan, G. J., et. al. “A mixture model-based approach to the clustering of microarray expression data.” Bioinformatics, 2001.</a:t>
+            </a:r>
+          </a:p>
+          <a:p>
+            <a:pPr marL="342900" indent="-342900" algn="just">
+              <a:buFont typeface="+mj-lt"/>
+              <a:buAutoNum type="arabicParenR"/>
+            </a:pPr>
+            <a:r>
+              <a:rPr lang="en-US" sz="1400" dirty="0">
+                <a:latin typeface="+mn-lt"/>
+                <a:cs typeface=""/>
+              </a:rPr>
+              <a:t>Steinbach, Michael, et. al. “A Comparison of Document Clustering Techniques.” Technical Report, University of Minnesota. May 2000.</a:t>
+            </a:r>
+          </a:p>
+          <a:p>
+            <a:pPr marL="342900" indent="-342900" algn="just">
+              <a:buFont typeface="+mj-lt"/>
+              <a:buAutoNum type="arabicParenR"/>
+            </a:pPr>
+            <a:endParaRPr lang="en-US" sz="1400" dirty="0">
+              <a:latin typeface="+mn-lt"/>
+              <a:cs typeface=""/>
+            </a:endParaRPr>
           </a:p>
         </p:txBody>
       </p:sp>

</xml_diff>

<commit_message>
page 3 of paper done
</commit_message>
<xml_diff>
--- a/poster/jpo4_poster.pptx
+++ b/poster/jpo4_poster.pptx
@@ -462,7 +462,7 @@
     </p:spTree>
     <p:extLst>
       <p:ext uri="{BB962C8B-B14F-4D97-AF65-F5344CB8AC3E}">
-        <p14:creationId xmlns="" xmlns:a="http://schemas.openxmlformats.org/drawingml/2006/main" xmlns:r="http://schemas.openxmlformats.org/officeDocument/2006/relationships" xmlns:p="http://schemas.openxmlformats.org/presentationml/2006/main" xmlns:p14="http://schemas.microsoft.com/office/powerpoint/2010/main" xmlns:mv="urn:schemas-microsoft-com:mac:vml" xmlns:mc="http://schemas.openxmlformats.org/markup-compatibility/2006" val="2638942905"/>
+        <p14:creationId xmlns:mc="http://schemas.openxmlformats.org/markup-compatibility/2006" xmlns:mv="urn:schemas-microsoft-com:mac:vml" xmlns:p14="http://schemas.microsoft.com/office/powerpoint/2010/main" xmlns:p="http://schemas.openxmlformats.org/presentationml/2006/main" xmlns:r="http://schemas.openxmlformats.org/officeDocument/2006/relationships" xmlns:a="http://schemas.openxmlformats.org/drawingml/2006/main" xmlns="" val="2638942905"/>
       </p:ext>
     </p:extLst>
   </p:cSld>
@@ -7986,7 +7986,19 @@
               <a:rPr lang="en-US" sz="8600" b="1" dirty="0" smtClean="0">
                 <a:latin typeface="+mn-lt"/>
               </a:rPr>
-              <a:t>Predicting Fantasy Football Perfomances</a:t>
+              <a:t>Optimizing Preseason Fantasy </a:t>
+            </a:r>
+            <a:r>
+              <a:rPr lang="en-US" sz="8600" b="1" dirty="0" smtClean="0">
+                <a:latin typeface="+mn-lt"/>
+              </a:rPr>
+              <a:t>Football</a:t>
+            </a:r>
+            <a:r>
+              <a:rPr lang="en-US" sz="8600" b="1" dirty="0" smtClean="0">
+                <a:latin typeface="+mn-lt"/>
+              </a:rPr>
+              <a:t> Rankings</a:t>
             </a:r>
           </a:p>
           <a:p>
@@ -13137,7 +13149,56 @@
                 <a:latin typeface="+mn-lt"/>
                 <a:cs typeface=""/>
               </a:rPr>
-              <a:t> 	β = [ μ – μ </a:t>
+              <a:t> 	β = [ </a:t>
+            </a:r>
+            <a:r>
+              <a:rPr lang="en-US" sz="2000" dirty="0" smtClean="0">
+                <a:latin typeface="+mn-lt"/>
+                <a:cs typeface=""/>
+              </a:rPr>
+              <a:t>μ</a:t>
+            </a:r>
+            <a:r>
+              <a:rPr lang="en-US" sz="2000" baseline="-25000" dirty="0" smtClean="0">
+                <a:latin typeface="+mn-lt"/>
+                <a:cs typeface=""/>
+              </a:rPr>
+              <a:t>Y</a:t>
+            </a:r>
+            <a:r>
+              <a:rPr lang="en-US" sz="2000" dirty="0" smtClean="0">
+                <a:latin typeface="+mn-lt"/>
+                <a:cs typeface=""/>
+              </a:rPr>
+              <a:t> </a:t>
+            </a:r>
+            <a:r>
+              <a:rPr lang="en-US" sz="2000" dirty="0">
+                <a:latin typeface="+mn-lt"/>
+                <a:cs typeface=""/>
+              </a:rPr>
+              <a:t>– </a:t>
+            </a:r>
+            <a:r>
+              <a:rPr lang="en-US" sz="2000" dirty="0" smtClean="0">
+                <a:latin typeface="+mn-lt"/>
+                <a:cs typeface=""/>
+              </a:rPr>
+              <a:t>μ</a:t>
+            </a:r>
+            <a:r>
+              <a:rPr lang="en-US" sz="2000" baseline="-25000" dirty="0" smtClean="0">
+                <a:latin typeface="+mn-lt"/>
+                <a:cs typeface=""/>
+              </a:rPr>
+              <a:t>X</a:t>
+            </a:r>
+            <a:r>
+              <a:rPr lang="en-US" sz="2000" dirty="0" smtClean="0">
+                <a:latin typeface="+mn-lt"/>
+                <a:cs typeface=""/>
+              </a:rPr>
+              <a:t> </a:t>
             </a:r>
             <a:r>
               <a:rPr lang="en-US" sz="2000" dirty="0">

</xml_diff>